<commit_message>
Added relevant FT for new functionality of PasteToFit Slide
</commit_message>
<xml_diff>
--- a/doc/test/PasteLab/PasteLab.pptx
+++ b/doc/test/PasteLab/PasteLab.pptx
@@ -8,7 +8,7 @@
     <p:sldMasterId id="2147483684" r:id="rId4"/>
   </p:sldMasterIdLst>
   <p:notesMasterIdLst>
-    <p:notesMasterId r:id="rId29"/>
+    <p:notesMasterId r:id="rId38"/>
   </p:notesMasterIdLst>
   <p:sldIdLst>
     <p:sldId id="287" r:id="rId5"/>
@@ -35,6 +35,15 @@
     <p:sldId id="383" r:id="rId26"/>
     <p:sldId id="388" r:id="rId27"/>
     <p:sldId id="395" r:id="rId28"/>
+    <p:sldId id="403" r:id="rId29"/>
+    <p:sldId id="397" r:id="rId30"/>
+    <p:sldId id="404" r:id="rId31"/>
+    <p:sldId id="399" r:id="rId32"/>
+    <p:sldId id="405" r:id="rId33"/>
+    <p:sldId id="401" r:id="rId34"/>
+    <p:sldId id="406" r:id="rId35"/>
+    <p:sldId id="407" r:id="rId36"/>
+    <p:sldId id="408" r:id="rId37"/>
   </p:sldIdLst>
   <p:sldSz cx="9144000" cy="6858000" type="screen4x3"/>
   <p:notesSz cx="6858000" cy="9144000"/>
@@ -166,6 +175,15 @@
             <p14:sldId id="383"/>
             <p14:sldId id="388"/>
             <p14:sldId id="395"/>
+            <p14:sldId id="403"/>
+            <p14:sldId id="397"/>
+            <p14:sldId id="404"/>
+            <p14:sldId id="399"/>
+            <p14:sldId id="405"/>
+            <p14:sldId id="401"/>
+            <p14:sldId id="406"/>
+            <p14:sldId id="407"/>
+            <p14:sldId id="408"/>
           </p14:sldIdLst>
         </p14:section>
       </p14:sectionLst>
@@ -270,7 +288,7 @@
           <a:p>
             <a:fld id="{43E32005-3A63-48D2-8C73-BF5F95786EBD}" type="datetimeFigureOut">
               <a:rPr lang="en-US" smtClean="0"/>
-              <a:t>5/30/2017</a:t>
+              <a:t>2/10/2018</a:t>
             </a:fld>
             <a:endParaRPr lang="en-US"/>
           </a:p>
@@ -334,38 +352,37 @@
           <a:p>
             <a:pPr lvl="0"/>
             <a:r>
-              <a:rPr lang="en-US" smtClean="0"/>
+              <a:rPr lang="en-US"/>
               <a:t>Click to edit Master text styles</a:t>
             </a:r>
           </a:p>
           <a:p>
             <a:pPr lvl="1"/>
             <a:r>
-              <a:rPr lang="en-US" smtClean="0"/>
+              <a:rPr lang="en-US"/>
               <a:t>Second level</a:t>
             </a:r>
           </a:p>
           <a:p>
             <a:pPr lvl="2"/>
             <a:r>
-              <a:rPr lang="en-US" smtClean="0"/>
+              <a:rPr lang="en-US"/>
               <a:t>Third level</a:t>
             </a:r>
           </a:p>
           <a:p>
             <a:pPr lvl="3"/>
             <a:r>
-              <a:rPr lang="en-US" smtClean="0"/>
+              <a:rPr lang="en-US"/>
               <a:t>Fourth level</a:t>
             </a:r>
           </a:p>
           <a:p>
             <a:pPr lvl="4"/>
             <a:r>
-              <a:rPr lang="en-US" smtClean="0"/>
+              <a:rPr lang="en-US"/>
               <a:t>Fifth level</a:t>
             </a:r>
-            <a:endParaRPr lang="en-US"/>
           </a:p>
         </p:txBody>
       </p:sp>
@@ -583,10 +600,9 @@
           <a:lstStyle/>
           <a:p>
             <a:r>
-              <a:rPr lang="en-US" dirty="0" smtClean="0"/>
+              <a:rPr lang="en-US" dirty="0"/>
               <a:t>You can also cut by using ctrl-x</a:t>
             </a:r>
-            <a:endParaRPr lang="en-US" dirty="0"/>
           </a:p>
         </p:txBody>
       </p:sp>
@@ -671,10 +687,9 @@
           <a:lstStyle/>
           <a:p>
             <a:r>
-              <a:rPr lang="en-US" dirty="0" smtClean="0"/>
+              <a:rPr lang="en-US" dirty="0"/>
               <a:t>You can also cut by using ctrl-x</a:t>
             </a:r>
-            <a:endParaRPr lang="en-US" dirty="0"/>
           </a:p>
         </p:txBody>
       </p:sp>
@@ -759,11 +774,11 @@
           <a:lstStyle/>
           <a:p>
             <a:r>
-              <a:rPr lang="en-US" dirty="0" smtClean="0"/>
+              <a:rPr lang="en-US" dirty="0"/>
               <a:t>Original Shapes (1 image) and 1 black</a:t>
             </a:r>
             <a:r>
-              <a:rPr lang="en-US" baseline="0" dirty="0" smtClean="0"/>
+              <a:rPr lang="en-US" baseline="0" dirty="0"/>
               <a:t> square</a:t>
             </a:r>
             <a:endParaRPr lang="en-US" dirty="0"/>
@@ -851,11 +866,11 @@
           <a:lstStyle/>
           <a:p>
             <a:r>
-              <a:rPr lang="en-US" dirty="0" smtClean="0"/>
+              <a:rPr lang="en-US" dirty="0"/>
               <a:t>Expected. Paste To</a:t>
             </a:r>
             <a:r>
-              <a:rPr lang="en-US" baseline="0" dirty="0" smtClean="0"/>
+              <a:rPr lang="en-US" baseline="0" dirty="0"/>
               <a:t> Cursor Position at the center of the black square</a:t>
             </a:r>
             <a:endParaRPr lang="en-US" dirty="0"/>
@@ -943,11 +958,11 @@
           <a:lstStyle/>
           <a:p>
             <a:r>
-              <a:rPr lang="en-US" dirty="0" smtClean="0"/>
+              <a:rPr lang="en-US" dirty="0"/>
               <a:t>Original Shapes (1 image) and 1 black</a:t>
             </a:r>
             <a:r>
-              <a:rPr lang="en-US" baseline="0" dirty="0" smtClean="0"/>
+              <a:rPr lang="en-US" baseline="0" dirty="0"/>
               <a:t> square</a:t>
             </a:r>
             <a:endParaRPr lang="en-US" dirty="0"/>
@@ -1035,11 +1050,11 @@
           <a:lstStyle/>
           <a:p>
             <a:r>
-              <a:rPr lang="en-US" dirty="0" smtClean="0"/>
+              <a:rPr lang="en-US" dirty="0"/>
               <a:t>Expected. Paste To</a:t>
             </a:r>
             <a:r>
-              <a:rPr lang="en-US" baseline="0" dirty="0" smtClean="0"/>
+              <a:rPr lang="en-US" baseline="0" dirty="0"/>
               <a:t> Original Position.</a:t>
             </a:r>
             <a:endParaRPr lang="en-US" dirty="0"/>
@@ -1127,10 +1142,9 @@
           <a:lstStyle/>
           <a:p>
             <a:r>
-              <a:rPr lang="en-US" dirty="0" smtClean="0"/>
+              <a:rPr lang="en-US" dirty="0"/>
               <a:t>You can also cut by using ctrl-x</a:t>
             </a:r>
-            <a:endParaRPr lang="en-US" dirty="0"/>
           </a:p>
         </p:txBody>
       </p:sp>
@@ -1215,11 +1229,11 @@
           <a:lstStyle/>
           <a:p>
             <a:r>
-              <a:rPr lang="en-US" dirty="0" smtClean="0"/>
+              <a:rPr lang="en-US" dirty="0"/>
               <a:t>Original</a:t>
             </a:r>
             <a:r>
-              <a:rPr lang="en-US" baseline="0" dirty="0" smtClean="0"/>
+              <a:rPr lang="en-US" baseline="0" dirty="0"/>
               <a:t> Shapes 3 colored squares and a buildings image</a:t>
             </a:r>
             <a:endParaRPr lang="en-US" dirty="0"/>
@@ -1307,11 +1321,11 @@
           <a:lstStyle/>
           <a:p>
             <a:r>
-              <a:rPr lang="en-US" dirty="0" smtClean="0"/>
+              <a:rPr lang="en-US" dirty="0"/>
               <a:t>Expected.</a:t>
             </a:r>
             <a:r>
-              <a:rPr lang="en-US" baseline="0" dirty="0" smtClean="0"/>
+              <a:rPr lang="en-US" baseline="0" dirty="0"/>
               <a:t> Cut the building image and right click the green square and select Replace With Clipboard.</a:t>
             </a:r>
           </a:p>
@@ -1398,29 +1412,29 @@
           <a:lstStyle/>
           <a:p>
             <a:r>
-              <a:rPr lang="en-US" dirty="0" smtClean="0"/>
+              <a:rPr lang="en-US" dirty="0"/>
               <a:t>Original</a:t>
             </a:r>
             <a:r>
-              <a:rPr lang="en-US" baseline="0" dirty="0" smtClean="0"/>
+              <a:rPr lang="en-US" baseline="0" dirty="0"/>
               <a:t> Shapes</a:t>
             </a:r>
             <a:r>
-              <a:rPr lang="en-US" dirty="0" smtClean="0"/>
+              <a:rPr lang="en-US" dirty="0"/>
               <a:t> 3 colored squares that are merged into a group and building</a:t>
             </a:r>
             <a:r>
-              <a:rPr lang="en-US" baseline="0" dirty="0" smtClean="0"/>
+              <a:rPr lang="en-US" baseline="0" dirty="0"/>
               <a:t> image</a:t>
             </a:r>
           </a:p>
           <a:p>
             <a:r>
-              <a:rPr lang="en-US" dirty="0" smtClean="0"/>
+              <a:rPr lang="en-US" dirty="0"/>
               <a:t>The grou</a:t>
             </a:r>
             <a:r>
-              <a:rPr lang="en-US" baseline="0" dirty="0" smtClean="0"/>
+              <a:rPr lang="en-US" baseline="0" dirty="0"/>
               <a:t>p of 3 colored squares have an appear animation</a:t>
             </a:r>
             <a:endParaRPr lang="en-US" dirty="0"/>
@@ -1508,32 +1522,28 @@
           <a:lstStyle/>
           <a:p>
             <a:r>
-              <a:rPr lang="en-US" dirty="0" smtClean="0"/>
+              <a:rPr lang="en-US" dirty="0"/>
               <a:t>Expected. Cut the building image and Replace With Clipboard</a:t>
             </a:r>
             <a:r>
-              <a:rPr lang="en-US" baseline="0" dirty="0" smtClean="0"/>
+              <a:rPr lang="en-US" baseline="0" dirty="0"/>
               <a:t> using the green square.</a:t>
             </a:r>
           </a:p>
           <a:p>
             <a:r>
-              <a:rPr lang="en-US" dirty="0" smtClean="0"/>
+              <a:rPr lang="en-US" dirty="0"/>
               <a:t>The group remains and picture is at</a:t>
             </a:r>
             <a:r>
-              <a:rPr lang="en-US" baseline="0" dirty="0" smtClean="0"/>
+              <a:rPr lang="en-US" baseline="0" dirty="0"/>
               <a:t> the green square’s position.</a:t>
             </a:r>
             <a:r>
               <a:rPr lang="en-US" b="0" baseline="0" dirty="0"/>
-              <a:t> </a:t>
-            </a:r>
-            <a:r>
-              <a:rPr lang="en-US" b="0" baseline="0" dirty="0" smtClean="0"/>
-              <a:t>Note that the group should still retain its animation</a:t>
-            </a:r>
-            <a:endParaRPr lang="en-US" baseline="0" dirty="0" smtClean="0"/>
+              <a:t> Note that the group should still retain its animation</a:t>
+            </a:r>
+            <a:endParaRPr lang="en-US" baseline="0" dirty="0"/>
           </a:p>
         </p:txBody>
       </p:sp>
@@ -1618,10 +1628,9 @@
           <a:lstStyle/>
           <a:p>
             <a:r>
-              <a:rPr lang="en-US" dirty="0" smtClean="0"/>
+              <a:rPr lang="en-US" dirty="0"/>
               <a:t>Original Shapes (1 image)</a:t>
             </a:r>
-            <a:endParaRPr lang="en-US" dirty="0"/>
           </a:p>
         </p:txBody>
       </p:sp>
@@ -1706,22 +1715,21 @@
           <a:lstStyle/>
           <a:p>
             <a:r>
-              <a:rPr lang="en-US" dirty="0" smtClean="0"/>
+              <a:rPr lang="en-US" dirty="0"/>
               <a:t>You can also cut by using ctrl-x</a:t>
             </a:r>
           </a:p>
           <a:p>
             <a:r>
-              <a:rPr lang="en-US" dirty="0" smtClean="0"/>
+              <a:rPr lang="en-US" dirty="0"/>
               <a:t>You can also copy by using ctrl-c</a:t>
             </a:r>
           </a:p>
           <a:p>
             <a:r>
-              <a:rPr lang="en-US" dirty="0" smtClean="0"/>
+              <a:rPr lang="en-US" dirty="0"/>
               <a:t>Use cut or copy depending on the instructions</a:t>
             </a:r>
-            <a:endParaRPr lang="en-US" dirty="0"/>
           </a:p>
         </p:txBody>
       </p:sp>
@@ -1806,19 +1814,19 @@
           <a:lstStyle/>
           <a:p>
             <a:r>
-              <a:rPr lang="en-US" dirty="0" smtClean="0"/>
+              <a:rPr lang="en-US" dirty="0"/>
               <a:t>Original</a:t>
             </a:r>
             <a:r>
-              <a:rPr lang="en-US" baseline="0" dirty="0" smtClean="0"/>
+              <a:rPr lang="en-US" baseline="0" dirty="0"/>
               <a:t> Shapes</a:t>
             </a:r>
             <a:r>
-              <a:rPr lang="en-US" dirty="0" smtClean="0"/>
+              <a:rPr lang="en-US" dirty="0"/>
               <a:t> 3 colored squares that are merged into a group and building</a:t>
             </a:r>
             <a:r>
-              <a:rPr lang="en-US" baseline="0" dirty="0" smtClean="0"/>
+              <a:rPr lang="en-US" baseline="0" dirty="0"/>
               <a:t> image</a:t>
             </a:r>
           </a:p>
@@ -1841,17 +1849,17 @@
               <a:defRPr/>
             </a:pPr>
             <a:r>
-              <a:rPr lang="en-US" dirty="0" smtClean="0"/>
+              <a:rPr lang="en-US" dirty="0"/>
               <a:t>The grou</a:t>
             </a:r>
             <a:r>
-              <a:rPr lang="en-US" baseline="0" dirty="0" smtClean="0"/>
+              <a:rPr lang="en-US" baseline="0" dirty="0"/>
               <a:t>p of 3 colored squares have an appear animation</a:t>
             </a:r>
-            <a:endParaRPr lang="en-US" dirty="0" smtClean="0"/>
-          </a:p>
-          <a:p>
-            <a:endParaRPr lang="en-US" baseline="0" dirty="0" smtClean="0"/>
+            <a:endParaRPr lang="en-US" dirty="0"/>
+          </a:p>
+          <a:p>
+            <a:endParaRPr lang="en-US" baseline="0" dirty="0"/>
           </a:p>
         </p:txBody>
       </p:sp>
@@ -1936,39 +1944,39 @@
           <a:lstStyle/>
           <a:p>
             <a:r>
-              <a:rPr lang="en-US" dirty="0" smtClean="0"/>
+              <a:rPr lang="en-US" dirty="0"/>
               <a:t>Expected. Cut the building image and Paste Into Group </a:t>
             </a:r>
             <a:r>
-              <a:rPr lang="en-US" baseline="0" dirty="0" smtClean="0"/>
+              <a:rPr lang="en-US" baseline="0" dirty="0"/>
               <a:t>on the group of 3 colored squares</a:t>
             </a:r>
           </a:p>
           <a:p>
             <a:r>
-              <a:rPr lang="en-US" dirty="0" smtClean="0"/>
+              <a:rPr lang="en-US" dirty="0"/>
               <a:t>The image</a:t>
             </a:r>
             <a:r>
-              <a:rPr lang="en-US" baseline="0" dirty="0" smtClean="0"/>
+              <a:rPr lang="en-US" baseline="0" dirty="0"/>
               <a:t> should be in the center of </a:t>
             </a:r>
             <a:r>
-              <a:rPr lang="en-US" baseline="0" smtClean="0"/>
+              <a:rPr lang="en-US" baseline="0"/>
               <a:t>the group.</a:t>
             </a:r>
             <a:r>
-              <a:rPr lang="en-US" b="0" baseline="0" smtClean="0"/>
+              <a:rPr lang="en-US" b="0" baseline="0"/>
               <a:t> </a:t>
             </a:r>
             <a:r>
-              <a:rPr lang="en-US" b="0" baseline="0" dirty="0" smtClean="0"/>
+              <a:rPr lang="en-US" b="0" baseline="0" dirty="0"/>
               <a:t>Note that the group should still retain its animation</a:t>
             </a:r>
-            <a:endParaRPr lang="en-US" baseline="0" dirty="0" smtClean="0"/>
-          </a:p>
-          <a:p>
-            <a:endParaRPr lang="en-US" baseline="0" dirty="0" smtClean="0"/>
+            <a:endParaRPr lang="en-US" baseline="0" dirty="0"/>
+          </a:p>
+          <a:p>
+            <a:endParaRPr lang="en-US" baseline="0" dirty="0"/>
           </a:p>
         </p:txBody>
       </p:sp>
@@ -1999,6 +2007,688 @@
     <p:extLst>
       <p:ext uri="{BB962C8B-B14F-4D97-AF65-F5344CB8AC3E}">
         <p14:creationId xmlns:p14="http://schemas.microsoft.com/office/powerpoint/2010/main" val="1944604826"/>
+      </p:ext>
+    </p:extLst>
+  </p:cSld>
+  <p:clrMapOvr>
+    <a:masterClrMapping/>
+  </p:clrMapOvr>
+</p:notes>
+</file>
+
+<file path=ppt/notesSlides/notesSlide23.xml><?xml version="1.0" encoding="utf-8"?>
+<p:notes xmlns:a="http://schemas.openxmlformats.org/drawingml/2006/main" xmlns:r="http://schemas.openxmlformats.org/officeDocument/2006/relationships" xmlns:p="http://schemas.openxmlformats.org/presentationml/2006/main">
+  <p:cSld>
+    <p:spTree>
+      <p:nvGrpSpPr>
+        <p:cNvPr id="1" name=""/>
+        <p:cNvGrpSpPr/>
+        <p:nvPr/>
+      </p:nvGrpSpPr>
+      <p:grpSpPr>
+        <a:xfrm>
+          <a:off x="0" y="0"/>
+          <a:ext cx="0" cy="0"/>
+          <a:chOff x="0" y="0"/>
+          <a:chExt cx="0" cy="0"/>
+        </a:xfrm>
+      </p:grpSpPr>
+      <p:sp>
+        <p:nvSpPr>
+          <p:cNvPr id="2" name="Slide Image Placeholder 1"/>
+          <p:cNvSpPr>
+            <a:spLocks noGrp="1" noRot="1" noChangeAspect="1"/>
+          </p:cNvSpPr>
+          <p:nvPr>
+            <p:ph type="sldImg"/>
+          </p:nvPr>
+        </p:nvSpPr>
+        <p:spPr/>
+      </p:sp>
+      <p:sp>
+        <p:nvSpPr>
+          <p:cNvPr id="3" name="Notes Placeholder 2"/>
+          <p:cNvSpPr>
+            <a:spLocks noGrp="1"/>
+          </p:cNvSpPr>
+          <p:nvPr>
+            <p:ph type="body" idx="1"/>
+          </p:nvPr>
+        </p:nvSpPr>
+        <p:spPr/>
+        <p:txBody>
+          <a:bodyPr/>
+          <a:lstStyle/>
+          <a:p>
+            <a:r>
+              <a:rPr lang="en-US" dirty="0"/>
+              <a:t>You can also cut by using ctrl-x</a:t>
+            </a:r>
+          </a:p>
+        </p:txBody>
+      </p:sp>
+      <p:sp>
+        <p:nvSpPr>
+          <p:cNvPr id="4" name="Slide Number Placeholder 3"/>
+          <p:cNvSpPr>
+            <a:spLocks noGrp="1"/>
+          </p:cNvSpPr>
+          <p:nvPr>
+            <p:ph type="sldNum" sz="quarter" idx="10"/>
+          </p:nvPr>
+        </p:nvSpPr>
+        <p:spPr/>
+        <p:txBody>
+          <a:bodyPr/>
+          <a:lstStyle/>
+          <a:p>
+            <a:pPr marL="0" marR="0" lvl="0" indent="0" algn="r" defTabSz="914400" rtl="0" eaLnBrk="1" fontAlgn="auto" latinLnBrk="0" hangingPunct="1">
+              <a:lnSpc>
+                <a:spcPct val="100000"/>
+              </a:lnSpc>
+              <a:spcBef>
+                <a:spcPts val="0"/>
+              </a:spcBef>
+              <a:spcAft>
+                <a:spcPts val="0"/>
+              </a:spcAft>
+              <a:buClrTx/>
+              <a:buSzTx/>
+              <a:buFontTx/>
+              <a:buNone/>
+              <a:tabLst/>
+              <a:defRPr/>
+            </a:pPr>
+            <a:fld id="{0FE7C38A-472B-4221-8E00-509E1DA863EC}" type="slidenum">
+              <a:rPr kumimoji="0" lang="en-US" sz="1200" b="0" i="0" u="none" strike="noStrike" kern="1200" cap="none" spc="0" normalizeH="0" baseline="0" noProof="0" smtClean="0">
+                <a:ln>
+                  <a:noFill/>
+                </a:ln>
+                <a:solidFill>
+                  <a:prstClr val="black"/>
+                </a:solidFill>
+                <a:effectLst/>
+                <a:uLnTx/>
+                <a:uFillTx/>
+                <a:latin typeface="Calibri" panose="020F0502020204030204"/>
+                <a:ea typeface="+mn-ea"/>
+                <a:cs typeface="+mn-cs"/>
+              </a:rPr>
+              <a:pPr marL="0" marR="0" lvl="0" indent="0" algn="r" defTabSz="914400" rtl="0" eaLnBrk="1" fontAlgn="auto" latinLnBrk="0" hangingPunct="1">
+                <a:lnSpc>
+                  <a:spcPct val="100000"/>
+                </a:lnSpc>
+                <a:spcBef>
+                  <a:spcPts val="0"/>
+                </a:spcBef>
+                <a:spcAft>
+                  <a:spcPts val="0"/>
+                </a:spcAft>
+                <a:buClrTx/>
+                <a:buSzTx/>
+                <a:buFontTx/>
+                <a:buNone/>
+                <a:tabLst/>
+                <a:defRPr/>
+              </a:pPr>
+              <a:t>25</a:t>
+            </a:fld>
+            <a:endParaRPr kumimoji="0" lang="en-US" sz="1200" b="0" i="0" u="none" strike="noStrike" kern="1200" cap="none" spc="0" normalizeH="0" baseline="0" noProof="0">
+              <a:ln>
+                <a:noFill/>
+              </a:ln>
+              <a:solidFill>
+                <a:prstClr val="black"/>
+              </a:solidFill>
+              <a:effectLst/>
+              <a:uLnTx/>
+              <a:uFillTx/>
+              <a:latin typeface="Calibri" panose="020F0502020204030204"/>
+              <a:ea typeface="+mn-ea"/>
+              <a:cs typeface="+mn-cs"/>
+            </a:endParaRPr>
+          </a:p>
+        </p:txBody>
+      </p:sp>
+    </p:spTree>
+    <p:extLst>
+      <p:ext uri="{BB962C8B-B14F-4D97-AF65-F5344CB8AC3E}">
+        <p14:creationId xmlns:p14="http://schemas.microsoft.com/office/powerpoint/2010/main" val="871116934"/>
+      </p:ext>
+    </p:extLst>
+  </p:cSld>
+  <p:clrMapOvr>
+    <a:masterClrMapping/>
+  </p:clrMapOvr>
+</p:notes>
+</file>
+
+<file path=ppt/notesSlides/notesSlide24.xml><?xml version="1.0" encoding="utf-8"?>
+<p:notes xmlns:a="http://schemas.openxmlformats.org/drawingml/2006/main" xmlns:r="http://schemas.openxmlformats.org/officeDocument/2006/relationships" xmlns:p="http://schemas.openxmlformats.org/presentationml/2006/main">
+  <p:cSld>
+    <p:spTree>
+      <p:nvGrpSpPr>
+        <p:cNvPr id="1" name=""/>
+        <p:cNvGrpSpPr/>
+        <p:nvPr/>
+      </p:nvGrpSpPr>
+      <p:grpSpPr>
+        <a:xfrm>
+          <a:off x="0" y="0"/>
+          <a:ext cx="0" cy="0"/>
+          <a:chOff x="0" y="0"/>
+          <a:chExt cx="0" cy="0"/>
+        </a:xfrm>
+      </p:grpSpPr>
+      <p:sp>
+        <p:nvSpPr>
+          <p:cNvPr id="2" name="Slide Image Placeholder 1"/>
+          <p:cNvSpPr>
+            <a:spLocks noGrp="1" noRot="1" noChangeAspect="1"/>
+          </p:cNvSpPr>
+          <p:nvPr>
+            <p:ph type="sldImg"/>
+          </p:nvPr>
+        </p:nvSpPr>
+        <p:spPr/>
+      </p:sp>
+      <p:sp>
+        <p:nvSpPr>
+          <p:cNvPr id="3" name="Notes Placeholder 2"/>
+          <p:cNvSpPr>
+            <a:spLocks noGrp="1"/>
+          </p:cNvSpPr>
+          <p:nvPr>
+            <p:ph type="body" idx="1"/>
+          </p:nvPr>
+        </p:nvSpPr>
+        <p:spPr/>
+        <p:txBody>
+          <a:bodyPr/>
+          <a:lstStyle/>
+          <a:p>
+            <a:r>
+              <a:rPr lang="en-US" dirty="0"/>
+              <a:t>Original Shapes (1 image)</a:t>
+            </a:r>
+          </a:p>
+        </p:txBody>
+      </p:sp>
+      <p:sp>
+        <p:nvSpPr>
+          <p:cNvPr id="4" name="Slide Number Placeholder 3"/>
+          <p:cNvSpPr>
+            <a:spLocks noGrp="1"/>
+          </p:cNvSpPr>
+          <p:nvPr>
+            <p:ph type="sldNum" sz="quarter" idx="10"/>
+          </p:nvPr>
+        </p:nvSpPr>
+        <p:spPr/>
+        <p:txBody>
+          <a:bodyPr/>
+          <a:lstStyle/>
+          <a:p>
+            <a:fld id="{0FE7C38A-472B-4221-8E00-509E1DA863EC}" type="slidenum">
+              <a:rPr lang="en-US" smtClean="0"/>
+              <a:t>26</a:t>
+            </a:fld>
+            <a:endParaRPr lang="en-US"/>
+          </a:p>
+        </p:txBody>
+      </p:sp>
+    </p:spTree>
+    <p:extLst>
+      <p:ext uri="{BB962C8B-B14F-4D97-AF65-F5344CB8AC3E}">
+        <p14:creationId xmlns:p14="http://schemas.microsoft.com/office/powerpoint/2010/main" val="1634132822"/>
+      </p:ext>
+    </p:extLst>
+  </p:cSld>
+  <p:clrMapOvr>
+    <a:masterClrMapping/>
+  </p:clrMapOvr>
+</p:notes>
+</file>
+
+<file path=ppt/notesSlides/notesSlide25.xml><?xml version="1.0" encoding="utf-8"?>
+<p:notes xmlns:a="http://schemas.openxmlformats.org/drawingml/2006/main" xmlns:r="http://schemas.openxmlformats.org/officeDocument/2006/relationships" xmlns:p="http://schemas.openxmlformats.org/presentationml/2006/main">
+  <p:cSld>
+    <p:spTree>
+      <p:nvGrpSpPr>
+        <p:cNvPr id="1" name=""/>
+        <p:cNvGrpSpPr/>
+        <p:nvPr/>
+      </p:nvGrpSpPr>
+      <p:grpSpPr>
+        <a:xfrm>
+          <a:off x="0" y="0"/>
+          <a:ext cx="0" cy="0"/>
+          <a:chOff x="0" y="0"/>
+          <a:chExt cx="0" cy="0"/>
+        </a:xfrm>
+      </p:grpSpPr>
+      <p:sp>
+        <p:nvSpPr>
+          <p:cNvPr id="2" name="Slide Image Placeholder 1"/>
+          <p:cNvSpPr>
+            <a:spLocks noGrp="1" noRot="1" noChangeAspect="1"/>
+          </p:cNvSpPr>
+          <p:nvPr>
+            <p:ph type="sldImg"/>
+          </p:nvPr>
+        </p:nvSpPr>
+        <p:spPr/>
+      </p:sp>
+      <p:sp>
+        <p:nvSpPr>
+          <p:cNvPr id="3" name="Notes Placeholder 2"/>
+          <p:cNvSpPr>
+            <a:spLocks noGrp="1"/>
+          </p:cNvSpPr>
+          <p:nvPr>
+            <p:ph type="body" idx="1"/>
+          </p:nvPr>
+        </p:nvSpPr>
+        <p:spPr/>
+        <p:txBody>
+          <a:bodyPr/>
+          <a:lstStyle/>
+          <a:p>
+            <a:r>
+              <a:rPr lang="en-US" dirty="0"/>
+              <a:t>Expected.</a:t>
+            </a:r>
+            <a:r>
+              <a:rPr lang="en-US" baseline="0" dirty="0"/>
+              <a:t> </a:t>
+            </a:r>
+            <a:r>
+              <a:rPr lang="en-US" dirty="0"/>
+              <a:t>The image should fit the slide as much as possible while maintain aspect ratio</a:t>
+            </a:r>
+          </a:p>
+        </p:txBody>
+      </p:sp>
+      <p:sp>
+        <p:nvSpPr>
+          <p:cNvPr id="4" name="Slide Number Placeholder 3"/>
+          <p:cNvSpPr>
+            <a:spLocks noGrp="1"/>
+          </p:cNvSpPr>
+          <p:nvPr>
+            <p:ph type="sldNum" sz="quarter" idx="10"/>
+          </p:nvPr>
+        </p:nvSpPr>
+        <p:spPr/>
+        <p:txBody>
+          <a:bodyPr/>
+          <a:lstStyle/>
+          <a:p>
+            <a:fld id="{0FE7C38A-472B-4221-8E00-509E1DA863EC}" type="slidenum">
+              <a:rPr lang="en-US" smtClean="0"/>
+              <a:t>27</a:t>
+            </a:fld>
+            <a:endParaRPr lang="en-US"/>
+          </a:p>
+        </p:txBody>
+      </p:sp>
+    </p:spTree>
+    <p:extLst>
+      <p:ext uri="{BB962C8B-B14F-4D97-AF65-F5344CB8AC3E}">
+        <p14:creationId xmlns:p14="http://schemas.microsoft.com/office/powerpoint/2010/main" val="176876081"/>
+      </p:ext>
+    </p:extLst>
+  </p:cSld>
+  <p:clrMapOvr>
+    <a:masterClrMapping/>
+  </p:clrMapOvr>
+</p:notes>
+</file>
+
+<file path=ppt/notesSlides/notesSlide26.xml><?xml version="1.0" encoding="utf-8"?>
+<p:notes xmlns:a="http://schemas.openxmlformats.org/drawingml/2006/main" xmlns:r="http://schemas.openxmlformats.org/officeDocument/2006/relationships" xmlns:p="http://schemas.openxmlformats.org/presentationml/2006/main">
+  <p:cSld>
+    <p:spTree>
+      <p:nvGrpSpPr>
+        <p:cNvPr id="1" name=""/>
+        <p:cNvGrpSpPr/>
+        <p:nvPr/>
+      </p:nvGrpSpPr>
+      <p:grpSpPr>
+        <a:xfrm>
+          <a:off x="0" y="0"/>
+          <a:ext cx="0" cy="0"/>
+          <a:chOff x="0" y="0"/>
+          <a:chExt cx="0" cy="0"/>
+        </a:xfrm>
+      </p:grpSpPr>
+      <p:sp>
+        <p:nvSpPr>
+          <p:cNvPr id="2" name="Slide Image Placeholder 1"/>
+          <p:cNvSpPr>
+            <a:spLocks noGrp="1" noRot="1" noChangeAspect="1"/>
+          </p:cNvSpPr>
+          <p:nvPr>
+            <p:ph type="sldImg"/>
+          </p:nvPr>
+        </p:nvSpPr>
+        <p:spPr/>
+      </p:sp>
+      <p:sp>
+        <p:nvSpPr>
+          <p:cNvPr id="3" name="Notes Placeholder 2"/>
+          <p:cNvSpPr>
+            <a:spLocks noGrp="1"/>
+          </p:cNvSpPr>
+          <p:nvPr>
+            <p:ph type="body" idx="1"/>
+          </p:nvPr>
+        </p:nvSpPr>
+        <p:spPr/>
+        <p:txBody>
+          <a:bodyPr/>
+          <a:lstStyle/>
+          <a:p>
+            <a:r>
+              <a:rPr lang="en-US" dirty="0"/>
+              <a:t>Original Shapes (1 image, rotated)</a:t>
+            </a:r>
+          </a:p>
+        </p:txBody>
+      </p:sp>
+      <p:sp>
+        <p:nvSpPr>
+          <p:cNvPr id="4" name="Slide Number Placeholder 3"/>
+          <p:cNvSpPr>
+            <a:spLocks noGrp="1"/>
+          </p:cNvSpPr>
+          <p:nvPr>
+            <p:ph type="sldNum" sz="quarter" idx="10"/>
+          </p:nvPr>
+        </p:nvSpPr>
+        <p:spPr/>
+        <p:txBody>
+          <a:bodyPr/>
+          <a:lstStyle/>
+          <a:p>
+            <a:fld id="{0FE7C38A-472B-4221-8E00-509E1DA863EC}" type="slidenum">
+              <a:rPr lang="en-US" smtClean="0"/>
+              <a:t>28</a:t>
+            </a:fld>
+            <a:endParaRPr lang="en-US"/>
+          </a:p>
+        </p:txBody>
+      </p:sp>
+    </p:spTree>
+    <p:extLst>
+      <p:ext uri="{BB962C8B-B14F-4D97-AF65-F5344CB8AC3E}">
+        <p14:creationId xmlns:p14="http://schemas.microsoft.com/office/powerpoint/2010/main" val="3505935701"/>
+      </p:ext>
+    </p:extLst>
+  </p:cSld>
+  <p:clrMapOvr>
+    <a:masterClrMapping/>
+  </p:clrMapOvr>
+</p:notes>
+</file>
+
+<file path=ppt/notesSlides/notesSlide27.xml><?xml version="1.0" encoding="utf-8"?>
+<p:notes xmlns:a="http://schemas.openxmlformats.org/drawingml/2006/main" xmlns:r="http://schemas.openxmlformats.org/officeDocument/2006/relationships" xmlns:p="http://schemas.openxmlformats.org/presentationml/2006/main">
+  <p:cSld>
+    <p:spTree>
+      <p:nvGrpSpPr>
+        <p:cNvPr id="1" name=""/>
+        <p:cNvGrpSpPr/>
+        <p:nvPr/>
+      </p:nvGrpSpPr>
+      <p:grpSpPr>
+        <a:xfrm>
+          <a:off x="0" y="0"/>
+          <a:ext cx="0" cy="0"/>
+          <a:chOff x="0" y="0"/>
+          <a:chExt cx="0" cy="0"/>
+        </a:xfrm>
+      </p:grpSpPr>
+      <p:sp>
+        <p:nvSpPr>
+          <p:cNvPr id="2" name="Slide Image Placeholder 1"/>
+          <p:cNvSpPr>
+            <a:spLocks noGrp="1" noRot="1" noChangeAspect="1"/>
+          </p:cNvSpPr>
+          <p:nvPr>
+            <p:ph type="sldImg"/>
+          </p:nvPr>
+        </p:nvSpPr>
+        <p:spPr/>
+      </p:sp>
+      <p:sp>
+        <p:nvSpPr>
+          <p:cNvPr id="3" name="Notes Placeholder 2"/>
+          <p:cNvSpPr>
+            <a:spLocks noGrp="1"/>
+          </p:cNvSpPr>
+          <p:nvPr>
+            <p:ph type="body" idx="1"/>
+          </p:nvPr>
+        </p:nvSpPr>
+        <p:spPr/>
+        <p:txBody>
+          <a:bodyPr/>
+          <a:lstStyle/>
+          <a:p>
+            <a:r>
+              <a:rPr lang="en-US" dirty="0"/>
+              <a:t>Expected. The Image should fit the slide while maintaining aspect ratio while rotated</a:t>
+            </a:r>
+          </a:p>
+        </p:txBody>
+      </p:sp>
+      <p:sp>
+        <p:nvSpPr>
+          <p:cNvPr id="4" name="Slide Number Placeholder 3"/>
+          <p:cNvSpPr>
+            <a:spLocks noGrp="1"/>
+          </p:cNvSpPr>
+          <p:nvPr>
+            <p:ph type="sldNum" sz="quarter" idx="10"/>
+          </p:nvPr>
+        </p:nvSpPr>
+        <p:spPr/>
+        <p:txBody>
+          <a:bodyPr/>
+          <a:lstStyle/>
+          <a:p>
+            <a:fld id="{0FE7C38A-472B-4221-8E00-509E1DA863EC}" type="slidenum">
+              <a:rPr lang="en-US" smtClean="0"/>
+              <a:t>29</a:t>
+            </a:fld>
+            <a:endParaRPr lang="en-US"/>
+          </a:p>
+        </p:txBody>
+      </p:sp>
+    </p:spTree>
+    <p:extLst>
+      <p:ext uri="{BB962C8B-B14F-4D97-AF65-F5344CB8AC3E}">
+        <p14:creationId xmlns:p14="http://schemas.microsoft.com/office/powerpoint/2010/main" val="2354417099"/>
+      </p:ext>
+    </p:extLst>
+  </p:cSld>
+  <p:clrMapOvr>
+    <a:masterClrMapping/>
+  </p:clrMapOvr>
+</p:notes>
+</file>
+
+<file path=ppt/notesSlides/notesSlide28.xml><?xml version="1.0" encoding="utf-8"?>
+<p:notes xmlns:a="http://schemas.openxmlformats.org/drawingml/2006/main" xmlns:r="http://schemas.openxmlformats.org/officeDocument/2006/relationships" xmlns:p="http://schemas.openxmlformats.org/presentationml/2006/main">
+  <p:cSld>
+    <p:spTree>
+      <p:nvGrpSpPr>
+        <p:cNvPr id="1" name=""/>
+        <p:cNvGrpSpPr/>
+        <p:nvPr/>
+      </p:nvGrpSpPr>
+      <p:grpSpPr>
+        <a:xfrm>
+          <a:off x="0" y="0"/>
+          <a:ext cx="0" cy="0"/>
+          <a:chOff x="0" y="0"/>
+          <a:chExt cx="0" cy="0"/>
+        </a:xfrm>
+      </p:grpSpPr>
+      <p:sp>
+        <p:nvSpPr>
+          <p:cNvPr id="2" name="Slide Image Placeholder 1"/>
+          <p:cNvSpPr>
+            <a:spLocks noGrp="1" noRot="1" noChangeAspect="1"/>
+          </p:cNvSpPr>
+          <p:nvPr>
+            <p:ph type="sldImg"/>
+          </p:nvPr>
+        </p:nvSpPr>
+        <p:spPr/>
+      </p:sp>
+      <p:sp>
+        <p:nvSpPr>
+          <p:cNvPr id="3" name="Notes Placeholder 2"/>
+          <p:cNvSpPr>
+            <a:spLocks noGrp="1"/>
+          </p:cNvSpPr>
+          <p:nvPr>
+            <p:ph type="body" idx="1"/>
+          </p:nvPr>
+        </p:nvSpPr>
+        <p:spPr/>
+        <p:txBody>
+          <a:bodyPr/>
+          <a:lstStyle/>
+          <a:p>
+            <a:r>
+              <a:rPr lang="en-US" dirty="0"/>
+              <a:t>Original Shapes (2 image)</a:t>
+            </a:r>
+          </a:p>
+        </p:txBody>
+      </p:sp>
+      <p:sp>
+        <p:nvSpPr>
+          <p:cNvPr id="4" name="Slide Number Placeholder 3"/>
+          <p:cNvSpPr>
+            <a:spLocks noGrp="1"/>
+          </p:cNvSpPr>
+          <p:nvPr>
+            <p:ph type="sldNum" sz="quarter" idx="10"/>
+          </p:nvPr>
+        </p:nvSpPr>
+        <p:spPr/>
+        <p:txBody>
+          <a:bodyPr/>
+          <a:lstStyle/>
+          <a:p>
+            <a:fld id="{0FE7C38A-472B-4221-8E00-509E1DA863EC}" type="slidenum">
+              <a:rPr lang="en-US" smtClean="0"/>
+              <a:t>30</a:t>
+            </a:fld>
+            <a:endParaRPr lang="en-US"/>
+          </a:p>
+        </p:txBody>
+      </p:sp>
+    </p:spTree>
+    <p:extLst>
+      <p:ext uri="{BB962C8B-B14F-4D97-AF65-F5344CB8AC3E}">
+        <p14:creationId xmlns:p14="http://schemas.microsoft.com/office/powerpoint/2010/main" val="755037131"/>
+      </p:ext>
+    </p:extLst>
+  </p:cSld>
+  <p:clrMapOvr>
+    <a:masterClrMapping/>
+  </p:clrMapOvr>
+</p:notes>
+</file>
+
+<file path=ppt/notesSlides/notesSlide29.xml><?xml version="1.0" encoding="utf-8"?>
+<p:notes xmlns:a="http://schemas.openxmlformats.org/drawingml/2006/main" xmlns:r="http://schemas.openxmlformats.org/officeDocument/2006/relationships" xmlns:p="http://schemas.openxmlformats.org/presentationml/2006/main">
+  <p:cSld>
+    <p:spTree>
+      <p:nvGrpSpPr>
+        <p:cNvPr id="1" name=""/>
+        <p:cNvGrpSpPr/>
+        <p:nvPr/>
+      </p:nvGrpSpPr>
+      <p:grpSpPr>
+        <a:xfrm>
+          <a:off x="0" y="0"/>
+          <a:ext cx="0" cy="0"/>
+          <a:chOff x="0" y="0"/>
+          <a:chExt cx="0" cy="0"/>
+        </a:xfrm>
+      </p:grpSpPr>
+      <p:sp>
+        <p:nvSpPr>
+          <p:cNvPr id="2" name="Slide Image Placeholder 1"/>
+          <p:cNvSpPr>
+            <a:spLocks noGrp="1" noRot="1" noChangeAspect="1"/>
+          </p:cNvSpPr>
+          <p:nvPr>
+            <p:ph type="sldImg"/>
+          </p:nvPr>
+        </p:nvSpPr>
+        <p:spPr/>
+      </p:sp>
+      <p:sp>
+        <p:nvSpPr>
+          <p:cNvPr id="3" name="Notes Placeholder 2"/>
+          <p:cNvSpPr>
+            <a:spLocks noGrp="1"/>
+          </p:cNvSpPr>
+          <p:nvPr>
+            <p:ph type="body" idx="1"/>
+          </p:nvPr>
+        </p:nvSpPr>
+        <p:spPr/>
+        <p:txBody>
+          <a:bodyPr/>
+          <a:lstStyle/>
+          <a:p>
+            <a:r>
+              <a:rPr lang="en-US" dirty="0"/>
+              <a:t>Expected. After multi-selection, the images are combined</a:t>
+            </a:r>
+            <a:r>
+              <a:rPr lang="en-US" baseline="0" dirty="0"/>
+              <a:t> into 1 and are stretched to fit the slide while maintaining aspect ratio</a:t>
+            </a:r>
+            <a:endParaRPr lang="en-US" dirty="0"/>
+          </a:p>
+        </p:txBody>
+      </p:sp>
+      <p:sp>
+        <p:nvSpPr>
+          <p:cNvPr id="4" name="Slide Number Placeholder 3"/>
+          <p:cNvSpPr>
+            <a:spLocks noGrp="1"/>
+          </p:cNvSpPr>
+          <p:nvPr>
+            <p:ph type="sldNum" sz="quarter" idx="10"/>
+          </p:nvPr>
+        </p:nvSpPr>
+        <p:spPr/>
+        <p:txBody>
+          <a:bodyPr/>
+          <a:lstStyle/>
+          <a:p>
+            <a:fld id="{0FE7C38A-472B-4221-8E00-509E1DA863EC}" type="slidenum">
+              <a:rPr lang="en-US" smtClean="0"/>
+              <a:t>31</a:t>
+            </a:fld>
+            <a:endParaRPr lang="en-US"/>
+          </a:p>
+        </p:txBody>
+      </p:sp>
+    </p:spTree>
+    <p:extLst>
+      <p:ext uri="{BB962C8B-B14F-4D97-AF65-F5344CB8AC3E}">
+        <p14:creationId xmlns:p14="http://schemas.microsoft.com/office/powerpoint/2010/main" val="422598403"/>
       </p:ext>
     </p:extLst>
   </p:cSld>
@@ -2053,18 +2743,17 @@
           <a:lstStyle/>
           <a:p>
             <a:r>
-              <a:rPr lang="en-US" dirty="0" smtClean="0"/>
+              <a:rPr lang="en-US" dirty="0"/>
               <a:t>Expected.</a:t>
             </a:r>
             <a:r>
-              <a:rPr lang="en-US" baseline="0" dirty="0" smtClean="0"/>
+              <a:rPr lang="en-US" baseline="0" dirty="0"/>
               <a:t> </a:t>
             </a:r>
             <a:r>
-              <a:rPr lang="en-US" dirty="0" smtClean="0"/>
+              <a:rPr lang="en-US" dirty="0"/>
               <a:t>The image should be cropped at the slides</a:t>
             </a:r>
-            <a:endParaRPr lang="en-US" dirty="0"/>
           </a:p>
         </p:txBody>
       </p:sp>
@@ -2095,6 +2784,185 @@
     <p:extLst>
       <p:ext uri="{BB962C8B-B14F-4D97-AF65-F5344CB8AC3E}">
         <p14:creationId xmlns:p14="http://schemas.microsoft.com/office/powerpoint/2010/main" val="2965218628"/>
+      </p:ext>
+    </p:extLst>
+  </p:cSld>
+  <p:clrMapOvr>
+    <a:masterClrMapping/>
+  </p:clrMapOvr>
+</p:notes>
+</file>
+
+<file path=ppt/notesSlides/notesSlide30.xml><?xml version="1.0" encoding="utf-8"?>
+<p:notes xmlns:a="http://schemas.openxmlformats.org/drawingml/2006/main" xmlns:r="http://schemas.openxmlformats.org/officeDocument/2006/relationships" xmlns:p="http://schemas.openxmlformats.org/presentationml/2006/main">
+  <p:cSld>
+    <p:spTree>
+      <p:nvGrpSpPr>
+        <p:cNvPr id="1" name=""/>
+        <p:cNvGrpSpPr/>
+        <p:nvPr/>
+      </p:nvGrpSpPr>
+      <p:grpSpPr>
+        <a:xfrm>
+          <a:off x="0" y="0"/>
+          <a:ext cx="0" cy="0"/>
+          <a:chOff x="0" y="0"/>
+          <a:chExt cx="0" cy="0"/>
+        </a:xfrm>
+      </p:grpSpPr>
+      <p:sp>
+        <p:nvSpPr>
+          <p:cNvPr id="2" name="Slide Image Placeholder 1"/>
+          <p:cNvSpPr>
+            <a:spLocks noGrp="1" noRot="1" noChangeAspect="1"/>
+          </p:cNvSpPr>
+          <p:nvPr>
+            <p:ph type="sldImg"/>
+          </p:nvPr>
+        </p:nvSpPr>
+        <p:spPr/>
+      </p:sp>
+      <p:sp>
+        <p:nvSpPr>
+          <p:cNvPr id="3" name="Notes Placeholder 2"/>
+          <p:cNvSpPr>
+            <a:spLocks noGrp="1"/>
+          </p:cNvSpPr>
+          <p:nvPr>
+            <p:ph type="body" idx="1"/>
+          </p:nvPr>
+        </p:nvSpPr>
+        <p:spPr/>
+        <p:txBody>
+          <a:bodyPr/>
+          <a:lstStyle/>
+          <a:p>
+            <a:r>
+              <a:rPr lang="en-US" dirty="0"/>
+              <a:t>Original Shapes (1 group of 2 images)</a:t>
+            </a:r>
+          </a:p>
+        </p:txBody>
+      </p:sp>
+      <p:sp>
+        <p:nvSpPr>
+          <p:cNvPr id="4" name="Slide Number Placeholder 3"/>
+          <p:cNvSpPr>
+            <a:spLocks noGrp="1"/>
+          </p:cNvSpPr>
+          <p:nvPr>
+            <p:ph type="sldNum" sz="quarter" idx="10"/>
+          </p:nvPr>
+        </p:nvSpPr>
+        <p:spPr/>
+        <p:txBody>
+          <a:bodyPr/>
+          <a:lstStyle/>
+          <a:p>
+            <a:fld id="{0FE7C38A-472B-4221-8E00-509E1DA863EC}" type="slidenum">
+              <a:rPr lang="en-US" smtClean="0"/>
+              <a:t>32</a:t>
+            </a:fld>
+            <a:endParaRPr lang="en-US"/>
+          </a:p>
+        </p:txBody>
+      </p:sp>
+    </p:spTree>
+    <p:extLst>
+      <p:ext uri="{BB962C8B-B14F-4D97-AF65-F5344CB8AC3E}">
+        <p14:creationId xmlns:p14="http://schemas.microsoft.com/office/powerpoint/2010/main" val="2388754777"/>
+      </p:ext>
+    </p:extLst>
+  </p:cSld>
+  <p:clrMapOvr>
+    <a:masterClrMapping/>
+  </p:clrMapOvr>
+</p:notes>
+</file>
+
+<file path=ppt/notesSlides/notesSlide31.xml><?xml version="1.0" encoding="utf-8"?>
+<p:notes xmlns:a="http://schemas.openxmlformats.org/drawingml/2006/main" xmlns:r="http://schemas.openxmlformats.org/officeDocument/2006/relationships" xmlns:p="http://schemas.openxmlformats.org/presentationml/2006/main">
+  <p:cSld>
+    <p:spTree>
+      <p:nvGrpSpPr>
+        <p:cNvPr id="1" name=""/>
+        <p:cNvGrpSpPr/>
+        <p:nvPr/>
+      </p:nvGrpSpPr>
+      <p:grpSpPr>
+        <a:xfrm>
+          <a:off x="0" y="0"/>
+          <a:ext cx="0" cy="0"/>
+          <a:chOff x="0" y="0"/>
+          <a:chExt cx="0" cy="0"/>
+        </a:xfrm>
+      </p:grpSpPr>
+      <p:sp>
+        <p:nvSpPr>
+          <p:cNvPr id="2" name="Slide Image Placeholder 1"/>
+          <p:cNvSpPr>
+            <a:spLocks noGrp="1" noRot="1" noChangeAspect="1"/>
+          </p:cNvSpPr>
+          <p:nvPr>
+            <p:ph type="sldImg"/>
+          </p:nvPr>
+        </p:nvSpPr>
+        <p:spPr/>
+      </p:sp>
+      <p:sp>
+        <p:nvSpPr>
+          <p:cNvPr id="3" name="Notes Placeholder 2"/>
+          <p:cNvSpPr>
+            <a:spLocks noGrp="1"/>
+          </p:cNvSpPr>
+          <p:nvPr>
+            <p:ph type="body" idx="1"/>
+          </p:nvPr>
+        </p:nvSpPr>
+        <p:spPr/>
+        <p:txBody>
+          <a:bodyPr/>
+          <a:lstStyle/>
+          <a:p>
+            <a:r>
+              <a:rPr lang="en-US" dirty="0"/>
+              <a:t>Expected. The group is</a:t>
+            </a:r>
+            <a:r>
+              <a:rPr lang="en-US" baseline="0" dirty="0"/>
+              <a:t> stretched to fit the slide while maintaining aspect ratio</a:t>
+            </a:r>
+            <a:endParaRPr lang="en-US" dirty="0"/>
+          </a:p>
+        </p:txBody>
+      </p:sp>
+      <p:sp>
+        <p:nvSpPr>
+          <p:cNvPr id="4" name="Slide Number Placeholder 3"/>
+          <p:cNvSpPr>
+            <a:spLocks noGrp="1"/>
+          </p:cNvSpPr>
+          <p:nvPr>
+            <p:ph type="sldNum" sz="quarter" idx="10"/>
+          </p:nvPr>
+        </p:nvSpPr>
+        <p:spPr/>
+        <p:txBody>
+          <a:bodyPr/>
+          <a:lstStyle/>
+          <a:p>
+            <a:fld id="{0FE7C38A-472B-4221-8E00-509E1DA863EC}" type="slidenum">
+              <a:rPr lang="en-US" smtClean="0"/>
+              <a:t>33</a:t>
+            </a:fld>
+            <a:endParaRPr lang="en-US"/>
+          </a:p>
+        </p:txBody>
+      </p:sp>
+    </p:spTree>
+    <p:extLst>
+      <p:ext uri="{BB962C8B-B14F-4D97-AF65-F5344CB8AC3E}">
+        <p14:creationId xmlns:p14="http://schemas.microsoft.com/office/powerpoint/2010/main" val="846059797"/>
       </p:ext>
     </p:extLst>
   </p:cSld>
@@ -2149,10 +3017,9 @@
           <a:lstStyle/>
           <a:p>
             <a:r>
-              <a:rPr lang="en-US" dirty="0" smtClean="0"/>
+              <a:rPr lang="en-US" dirty="0"/>
               <a:t>Original Shapes (1 image, rotated)</a:t>
             </a:r>
-            <a:endParaRPr lang="en-US" dirty="0"/>
           </a:p>
         </p:txBody>
       </p:sp>
@@ -2237,11 +3104,11 @@
           <a:lstStyle/>
           <a:p>
             <a:r>
-              <a:rPr lang="en-US" dirty="0" smtClean="0"/>
+              <a:rPr lang="en-US" dirty="0"/>
               <a:t>Expected. The Image should be cropped</a:t>
             </a:r>
             <a:r>
-              <a:rPr lang="en-US" baseline="0" dirty="0" smtClean="0"/>
+              <a:rPr lang="en-US" baseline="0" dirty="0"/>
               <a:t> at the corners</a:t>
             </a:r>
             <a:endParaRPr lang="en-US" dirty="0"/>
@@ -2329,10 +3196,9 @@
           <a:lstStyle/>
           <a:p>
             <a:r>
-              <a:rPr lang="en-US" dirty="0" smtClean="0"/>
+              <a:rPr lang="en-US" dirty="0"/>
               <a:t>Original Shapes (2 image)</a:t>
             </a:r>
-            <a:endParaRPr lang="en-US" dirty="0"/>
           </a:p>
         </p:txBody>
       </p:sp>
@@ -2417,11 +3283,11 @@
           <a:lstStyle/>
           <a:p>
             <a:r>
-              <a:rPr lang="en-US" dirty="0" smtClean="0"/>
+              <a:rPr lang="en-US" dirty="0"/>
               <a:t>Expected. The images are combined</a:t>
             </a:r>
             <a:r>
-              <a:rPr lang="en-US" baseline="0" dirty="0" smtClean="0"/>
+              <a:rPr lang="en-US" baseline="0" dirty="0"/>
               <a:t> into 1 and are cropped accordingly. (No stretching should occur)</a:t>
             </a:r>
             <a:endParaRPr lang="en-US" dirty="0"/>
@@ -2509,10 +3375,9 @@
           <a:lstStyle/>
           <a:p>
             <a:r>
-              <a:rPr lang="en-US" dirty="0" smtClean="0"/>
+              <a:rPr lang="en-US" dirty="0"/>
               <a:t>Original Shapes (1 group of 2 images)</a:t>
             </a:r>
-            <a:endParaRPr lang="en-US" dirty="0"/>
           </a:p>
         </p:txBody>
       </p:sp>
@@ -2597,11 +3462,11 @@
           <a:lstStyle/>
           <a:p>
             <a:r>
-              <a:rPr lang="en-US" dirty="0" smtClean="0"/>
+              <a:rPr lang="en-US" dirty="0"/>
               <a:t>Expected. The group is combined</a:t>
             </a:r>
             <a:r>
-              <a:rPr lang="en-US" baseline="0" dirty="0" smtClean="0"/>
+              <a:rPr lang="en-US" baseline="0" dirty="0"/>
               <a:t> into 1 image and is cropped accordingly. (No stretching should occur)</a:t>
             </a:r>
             <a:endParaRPr lang="en-US" dirty="0"/>
@@ -2823,7 +3688,7 @@
           <a:p>
             <a:fld id="{699DC775-C286-4358-8C92-D7E584E969B3}" type="datetimeFigureOut">
               <a:rPr lang="en-US" smtClean="0"/>
-              <a:t>5/30/2017</a:t>
+              <a:t>2/10/2018</a:t>
             </a:fld>
             <a:endParaRPr lang="en-US"/>
           </a:p>
@@ -2991,7 +3856,7 @@
           <a:p>
             <a:fld id="{699DC775-C286-4358-8C92-D7E584E969B3}" type="datetimeFigureOut">
               <a:rPr lang="en-US" smtClean="0"/>
-              <a:t>5/30/2017</a:t>
+              <a:t>2/10/2018</a:t>
             </a:fld>
             <a:endParaRPr lang="en-US"/>
           </a:p>
@@ -3169,7 +4034,7 @@
           <a:p>
             <a:fld id="{699DC775-C286-4358-8C92-D7E584E969B3}" type="datetimeFigureOut">
               <a:rPr lang="en-US" smtClean="0"/>
-              <a:t>5/30/2017</a:t>
+              <a:t>2/10/2018</a:t>
             </a:fld>
             <a:endParaRPr lang="en-US"/>
           </a:p>
@@ -3409,7 +4274,7 @@
           <a:p>
             <a:fld id="{699DC775-C286-4358-8C92-D7E584E969B3}" type="datetimeFigureOut">
               <a:rPr lang="en-US" smtClean="0"/>
-              <a:t>5/30/2017</a:t>
+              <a:t>2/10/2018</a:t>
             </a:fld>
             <a:endParaRPr lang="en-US"/>
           </a:p>
@@ -3577,7 +4442,7 @@
           <a:p>
             <a:fld id="{699DC775-C286-4358-8C92-D7E584E969B3}" type="datetimeFigureOut">
               <a:rPr lang="en-US" smtClean="0"/>
-              <a:t>5/30/2017</a:t>
+              <a:t>2/10/2018</a:t>
             </a:fld>
             <a:endParaRPr lang="en-US"/>
           </a:p>
@@ -3822,7 +4687,7 @@
           <a:p>
             <a:fld id="{699DC775-C286-4358-8C92-D7E584E969B3}" type="datetimeFigureOut">
               <a:rPr lang="en-US" smtClean="0"/>
-              <a:t>5/30/2017</a:t>
+              <a:t>2/10/2018</a:t>
             </a:fld>
             <a:endParaRPr lang="en-US"/>
           </a:p>
@@ -4107,7 +4972,7 @@
           <a:p>
             <a:fld id="{699DC775-C286-4358-8C92-D7E584E969B3}" type="datetimeFigureOut">
               <a:rPr lang="en-US" smtClean="0"/>
-              <a:t>5/30/2017</a:t>
+              <a:t>2/10/2018</a:t>
             </a:fld>
             <a:endParaRPr lang="en-US"/>
           </a:p>
@@ -4526,7 +5391,7 @@
           <a:p>
             <a:fld id="{699DC775-C286-4358-8C92-D7E584E969B3}" type="datetimeFigureOut">
               <a:rPr lang="en-US" smtClean="0"/>
-              <a:t>5/30/2017</a:t>
+              <a:t>2/10/2018</a:t>
             </a:fld>
             <a:endParaRPr lang="en-US"/>
           </a:p>
@@ -4643,7 +5508,7 @@
           <a:p>
             <a:fld id="{699DC775-C286-4358-8C92-D7E584E969B3}" type="datetimeFigureOut">
               <a:rPr lang="en-US" smtClean="0"/>
-              <a:t>5/30/2017</a:t>
+              <a:t>2/10/2018</a:t>
             </a:fld>
             <a:endParaRPr lang="en-US"/>
           </a:p>
@@ -4738,7 +5603,7 @@
           <a:p>
             <a:fld id="{699DC775-C286-4358-8C92-D7E584E969B3}" type="datetimeFigureOut">
               <a:rPr lang="en-US" smtClean="0"/>
-              <a:t>5/30/2017</a:t>
+              <a:t>2/10/2018</a:t>
             </a:fld>
             <a:endParaRPr lang="en-US"/>
           </a:p>
@@ -5013,7 +5878,7 @@
           <a:p>
             <a:fld id="{699DC775-C286-4358-8C92-D7E584E969B3}" type="datetimeFigureOut">
               <a:rPr lang="en-US" smtClean="0"/>
-              <a:t>5/30/2017</a:t>
+              <a:t>2/10/2018</a:t>
             </a:fld>
             <a:endParaRPr lang="en-US"/>
           </a:p>
@@ -5181,7 +6046,7 @@
           <a:p>
             <a:fld id="{699DC775-C286-4358-8C92-D7E584E969B3}" type="datetimeFigureOut">
               <a:rPr lang="en-US" smtClean="0"/>
-              <a:t>5/30/2017</a:t>
+              <a:t>2/10/2018</a:t>
             </a:fld>
             <a:endParaRPr lang="en-US"/>
           </a:p>
@@ -5433,7 +6298,7 @@
           <a:p>
             <a:fld id="{699DC775-C286-4358-8C92-D7E584E969B3}" type="datetimeFigureOut">
               <a:rPr lang="en-US" smtClean="0"/>
-              <a:t>5/30/2017</a:t>
+              <a:t>2/10/2018</a:t>
             </a:fld>
             <a:endParaRPr lang="en-US"/>
           </a:p>
@@ -5601,7 +6466,7 @@
           <a:p>
             <a:fld id="{699DC775-C286-4358-8C92-D7E584E969B3}" type="datetimeFigureOut">
               <a:rPr lang="en-US" smtClean="0"/>
-              <a:t>5/30/2017</a:t>
+              <a:t>2/10/2018</a:t>
             </a:fld>
             <a:endParaRPr lang="en-US"/>
           </a:p>
@@ -5779,7 +6644,7 @@
           <a:p>
             <a:fld id="{699DC775-C286-4358-8C92-D7E584E969B3}" type="datetimeFigureOut">
               <a:rPr lang="en-US" smtClean="0"/>
-              <a:t>5/30/2017</a:t>
+              <a:t>2/10/2018</a:t>
             </a:fld>
             <a:endParaRPr lang="en-US"/>
           </a:p>
@@ -6027,7 +6892,7 @@
           <a:p>
             <a:fld id="{699DC775-C286-4358-8C92-D7E584E969B3}" type="datetimeFigureOut">
               <a:rPr lang="en-US" smtClean="0"/>
-              <a:t>5/30/2017</a:t>
+              <a:t>2/10/2018</a:t>
             </a:fld>
             <a:endParaRPr lang="en-US"/>
           </a:p>
@@ -6203,7 +7068,7 @@
           <a:p>
             <a:fld id="{699DC775-C286-4358-8C92-D7E584E969B3}" type="datetimeFigureOut">
               <a:rPr lang="en-US" smtClean="0"/>
-              <a:t>5/30/2017</a:t>
+              <a:t>2/10/2018</a:t>
             </a:fld>
             <a:endParaRPr lang="en-US"/>
           </a:p>
@@ -6456,7 +7321,7 @@
           <a:p>
             <a:fld id="{699DC775-C286-4358-8C92-D7E584E969B3}" type="datetimeFigureOut">
               <a:rPr lang="en-US" smtClean="0"/>
-              <a:t>5/30/2017</a:t>
+              <a:t>2/10/2018</a:t>
             </a:fld>
             <a:endParaRPr lang="en-US"/>
           </a:p>
@@ -6749,7 +7614,7 @@
           <a:p>
             <a:fld id="{699DC775-C286-4358-8C92-D7E584E969B3}" type="datetimeFigureOut">
               <a:rPr lang="en-US" smtClean="0"/>
-              <a:t>5/30/2017</a:t>
+              <a:t>2/10/2018</a:t>
             </a:fld>
             <a:endParaRPr lang="en-US"/>
           </a:p>
@@ -7176,7 +8041,7 @@
           <a:p>
             <a:fld id="{699DC775-C286-4358-8C92-D7E584E969B3}" type="datetimeFigureOut">
               <a:rPr lang="en-US" smtClean="0"/>
-              <a:t>5/30/2017</a:t>
+              <a:t>2/10/2018</a:t>
             </a:fld>
             <a:endParaRPr lang="en-US"/>
           </a:p>
@@ -7301,7 +8166,7 @@
           <a:p>
             <a:fld id="{699DC775-C286-4358-8C92-D7E584E969B3}" type="datetimeFigureOut">
               <a:rPr lang="en-US" smtClean="0"/>
-              <a:t>5/30/2017</a:t>
+              <a:t>2/10/2018</a:t>
             </a:fld>
             <a:endParaRPr lang="en-US"/>
           </a:p>
@@ -7404,7 +8269,7 @@
           <a:p>
             <a:fld id="{699DC775-C286-4358-8C92-D7E584E969B3}" type="datetimeFigureOut">
               <a:rPr lang="en-US" smtClean="0"/>
-              <a:t>5/30/2017</a:t>
+              <a:t>2/10/2018</a:t>
             </a:fld>
             <a:endParaRPr lang="en-US"/>
           </a:p>
@@ -7649,7 +8514,7 @@
           <a:p>
             <a:fld id="{699DC775-C286-4358-8C92-D7E584E969B3}" type="datetimeFigureOut">
               <a:rPr lang="en-US" smtClean="0"/>
-              <a:t>5/30/2017</a:t>
+              <a:t>2/10/2018</a:t>
             </a:fld>
             <a:endParaRPr lang="en-US"/>
           </a:p>
@@ -7932,7 +8797,7 @@
           <a:p>
             <a:fld id="{699DC775-C286-4358-8C92-D7E584E969B3}" type="datetimeFigureOut">
               <a:rPr lang="en-US" smtClean="0"/>
-              <a:t>5/30/2017</a:t>
+              <a:t>2/10/2018</a:t>
             </a:fld>
             <a:endParaRPr lang="en-US"/>
           </a:p>
@@ -8192,7 +9057,7 @@
           <a:p>
             <a:fld id="{699DC775-C286-4358-8C92-D7E584E969B3}" type="datetimeFigureOut">
               <a:rPr lang="en-US" smtClean="0"/>
-              <a:t>5/30/2017</a:t>
+              <a:t>2/10/2018</a:t>
             </a:fld>
             <a:endParaRPr lang="en-US"/>
           </a:p>
@@ -8368,7 +9233,7 @@
           <a:p>
             <a:fld id="{699DC775-C286-4358-8C92-D7E584E969B3}" type="datetimeFigureOut">
               <a:rPr lang="en-US" smtClean="0"/>
-              <a:t>5/30/2017</a:t>
+              <a:t>2/10/2018</a:t>
             </a:fld>
             <a:endParaRPr lang="en-US"/>
           </a:p>
@@ -8554,7 +9419,7 @@
           <a:p>
             <a:fld id="{699DC775-C286-4358-8C92-D7E584E969B3}" type="datetimeFigureOut">
               <a:rPr lang="en-US" smtClean="0"/>
-              <a:t>5/30/2017</a:t>
+              <a:t>2/10/2018</a:t>
             </a:fld>
             <a:endParaRPr lang="en-US"/>
           </a:p>
@@ -8657,10 +9522,9 @@
           </a:lstStyle>
           <a:p>
             <a:r>
-              <a:rPr lang="en-US" smtClean="0"/>
+              <a:rPr lang="en-US"/>
               <a:t>Click to edit Master title style</a:t>
             </a:r>
-            <a:endParaRPr lang="en-US"/>
           </a:p>
         </p:txBody>
       </p:sp>
@@ -8722,10 +9586,9 @@
           </a:lstStyle>
           <a:p>
             <a:r>
-              <a:rPr lang="en-US" smtClean="0"/>
+              <a:rPr lang="en-US"/>
               <a:t>Click to edit Master subtitle style</a:t>
             </a:r>
-            <a:endParaRPr lang="en-US"/>
           </a:p>
         </p:txBody>
       </p:sp>
@@ -8746,7 +9609,7 @@
           <a:p>
             <a:fld id="{45696B32-6A70-48EC-8939-9D142D9557CD}" type="datetimeFigureOut">
               <a:rPr lang="en-US" smtClean="0"/>
-              <a:t>5/30/2017</a:t>
+              <a:t>2/10/2018</a:t>
             </a:fld>
             <a:endParaRPr lang="en-US"/>
           </a:p>
@@ -8986,10 +9849,9 @@
           <a:lstStyle/>
           <a:p>
             <a:r>
-              <a:rPr lang="en-US" smtClean="0"/>
+              <a:rPr lang="en-US"/>
               <a:t>Click to edit Master title style</a:t>
             </a:r>
-            <a:endParaRPr lang="en-US"/>
           </a:p>
         </p:txBody>
       </p:sp>
@@ -9010,38 +9872,37 @@
           <a:p>
             <a:pPr lvl="0"/>
             <a:r>
-              <a:rPr lang="en-US" smtClean="0"/>
+              <a:rPr lang="en-US"/>
               <a:t>Click to edit Master text styles</a:t>
             </a:r>
           </a:p>
           <a:p>
             <a:pPr lvl="1"/>
             <a:r>
-              <a:rPr lang="en-US" smtClean="0"/>
+              <a:rPr lang="en-US"/>
               <a:t>Second level</a:t>
             </a:r>
           </a:p>
           <a:p>
             <a:pPr lvl="2"/>
             <a:r>
-              <a:rPr lang="en-US" smtClean="0"/>
+              <a:rPr lang="en-US"/>
               <a:t>Third level</a:t>
             </a:r>
           </a:p>
           <a:p>
             <a:pPr lvl="3"/>
             <a:r>
-              <a:rPr lang="en-US" smtClean="0"/>
+              <a:rPr lang="en-US"/>
               <a:t>Fourth level</a:t>
             </a:r>
           </a:p>
           <a:p>
             <a:pPr lvl="4"/>
             <a:r>
-              <a:rPr lang="en-US" smtClean="0"/>
+              <a:rPr lang="en-US"/>
               <a:t>Fifth level</a:t>
             </a:r>
-            <a:endParaRPr lang="en-US"/>
           </a:p>
         </p:txBody>
       </p:sp>
@@ -9062,7 +9923,7 @@
           <a:p>
             <a:fld id="{45696B32-6A70-48EC-8939-9D142D9557CD}" type="datetimeFigureOut">
               <a:rPr lang="en-US" smtClean="0"/>
-              <a:t>5/30/2017</a:t>
+              <a:t>2/10/2018</a:t>
             </a:fld>
             <a:endParaRPr lang="en-US"/>
           </a:p>
@@ -9165,10 +10026,9 @@
           </a:lstStyle>
           <a:p>
             <a:r>
-              <a:rPr lang="en-US" smtClean="0"/>
+              <a:rPr lang="en-US"/>
               <a:t>Click to edit Master title style</a:t>
             </a:r>
-            <a:endParaRPr lang="en-US"/>
           </a:p>
         </p:txBody>
       </p:sp>
@@ -9285,7 +10145,7 @@
           <a:p>
             <a:pPr lvl="0"/>
             <a:r>
-              <a:rPr lang="en-US" smtClean="0"/>
+              <a:rPr lang="en-US"/>
               <a:t>Click to edit Master text styles</a:t>
             </a:r>
           </a:p>
@@ -9308,7 +10168,7 @@
           <a:p>
             <a:fld id="{45696B32-6A70-48EC-8939-9D142D9557CD}" type="datetimeFigureOut">
               <a:rPr lang="en-US" smtClean="0"/>
-              <a:t>5/30/2017</a:t>
+              <a:t>2/10/2018</a:t>
             </a:fld>
             <a:endParaRPr lang="en-US"/>
           </a:p>
@@ -9402,10 +10262,9 @@
           <a:lstStyle/>
           <a:p>
             <a:r>
-              <a:rPr lang="en-US" smtClean="0"/>
+              <a:rPr lang="en-US"/>
               <a:t>Click to edit Master title style</a:t>
             </a:r>
-            <a:endParaRPr lang="en-US"/>
           </a:p>
         </p:txBody>
       </p:sp>
@@ -9431,38 +10290,37 @@
           <a:p>
             <a:pPr lvl="0"/>
             <a:r>
-              <a:rPr lang="en-US" smtClean="0"/>
+              <a:rPr lang="en-US"/>
               <a:t>Click to edit Master text styles</a:t>
             </a:r>
           </a:p>
           <a:p>
             <a:pPr lvl="1"/>
             <a:r>
-              <a:rPr lang="en-US" smtClean="0"/>
+              <a:rPr lang="en-US"/>
               <a:t>Second level</a:t>
             </a:r>
           </a:p>
           <a:p>
             <a:pPr lvl="2"/>
             <a:r>
-              <a:rPr lang="en-US" smtClean="0"/>
+              <a:rPr lang="en-US"/>
               <a:t>Third level</a:t>
             </a:r>
           </a:p>
           <a:p>
             <a:pPr lvl="3"/>
             <a:r>
-              <a:rPr lang="en-US" smtClean="0"/>
+              <a:rPr lang="en-US"/>
               <a:t>Fourth level</a:t>
             </a:r>
           </a:p>
           <a:p>
             <a:pPr lvl="4"/>
             <a:r>
-              <a:rPr lang="en-US" smtClean="0"/>
+              <a:rPr lang="en-US"/>
               <a:t>Fifth level</a:t>
             </a:r>
-            <a:endParaRPr lang="en-US"/>
           </a:p>
         </p:txBody>
       </p:sp>
@@ -9488,38 +10346,37 @@
           <a:p>
             <a:pPr lvl="0"/>
             <a:r>
-              <a:rPr lang="en-US" smtClean="0"/>
+              <a:rPr lang="en-US"/>
               <a:t>Click to edit Master text styles</a:t>
             </a:r>
           </a:p>
           <a:p>
             <a:pPr lvl="1"/>
             <a:r>
-              <a:rPr lang="en-US" smtClean="0"/>
+              <a:rPr lang="en-US"/>
               <a:t>Second level</a:t>
             </a:r>
           </a:p>
           <a:p>
             <a:pPr lvl="2"/>
             <a:r>
-              <a:rPr lang="en-US" smtClean="0"/>
+              <a:rPr lang="en-US"/>
               <a:t>Third level</a:t>
             </a:r>
           </a:p>
           <a:p>
             <a:pPr lvl="3"/>
             <a:r>
-              <a:rPr lang="en-US" smtClean="0"/>
+              <a:rPr lang="en-US"/>
               <a:t>Fourth level</a:t>
             </a:r>
           </a:p>
           <a:p>
             <a:pPr lvl="4"/>
             <a:r>
-              <a:rPr lang="en-US" smtClean="0"/>
+              <a:rPr lang="en-US"/>
               <a:t>Fifth level</a:t>
             </a:r>
-            <a:endParaRPr lang="en-US"/>
           </a:p>
         </p:txBody>
       </p:sp>
@@ -9540,7 +10397,7 @@
           <a:p>
             <a:fld id="{45696B32-6A70-48EC-8939-9D142D9557CD}" type="datetimeFigureOut">
               <a:rPr lang="en-US" smtClean="0"/>
-              <a:t>5/30/2017</a:t>
+              <a:t>2/10/2018</a:t>
             </a:fld>
             <a:endParaRPr lang="en-US"/>
           </a:p>
@@ -9639,10 +10496,9 @@
           <a:lstStyle/>
           <a:p>
             <a:r>
-              <a:rPr lang="en-US" smtClean="0"/>
+              <a:rPr lang="en-US"/>
               <a:t>Click to edit Master title style</a:t>
             </a:r>
-            <a:endParaRPr lang="en-US"/>
           </a:p>
         </p:txBody>
       </p:sp>
@@ -9705,7 +10561,7 @@
           <a:p>
             <a:pPr lvl="0"/>
             <a:r>
-              <a:rPr lang="en-US" smtClean="0"/>
+              <a:rPr lang="en-US"/>
               <a:t>Click to edit Master text styles</a:t>
             </a:r>
           </a:p>
@@ -9733,38 +10589,37 @@
           <a:p>
             <a:pPr lvl="0"/>
             <a:r>
-              <a:rPr lang="en-US" smtClean="0"/>
+              <a:rPr lang="en-US"/>
               <a:t>Click to edit Master text styles</a:t>
             </a:r>
           </a:p>
           <a:p>
             <a:pPr lvl="1"/>
             <a:r>
-              <a:rPr lang="en-US" smtClean="0"/>
+              <a:rPr lang="en-US"/>
               <a:t>Second level</a:t>
             </a:r>
           </a:p>
           <a:p>
             <a:pPr lvl="2"/>
             <a:r>
-              <a:rPr lang="en-US" smtClean="0"/>
+              <a:rPr lang="en-US"/>
               <a:t>Third level</a:t>
             </a:r>
           </a:p>
           <a:p>
             <a:pPr lvl="3"/>
             <a:r>
-              <a:rPr lang="en-US" smtClean="0"/>
+              <a:rPr lang="en-US"/>
               <a:t>Fourth level</a:t>
             </a:r>
           </a:p>
           <a:p>
             <a:pPr lvl="4"/>
             <a:r>
-              <a:rPr lang="en-US" smtClean="0"/>
+              <a:rPr lang="en-US"/>
               <a:t>Fifth level</a:t>
             </a:r>
-            <a:endParaRPr lang="en-US"/>
           </a:p>
         </p:txBody>
       </p:sp>
@@ -9827,7 +10682,7 @@
           <a:p>
             <a:pPr lvl="0"/>
             <a:r>
-              <a:rPr lang="en-US" smtClean="0"/>
+              <a:rPr lang="en-US"/>
               <a:t>Click to edit Master text styles</a:t>
             </a:r>
           </a:p>
@@ -9855,38 +10710,37 @@
           <a:p>
             <a:pPr lvl="0"/>
             <a:r>
-              <a:rPr lang="en-US" smtClean="0"/>
+              <a:rPr lang="en-US"/>
               <a:t>Click to edit Master text styles</a:t>
             </a:r>
           </a:p>
           <a:p>
             <a:pPr lvl="1"/>
             <a:r>
-              <a:rPr lang="en-US" smtClean="0"/>
+              <a:rPr lang="en-US"/>
               <a:t>Second level</a:t>
             </a:r>
           </a:p>
           <a:p>
             <a:pPr lvl="2"/>
             <a:r>
-              <a:rPr lang="en-US" smtClean="0"/>
+              <a:rPr lang="en-US"/>
               <a:t>Third level</a:t>
             </a:r>
           </a:p>
           <a:p>
             <a:pPr lvl="3"/>
             <a:r>
-              <a:rPr lang="en-US" smtClean="0"/>
+              <a:rPr lang="en-US"/>
               <a:t>Fourth level</a:t>
             </a:r>
           </a:p>
           <a:p>
             <a:pPr lvl="4"/>
             <a:r>
-              <a:rPr lang="en-US" smtClean="0"/>
+              <a:rPr lang="en-US"/>
               <a:t>Fifth level</a:t>
             </a:r>
-            <a:endParaRPr lang="en-US"/>
           </a:p>
         </p:txBody>
       </p:sp>
@@ -9907,7 +10761,7 @@
           <a:p>
             <a:fld id="{45696B32-6A70-48EC-8939-9D142D9557CD}" type="datetimeFigureOut">
               <a:rPr lang="en-US" smtClean="0"/>
-              <a:t>5/30/2017</a:t>
+              <a:t>2/10/2018</a:t>
             </a:fld>
             <a:endParaRPr lang="en-US"/>
           </a:p>
@@ -10001,10 +10855,9 @@
           <a:lstStyle/>
           <a:p>
             <a:r>
-              <a:rPr lang="en-US" smtClean="0"/>
+              <a:rPr lang="en-US"/>
               <a:t>Click to edit Master title style</a:t>
             </a:r>
-            <a:endParaRPr lang="en-US"/>
           </a:p>
         </p:txBody>
       </p:sp>
@@ -10025,7 +10878,7 @@
           <a:p>
             <a:fld id="{45696B32-6A70-48EC-8939-9D142D9557CD}" type="datetimeFigureOut">
               <a:rPr lang="en-US" smtClean="0"/>
-              <a:t>5/30/2017</a:t>
+              <a:t>2/10/2018</a:t>
             </a:fld>
             <a:endParaRPr lang="en-US"/>
           </a:p>
@@ -10310,7 +11163,7 @@
           <a:p>
             <a:fld id="{699DC775-C286-4358-8C92-D7E584E969B3}" type="datetimeFigureOut">
               <a:rPr lang="en-US" smtClean="0"/>
-              <a:t>5/30/2017</a:t>
+              <a:t>2/10/2018</a:t>
             </a:fld>
             <a:endParaRPr lang="en-US"/>
           </a:p>
@@ -10405,7 +11258,7 @@
           <a:p>
             <a:fld id="{45696B32-6A70-48EC-8939-9D142D9557CD}" type="datetimeFigureOut">
               <a:rPr lang="en-US" smtClean="0"/>
-              <a:t>5/30/2017</a:t>
+              <a:t>2/10/2018</a:t>
             </a:fld>
             <a:endParaRPr lang="en-US"/>
           </a:p>
@@ -10508,10 +11361,9 @@
           </a:lstStyle>
           <a:p>
             <a:r>
-              <a:rPr lang="en-US" smtClean="0"/>
+              <a:rPr lang="en-US"/>
               <a:t>Click to edit Master title style</a:t>
             </a:r>
-            <a:endParaRPr lang="en-US"/>
           </a:p>
         </p:txBody>
       </p:sp>
@@ -10565,38 +11417,37 @@
           <a:p>
             <a:pPr lvl="0"/>
             <a:r>
-              <a:rPr lang="en-US" smtClean="0"/>
+              <a:rPr lang="en-US"/>
               <a:t>Click to edit Master text styles</a:t>
             </a:r>
           </a:p>
           <a:p>
             <a:pPr lvl="1"/>
             <a:r>
-              <a:rPr lang="en-US" smtClean="0"/>
+              <a:rPr lang="en-US"/>
               <a:t>Second level</a:t>
             </a:r>
           </a:p>
           <a:p>
             <a:pPr lvl="2"/>
             <a:r>
-              <a:rPr lang="en-US" smtClean="0"/>
+              <a:rPr lang="en-US"/>
               <a:t>Third level</a:t>
             </a:r>
           </a:p>
           <a:p>
             <a:pPr lvl="3"/>
             <a:r>
-              <a:rPr lang="en-US" smtClean="0"/>
+              <a:rPr lang="en-US"/>
               <a:t>Fourth level</a:t>
             </a:r>
           </a:p>
           <a:p>
             <a:pPr lvl="4"/>
             <a:r>
-              <a:rPr lang="en-US" smtClean="0"/>
+              <a:rPr lang="en-US"/>
               <a:t>Fifth level</a:t>
             </a:r>
-            <a:endParaRPr lang="en-US"/>
           </a:p>
         </p:txBody>
       </p:sp>
@@ -10659,7 +11510,7 @@
           <a:p>
             <a:pPr lvl="0"/>
             <a:r>
-              <a:rPr lang="en-US" smtClean="0"/>
+              <a:rPr lang="en-US"/>
               <a:t>Click to edit Master text styles</a:t>
             </a:r>
           </a:p>
@@ -10682,7 +11533,7 @@
           <a:p>
             <a:fld id="{45696B32-6A70-48EC-8939-9D142D9557CD}" type="datetimeFigureOut">
               <a:rPr lang="en-US" smtClean="0"/>
-              <a:t>5/30/2017</a:t>
+              <a:t>2/10/2018</a:t>
             </a:fld>
             <a:endParaRPr lang="en-US"/>
           </a:p>
@@ -10785,10 +11636,9 @@
           </a:lstStyle>
           <a:p>
             <a:r>
-              <a:rPr lang="en-US" smtClean="0"/>
+              <a:rPr lang="en-US"/>
               <a:t>Click to edit Master title style</a:t>
             </a:r>
-            <a:endParaRPr lang="en-US"/>
           </a:p>
         </p:txBody>
       </p:sp>
@@ -10912,7 +11762,7 @@
           <a:p>
             <a:pPr lvl="0"/>
             <a:r>
-              <a:rPr lang="en-US" smtClean="0"/>
+              <a:rPr lang="en-US"/>
               <a:t>Click to edit Master text styles</a:t>
             </a:r>
           </a:p>
@@ -10935,7 +11785,7 @@
           <a:p>
             <a:fld id="{45696B32-6A70-48EC-8939-9D142D9557CD}" type="datetimeFigureOut">
               <a:rPr lang="en-US" smtClean="0"/>
-              <a:t>5/30/2017</a:t>
+              <a:t>2/10/2018</a:t>
             </a:fld>
             <a:endParaRPr lang="en-US"/>
           </a:p>
@@ -11029,10 +11879,9 @@
           <a:lstStyle/>
           <a:p>
             <a:r>
-              <a:rPr lang="en-US" smtClean="0"/>
+              <a:rPr lang="en-US"/>
               <a:t>Click to edit Master title style</a:t>
             </a:r>
-            <a:endParaRPr lang="en-US"/>
           </a:p>
         </p:txBody>
       </p:sp>
@@ -11053,38 +11902,37 @@
           <a:p>
             <a:pPr lvl="0"/>
             <a:r>
-              <a:rPr lang="en-US" smtClean="0"/>
+              <a:rPr lang="en-US"/>
               <a:t>Click to edit Master text styles</a:t>
             </a:r>
           </a:p>
           <a:p>
             <a:pPr lvl="1"/>
             <a:r>
-              <a:rPr lang="en-US" smtClean="0"/>
+              <a:rPr lang="en-US"/>
               <a:t>Second level</a:t>
             </a:r>
           </a:p>
           <a:p>
             <a:pPr lvl="2"/>
             <a:r>
-              <a:rPr lang="en-US" smtClean="0"/>
+              <a:rPr lang="en-US"/>
               <a:t>Third level</a:t>
             </a:r>
           </a:p>
           <a:p>
             <a:pPr lvl="3"/>
             <a:r>
-              <a:rPr lang="en-US" smtClean="0"/>
+              <a:rPr lang="en-US"/>
               <a:t>Fourth level</a:t>
             </a:r>
           </a:p>
           <a:p>
             <a:pPr lvl="4"/>
             <a:r>
-              <a:rPr lang="en-US" smtClean="0"/>
+              <a:rPr lang="en-US"/>
               <a:t>Fifth level</a:t>
             </a:r>
-            <a:endParaRPr lang="en-US"/>
           </a:p>
         </p:txBody>
       </p:sp>
@@ -11105,7 +11953,7 @@
           <a:p>
             <a:fld id="{45696B32-6A70-48EC-8939-9D142D9557CD}" type="datetimeFigureOut">
               <a:rPr lang="en-US" smtClean="0"/>
-              <a:t>5/30/2017</a:t>
+              <a:t>2/10/2018</a:t>
             </a:fld>
             <a:endParaRPr lang="en-US"/>
           </a:p>
@@ -11204,10 +12052,9 @@
           <a:lstStyle/>
           <a:p>
             <a:r>
-              <a:rPr lang="en-US" smtClean="0"/>
+              <a:rPr lang="en-US"/>
               <a:t>Click to edit Master title style</a:t>
             </a:r>
-            <a:endParaRPr lang="en-US"/>
           </a:p>
         </p:txBody>
       </p:sp>
@@ -11233,38 +12080,37 @@
           <a:p>
             <a:pPr lvl="0"/>
             <a:r>
-              <a:rPr lang="en-US" smtClean="0"/>
+              <a:rPr lang="en-US"/>
               <a:t>Click to edit Master text styles</a:t>
             </a:r>
           </a:p>
           <a:p>
             <a:pPr lvl="1"/>
             <a:r>
-              <a:rPr lang="en-US" smtClean="0"/>
+              <a:rPr lang="en-US"/>
               <a:t>Second level</a:t>
             </a:r>
           </a:p>
           <a:p>
             <a:pPr lvl="2"/>
             <a:r>
-              <a:rPr lang="en-US" smtClean="0"/>
+              <a:rPr lang="en-US"/>
               <a:t>Third level</a:t>
             </a:r>
           </a:p>
           <a:p>
             <a:pPr lvl="3"/>
             <a:r>
-              <a:rPr lang="en-US" smtClean="0"/>
+              <a:rPr lang="en-US"/>
               <a:t>Fourth level</a:t>
             </a:r>
           </a:p>
           <a:p>
             <a:pPr lvl="4"/>
             <a:r>
-              <a:rPr lang="en-US" smtClean="0"/>
+              <a:rPr lang="en-US"/>
               <a:t>Fifth level</a:t>
             </a:r>
-            <a:endParaRPr lang="en-US"/>
           </a:p>
         </p:txBody>
       </p:sp>
@@ -11285,7 +12131,7 @@
           <a:p>
             <a:fld id="{45696B32-6A70-48EC-8939-9D142D9557CD}" type="datetimeFigureOut">
               <a:rPr lang="en-US" smtClean="0"/>
-              <a:t>5/30/2017</a:t>
+              <a:t>2/10/2018</a:t>
             </a:fld>
             <a:endParaRPr lang="en-US"/>
           </a:p>
@@ -11704,7 +12550,7 @@
           <a:p>
             <a:fld id="{699DC775-C286-4358-8C92-D7E584E969B3}" type="datetimeFigureOut">
               <a:rPr lang="en-US" smtClean="0"/>
-              <a:t>5/30/2017</a:t>
+              <a:t>2/10/2018</a:t>
             </a:fld>
             <a:endParaRPr lang="en-US"/>
           </a:p>
@@ -11821,7 +12667,7 @@
           <a:p>
             <a:fld id="{699DC775-C286-4358-8C92-D7E584E969B3}" type="datetimeFigureOut">
               <a:rPr lang="en-US" smtClean="0"/>
-              <a:t>5/30/2017</a:t>
+              <a:t>2/10/2018</a:t>
             </a:fld>
             <a:endParaRPr lang="en-US"/>
           </a:p>
@@ -11916,7 +12762,7 @@
           <a:p>
             <a:fld id="{699DC775-C286-4358-8C92-D7E584E969B3}" type="datetimeFigureOut">
               <a:rPr lang="en-US" smtClean="0"/>
-              <a:t>5/30/2017</a:t>
+              <a:t>2/10/2018</a:t>
             </a:fld>
             <a:endParaRPr lang="en-US"/>
           </a:p>
@@ -12191,7 +13037,7 @@
           <a:p>
             <a:fld id="{699DC775-C286-4358-8C92-D7E584E969B3}" type="datetimeFigureOut">
               <a:rPr lang="en-US" smtClean="0"/>
-              <a:t>5/30/2017</a:t>
+              <a:t>2/10/2018</a:t>
             </a:fld>
             <a:endParaRPr lang="en-US"/>
           </a:p>
@@ -12443,7 +13289,7 @@
           <a:p>
             <a:fld id="{699DC775-C286-4358-8C92-D7E584E969B3}" type="datetimeFigureOut">
               <a:rPr lang="en-US" smtClean="0"/>
-              <a:t>5/30/2017</a:t>
+              <a:t>2/10/2018</a:t>
             </a:fld>
             <a:endParaRPr lang="en-US"/>
           </a:p>
@@ -12654,7 +13500,7 @@
           <a:p>
             <a:fld id="{699DC775-C286-4358-8C92-D7E584E969B3}" type="datetimeFigureOut">
               <a:rPr lang="en-US" smtClean="0"/>
-              <a:t>5/30/2017</a:t>
+              <a:t>2/10/2018</a:t>
             </a:fld>
             <a:endParaRPr lang="en-US"/>
           </a:p>
@@ -13167,7 +14013,7 @@
           <a:p>
             <a:fld id="{699DC775-C286-4358-8C92-D7E584E969B3}" type="datetimeFigureOut">
               <a:rPr lang="en-US" smtClean="0"/>
-              <a:t>5/30/2017</a:t>
+              <a:t>2/10/2018</a:t>
             </a:fld>
             <a:endParaRPr lang="en-US"/>
           </a:p>
@@ -13678,7 +14524,7 @@
           <a:p>
             <a:fld id="{699DC775-C286-4358-8C92-D7E584E969B3}" type="datetimeFigureOut">
               <a:rPr lang="en-US" smtClean="0"/>
-              <a:t>5/30/2017</a:t>
+              <a:t>2/10/2018</a:t>
             </a:fld>
             <a:endParaRPr lang="en-US"/>
           </a:p>
@@ -14084,10 +14930,9 @@
           <a:lstStyle/>
           <a:p>
             <a:r>
-              <a:rPr lang="en-US" smtClean="0"/>
+              <a:rPr lang="en-US"/>
               <a:t>Click to edit Master title style</a:t>
             </a:r>
-            <a:endParaRPr lang="en-US"/>
           </a:p>
         </p:txBody>
       </p:sp>
@@ -14118,38 +14963,37 @@
           <a:p>
             <a:pPr lvl="0"/>
             <a:r>
-              <a:rPr lang="en-US" smtClean="0"/>
+              <a:rPr lang="en-US"/>
               <a:t>Click to edit Master text styles</a:t>
             </a:r>
           </a:p>
           <a:p>
             <a:pPr lvl="1"/>
             <a:r>
-              <a:rPr lang="en-US" smtClean="0"/>
+              <a:rPr lang="en-US"/>
               <a:t>Second level</a:t>
             </a:r>
           </a:p>
           <a:p>
             <a:pPr lvl="2"/>
             <a:r>
-              <a:rPr lang="en-US" smtClean="0"/>
+              <a:rPr lang="en-US"/>
               <a:t>Third level</a:t>
             </a:r>
           </a:p>
           <a:p>
             <a:pPr lvl="3"/>
             <a:r>
-              <a:rPr lang="en-US" smtClean="0"/>
+              <a:rPr lang="en-US"/>
               <a:t>Fourth level</a:t>
             </a:r>
           </a:p>
           <a:p>
             <a:pPr lvl="4"/>
             <a:r>
-              <a:rPr lang="en-US" smtClean="0"/>
+              <a:rPr lang="en-US"/>
               <a:t>Fifth level</a:t>
             </a:r>
-            <a:endParaRPr lang="en-US"/>
           </a:p>
         </p:txBody>
       </p:sp>
@@ -14188,7 +15032,7 @@
           <a:p>
             <a:fld id="{45696B32-6A70-48EC-8939-9D142D9557CD}" type="datetimeFigureOut">
               <a:rPr lang="en-US" smtClean="0"/>
-              <a:t>5/30/2017</a:t>
+              <a:t>2/10/2018</a:t>
             </a:fld>
             <a:endParaRPr lang="en-US"/>
           </a:p>
@@ -14918,7 +15762,7 @@
           <a:lstStyle/>
           <a:p>
             <a:r>
-              <a:rPr lang="en-US" dirty="0" smtClean="0"/>
+              <a:rPr lang="en-US" dirty="0"/>
               <a:t>Paste:: Paste At Cursor/Original Position</a:t>
             </a:r>
             <a:endParaRPr lang="en-SG" dirty="0"/>
@@ -14944,59 +15788,36 @@
               <a:buNone/>
             </a:pPr>
             <a:r>
-              <a:rPr lang="en-US" b="1" dirty="0" smtClean="0"/>
-              <a:t>Additional instructions</a:t>
-            </a:r>
-            <a:r>
               <a:rPr lang="en-US" b="1" dirty="0"/>
-              <a:t>:</a:t>
+              <a:t>Additional instructions:</a:t>
             </a:r>
           </a:p>
           <a:p>
             <a:pPr marL="285750" indent="-285750"/>
             <a:r>
               <a:rPr lang="en-US" dirty="0"/>
-              <a:t>Select </a:t>
-            </a:r>
-            <a:r>
-              <a:rPr lang="en-US" dirty="0" smtClean="0"/>
-              <a:t>the appropriate shape/group.</a:t>
-            </a:r>
-            <a:endParaRPr lang="en-US" dirty="0"/>
+              <a:t>Select the appropriate shape/group.</a:t>
+            </a:r>
           </a:p>
           <a:p>
             <a:pPr marL="285750" indent="-285750"/>
             <a:r>
-              <a:rPr lang="en-US" dirty="0" smtClean="0"/>
+              <a:rPr lang="en-US" dirty="0"/>
               <a:t>Right click on the shape/group and click cut.</a:t>
             </a:r>
-            <a:endParaRPr lang="en-US" dirty="0"/>
           </a:p>
           <a:p>
             <a:pPr marL="285750" indent="-285750"/>
             <a:r>
-              <a:rPr lang="en-US" dirty="0" smtClean="0"/>
+              <a:rPr lang="en-US" dirty="0"/>
               <a:t>Right click on an empty position on the slide</a:t>
             </a:r>
-            <a:endParaRPr lang="en-US" dirty="0"/>
           </a:p>
           <a:p>
             <a:pPr marL="285750" indent="-285750"/>
             <a:r>
-              <a:rPr lang="en-US" dirty="0" smtClean="0"/>
-              <a:t>Select either </a:t>
-            </a:r>
-            <a:r>
               <a:rPr lang="en-US" dirty="0"/>
-              <a:t>Paste To </a:t>
-            </a:r>
-            <a:r>
-              <a:rPr lang="en-US" dirty="0" smtClean="0"/>
-              <a:t>Cursor Position or Paste To Original Position under </a:t>
-            </a:r>
-            <a:r>
-              <a:rPr lang="en-US" dirty="0"/>
-              <a:t>the </a:t>
+              <a:t>Select either Paste To Cursor Position or Paste To Original Position under the </a:t>
             </a:r>
             <a:r>
               <a:rPr lang="en-US" dirty="0" err="1"/>
@@ -15004,13 +15825,8 @@
             </a:r>
             <a:r>
               <a:rPr lang="en-US" dirty="0"/>
-              <a:t> context </a:t>
-            </a:r>
-            <a:r>
-              <a:rPr lang="en-US" dirty="0" smtClean="0"/>
-              <a:t>menu based on the test case</a:t>
-            </a:r>
-            <a:endParaRPr lang="en-US" dirty="0"/>
+              <a:t> context menu based on the test case</a:t>
+            </a:r>
           </a:p>
         </p:txBody>
       </p:sp>
@@ -15249,13 +16065,6 @@
   <p:clrMapOvr>
     <a:masterClrMapping/>
   </p:clrMapOvr>
-  <p:timing>
-    <p:tnLst>
-      <p:par>
-        <p:cTn id="1" dur="indefinite" restart="never" nodeType="tmRoot"/>
-      </p:par>
-    </p:tnLst>
-  </p:timing>
 </p:sld>
 </file>
 
@@ -15362,13 +16171,6 @@
   <p:clrMapOvr>
     <a:masterClrMapping/>
   </p:clrMapOvr>
-  <p:timing>
-    <p:tnLst>
-      <p:par>
-        <p:cTn id="1" dur="indefinite" restart="never" nodeType="tmRoot"/>
-      </p:par>
-    </p:tnLst>
-  </p:timing>
 </p:sld>
 </file>
 
@@ -15475,13 +16277,6 @@
   <p:clrMapOvr>
     <a:masterClrMapping/>
   </p:clrMapOvr>
-  <p:timing>
-    <p:tnLst>
-      <p:par>
-        <p:cTn id="1" dur="indefinite" restart="never" nodeType="tmRoot"/>
-      </p:par>
-    </p:tnLst>
-  </p:timing>
 </p:sld>
 </file>
 
@@ -15518,7 +16313,7 @@
           <a:lstStyle/>
           <a:p>
             <a:r>
-              <a:rPr lang="en-US" dirty="0" smtClean="0"/>
+              <a:rPr lang="en-US" dirty="0"/>
               <a:t>Paste:: Replace With Clipboard</a:t>
             </a:r>
             <a:endParaRPr lang="en-SG" dirty="0"/>
@@ -15544,57 +16339,45 @@
               <a:buNone/>
             </a:pPr>
             <a:r>
-              <a:rPr lang="en-US" b="1" dirty="0" smtClean="0"/>
-              <a:t>Additional instructions</a:t>
-            </a:r>
-            <a:r>
               <a:rPr lang="en-US" b="1" dirty="0"/>
-              <a:t>:</a:t>
+              <a:t>Additional instructions:</a:t>
             </a:r>
           </a:p>
           <a:p>
             <a:pPr marL="285750" indent="-285750"/>
             <a:r>
               <a:rPr lang="en-US" dirty="0"/>
-              <a:t>Select </a:t>
-            </a:r>
-            <a:r>
-              <a:rPr lang="en-US" dirty="0" smtClean="0"/>
-              <a:t>the appropriate shape/group.</a:t>
-            </a:r>
-            <a:endParaRPr lang="en-US" dirty="0"/>
+              <a:t>Select the appropriate shape/group.</a:t>
+            </a:r>
           </a:p>
           <a:p>
             <a:pPr marL="285750" indent="-285750"/>
             <a:r>
-              <a:rPr lang="en-US" dirty="0" smtClean="0"/>
+              <a:rPr lang="en-US" dirty="0"/>
               <a:t>Right click on the shape/group and click cut.</a:t>
             </a:r>
-            <a:endParaRPr lang="en-US" dirty="0"/>
           </a:p>
           <a:p>
             <a:pPr marL="285750" indent="-285750"/>
             <a:r>
-              <a:rPr lang="en-US" dirty="0" smtClean="0"/>
+              <a:rPr lang="en-US" dirty="0"/>
               <a:t>Right click on the shape to be replaced</a:t>
             </a:r>
-            <a:endParaRPr lang="en-US" dirty="0"/>
           </a:p>
           <a:p>
             <a:pPr marL="285750" indent="-285750"/>
             <a:r>
-              <a:rPr lang="en-US" dirty="0" smtClean="0"/>
+              <a:rPr lang="en-US" dirty="0"/>
               <a:t>Select Replace With Clipboard in the </a:t>
             </a:r>
             <a:r>
-              <a:rPr lang="en-US" dirty="0" err="1" smtClean="0"/>
+              <a:rPr lang="en-US" dirty="0" err="1"/>
               <a:t>PowerPointLabs</a:t>
             </a:r>
             <a:r>
-              <a:rPr lang="en-US" dirty="0" smtClean="0"/>
+              <a:rPr lang="en-US" dirty="0"/>
               <a:t> context menu</a:t>
             </a:r>
-            <a:endParaRPr lang="en-US" dirty="0"/>
           </a:p>
         </p:txBody>
       </p:sp>
@@ -15608,13 +16391,6 @@
   <p:clrMapOvr>
     <a:masterClrMapping/>
   </p:clrMapOvr>
-  <p:timing>
-    <p:tnLst>
-      <p:par>
-        <p:cTn id="1" dur="indefinite" restart="never" nodeType="tmRoot"/>
-      </p:par>
-    </p:tnLst>
-  </p:timing>
 </p:sld>
 </file>
 
@@ -15804,13 +16580,6 @@
   <p:clrMapOvr>
     <a:masterClrMapping/>
   </p:clrMapOvr>
-  <p:timing>
-    <p:tnLst>
-      <p:par>
-        <p:cTn id="1" dur="indefinite" restart="never" nodeType="tmRoot"/>
-      </p:par>
-    </p:tnLst>
-  </p:timing>
 </p:sld>
 </file>
 
@@ -15957,13 +16726,6 @@
   <p:clrMapOvr>
     <a:masterClrMapping/>
   </p:clrMapOvr>
-  <p:timing>
-    <p:tnLst>
-      <p:par>
-        <p:cTn id="1" dur="indefinite" restart="never" nodeType="tmRoot"/>
-      </p:par>
-    </p:tnLst>
-  </p:timing>
 </p:sld>
 </file>
 
@@ -16018,7 +16780,7 @@
           <a:p>
             <a:pPr algn="l"/>
             <a:r>
-              <a:rPr lang="en-US" sz="7200" dirty="0" smtClean="0"/>
+              <a:rPr lang="en-US" sz="7200" dirty="0"/>
               <a:t>Paste Lab</a:t>
             </a:r>
             <a:endParaRPr lang="en-SG" sz="7200" dirty="0">
@@ -16590,7 +17352,7 @@
           <a:lstStyle/>
           <a:p>
             <a:r>
-              <a:rPr lang="en-US" dirty="0" smtClean="0"/>
+              <a:rPr lang="en-US" dirty="0"/>
               <a:t>Paste:: Paste Into Group</a:t>
             </a:r>
             <a:endParaRPr lang="en-SG" dirty="0"/>
@@ -16616,57 +17378,45 @@
               <a:buNone/>
             </a:pPr>
             <a:r>
-              <a:rPr lang="en-US" b="1" dirty="0" smtClean="0"/>
-              <a:t>Additional instructions</a:t>
-            </a:r>
-            <a:r>
               <a:rPr lang="en-US" b="1" dirty="0"/>
-              <a:t>:</a:t>
+              <a:t>Additional instructions:</a:t>
             </a:r>
           </a:p>
           <a:p>
             <a:pPr marL="285750" indent="-285750"/>
             <a:r>
               <a:rPr lang="en-US" dirty="0"/>
-              <a:t>Select </a:t>
-            </a:r>
-            <a:r>
-              <a:rPr lang="en-US" dirty="0" smtClean="0"/>
-              <a:t>the appropriate shape/group.</a:t>
-            </a:r>
-            <a:endParaRPr lang="en-US" dirty="0"/>
+              <a:t>Select the appropriate shape/group.</a:t>
+            </a:r>
           </a:p>
           <a:p>
             <a:pPr marL="285750" indent="-285750"/>
             <a:r>
-              <a:rPr lang="en-US" dirty="0" smtClean="0"/>
+              <a:rPr lang="en-US" dirty="0"/>
               <a:t>Right click on the shape/group and click cut/copy.</a:t>
             </a:r>
-            <a:endParaRPr lang="en-US" dirty="0"/>
           </a:p>
           <a:p>
             <a:pPr marL="285750" indent="-285750"/>
             <a:r>
-              <a:rPr lang="en-US" dirty="0" smtClean="0"/>
+              <a:rPr lang="en-US" dirty="0"/>
               <a:t>Right click on the group of squares</a:t>
             </a:r>
-            <a:endParaRPr lang="en-US" dirty="0"/>
           </a:p>
           <a:p>
             <a:pPr marL="285750" indent="-285750"/>
             <a:r>
-              <a:rPr lang="en-US" dirty="0" smtClean="0"/>
+              <a:rPr lang="en-US" dirty="0"/>
               <a:t>Select Paste Into Group in the </a:t>
             </a:r>
             <a:r>
-              <a:rPr lang="en-US" dirty="0" err="1" smtClean="0"/>
+              <a:rPr lang="en-US" dirty="0" err="1"/>
               <a:t>PowerPointLabs</a:t>
             </a:r>
             <a:r>
-              <a:rPr lang="en-US" dirty="0" smtClean="0"/>
+              <a:rPr lang="en-US" dirty="0"/>
               <a:t> context menu</a:t>
             </a:r>
-            <a:endParaRPr lang="en-US" dirty="0"/>
           </a:p>
         </p:txBody>
       </p:sp>
@@ -16680,13 +17430,6 @@
   <p:clrMapOvr>
     <a:masterClrMapping/>
   </p:clrMapOvr>
-  <p:timing>
-    <p:tnLst>
-      <p:par>
-        <p:cTn id="1" dur="indefinite" restart="never" nodeType="tmRoot"/>
-      </p:par>
-    </p:tnLst>
-  </p:timing>
 </p:sld>
 </file>
 
@@ -17263,6 +18006,372 @@
 </p:sld>
 </file>
 
+<file path=ppt/slides/slide25.xml><?xml version="1.0" encoding="utf-8"?>
+<p:sld xmlns:a="http://schemas.openxmlformats.org/drawingml/2006/main" xmlns:r="http://schemas.openxmlformats.org/officeDocument/2006/relationships" xmlns:p="http://schemas.openxmlformats.org/presentationml/2006/main">
+  <p:cSld>
+    <p:spTree>
+      <p:nvGrpSpPr>
+        <p:cNvPr id="1" name=""/>
+        <p:cNvGrpSpPr/>
+        <p:nvPr/>
+      </p:nvGrpSpPr>
+      <p:grpSpPr>
+        <a:xfrm>
+          <a:off x="0" y="0"/>
+          <a:ext cx="0" cy="0"/>
+          <a:chOff x="0" y="0"/>
+          <a:chExt cx="0" cy="0"/>
+        </a:xfrm>
+      </p:grpSpPr>
+      <p:sp>
+        <p:nvSpPr>
+          <p:cNvPr id="2" name="Title 1"/>
+          <p:cNvSpPr>
+            <a:spLocks noGrp="1"/>
+          </p:cNvSpPr>
+          <p:nvPr>
+            <p:ph type="title"/>
+          </p:nvPr>
+        </p:nvSpPr>
+        <p:spPr/>
+        <p:txBody>
+          <a:bodyPr/>
+          <a:lstStyle/>
+          <a:p>
+            <a:r>
+              <a:rPr lang="en-US" dirty="0"/>
+              <a:t>Paste:: Paste To Fit Slide </a:t>
+            </a:r>
+            <a:endParaRPr lang="en-SG" dirty="0"/>
+          </a:p>
+        </p:txBody>
+      </p:sp>
+      <p:sp>
+        <p:nvSpPr>
+          <p:cNvPr id="4" name="Content Placeholder 3"/>
+          <p:cNvSpPr>
+            <a:spLocks noGrp="1"/>
+          </p:cNvSpPr>
+          <p:nvPr>
+            <p:ph idx="1"/>
+          </p:nvPr>
+        </p:nvSpPr>
+        <p:spPr/>
+        <p:txBody>
+          <a:bodyPr/>
+          <a:lstStyle/>
+          <a:p>
+            <a:pPr marL="0" indent="0">
+              <a:buNone/>
+            </a:pPr>
+            <a:r>
+              <a:rPr lang="en-US" b="1" dirty="0"/>
+              <a:t>Additional instructions:</a:t>
+            </a:r>
+          </a:p>
+          <a:p>
+            <a:pPr marL="285750" indent="-285750"/>
+            <a:r>
+              <a:rPr lang="en-US" dirty="0"/>
+              <a:t>Select the appropriate shape/group.</a:t>
+            </a:r>
+          </a:p>
+          <a:p>
+            <a:pPr marL="285750" indent="-285750"/>
+            <a:r>
+              <a:rPr lang="en-US" dirty="0"/>
+              <a:t>Right click on the shape/group and click cut.</a:t>
+            </a:r>
+          </a:p>
+          <a:p>
+            <a:pPr marL="285750" indent="-285750"/>
+            <a:r>
+              <a:rPr lang="en-US" dirty="0"/>
+              <a:t>Right click on an empty position on the slide</a:t>
+            </a:r>
+          </a:p>
+          <a:p>
+            <a:pPr marL="285750" indent="-285750"/>
+            <a:r>
+              <a:rPr lang="en-US" dirty="0"/>
+              <a:t>Select Paste To Fit Slide under the </a:t>
+            </a:r>
+            <a:r>
+              <a:rPr lang="en-US" dirty="0" err="1"/>
+              <a:t>PowerPointLabs</a:t>
+            </a:r>
+            <a:r>
+              <a:rPr lang="en-US" dirty="0"/>
+              <a:t> context menu</a:t>
+            </a:r>
+          </a:p>
+        </p:txBody>
+      </p:sp>
+    </p:spTree>
+    <p:extLst>
+      <p:ext uri="{BB962C8B-B14F-4D97-AF65-F5344CB8AC3E}">
+        <p14:creationId xmlns:p14="http://schemas.microsoft.com/office/powerpoint/2010/main" val="3942310800"/>
+      </p:ext>
+    </p:extLst>
+  </p:cSld>
+  <p:clrMapOvr>
+    <a:masterClrMapping/>
+  </p:clrMapOvr>
+</p:sld>
+</file>
+
+<file path=ppt/slides/slide26.xml><?xml version="1.0" encoding="utf-8"?>
+<p:sld xmlns:a="http://schemas.openxmlformats.org/drawingml/2006/main" xmlns:r="http://schemas.openxmlformats.org/officeDocument/2006/relationships" xmlns:p="http://schemas.openxmlformats.org/presentationml/2006/main">
+  <p:cSld>
+    <p:spTree>
+      <p:nvGrpSpPr>
+        <p:cNvPr id="1" name=""/>
+        <p:cNvGrpSpPr/>
+        <p:nvPr/>
+      </p:nvGrpSpPr>
+      <p:grpSpPr>
+        <a:xfrm>
+          <a:off x="0" y="0"/>
+          <a:ext cx="0" cy="0"/>
+          <a:chOff x="0" y="0"/>
+          <a:chExt cx="0" cy="0"/>
+        </a:xfrm>
+      </p:grpSpPr>
+      <p:pic>
+        <p:nvPicPr>
+          <p:cNvPr id="5" name="selectMe"/>
+          <p:cNvPicPr>
+            <a:picLocks noChangeAspect="1"/>
+          </p:cNvPicPr>
+          <p:nvPr/>
+        </p:nvPicPr>
+        <p:blipFill>
+          <a:blip r:embed="rId3">
+            <a:extLst>
+              <a:ext uri="{28A0092B-C50C-407E-A947-70E740481C1C}">
+                <a14:useLocalDpi xmlns:a14="http://schemas.microsoft.com/office/drawing/2010/main" val="0"/>
+              </a:ext>
+            </a:extLst>
+          </a:blip>
+          <a:stretch>
+            <a:fillRect/>
+          </a:stretch>
+        </p:blipFill>
+        <p:spPr>
+          <a:xfrm>
+            <a:off x="2514600" y="1447800"/>
+            <a:ext cx="4572000" cy="3058418"/>
+          </a:xfrm>
+          <a:prstGeom prst="rect">
+            <a:avLst/>
+          </a:prstGeom>
+        </p:spPr>
+      </p:pic>
+    </p:spTree>
+    <p:extLst>
+      <p:ext uri="{BB962C8B-B14F-4D97-AF65-F5344CB8AC3E}">
+        <p14:creationId xmlns:p14="http://schemas.microsoft.com/office/powerpoint/2010/main" val="1421508047"/>
+      </p:ext>
+    </p:extLst>
+  </p:cSld>
+  <p:clrMapOvr>
+    <a:masterClrMapping/>
+  </p:clrMapOvr>
+</p:sld>
+</file>
+
+<file path=ppt/slides/slide27.xml><?xml version="1.0" encoding="utf-8"?>
+<p:sld xmlns:a="http://schemas.openxmlformats.org/drawingml/2006/main" xmlns:r="http://schemas.openxmlformats.org/officeDocument/2006/relationships" xmlns:p="http://schemas.openxmlformats.org/presentationml/2006/main">
+  <p:cSld>
+    <p:spTree>
+      <p:nvGrpSpPr>
+        <p:cNvPr id="1" name=""/>
+        <p:cNvGrpSpPr/>
+        <p:nvPr/>
+      </p:nvGrpSpPr>
+      <p:grpSpPr>
+        <a:xfrm>
+          <a:off x="0" y="0"/>
+          <a:ext cx="0" cy="0"/>
+          <a:chOff x="0" y="0"/>
+          <a:chExt cx="0" cy="0"/>
+        </a:xfrm>
+      </p:grpSpPr>
+      <p:pic>
+        <p:nvPicPr>
+          <p:cNvPr id="3" name="selectMe">
+            <a:extLst>
+              <a:ext uri="{FF2B5EF4-FFF2-40B4-BE49-F238E27FC236}">
+                <a16:creationId xmlns:a16="http://schemas.microsoft.com/office/drawing/2014/main" id="{063F6D96-8C57-440E-921B-1C0D5A5C810B}"/>
+              </a:ext>
+            </a:extLst>
+          </p:cNvPr>
+          <p:cNvPicPr>
+            <a:picLocks noChangeAspect="1"/>
+          </p:cNvPicPr>
+          <p:nvPr/>
+        </p:nvPicPr>
+        <p:blipFill>
+          <a:blip r:embed="rId3">
+            <a:extLst>
+              <a:ext uri="{28A0092B-C50C-407E-A947-70E740481C1C}">
+                <a14:useLocalDpi xmlns:a14="http://schemas.microsoft.com/office/drawing/2010/main" val="0"/>
+              </a:ext>
+            </a:extLst>
+          </a:blip>
+          <a:stretch>
+            <a:fillRect/>
+          </a:stretch>
+        </p:blipFill>
+        <p:spPr>
+          <a:xfrm>
+            <a:off x="0" y="370582"/>
+            <a:ext cx="9144000" cy="6116836"/>
+          </a:xfrm>
+          <a:prstGeom prst="rect">
+            <a:avLst/>
+          </a:prstGeom>
+        </p:spPr>
+      </p:pic>
+    </p:spTree>
+    <p:extLst>
+      <p:ext uri="{BB962C8B-B14F-4D97-AF65-F5344CB8AC3E}">
+        <p14:creationId xmlns:p14="http://schemas.microsoft.com/office/powerpoint/2010/main" val="2753748216"/>
+      </p:ext>
+    </p:extLst>
+  </p:cSld>
+  <p:clrMapOvr>
+    <a:masterClrMapping/>
+  </p:clrMapOvr>
+</p:sld>
+</file>
+
+<file path=ppt/slides/slide28.xml><?xml version="1.0" encoding="utf-8"?>
+<p:sld xmlns:a="http://schemas.openxmlformats.org/drawingml/2006/main" xmlns:r="http://schemas.openxmlformats.org/officeDocument/2006/relationships" xmlns:p="http://schemas.openxmlformats.org/presentationml/2006/main">
+  <p:cSld>
+    <p:spTree>
+      <p:nvGrpSpPr>
+        <p:cNvPr id="1" name=""/>
+        <p:cNvGrpSpPr/>
+        <p:nvPr/>
+      </p:nvGrpSpPr>
+      <p:grpSpPr>
+        <a:xfrm>
+          <a:off x="0" y="0"/>
+          <a:ext cx="0" cy="0"/>
+          <a:chOff x="0" y="0"/>
+          <a:chExt cx="0" cy="0"/>
+        </a:xfrm>
+      </p:grpSpPr>
+      <p:pic>
+        <p:nvPicPr>
+          <p:cNvPr id="4" name="selectMe"/>
+          <p:cNvPicPr>
+            <a:picLocks noChangeAspect="1"/>
+          </p:cNvPicPr>
+          <p:nvPr/>
+        </p:nvPicPr>
+        <p:blipFill>
+          <a:blip r:embed="rId3">
+            <a:extLst>
+              <a:ext uri="{28A0092B-C50C-407E-A947-70E740481C1C}">
+                <a14:useLocalDpi xmlns:a14="http://schemas.microsoft.com/office/drawing/2010/main" val="0"/>
+              </a:ext>
+            </a:extLst>
+          </a:blip>
+          <a:stretch>
+            <a:fillRect/>
+          </a:stretch>
+        </p:blipFill>
+        <p:spPr>
+          <a:xfrm rot="19620406">
+            <a:off x="2362200" y="1295400"/>
+            <a:ext cx="4572000" cy="3058418"/>
+          </a:xfrm>
+          <a:prstGeom prst="rect">
+            <a:avLst/>
+          </a:prstGeom>
+        </p:spPr>
+      </p:pic>
+    </p:spTree>
+    <p:extLst>
+      <p:ext uri="{BB962C8B-B14F-4D97-AF65-F5344CB8AC3E}">
+        <p14:creationId xmlns:p14="http://schemas.microsoft.com/office/powerpoint/2010/main" val="1942971641"/>
+      </p:ext>
+    </p:extLst>
+  </p:cSld>
+  <p:clrMapOvr>
+    <a:masterClrMapping/>
+  </p:clrMapOvr>
+</p:sld>
+</file>
+
+<file path=ppt/slides/slide29.xml><?xml version="1.0" encoding="utf-8"?>
+<p:sld xmlns:a="http://schemas.openxmlformats.org/drawingml/2006/main" xmlns:r="http://schemas.openxmlformats.org/officeDocument/2006/relationships" xmlns:p="http://schemas.openxmlformats.org/presentationml/2006/main">
+  <p:cSld>
+    <p:spTree>
+      <p:nvGrpSpPr>
+        <p:cNvPr id="1" name=""/>
+        <p:cNvGrpSpPr/>
+        <p:nvPr/>
+      </p:nvGrpSpPr>
+      <p:grpSpPr>
+        <a:xfrm>
+          <a:off x="0" y="0"/>
+          <a:ext cx="0" cy="0"/>
+          <a:chOff x="0" y="0"/>
+          <a:chExt cx="0" cy="0"/>
+        </a:xfrm>
+      </p:grpSpPr>
+      <p:pic>
+        <p:nvPicPr>
+          <p:cNvPr id="3" name="selectMe">
+            <a:extLst>
+              <a:ext uri="{FF2B5EF4-FFF2-40B4-BE49-F238E27FC236}">
+                <a16:creationId xmlns:a16="http://schemas.microsoft.com/office/drawing/2014/main" id="{97E693C9-324B-4A09-A689-A1DFF118EC91}"/>
+              </a:ext>
+            </a:extLst>
+          </p:cNvPr>
+          <p:cNvPicPr>
+            <a:picLocks noChangeAspect="1"/>
+          </p:cNvPicPr>
+          <p:nvPr/>
+        </p:nvPicPr>
+        <p:blipFill>
+          <a:blip r:embed="rId3">
+            <a:extLst>
+              <a:ext uri="{28A0092B-C50C-407E-A947-70E740481C1C}">
+                <a14:useLocalDpi xmlns:a14="http://schemas.microsoft.com/office/drawing/2010/main" val="0"/>
+              </a:ext>
+            </a:extLst>
+          </a:blip>
+          <a:stretch>
+            <a:fillRect/>
+          </a:stretch>
+        </p:blipFill>
+        <p:spPr>
+          <a:xfrm rot="19620406">
+            <a:off x="1470539" y="1354292"/>
+            <a:ext cx="6202923" cy="4149416"/>
+          </a:xfrm>
+          <a:prstGeom prst="rect">
+            <a:avLst/>
+          </a:prstGeom>
+        </p:spPr>
+      </p:pic>
+    </p:spTree>
+    <p:extLst>
+      <p:ext uri="{BB962C8B-B14F-4D97-AF65-F5344CB8AC3E}">
+        <p14:creationId xmlns:p14="http://schemas.microsoft.com/office/powerpoint/2010/main" val="4262159515"/>
+      </p:ext>
+    </p:extLst>
+  </p:cSld>
+  <p:clrMapOvr>
+    <a:masterClrMapping/>
+  </p:clrMapOvr>
+</p:sld>
+</file>
+
 <file path=ppt/slides/slide3.xml><?xml version="1.0" encoding="utf-8"?>
 <p:sld xmlns:a="http://schemas.openxmlformats.org/drawingml/2006/main" xmlns:r="http://schemas.openxmlformats.org/officeDocument/2006/relationships" xmlns:p="http://schemas.openxmlformats.org/presentationml/2006/main">
   <p:cSld>
@@ -17296,16 +18405,8 @@
           <a:lstStyle/>
           <a:p>
             <a:r>
-              <a:rPr lang="en-US" dirty="0" smtClean="0"/>
-              <a:t>Paste:: Paste To </a:t>
-            </a:r>
-            <a:r>
               <a:rPr lang="en-US" dirty="0"/>
-              <a:t>F</a:t>
-            </a:r>
-            <a:r>
-              <a:rPr lang="en-US" dirty="0" smtClean="0"/>
-              <a:t>ill Slide </a:t>
+              <a:t>Paste:: Paste To Fill Slide </a:t>
             </a:r>
             <a:endParaRPr lang="en-SG" dirty="0"/>
           </a:p>
@@ -17330,57 +18431,45 @@
               <a:buNone/>
             </a:pPr>
             <a:r>
-              <a:rPr lang="en-US" b="1" dirty="0" smtClean="0"/>
-              <a:t>Additional instructions</a:t>
-            </a:r>
-            <a:r>
               <a:rPr lang="en-US" b="1" dirty="0"/>
-              <a:t>:</a:t>
+              <a:t>Additional instructions:</a:t>
             </a:r>
           </a:p>
           <a:p>
             <a:pPr marL="285750" indent="-285750"/>
             <a:r>
               <a:rPr lang="en-US" dirty="0"/>
-              <a:t>Select </a:t>
-            </a:r>
-            <a:r>
-              <a:rPr lang="en-US" dirty="0" smtClean="0"/>
-              <a:t>the appropriate shape/group.</a:t>
-            </a:r>
-            <a:endParaRPr lang="en-US" dirty="0"/>
+              <a:t>Select the appropriate shape/group.</a:t>
+            </a:r>
           </a:p>
           <a:p>
             <a:pPr marL="285750" indent="-285750"/>
             <a:r>
-              <a:rPr lang="en-US" dirty="0" smtClean="0"/>
+              <a:rPr lang="en-US" dirty="0"/>
               <a:t>Right click on the shape/group and click cut.</a:t>
             </a:r>
-            <a:endParaRPr lang="en-US" dirty="0"/>
           </a:p>
           <a:p>
             <a:pPr marL="285750" indent="-285750"/>
             <a:r>
-              <a:rPr lang="en-US" dirty="0" smtClean="0"/>
+              <a:rPr lang="en-US" dirty="0"/>
               <a:t>Right click on an empty position on the slide</a:t>
             </a:r>
-            <a:endParaRPr lang="en-US" dirty="0"/>
           </a:p>
           <a:p>
             <a:pPr marL="285750" indent="-285750"/>
             <a:r>
-              <a:rPr lang="en-US" dirty="0" smtClean="0"/>
+              <a:rPr lang="en-US" dirty="0"/>
               <a:t>Select Paste To Fill Slide under the </a:t>
             </a:r>
             <a:r>
-              <a:rPr lang="en-US" dirty="0" err="1" smtClean="0"/>
+              <a:rPr lang="en-US" dirty="0" err="1"/>
               <a:t>PowerPointLabs</a:t>
             </a:r>
             <a:r>
-              <a:rPr lang="en-US" dirty="0" smtClean="0"/>
+              <a:rPr lang="en-US" dirty="0"/>
               <a:t> context menu</a:t>
             </a:r>
-            <a:endParaRPr lang="en-US" dirty="0"/>
           </a:p>
         </p:txBody>
       </p:sp>
@@ -17388,6 +18477,455 @@
     <p:extLst>
       <p:ext uri="{BB962C8B-B14F-4D97-AF65-F5344CB8AC3E}">
         <p14:creationId xmlns:p14="http://schemas.microsoft.com/office/powerpoint/2010/main" val="3856831695"/>
+      </p:ext>
+    </p:extLst>
+  </p:cSld>
+  <p:clrMapOvr>
+    <a:masterClrMapping/>
+  </p:clrMapOvr>
+</p:sld>
+</file>
+
+<file path=ppt/slides/slide30.xml><?xml version="1.0" encoding="utf-8"?>
+<p:sld xmlns:a="http://schemas.openxmlformats.org/drawingml/2006/main" xmlns:r="http://schemas.openxmlformats.org/officeDocument/2006/relationships" xmlns:p="http://schemas.openxmlformats.org/presentationml/2006/main">
+  <p:cSld>
+    <p:spTree>
+      <p:nvGrpSpPr>
+        <p:cNvPr id="1" name=""/>
+        <p:cNvGrpSpPr/>
+        <p:nvPr/>
+      </p:nvGrpSpPr>
+      <p:grpSpPr>
+        <a:xfrm>
+          <a:off x="0" y="0"/>
+          <a:ext cx="0" cy="0"/>
+          <a:chOff x="0" y="0"/>
+          <a:chExt cx="0" cy="0"/>
+        </a:xfrm>
+      </p:grpSpPr>
+      <p:pic>
+        <p:nvPicPr>
+          <p:cNvPr id="5" name="selectMe"/>
+          <p:cNvPicPr>
+            <a:picLocks noChangeAspect="1"/>
+          </p:cNvPicPr>
+          <p:nvPr/>
+        </p:nvPicPr>
+        <p:blipFill>
+          <a:blip r:embed="rId3">
+            <a:extLst>
+              <a:ext uri="{28A0092B-C50C-407E-A947-70E740481C1C}">
+                <a14:useLocalDpi xmlns:a14="http://schemas.microsoft.com/office/drawing/2010/main" val="0"/>
+              </a:ext>
+            </a:extLst>
+          </a:blip>
+          <a:stretch>
+            <a:fillRect/>
+          </a:stretch>
+        </p:blipFill>
+        <p:spPr>
+          <a:xfrm>
+            <a:off x="2057400" y="2057400"/>
+            <a:ext cx="4572000" cy="3058418"/>
+          </a:xfrm>
+          <a:prstGeom prst="rect">
+            <a:avLst/>
+          </a:prstGeom>
+        </p:spPr>
+      </p:pic>
+      <p:pic>
+        <p:nvPicPr>
+          <p:cNvPr id="3" name="selectMe1"/>
+          <p:cNvPicPr>
+            <a:picLocks noChangeAspect="1"/>
+          </p:cNvPicPr>
+          <p:nvPr/>
+        </p:nvPicPr>
+        <p:blipFill>
+          <a:blip r:embed="rId4">
+            <a:extLst>
+              <a:ext uri="{28A0092B-C50C-407E-A947-70E740481C1C}">
+                <a14:useLocalDpi xmlns:a14="http://schemas.microsoft.com/office/drawing/2010/main" val="0"/>
+              </a:ext>
+            </a:extLst>
+          </a:blip>
+          <a:srcRect l="26687" t="26687" r="27736" b="26687"/>
+          <a:stretch>
+            <a:fillRect/>
+          </a:stretch>
+        </p:blipFill>
+        <p:spPr>
+          <a:xfrm>
+            <a:off x="2896508" y="762000"/>
+            <a:ext cx="2893784" cy="2960418"/>
+          </a:xfrm>
+          <a:prstGeom prst="rect">
+            <a:avLst/>
+          </a:prstGeom>
+        </p:spPr>
+      </p:pic>
+    </p:spTree>
+    <p:extLst>
+      <p:ext uri="{BB962C8B-B14F-4D97-AF65-F5344CB8AC3E}">
+        <p14:creationId xmlns:p14="http://schemas.microsoft.com/office/powerpoint/2010/main" val="3180922043"/>
+      </p:ext>
+    </p:extLst>
+  </p:cSld>
+  <p:clrMapOvr>
+    <a:masterClrMapping/>
+  </p:clrMapOvr>
+</p:sld>
+</file>
+
+<file path=ppt/slides/slide31.xml><?xml version="1.0" encoding="utf-8"?>
+<p:sld xmlns:a="http://schemas.openxmlformats.org/drawingml/2006/main" xmlns:r="http://schemas.openxmlformats.org/officeDocument/2006/relationships" xmlns:p="http://schemas.openxmlformats.org/presentationml/2006/main">
+  <p:cSld>
+    <p:spTree>
+      <p:nvGrpSpPr>
+        <p:cNvPr id="1" name=""/>
+        <p:cNvGrpSpPr/>
+        <p:nvPr/>
+      </p:nvGrpSpPr>
+      <p:grpSpPr>
+        <a:xfrm>
+          <a:off x="0" y="0"/>
+          <a:ext cx="0" cy="0"/>
+          <a:chOff x="0" y="0"/>
+          <a:chExt cx="0" cy="0"/>
+        </a:xfrm>
+      </p:grpSpPr>
+      <p:grpSp>
+        <p:nvGrpSpPr>
+          <p:cNvPr id="2" name="Group 1">
+            <a:extLst>
+              <a:ext uri="{FF2B5EF4-FFF2-40B4-BE49-F238E27FC236}">
+                <a16:creationId xmlns:a16="http://schemas.microsoft.com/office/drawing/2014/main" id="{2AA390AC-8F39-407E-930D-1FF357A9E7C2}"/>
+              </a:ext>
+            </a:extLst>
+          </p:cNvPr>
+          <p:cNvGrpSpPr>
+            <a:grpSpLocks noChangeAspect="1"/>
+          </p:cNvGrpSpPr>
+          <p:nvPr/>
+        </p:nvGrpSpPr>
+        <p:grpSpPr>
+          <a:xfrm>
+            <a:off x="971163" y="0"/>
+            <a:ext cx="7201674" cy="6857999"/>
+            <a:chOff x="2057400" y="762000"/>
+            <a:chExt cx="4572000" cy="4353818"/>
+          </a:xfrm>
+        </p:grpSpPr>
+        <p:pic>
+          <p:nvPicPr>
+            <p:cNvPr id="4" name="selectMe">
+              <a:extLst>
+                <a:ext uri="{FF2B5EF4-FFF2-40B4-BE49-F238E27FC236}">
+                  <a16:creationId xmlns:a16="http://schemas.microsoft.com/office/drawing/2014/main" id="{7FAE5008-CD7B-48EE-BB15-BB675BC5E358}"/>
+                </a:ext>
+              </a:extLst>
+            </p:cNvPr>
+            <p:cNvPicPr>
+              <a:picLocks noChangeAspect="1"/>
+            </p:cNvPicPr>
+            <p:nvPr/>
+          </p:nvPicPr>
+          <p:blipFill>
+            <a:blip r:embed="rId3">
+              <a:extLst>
+                <a:ext uri="{28A0092B-C50C-407E-A947-70E740481C1C}">
+                  <a14:useLocalDpi xmlns:a14="http://schemas.microsoft.com/office/drawing/2010/main" val="0"/>
+                </a:ext>
+              </a:extLst>
+            </a:blip>
+            <a:stretch>
+              <a:fillRect/>
+            </a:stretch>
+          </p:blipFill>
+          <p:spPr>
+            <a:xfrm>
+              <a:off x="2057400" y="2057400"/>
+              <a:ext cx="4572000" cy="3058418"/>
+            </a:xfrm>
+            <a:prstGeom prst="rect">
+              <a:avLst/>
+            </a:prstGeom>
+          </p:spPr>
+        </p:pic>
+        <p:pic>
+          <p:nvPicPr>
+            <p:cNvPr id="6" name="selectMe1">
+              <a:extLst>
+                <a:ext uri="{FF2B5EF4-FFF2-40B4-BE49-F238E27FC236}">
+                  <a16:creationId xmlns:a16="http://schemas.microsoft.com/office/drawing/2014/main" id="{0CBD59F5-66D6-4328-A6DE-4DDFB7FF3B76}"/>
+                </a:ext>
+              </a:extLst>
+            </p:cNvPr>
+            <p:cNvPicPr>
+              <a:picLocks noChangeAspect="1"/>
+            </p:cNvPicPr>
+            <p:nvPr/>
+          </p:nvPicPr>
+          <p:blipFill>
+            <a:blip r:embed="rId4">
+              <a:extLst>
+                <a:ext uri="{28A0092B-C50C-407E-A947-70E740481C1C}">
+                  <a14:useLocalDpi xmlns:a14="http://schemas.microsoft.com/office/drawing/2010/main" val="0"/>
+                </a:ext>
+              </a:extLst>
+            </a:blip>
+            <a:srcRect l="26687" t="26687" r="27736" b="26687"/>
+            <a:stretch>
+              <a:fillRect/>
+            </a:stretch>
+          </p:blipFill>
+          <p:spPr>
+            <a:xfrm>
+              <a:off x="2896508" y="762000"/>
+              <a:ext cx="2893784" cy="2960418"/>
+            </a:xfrm>
+            <a:prstGeom prst="rect">
+              <a:avLst/>
+            </a:prstGeom>
+          </p:spPr>
+        </p:pic>
+      </p:grpSp>
+    </p:spTree>
+    <p:extLst>
+      <p:ext uri="{BB962C8B-B14F-4D97-AF65-F5344CB8AC3E}">
+        <p14:creationId xmlns:p14="http://schemas.microsoft.com/office/powerpoint/2010/main" val="3386885968"/>
+      </p:ext>
+    </p:extLst>
+  </p:cSld>
+  <p:clrMapOvr>
+    <a:masterClrMapping/>
+  </p:clrMapOvr>
+</p:sld>
+</file>
+
+<file path=ppt/slides/slide32.xml><?xml version="1.0" encoding="utf-8"?>
+<p:sld xmlns:a="http://schemas.openxmlformats.org/drawingml/2006/main" xmlns:r="http://schemas.openxmlformats.org/officeDocument/2006/relationships" xmlns:p="http://schemas.openxmlformats.org/presentationml/2006/main">
+  <p:cSld>
+    <p:spTree>
+      <p:nvGrpSpPr>
+        <p:cNvPr id="1" name=""/>
+        <p:cNvGrpSpPr/>
+        <p:nvPr/>
+      </p:nvGrpSpPr>
+      <p:grpSpPr>
+        <a:xfrm>
+          <a:off x="0" y="0"/>
+          <a:ext cx="0" cy="0"/>
+          <a:chOff x="0" y="0"/>
+          <a:chExt cx="0" cy="0"/>
+        </a:xfrm>
+      </p:grpSpPr>
+      <p:grpSp>
+        <p:nvGrpSpPr>
+          <p:cNvPr id="2" name="selectMe"/>
+          <p:cNvGrpSpPr/>
+          <p:nvPr/>
+        </p:nvGrpSpPr>
+        <p:grpSpPr>
+          <a:xfrm>
+            <a:off x="2057400" y="762000"/>
+            <a:ext cx="4572000" cy="4353818"/>
+            <a:chOff x="2057400" y="762000"/>
+            <a:chExt cx="4572000" cy="4353818"/>
+          </a:xfrm>
+        </p:grpSpPr>
+        <p:pic>
+          <p:nvPicPr>
+            <p:cNvPr id="5" name="selectMe2"/>
+            <p:cNvPicPr>
+              <a:picLocks noChangeAspect="1"/>
+            </p:cNvPicPr>
+            <p:nvPr/>
+          </p:nvPicPr>
+          <p:blipFill>
+            <a:blip r:embed="rId3">
+              <a:extLst>
+                <a:ext uri="{28A0092B-C50C-407E-A947-70E740481C1C}">
+                  <a14:useLocalDpi xmlns:a14="http://schemas.microsoft.com/office/drawing/2010/main" val="0"/>
+                </a:ext>
+              </a:extLst>
+            </a:blip>
+            <a:stretch>
+              <a:fillRect/>
+            </a:stretch>
+          </p:blipFill>
+          <p:spPr>
+            <a:xfrm>
+              <a:off x="2057400" y="2057400"/>
+              <a:ext cx="4572000" cy="3058418"/>
+            </a:xfrm>
+            <a:prstGeom prst="rect">
+              <a:avLst/>
+            </a:prstGeom>
+          </p:spPr>
+        </p:pic>
+        <p:pic>
+          <p:nvPicPr>
+            <p:cNvPr id="3" name="selectMe1"/>
+            <p:cNvPicPr>
+              <a:picLocks noChangeAspect="1"/>
+            </p:cNvPicPr>
+            <p:nvPr/>
+          </p:nvPicPr>
+          <p:blipFill>
+            <a:blip r:embed="rId4">
+              <a:extLst>
+                <a:ext uri="{28A0092B-C50C-407E-A947-70E740481C1C}">
+                  <a14:useLocalDpi xmlns:a14="http://schemas.microsoft.com/office/drawing/2010/main" val="0"/>
+                </a:ext>
+              </a:extLst>
+            </a:blip>
+            <a:srcRect l="26687" t="26687" r="27736" b="26687"/>
+            <a:stretch>
+              <a:fillRect/>
+            </a:stretch>
+          </p:blipFill>
+          <p:spPr>
+            <a:xfrm>
+              <a:off x="2896508" y="762000"/>
+              <a:ext cx="2893784" cy="2960418"/>
+            </a:xfrm>
+            <a:prstGeom prst="rect">
+              <a:avLst/>
+            </a:prstGeom>
+          </p:spPr>
+        </p:pic>
+      </p:grpSp>
+    </p:spTree>
+    <p:extLst>
+      <p:ext uri="{BB962C8B-B14F-4D97-AF65-F5344CB8AC3E}">
+        <p14:creationId xmlns:p14="http://schemas.microsoft.com/office/powerpoint/2010/main" val="1371031776"/>
+      </p:ext>
+    </p:extLst>
+  </p:cSld>
+  <p:clrMapOvr>
+    <a:masterClrMapping/>
+  </p:clrMapOvr>
+</p:sld>
+</file>
+
+<file path=ppt/slides/slide33.xml><?xml version="1.0" encoding="utf-8"?>
+<p:sld xmlns:a="http://schemas.openxmlformats.org/drawingml/2006/main" xmlns:r="http://schemas.openxmlformats.org/officeDocument/2006/relationships" xmlns:p="http://schemas.openxmlformats.org/presentationml/2006/main">
+  <p:cSld>
+    <p:spTree>
+      <p:nvGrpSpPr>
+        <p:cNvPr id="1" name=""/>
+        <p:cNvGrpSpPr/>
+        <p:nvPr/>
+      </p:nvGrpSpPr>
+      <p:grpSpPr>
+        <a:xfrm>
+          <a:off x="0" y="0"/>
+          <a:ext cx="0" cy="0"/>
+          <a:chOff x="0" y="0"/>
+          <a:chExt cx="0" cy="0"/>
+        </a:xfrm>
+      </p:grpSpPr>
+      <p:grpSp>
+        <p:nvGrpSpPr>
+          <p:cNvPr id="6" name="selectMe">
+            <a:extLst>
+              <a:ext uri="{FF2B5EF4-FFF2-40B4-BE49-F238E27FC236}">
+                <a16:creationId xmlns:a16="http://schemas.microsoft.com/office/drawing/2014/main" id="{99440D81-4FFA-4893-A454-DFB58FFEEC1F}"/>
+              </a:ext>
+            </a:extLst>
+          </p:cNvPr>
+          <p:cNvGrpSpPr>
+            <a:grpSpLocks noChangeAspect="1"/>
+          </p:cNvGrpSpPr>
+          <p:nvPr/>
+        </p:nvGrpSpPr>
+        <p:grpSpPr>
+          <a:xfrm>
+            <a:off x="971163" y="0"/>
+            <a:ext cx="7201674" cy="6857999"/>
+            <a:chOff x="2057400" y="762000"/>
+            <a:chExt cx="4572000" cy="4353818"/>
+          </a:xfrm>
+        </p:grpSpPr>
+        <p:pic>
+          <p:nvPicPr>
+            <p:cNvPr id="7" name="selectMe2">
+              <a:extLst>
+                <a:ext uri="{FF2B5EF4-FFF2-40B4-BE49-F238E27FC236}">
+                  <a16:creationId xmlns:a16="http://schemas.microsoft.com/office/drawing/2014/main" id="{EF6E2260-8E85-411B-B58A-F25211B9BD9A}"/>
+                </a:ext>
+              </a:extLst>
+            </p:cNvPr>
+            <p:cNvPicPr>
+              <a:picLocks noChangeAspect="1"/>
+            </p:cNvPicPr>
+            <p:nvPr/>
+          </p:nvPicPr>
+          <p:blipFill>
+            <a:blip r:embed="rId3">
+              <a:extLst>
+                <a:ext uri="{28A0092B-C50C-407E-A947-70E740481C1C}">
+                  <a14:useLocalDpi xmlns:a14="http://schemas.microsoft.com/office/drawing/2010/main" val="0"/>
+                </a:ext>
+              </a:extLst>
+            </a:blip>
+            <a:stretch>
+              <a:fillRect/>
+            </a:stretch>
+          </p:blipFill>
+          <p:spPr>
+            <a:xfrm>
+              <a:off x="2057400" y="2057400"/>
+              <a:ext cx="4572000" cy="3058418"/>
+            </a:xfrm>
+            <a:prstGeom prst="rect">
+              <a:avLst/>
+            </a:prstGeom>
+          </p:spPr>
+        </p:pic>
+        <p:pic>
+          <p:nvPicPr>
+            <p:cNvPr id="8" name="selectMe1">
+              <a:extLst>
+                <a:ext uri="{FF2B5EF4-FFF2-40B4-BE49-F238E27FC236}">
+                  <a16:creationId xmlns:a16="http://schemas.microsoft.com/office/drawing/2014/main" id="{B58ED834-2AB1-4135-B883-54EB019142AF}"/>
+                </a:ext>
+              </a:extLst>
+            </p:cNvPr>
+            <p:cNvPicPr>
+              <a:picLocks noChangeAspect="1"/>
+            </p:cNvPicPr>
+            <p:nvPr/>
+          </p:nvPicPr>
+          <p:blipFill>
+            <a:blip r:embed="rId4">
+              <a:extLst>
+                <a:ext uri="{28A0092B-C50C-407E-A947-70E740481C1C}">
+                  <a14:useLocalDpi xmlns:a14="http://schemas.microsoft.com/office/drawing/2010/main" val="0"/>
+                </a:ext>
+              </a:extLst>
+            </a:blip>
+            <a:srcRect l="26687" t="26687" r="27736" b="26687"/>
+            <a:stretch>
+              <a:fillRect/>
+            </a:stretch>
+          </p:blipFill>
+          <p:spPr>
+            <a:xfrm>
+              <a:off x="2896508" y="762000"/>
+              <a:ext cx="2893784" cy="2960418"/>
+            </a:xfrm>
+            <a:prstGeom prst="rect">
+              <a:avLst/>
+            </a:prstGeom>
+          </p:spPr>
+        </p:pic>
+      </p:grpSp>
+    </p:spTree>
+    <p:extLst>
+      <p:ext uri="{BB962C8B-B14F-4D97-AF65-F5344CB8AC3E}">
+        <p14:creationId xmlns:p14="http://schemas.microsoft.com/office/powerpoint/2010/main" val="2662084768"/>
       </p:ext>
     </p:extLst>
   </p:cSld>

</xml_diff>

<commit_message>
#1403 Suggested new feature: Paste To Fit Slide (#1583)
* Updated Action Framework with handlers for PasteToFit, added new cs file for new function and updated TextCollection for new function

* edited Ribbon1.xml to include new function

* Added in ResizeShape method for new function in PasteToFitSlide.cs

* added PasteToFit function into context menu and update all references in files like ThisAddIn and other Action Framework files

* Refactored code by returning empty collection for PasteToFitSlideActionHandler Line 20

* Added PasteToFitSlide icon

* Added relevant FT for new functionality of PasteToFit Slide

* Removed comment about PasteToFit icon
</commit_message>
<xml_diff>
--- a/doc/test/PasteLab/PasteLab.pptx
+++ b/doc/test/PasteLab/PasteLab.pptx
@@ -8,7 +8,7 @@
     <p:sldMasterId id="2147483684" r:id="rId4"/>
   </p:sldMasterIdLst>
   <p:notesMasterIdLst>
-    <p:notesMasterId r:id="rId29"/>
+    <p:notesMasterId r:id="rId38"/>
   </p:notesMasterIdLst>
   <p:sldIdLst>
     <p:sldId id="287" r:id="rId5"/>
@@ -35,6 +35,15 @@
     <p:sldId id="383" r:id="rId26"/>
     <p:sldId id="388" r:id="rId27"/>
     <p:sldId id="395" r:id="rId28"/>
+    <p:sldId id="403" r:id="rId29"/>
+    <p:sldId id="397" r:id="rId30"/>
+    <p:sldId id="404" r:id="rId31"/>
+    <p:sldId id="399" r:id="rId32"/>
+    <p:sldId id="405" r:id="rId33"/>
+    <p:sldId id="401" r:id="rId34"/>
+    <p:sldId id="406" r:id="rId35"/>
+    <p:sldId id="407" r:id="rId36"/>
+    <p:sldId id="408" r:id="rId37"/>
   </p:sldIdLst>
   <p:sldSz cx="9144000" cy="6858000" type="screen4x3"/>
   <p:notesSz cx="6858000" cy="9144000"/>
@@ -166,6 +175,15 @@
             <p14:sldId id="383"/>
             <p14:sldId id="388"/>
             <p14:sldId id="395"/>
+            <p14:sldId id="403"/>
+            <p14:sldId id="397"/>
+            <p14:sldId id="404"/>
+            <p14:sldId id="399"/>
+            <p14:sldId id="405"/>
+            <p14:sldId id="401"/>
+            <p14:sldId id="406"/>
+            <p14:sldId id="407"/>
+            <p14:sldId id="408"/>
           </p14:sldIdLst>
         </p14:section>
       </p14:sectionLst>
@@ -270,7 +288,7 @@
           <a:p>
             <a:fld id="{43E32005-3A63-48D2-8C73-BF5F95786EBD}" type="datetimeFigureOut">
               <a:rPr lang="en-US" smtClean="0"/>
-              <a:t>5/30/2017</a:t>
+              <a:t>2/10/2018</a:t>
             </a:fld>
             <a:endParaRPr lang="en-US"/>
           </a:p>
@@ -334,38 +352,37 @@
           <a:p>
             <a:pPr lvl="0"/>
             <a:r>
-              <a:rPr lang="en-US" smtClean="0"/>
+              <a:rPr lang="en-US"/>
               <a:t>Click to edit Master text styles</a:t>
             </a:r>
           </a:p>
           <a:p>
             <a:pPr lvl="1"/>
             <a:r>
-              <a:rPr lang="en-US" smtClean="0"/>
+              <a:rPr lang="en-US"/>
               <a:t>Second level</a:t>
             </a:r>
           </a:p>
           <a:p>
             <a:pPr lvl="2"/>
             <a:r>
-              <a:rPr lang="en-US" smtClean="0"/>
+              <a:rPr lang="en-US"/>
               <a:t>Third level</a:t>
             </a:r>
           </a:p>
           <a:p>
             <a:pPr lvl="3"/>
             <a:r>
-              <a:rPr lang="en-US" smtClean="0"/>
+              <a:rPr lang="en-US"/>
               <a:t>Fourth level</a:t>
             </a:r>
           </a:p>
           <a:p>
             <a:pPr lvl="4"/>
             <a:r>
-              <a:rPr lang="en-US" smtClean="0"/>
+              <a:rPr lang="en-US"/>
               <a:t>Fifth level</a:t>
             </a:r>
-            <a:endParaRPr lang="en-US"/>
           </a:p>
         </p:txBody>
       </p:sp>
@@ -583,10 +600,9 @@
           <a:lstStyle/>
           <a:p>
             <a:r>
-              <a:rPr lang="en-US" dirty="0" smtClean="0"/>
+              <a:rPr lang="en-US" dirty="0"/>
               <a:t>You can also cut by using ctrl-x</a:t>
             </a:r>
-            <a:endParaRPr lang="en-US" dirty="0"/>
           </a:p>
         </p:txBody>
       </p:sp>
@@ -671,10 +687,9 @@
           <a:lstStyle/>
           <a:p>
             <a:r>
-              <a:rPr lang="en-US" dirty="0" smtClean="0"/>
+              <a:rPr lang="en-US" dirty="0"/>
               <a:t>You can also cut by using ctrl-x</a:t>
             </a:r>
-            <a:endParaRPr lang="en-US" dirty="0"/>
           </a:p>
         </p:txBody>
       </p:sp>
@@ -759,11 +774,11 @@
           <a:lstStyle/>
           <a:p>
             <a:r>
-              <a:rPr lang="en-US" dirty="0" smtClean="0"/>
+              <a:rPr lang="en-US" dirty="0"/>
               <a:t>Original Shapes (1 image) and 1 black</a:t>
             </a:r>
             <a:r>
-              <a:rPr lang="en-US" baseline="0" dirty="0" smtClean="0"/>
+              <a:rPr lang="en-US" baseline="0" dirty="0"/>
               <a:t> square</a:t>
             </a:r>
             <a:endParaRPr lang="en-US" dirty="0"/>
@@ -851,11 +866,11 @@
           <a:lstStyle/>
           <a:p>
             <a:r>
-              <a:rPr lang="en-US" dirty="0" smtClean="0"/>
+              <a:rPr lang="en-US" dirty="0"/>
               <a:t>Expected. Paste To</a:t>
             </a:r>
             <a:r>
-              <a:rPr lang="en-US" baseline="0" dirty="0" smtClean="0"/>
+              <a:rPr lang="en-US" baseline="0" dirty="0"/>
               <a:t> Cursor Position at the center of the black square</a:t>
             </a:r>
             <a:endParaRPr lang="en-US" dirty="0"/>
@@ -943,11 +958,11 @@
           <a:lstStyle/>
           <a:p>
             <a:r>
-              <a:rPr lang="en-US" dirty="0" smtClean="0"/>
+              <a:rPr lang="en-US" dirty="0"/>
               <a:t>Original Shapes (1 image) and 1 black</a:t>
             </a:r>
             <a:r>
-              <a:rPr lang="en-US" baseline="0" dirty="0" smtClean="0"/>
+              <a:rPr lang="en-US" baseline="0" dirty="0"/>
               <a:t> square</a:t>
             </a:r>
             <a:endParaRPr lang="en-US" dirty="0"/>
@@ -1035,11 +1050,11 @@
           <a:lstStyle/>
           <a:p>
             <a:r>
-              <a:rPr lang="en-US" dirty="0" smtClean="0"/>
+              <a:rPr lang="en-US" dirty="0"/>
               <a:t>Expected. Paste To</a:t>
             </a:r>
             <a:r>
-              <a:rPr lang="en-US" baseline="0" dirty="0" smtClean="0"/>
+              <a:rPr lang="en-US" baseline="0" dirty="0"/>
               <a:t> Original Position.</a:t>
             </a:r>
             <a:endParaRPr lang="en-US" dirty="0"/>
@@ -1127,10 +1142,9 @@
           <a:lstStyle/>
           <a:p>
             <a:r>
-              <a:rPr lang="en-US" dirty="0" smtClean="0"/>
+              <a:rPr lang="en-US" dirty="0"/>
               <a:t>You can also cut by using ctrl-x</a:t>
             </a:r>
-            <a:endParaRPr lang="en-US" dirty="0"/>
           </a:p>
         </p:txBody>
       </p:sp>
@@ -1215,11 +1229,11 @@
           <a:lstStyle/>
           <a:p>
             <a:r>
-              <a:rPr lang="en-US" dirty="0" smtClean="0"/>
+              <a:rPr lang="en-US" dirty="0"/>
               <a:t>Original</a:t>
             </a:r>
             <a:r>
-              <a:rPr lang="en-US" baseline="0" dirty="0" smtClean="0"/>
+              <a:rPr lang="en-US" baseline="0" dirty="0"/>
               <a:t> Shapes 3 colored squares and a buildings image</a:t>
             </a:r>
             <a:endParaRPr lang="en-US" dirty="0"/>
@@ -1307,11 +1321,11 @@
           <a:lstStyle/>
           <a:p>
             <a:r>
-              <a:rPr lang="en-US" dirty="0" smtClean="0"/>
+              <a:rPr lang="en-US" dirty="0"/>
               <a:t>Expected.</a:t>
             </a:r>
             <a:r>
-              <a:rPr lang="en-US" baseline="0" dirty="0" smtClean="0"/>
+              <a:rPr lang="en-US" baseline="0" dirty="0"/>
               <a:t> Cut the building image and right click the green square and select Replace With Clipboard.</a:t>
             </a:r>
           </a:p>
@@ -1398,29 +1412,29 @@
           <a:lstStyle/>
           <a:p>
             <a:r>
-              <a:rPr lang="en-US" dirty="0" smtClean="0"/>
+              <a:rPr lang="en-US" dirty="0"/>
               <a:t>Original</a:t>
             </a:r>
             <a:r>
-              <a:rPr lang="en-US" baseline="0" dirty="0" smtClean="0"/>
+              <a:rPr lang="en-US" baseline="0" dirty="0"/>
               <a:t> Shapes</a:t>
             </a:r>
             <a:r>
-              <a:rPr lang="en-US" dirty="0" smtClean="0"/>
+              <a:rPr lang="en-US" dirty="0"/>
               <a:t> 3 colored squares that are merged into a group and building</a:t>
             </a:r>
             <a:r>
-              <a:rPr lang="en-US" baseline="0" dirty="0" smtClean="0"/>
+              <a:rPr lang="en-US" baseline="0" dirty="0"/>
               <a:t> image</a:t>
             </a:r>
           </a:p>
           <a:p>
             <a:r>
-              <a:rPr lang="en-US" dirty="0" smtClean="0"/>
+              <a:rPr lang="en-US" dirty="0"/>
               <a:t>The grou</a:t>
             </a:r>
             <a:r>
-              <a:rPr lang="en-US" baseline="0" dirty="0" smtClean="0"/>
+              <a:rPr lang="en-US" baseline="0" dirty="0"/>
               <a:t>p of 3 colored squares have an appear animation</a:t>
             </a:r>
             <a:endParaRPr lang="en-US" dirty="0"/>
@@ -1508,32 +1522,28 @@
           <a:lstStyle/>
           <a:p>
             <a:r>
-              <a:rPr lang="en-US" dirty="0" smtClean="0"/>
+              <a:rPr lang="en-US" dirty="0"/>
               <a:t>Expected. Cut the building image and Replace With Clipboard</a:t>
             </a:r>
             <a:r>
-              <a:rPr lang="en-US" baseline="0" dirty="0" smtClean="0"/>
+              <a:rPr lang="en-US" baseline="0" dirty="0"/>
               <a:t> using the green square.</a:t>
             </a:r>
           </a:p>
           <a:p>
             <a:r>
-              <a:rPr lang="en-US" dirty="0" smtClean="0"/>
+              <a:rPr lang="en-US" dirty="0"/>
               <a:t>The group remains and picture is at</a:t>
             </a:r>
             <a:r>
-              <a:rPr lang="en-US" baseline="0" dirty="0" smtClean="0"/>
+              <a:rPr lang="en-US" baseline="0" dirty="0"/>
               <a:t> the green square’s position.</a:t>
             </a:r>
             <a:r>
               <a:rPr lang="en-US" b="0" baseline="0" dirty="0"/>
-              <a:t> </a:t>
-            </a:r>
-            <a:r>
-              <a:rPr lang="en-US" b="0" baseline="0" dirty="0" smtClean="0"/>
-              <a:t>Note that the group should still retain its animation</a:t>
-            </a:r>
-            <a:endParaRPr lang="en-US" baseline="0" dirty="0" smtClean="0"/>
+              <a:t> Note that the group should still retain its animation</a:t>
+            </a:r>
+            <a:endParaRPr lang="en-US" baseline="0" dirty="0"/>
           </a:p>
         </p:txBody>
       </p:sp>
@@ -1618,10 +1628,9 @@
           <a:lstStyle/>
           <a:p>
             <a:r>
-              <a:rPr lang="en-US" dirty="0" smtClean="0"/>
+              <a:rPr lang="en-US" dirty="0"/>
               <a:t>Original Shapes (1 image)</a:t>
             </a:r>
-            <a:endParaRPr lang="en-US" dirty="0"/>
           </a:p>
         </p:txBody>
       </p:sp>
@@ -1706,22 +1715,21 @@
           <a:lstStyle/>
           <a:p>
             <a:r>
-              <a:rPr lang="en-US" dirty="0" smtClean="0"/>
+              <a:rPr lang="en-US" dirty="0"/>
               <a:t>You can also cut by using ctrl-x</a:t>
             </a:r>
           </a:p>
           <a:p>
             <a:r>
-              <a:rPr lang="en-US" dirty="0" smtClean="0"/>
+              <a:rPr lang="en-US" dirty="0"/>
               <a:t>You can also copy by using ctrl-c</a:t>
             </a:r>
           </a:p>
           <a:p>
             <a:r>
-              <a:rPr lang="en-US" dirty="0" smtClean="0"/>
+              <a:rPr lang="en-US" dirty="0"/>
               <a:t>Use cut or copy depending on the instructions</a:t>
             </a:r>
-            <a:endParaRPr lang="en-US" dirty="0"/>
           </a:p>
         </p:txBody>
       </p:sp>
@@ -1806,19 +1814,19 @@
           <a:lstStyle/>
           <a:p>
             <a:r>
-              <a:rPr lang="en-US" dirty="0" smtClean="0"/>
+              <a:rPr lang="en-US" dirty="0"/>
               <a:t>Original</a:t>
             </a:r>
             <a:r>
-              <a:rPr lang="en-US" baseline="0" dirty="0" smtClean="0"/>
+              <a:rPr lang="en-US" baseline="0" dirty="0"/>
               <a:t> Shapes</a:t>
             </a:r>
             <a:r>
-              <a:rPr lang="en-US" dirty="0" smtClean="0"/>
+              <a:rPr lang="en-US" dirty="0"/>
               <a:t> 3 colored squares that are merged into a group and building</a:t>
             </a:r>
             <a:r>
-              <a:rPr lang="en-US" baseline="0" dirty="0" smtClean="0"/>
+              <a:rPr lang="en-US" baseline="0" dirty="0"/>
               <a:t> image</a:t>
             </a:r>
           </a:p>
@@ -1841,17 +1849,17 @@
               <a:defRPr/>
             </a:pPr>
             <a:r>
-              <a:rPr lang="en-US" dirty="0" smtClean="0"/>
+              <a:rPr lang="en-US" dirty="0"/>
               <a:t>The grou</a:t>
             </a:r>
             <a:r>
-              <a:rPr lang="en-US" baseline="0" dirty="0" smtClean="0"/>
+              <a:rPr lang="en-US" baseline="0" dirty="0"/>
               <a:t>p of 3 colored squares have an appear animation</a:t>
             </a:r>
-            <a:endParaRPr lang="en-US" dirty="0" smtClean="0"/>
-          </a:p>
-          <a:p>
-            <a:endParaRPr lang="en-US" baseline="0" dirty="0" smtClean="0"/>
+            <a:endParaRPr lang="en-US" dirty="0"/>
+          </a:p>
+          <a:p>
+            <a:endParaRPr lang="en-US" baseline="0" dirty="0"/>
           </a:p>
         </p:txBody>
       </p:sp>
@@ -1936,39 +1944,39 @@
           <a:lstStyle/>
           <a:p>
             <a:r>
-              <a:rPr lang="en-US" dirty="0" smtClean="0"/>
+              <a:rPr lang="en-US" dirty="0"/>
               <a:t>Expected. Cut the building image and Paste Into Group </a:t>
             </a:r>
             <a:r>
-              <a:rPr lang="en-US" baseline="0" dirty="0" smtClean="0"/>
+              <a:rPr lang="en-US" baseline="0" dirty="0"/>
               <a:t>on the group of 3 colored squares</a:t>
             </a:r>
           </a:p>
           <a:p>
             <a:r>
-              <a:rPr lang="en-US" dirty="0" smtClean="0"/>
+              <a:rPr lang="en-US" dirty="0"/>
               <a:t>The image</a:t>
             </a:r>
             <a:r>
-              <a:rPr lang="en-US" baseline="0" dirty="0" smtClean="0"/>
+              <a:rPr lang="en-US" baseline="0" dirty="0"/>
               <a:t> should be in the center of </a:t>
             </a:r>
             <a:r>
-              <a:rPr lang="en-US" baseline="0" smtClean="0"/>
+              <a:rPr lang="en-US" baseline="0"/>
               <a:t>the group.</a:t>
             </a:r>
             <a:r>
-              <a:rPr lang="en-US" b="0" baseline="0" smtClean="0"/>
+              <a:rPr lang="en-US" b="0" baseline="0"/>
               <a:t> </a:t>
             </a:r>
             <a:r>
-              <a:rPr lang="en-US" b="0" baseline="0" dirty="0" smtClean="0"/>
+              <a:rPr lang="en-US" b="0" baseline="0" dirty="0"/>
               <a:t>Note that the group should still retain its animation</a:t>
             </a:r>
-            <a:endParaRPr lang="en-US" baseline="0" dirty="0" smtClean="0"/>
-          </a:p>
-          <a:p>
-            <a:endParaRPr lang="en-US" baseline="0" dirty="0" smtClean="0"/>
+            <a:endParaRPr lang="en-US" baseline="0" dirty="0"/>
+          </a:p>
+          <a:p>
+            <a:endParaRPr lang="en-US" baseline="0" dirty="0"/>
           </a:p>
         </p:txBody>
       </p:sp>
@@ -1999,6 +2007,688 @@
     <p:extLst>
       <p:ext uri="{BB962C8B-B14F-4D97-AF65-F5344CB8AC3E}">
         <p14:creationId xmlns:p14="http://schemas.microsoft.com/office/powerpoint/2010/main" val="1944604826"/>
+      </p:ext>
+    </p:extLst>
+  </p:cSld>
+  <p:clrMapOvr>
+    <a:masterClrMapping/>
+  </p:clrMapOvr>
+</p:notes>
+</file>
+
+<file path=ppt/notesSlides/notesSlide23.xml><?xml version="1.0" encoding="utf-8"?>
+<p:notes xmlns:a="http://schemas.openxmlformats.org/drawingml/2006/main" xmlns:r="http://schemas.openxmlformats.org/officeDocument/2006/relationships" xmlns:p="http://schemas.openxmlformats.org/presentationml/2006/main">
+  <p:cSld>
+    <p:spTree>
+      <p:nvGrpSpPr>
+        <p:cNvPr id="1" name=""/>
+        <p:cNvGrpSpPr/>
+        <p:nvPr/>
+      </p:nvGrpSpPr>
+      <p:grpSpPr>
+        <a:xfrm>
+          <a:off x="0" y="0"/>
+          <a:ext cx="0" cy="0"/>
+          <a:chOff x="0" y="0"/>
+          <a:chExt cx="0" cy="0"/>
+        </a:xfrm>
+      </p:grpSpPr>
+      <p:sp>
+        <p:nvSpPr>
+          <p:cNvPr id="2" name="Slide Image Placeholder 1"/>
+          <p:cNvSpPr>
+            <a:spLocks noGrp="1" noRot="1" noChangeAspect="1"/>
+          </p:cNvSpPr>
+          <p:nvPr>
+            <p:ph type="sldImg"/>
+          </p:nvPr>
+        </p:nvSpPr>
+        <p:spPr/>
+      </p:sp>
+      <p:sp>
+        <p:nvSpPr>
+          <p:cNvPr id="3" name="Notes Placeholder 2"/>
+          <p:cNvSpPr>
+            <a:spLocks noGrp="1"/>
+          </p:cNvSpPr>
+          <p:nvPr>
+            <p:ph type="body" idx="1"/>
+          </p:nvPr>
+        </p:nvSpPr>
+        <p:spPr/>
+        <p:txBody>
+          <a:bodyPr/>
+          <a:lstStyle/>
+          <a:p>
+            <a:r>
+              <a:rPr lang="en-US" dirty="0"/>
+              <a:t>You can also cut by using ctrl-x</a:t>
+            </a:r>
+          </a:p>
+        </p:txBody>
+      </p:sp>
+      <p:sp>
+        <p:nvSpPr>
+          <p:cNvPr id="4" name="Slide Number Placeholder 3"/>
+          <p:cNvSpPr>
+            <a:spLocks noGrp="1"/>
+          </p:cNvSpPr>
+          <p:nvPr>
+            <p:ph type="sldNum" sz="quarter" idx="10"/>
+          </p:nvPr>
+        </p:nvSpPr>
+        <p:spPr/>
+        <p:txBody>
+          <a:bodyPr/>
+          <a:lstStyle/>
+          <a:p>
+            <a:pPr marL="0" marR="0" lvl="0" indent="0" algn="r" defTabSz="914400" rtl="0" eaLnBrk="1" fontAlgn="auto" latinLnBrk="0" hangingPunct="1">
+              <a:lnSpc>
+                <a:spcPct val="100000"/>
+              </a:lnSpc>
+              <a:spcBef>
+                <a:spcPts val="0"/>
+              </a:spcBef>
+              <a:spcAft>
+                <a:spcPts val="0"/>
+              </a:spcAft>
+              <a:buClrTx/>
+              <a:buSzTx/>
+              <a:buFontTx/>
+              <a:buNone/>
+              <a:tabLst/>
+              <a:defRPr/>
+            </a:pPr>
+            <a:fld id="{0FE7C38A-472B-4221-8E00-509E1DA863EC}" type="slidenum">
+              <a:rPr kumimoji="0" lang="en-US" sz="1200" b="0" i="0" u="none" strike="noStrike" kern="1200" cap="none" spc="0" normalizeH="0" baseline="0" noProof="0" smtClean="0">
+                <a:ln>
+                  <a:noFill/>
+                </a:ln>
+                <a:solidFill>
+                  <a:prstClr val="black"/>
+                </a:solidFill>
+                <a:effectLst/>
+                <a:uLnTx/>
+                <a:uFillTx/>
+                <a:latin typeface="Calibri" panose="020F0502020204030204"/>
+                <a:ea typeface="+mn-ea"/>
+                <a:cs typeface="+mn-cs"/>
+              </a:rPr>
+              <a:pPr marL="0" marR="0" lvl="0" indent="0" algn="r" defTabSz="914400" rtl="0" eaLnBrk="1" fontAlgn="auto" latinLnBrk="0" hangingPunct="1">
+                <a:lnSpc>
+                  <a:spcPct val="100000"/>
+                </a:lnSpc>
+                <a:spcBef>
+                  <a:spcPts val="0"/>
+                </a:spcBef>
+                <a:spcAft>
+                  <a:spcPts val="0"/>
+                </a:spcAft>
+                <a:buClrTx/>
+                <a:buSzTx/>
+                <a:buFontTx/>
+                <a:buNone/>
+                <a:tabLst/>
+                <a:defRPr/>
+              </a:pPr>
+              <a:t>25</a:t>
+            </a:fld>
+            <a:endParaRPr kumimoji="0" lang="en-US" sz="1200" b="0" i="0" u="none" strike="noStrike" kern="1200" cap="none" spc="0" normalizeH="0" baseline="0" noProof="0">
+              <a:ln>
+                <a:noFill/>
+              </a:ln>
+              <a:solidFill>
+                <a:prstClr val="black"/>
+              </a:solidFill>
+              <a:effectLst/>
+              <a:uLnTx/>
+              <a:uFillTx/>
+              <a:latin typeface="Calibri" panose="020F0502020204030204"/>
+              <a:ea typeface="+mn-ea"/>
+              <a:cs typeface="+mn-cs"/>
+            </a:endParaRPr>
+          </a:p>
+        </p:txBody>
+      </p:sp>
+    </p:spTree>
+    <p:extLst>
+      <p:ext uri="{BB962C8B-B14F-4D97-AF65-F5344CB8AC3E}">
+        <p14:creationId xmlns:p14="http://schemas.microsoft.com/office/powerpoint/2010/main" val="871116934"/>
+      </p:ext>
+    </p:extLst>
+  </p:cSld>
+  <p:clrMapOvr>
+    <a:masterClrMapping/>
+  </p:clrMapOvr>
+</p:notes>
+</file>
+
+<file path=ppt/notesSlides/notesSlide24.xml><?xml version="1.0" encoding="utf-8"?>
+<p:notes xmlns:a="http://schemas.openxmlformats.org/drawingml/2006/main" xmlns:r="http://schemas.openxmlformats.org/officeDocument/2006/relationships" xmlns:p="http://schemas.openxmlformats.org/presentationml/2006/main">
+  <p:cSld>
+    <p:spTree>
+      <p:nvGrpSpPr>
+        <p:cNvPr id="1" name=""/>
+        <p:cNvGrpSpPr/>
+        <p:nvPr/>
+      </p:nvGrpSpPr>
+      <p:grpSpPr>
+        <a:xfrm>
+          <a:off x="0" y="0"/>
+          <a:ext cx="0" cy="0"/>
+          <a:chOff x="0" y="0"/>
+          <a:chExt cx="0" cy="0"/>
+        </a:xfrm>
+      </p:grpSpPr>
+      <p:sp>
+        <p:nvSpPr>
+          <p:cNvPr id="2" name="Slide Image Placeholder 1"/>
+          <p:cNvSpPr>
+            <a:spLocks noGrp="1" noRot="1" noChangeAspect="1"/>
+          </p:cNvSpPr>
+          <p:nvPr>
+            <p:ph type="sldImg"/>
+          </p:nvPr>
+        </p:nvSpPr>
+        <p:spPr/>
+      </p:sp>
+      <p:sp>
+        <p:nvSpPr>
+          <p:cNvPr id="3" name="Notes Placeholder 2"/>
+          <p:cNvSpPr>
+            <a:spLocks noGrp="1"/>
+          </p:cNvSpPr>
+          <p:nvPr>
+            <p:ph type="body" idx="1"/>
+          </p:nvPr>
+        </p:nvSpPr>
+        <p:spPr/>
+        <p:txBody>
+          <a:bodyPr/>
+          <a:lstStyle/>
+          <a:p>
+            <a:r>
+              <a:rPr lang="en-US" dirty="0"/>
+              <a:t>Original Shapes (1 image)</a:t>
+            </a:r>
+          </a:p>
+        </p:txBody>
+      </p:sp>
+      <p:sp>
+        <p:nvSpPr>
+          <p:cNvPr id="4" name="Slide Number Placeholder 3"/>
+          <p:cNvSpPr>
+            <a:spLocks noGrp="1"/>
+          </p:cNvSpPr>
+          <p:nvPr>
+            <p:ph type="sldNum" sz="quarter" idx="10"/>
+          </p:nvPr>
+        </p:nvSpPr>
+        <p:spPr/>
+        <p:txBody>
+          <a:bodyPr/>
+          <a:lstStyle/>
+          <a:p>
+            <a:fld id="{0FE7C38A-472B-4221-8E00-509E1DA863EC}" type="slidenum">
+              <a:rPr lang="en-US" smtClean="0"/>
+              <a:t>26</a:t>
+            </a:fld>
+            <a:endParaRPr lang="en-US"/>
+          </a:p>
+        </p:txBody>
+      </p:sp>
+    </p:spTree>
+    <p:extLst>
+      <p:ext uri="{BB962C8B-B14F-4D97-AF65-F5344CB8AC3E}">
+        <p14:creationId xmlns:p14="http://schemas.microsoft.com/office/powerpoint/2010/main" val="1634132822"/>
+      </p:ext>
+    </p:extLst>
+  </p:cSld>
+  <p:clrMapOvr>
+    <a:masterClrMapping/>
+  </p:clrMapOvr>
+</p:notes>
+</file>
+
+<file path=ppt/notesSlides/notesSlide25.xml><?xml version="1.0" encoding="utf-8"?>
+<p:notes xmlns:a="http://schemas.openxmlformats.org/drawingml/2006/main" xmlns:r="http://schemas.openxmlformats.org/officeDocument/2006/relationships" xmlns:p="http://schemas.openxmlformats.org/presentationml/2006/main">
+  <p:cSld>
+    <p:spTree>
+      <p:nvGrpSpPr>
+        <p:cNvPr id="1" name=""/>
+        <p:cNvGrpSpPr/>
+        <p:nvPr/>
+      </p:nvGrpSpPr>
+      <p:grpSpPr>
+        <a:xfrm>
+          <a:off x="0" y="0"/>
+          <a:ext cx="0" cy="0"/>
+          <a:chOff x="0" y="0"/>
+          <a:chExt cx="0" cy="0"/>
+        </a:xfrm>
+      </p:grpSpPr>
+      <p:sp>
+        <p:nvSpPr>
+          <p:cNvPr id="2" name="Slide Image Placeholder 1"/>
+          <p:cNvSpPr>
+            <a:spLocks noGrp="1" noRot="1" noChangeAspect="1"/>
+          </p:cNvSpPr>
+          <p:nvPr>
+            <p:ph type="sldImg"/>
+          </p:nvPr>
+        </p:nvSpPr>
+        <p:spPr/>
+      </p:sp>
+      <p:sp>
+        <p:nvSpPr>
+          <p:cNvPr id="3" name="Notes Placeholder 2"/>
+          <p:cNvSpPr>
+            <a:spLocks noGrp="1"/>
+          </p:cNvSpPr>
+          <p:nvPr>
+            <p:ph type="body" idx="1"/>
+          </p:nvPr>
+        </p:nvSpPr>
+        <p:spPr/>
+        <p:txBody>
+          <a:bodyPr/>
+          <a:lstStyle/>
+          <a:p>
+            <a:r>
+              <a:rPr lang="en-US" dirty="0"/>
+              <a:t>Expected.</a:t>
+            </a:r>
+            <a:r>
+              <a:rPr lang="en-US" baseline="0" dirty="0"/>
+              <a:t> </a:t>
+            </a:r>
+            <a:r>
+              <a:rPr lang="en-US" dirty="0"/>
+              <a:t>The image should fit the slide as much as possible while maintain aspect ratio</a:t>
+            </a:r>
+          </a:p>
+        </p:txBody>
+      </p:sp>
+      <p:sp>
+        <p:nvSpPr>
+          <p:cNvPr id="4" name="Slide Number Placeholder 3"/>
+          <p:cNvSpPr>
+            <a:spLocks noGrp="1"/>
+          </p:cNvSpPr>
+          <p:nvPr>
+            <p:ph type="sldNum" sz="quarter" idx="10"/>
+          </p:nvPr>
+        </p:nvSpPr>
+        <p:spPr/>
+        <p:txBody>
+          <a:bodyPr/>
+          <a:lstStyle/>
+          <a:p>
+            <a:fld id="{0FE7C38A-472B-4221-8E00-509E1DA863EC}" type="slidenum">
+              <a:rPr lang="en-US" smtClean="0"/>
+              <a:t>27</a:t>
+            </a:fld>
+            <a:endParaRPr lang="en-US"/>
+          </a:p>
+        </p:txBody>
+      </p:sp>
+    </p:spTree>
+    <p:extLst>
+      <p:ext uri="{BB962C8B-B14F-4D97-AF65-F5344CB8AC3E}">
+        <p14:creationId xmlns:p14="http://schemas.microsoft.com/office/powerpoint/2010/main" val="176876081"/>
+      </p:ext>
+    </p:extLst>
+  </p:cSld>
+  <p:clrMapOvr>
+    <a:masterClrMapping/>
+  </p:clrMapOvr>
+</p:notes>
+</file>
+
+<file path=ppt/notesSlides/notesSlide26.xml><?xml version="1.0" encoding="utf-8"?>
+<p:notes xmlns:a="http://schemas.openxmlformats.org/drawingml/2006/main" xmlns:r="http://schemas.openxmlformats.org/officeDocument/2006/relationships" xmlns:p="http://schemas.openxmlformats.org/presentationml/2006/main">
+  <p:cSld>
+    <p:spTree>
+      <p:nvGrpSpPr>
+        <p:cNvPr id="1" name=""/>
+        <p:cNvGrpSpPr/>
+        <p:nvPr/>
+      </p:nvGrpSpPr>
+      <p:grpSpPr>
+        <a:xfrm>
+          <a:off x="0" y="0"/>
+          <a:ext cx="0" cy="0"/>
+          <a:chOff x="0" y="0"/>
+          <a:chExt cx="0" cy="0"/>
+        </a:xfrm>
+      </p:grpSpPr>
+      <p:sp>
+        <p:nvSpPr>
+          <p:cNvPr id="2" name="Slide Image Placeholder 1"/>
+          <p:cNvSpPr>
+            <a:spLocks noGrp="1" noRot="1" noChangeAspect="1"/>
+          </p:cNvSpPr>
+          <p:nvPr>
+            <p:ph type="sldImg"/>
+          </p:nvPr>
+        </p:nvSpPr>
+        <p:spPr/>
+      </p:sp>
+      <p:sp>
+        <p:nvSpPr>
+          <p:cNvPr id="3" name="Notes Placeholder 2"/>
+          <p:cNvSpPr>
+            <a:spLocks noGrp="1"/>
+          </p:cNvSpPr>
+          <p:nvPr>
+            <p:ph type="body" idx="1"/>
+          </p:nvPr>
+        </p:nvSpPr>
+        <p:spPr/>
+        <p:txBody>
+          <a:bodyPr/>
+          <a:lstStyle/>
+          <a:p>
+            <a:r>
+              <a:rPr lang="en-US" dirty="0"/>
+              <a:t>Original Shapes (1 image, rotated)</a:t>
+            </a:r>
+          </a:p>
+        </p:txBody>
+      </p:sp>
+      <p:sp>
+        <p:nvSpPr>
+          <p:cNvPr id="4" name="Slide Number Placeholder 3"/>
+          <p:cNvSpPr>
+            <a:spLocks noGrp="1"/>
+          </p:cNvSpPr>
+          <p:nvPr>
+            <p:ph type="sldNum" sz="quarter" idx="10"/>
+          </p:nvPr>
+        </p:nvSpPr>
+        <p:spPr/>
+        <p:txBody>
+          <a:bodyPr/>
+          <a:lstStyle/>
+          <a:p>
+            <a:fld id="{0FE7C38A-472B-4221-8E00-509E1DA863EC}" type="slidenum">
+              <a:rPr lang="en-US" smtClean="0"/>
+              <a:t>28</a:t>
+            </a:fld>
+            <a:endParaRPr lang="en-US"/>
+          </a:p>
+        </p:txBody>
+      </p:sp>
+    </p:spTree>
+    <p:extLst>
+      <p:ext uri="{BB962C8B-B14F-4D97-AF65-F5344CB8AC3E}">
+        <p14:creationId xmlns:p14="http://schemas.microsoft.com/office/powerpoint/2010/main" val="3505935701"/>
+      </p:ext>
+    </p:extLst>
+  </p:cSld>
+  <p:clrMapOvr>
+    <a:masterClrMapping/>
+  </p:clrMapOvr>
+</p:notes>
+</file>
+
+<file path=ppt/notesSlides/notesSlide27.xml><?xml version="1.0" encoding="utf-8"?>
+<p:notes xmlns:a="http://schemas.openxmlformats.org/drawingml/2006/main" xmlns:r="http://schemas.openxmlformats.org/officeDocument/2006/relationships" xmlns:p="http://schemas.openxmlformats.org/presentationml/2006/main">
+  <p:cSld>
+    <p:spTree>
+      <p:nvGrpSpPr>
+        <p:cNvPr id="1" name=""/>
+        <p:cNvGrpSpPr/>
+        <p:nvPr/>
+      </p:nvGrpSpPr>
+      <p:grpSpPr>
+        <a:xfrm>
+          <a:off x="0" y="0"/>
+          <a:ext cx="0" cy="0"/>
+          <a:chOff x="0" y="0"/>
+          <a:chExt cx="0" cy="0"/>
+        </a:xfrm>
+      </p:grpSpPr>
+      <p:sp>
+        <p:nvSpPr>
+          <p:cNvPr id="2" name="Slide Image Placeholder 1"/>
+          <p:cNvSpPr>
+            <a:spLocks noGrp="1" noRot="1" noChangeAspect="1"/>
+          </p:cNvSpPr>
+          <p:nvPr>
+            <p:ph type="sldImg"/>
+          </p:nvPr>
+        </p:nvSpPr>
+        <p:spPr/>
+      </p:sp>
+      <p:sp>
+        <p:nvSpPr>
+          <p:cNvPr id="3" name="Notes Placeholder 2"/>
+          <p:cNvSpPr>
+            <a:spLocks noGrp="1"/>
+          </p:cNvSpPr>
+          <p:nvPr>
+            <p:ph type="body" idx="1"/>
+          </p:nvPr>
+        </p:nvSpPr>
+        <p:spPr/>
+        <p:txBody>
+          <a:bodyPr/>
+          <a:lstStyle/>
+          <a:p>
+            <a:r>
+              <a:rPr lang="en-US" dirty="0"/>
+              <a:t>Expected. The Image should fit the slide while maintaining aspect ratio while rotated</a:t>
+            </a:r>
+          </a:p>
+        </p:txBody>
+      </p:sp>
+      <p:sp>
+        <p:nvSpPr>
+          <p:cNvPr id="4" name="Slide Number Placeholder 3"/>
+          <p:cNvSpPr>
+            <a:spLocks noGrp="1"/>
+          </p:cNvSpPr>
+          <p:nvPr>
+            <p:ph type="sldNum" sz="quarter" idx="10"/>
+          </p:nvPr>
+        </p:nvSpPr>
+        <p:spPr/>
+        <p:txBody>
+          <a:bodyPr/>
+          <a:lstStyle/>
+          <a:p>
+            <a:fld id="{0FE7C38A-472B-4221-8E00-509E1DA863EC}" type="slidenum">
+              <a:rPr lang="en-US" smtClean="0"/>
+              <a:t>29</a:t>
+            </a:fld>
+            <a:endParaRPr lang="en-US"/>
+          </a:p>
+        </p:txBody>
+      </p:sp>
+    </p:spTree>
+    <p:extLst>
+      <p:ext uri="{BB962C8B-B14F-4D97-AF65-F5344CB8AC3E}">
+        <p14:creationId xmlns:p14="http://schemas.microsoft.com/office/powerpoint/2010/main" val="2354417099"/>
+      </p:ext>
+    </p:extLst>
+  </p:cSld>
+  <p:clrMapOvr>
+    <a:masterClrMapping/>
+  </p:clrMapOvr>
+</p:notes>
+</file>
+
+<file path=ppt/notesSlides/notesSlide28.xml><?xml version="1.0" encoding="utf-8"?>
+<p:notes xmlns:a="http://schemas.openxmlformats.org/drawingml/2006/main" xmlns:r="http://schemas.openxmlformats.org/officeDocument/2006/relationships" xmlns:p="http://schemas.openxmlformats.org/presentationml/2006/main">
+  <p:cSld>
+    <p:spTree>
+      <p:nvGrpSpPr>
+        <p:cNvPr id="1" name=""/>
+        <p:cNvGrpSpPr/>
+        <p:nvPr/>
+      </p:nvGrpSpPr>
+      <p:grpSpPr>
+        <a:xfrm>
+          <a:off x="0" y="0"/>
+          <a:ext cx="0" cy="0"/>
+          <a:chOff x="0" y="0"/>
+          <a:chExt cx="0" cy="0"/>
+        </a:xfrm>
+      </p:grpSpPr>
+      <p:sp>
+        <p:nvSpPr>
+          <p:cNvPr id="2" name="Slide Image Placeholder 1"/>
+          <p:cNvSpPr>
+            <a:spLocks noGrp="1" noRot="1" noChangeAspect="1"/>
+          </p:cNvSpPr>
+          <p:nvPr>
+            <p:ph type="sldImg"/>
+          </p:nvPr>
+        </p:nvSpPr>
+        <p:spPr/>
+      </p:sp>
+      <p:sp>
+        <p:nvSpPr>
+          <p:cNvPr id="3" name="Notes Placeholder 2"/>
+          <p:cNvSpPr>
+            <a:spLocks noGrp="1"/>
+          </p:cNvSpPr>
+          <p:nvPr>
+            <p:ph type="body" idx="1"/>
+          </p:nvPr>
+        </p:nvSpPr>
+        <p:spPr/>
+        <p:txBody>
+          <a:bodyPr/>
+          <a:lstStyle/>
+          <a:p>
+            <a:r>
+              <a:rPr lang="en-US" dirty="0"/>
+              <a:t>Original Shapes (2 image)</a:t>
+            </a:r>
+          </a:p>
+        </p:txBody>
+      </p:sp>
+      <p:sp>
+        <p:nvSpPr>
+          <p:cNvPr id="4" name="Slide Number Placeholder 3"/>
+          <p:cNvSpPr>
+            <a:spLocks noGrp="1"/>
+          </p:cNvSpPr>
+          <p:nvPr>
+            <p:ph type="sldNum" sz="quarter" idx="10"/>
+          </p:nvPr>
+        </p:nvSpPr>
+        <p:spPr/>
+        <p:txBody>
+          <a:bodyPr/>
+          <a:lstStyle/>
+          <a:p>
+            <a:fld id="{0FE7C38A-472B-4221-8E00-509E1DA863EC}" type="slidenum">
+              <a:rPr lang="en-US" smtClean="0"/>
+              <a:t>30</a:t>
+            </a:fld>
+            <a:endParaRPr lang="en-US"/>
+          </a:p>
+        </p:txBody>
+      </p:sp>
+    </p:spTree>
+    <p:extLst>
+      <p:ext uri="{BB962C8B-B14F-4D97-AF65-F5344CB8AC3E}">
+        <p14:creationId xmlns:p14="http://schemas.microsoft.com/office/powerpoint/2010/main" val="755037131"/>
+      </p:ext>
+    </p:extLst>
+  </p:cSld>
+  <p:clrMapOvr>
+    <a:masterClrMapping/>
+  </p:clrMapOvr>
+</p:notes>
+</file>
+
+<file path=ppt/notesSlides/notesSlide29.xml><?xml version="1.0" encoding="utf-8"?>
+<p:notes xmlns:a="http://schemas.openxmlformats.org/drawingml/2006/main" xmlns:r="http://schemas.openxmlformats.org/officeDocument/2006/relationships" xmlns:p="http://schemas.openxmlformats.org/presentationml/2006/main">
+  <p:cSld>
+    <p:spTree>
+      <p:nvGrpSpPr>
+        <p:cNvPr id="1" name=""/>
+        <p:cNvGrpSpPr/>
+        <p:nvPr/>
+      </p:nvGrpSpPr>
+      <p:grpSpPr>
+        <a:xfrm>
+          <a:off x="0" y="0"/>
+          <a:ext cx="0" cy="0"/>
+          <a:chOff x="0" y="0"/>
+          <a:chExt cx="0" cy="0"/>
+        </a:xfrm>
+      </p:grpSpPr>
+      <p:sp>
+        <p:nvSpPr>
+          <p:cNvPr id="2" name="Slide Image Placeholder 1"/>
+          <p:cNvSpPr>
+            <a:spLocks noGrp="1" noRot="1" noChangeAspect="1"/>
+          </p:cNvSpPr>
+          <p:nvPr>
+            <p:ph type="sldImg"/>
+          </p:nvPr>
+        </p:nvSpPr>
+        <p:spPr/>
+      </p:sp>
+      <p:sp>
+        <p:nvSpPr>
+          <p:cNvPr id="3" name="Notes Placeholder 2"/>
+          <p:cNvSpPr>
+            <a:spLocks noGrp="1"/>
+          </p:cNvSpPr>
+          <p:nvPr>
+            <p:ph type="body" idx="1"/>
+          </p:nvPr>
+        </p:nvSpPr>
+        <p:spPr/>
+        <p:txBody>
+          <a:bodyPr/>
+          <a:lstStyle/>
+          <a:p>
+            <a:r>
+              <a:rPr lang="en-US" dirty="0"/>
+              <a:t>Expected. After multi-selection, the images are combined</a:t>
+            </a:r>
+            <a:r>
+              <a:rPr lang="en-US" baseline="0" dirty="0"/>
+              <a:t> into 1 and are stretched to fit the slide while maintaining aspect ratio</a:t>
+            </a:r>
+            <a:endParaRPr lang="en-US" dirty="0"/>
+          </a:p>
+        </p:txBody>
+      </p:sp>
+      <p:sp>
+        <p:nvSpPr>
+          <p:cNvPr id="4" name="Slide Number Placeholder 3"/>
+          <p:cNvSpPr>
+            <a:spLocks noGrp="1"/>
+          </p:cNvSpPr>
+          <p:nvPr>
+            <p:ph type="sldNum" sz="quarter" idx="10"/>
+          </p:nvPr>
+        </p:nvSpPr>
+        <p:spPr/>
+        <p:txBody>
+          <a:bodyPr/>
+          <a:lstStyle/>
+          <a:p>
+            <a:fld id="{0FE7C38A-472B-4221-8E00-509E1DA863EC}" type="slidenum">
+              <a:rPr lang="en-US" smtClean="0"/>
+              <a:t>31</a:t>
+            </a:fld>
+            <a:endParaRPr lang="en-US"/>
+          </a:p>
+        </p:txBody>
+      </p:sp>
+    </p:spTree>
+    <p:extLst>
+      <p:ext uri="{BB962C8B-B14F-4D97-AF65-F5344CB8AC3E}">
+        <p14:creationId xmlns:p14="http://schemas.microsoft.com/office/powerpoint/2010/main" val="422598403"/>
       </p:ext>
     </p:extLst>
   </p:cSld>
@@ -2053,18 +2743,17 @@
           <a:lstStyle/>
           <a:p>
             <a:r>
-              <a:rPr lang="en-US" dirty="0" smtClean="0"/>
+              <a:rPr lang="en-US" dirty="0"/>
               <a:t>Expected.</a:t>
             </a:r>
             <a:r>
-              <a:rPr lang="en-US" baseline="0" dirty="0" smtClean="0"/>
+              <a:rPr lang="en-US" baseline="0" dirty="0"/>
               <a:t> </a:t>
             </a:r>
             <a:r>
-              <a:rPr lang="en-US" dirty="0" smtClean="0"/>
+              <a:rPr lang="en-US" dirty="0"/>
               <a:t>The image should be cropped at the slides</a:t>
             </a:r>
-            <a:endParaRPr lang="en-US" dirty="0"/>
           </a:p>
         </p:txBody>
       </p:sp>
@@ -2095,6 +2784,185 @@
     <p:extLst>
       <p:ext uri="{BB962C8B-B14F-4D97-AF65-F5344CB8AC3E}">
         <p14:creationId xmlns:p14="http://schemas.microsoft.com/office/powerpoint/2010/main" val="2965218628"/>
+      </p:ext>
+    </p:extLst>
+  </p:cSld>
+  <p:clrMapOvr>
+    <a:masterClrMapping/>
+  </p:clrMapOvr>
+</p:notes>
+</file>
+
+<file path=ppt/notesSlides/notesSlide30.xml><?xml version="1.0" encoding="utf-8"?>
+<p:notes xmlns:a="http://schemas.openxmlformats.org/drawingml/2006/main" xmlns:r="http://schemas.openxmlformats.org/officeDocument/2006/relationships" xmlns:p="http://schemas.openxmlformats.org/presentationml/2006/main">
+  <p:cSld>
+    <p:spTree>
+      <p:nvGrpSpPr>
+        <p:cNvPr id="1" name=""/>
+        <p:cNvGrpSpPr/>
+        <p:nvPr/>
+      </p:nvGrpSpPr>
+      <p:grpSpPr>
+        <a:xfrm>
+          <a:off x="0" y="0"/>
+          <a:ext cx="0" cy="0"/>
+          <a:chOff x="0" y="0"/>
+          <a:chExt cx="0" cy="0"/>
+        </a:xfrm>
+      </p:grpSpPr>
+      <p:sp>
+        <p:nvSpPr>
+          <p:cNvPr id="2" name="Slide Image Placeholder 1"/>
+          <p:cNvSpPr>
+            <a:spLocks noGrp="1" noRot="1" noChangeAspect="1"/>
+          </p:cNvSpPr>
+          <p:nvPr>
+            <p:ph type="sldImg"/>
+          </p:nvPr>
+        </p:nvSpPr>
+        <p:spPr/>
+      </p:sp>
+      <p:sp>
+        <p:nvSpPr>
+          <p:cNvPr id="3" name="Notes Placeholder 2"/>
+          <p:cNvSpPr>
+            <a:spLocks noGrp="1"/>
+          </p:cNvSpPr>
+          <p:nvPr>
+            <p:ph type="body" idx="1"/>
+          </p:nvPr>
+        </p:nvSpPr>
+        <p:spPr/>
+        <p:txBody>
+          <a:bodyPr/>
+          <a:lstStyle/>
+          <a:p>
+            <a:r>
+              <a:rPr lang="en-US" dirty="0"/>
+              <a:t>Original Shapes (1 group of 2 images)</a:t>
+            </a:r>
+          </a:p>
+        </p:txBody>
+      </p:sp>
+      <p:sp>
+        <p:nvSpPr>
+          <p:cNvPr id="4" name="Slide Number Placeholder 3"/>
+          <p:cNvSpPr>
+            <a:spLocks noGrp="1"/>
+          </p:cNvSpPr>
+          <p:nvPr>
+            <p:ph type="sldNum" sz="quarter" idx="10"/>
+          </p:nvPr>
+        </p:nvSpPr>
+        <p:spPr/>
+        <p:txBody>
+          <a:bodyPr/>
+          <a:lstStyle/>
+          <a:p>
+            <a:fld id="{0FE7C38A-472B-4221-8E00-509E1DA863EC}" type="slidenum">
+              <a:rPr lang="en-US" smtClean="0"/>
+              <a:t>32</a:t>
+            </a:fld>
+            <a:endParaRPr lang="en-US"/>
+          </a:p>
+        </p:txBody>
+      </p:sp>
+    </p:spTree>
+    <p:extLst>
+      <p:ext uri="{BB962C8B-B14F-4D97-AF65-F5344CB8AC3E}">
+        <p14:creationId xmlns:p14="http://schemas.microsoft.com/office/powerpoint/2010/main" val="2388754777"/>
+      </p:ext>
+    </p:extLst>
+  </p:cSld>
+  <p:clrMapOvr>
+    <a:masterClrMapping/>
+  </p:clrMapOvr>
+</p:notes>
+</file>
+
+<file path=ppt/notesSlides/notesSlide31.xml><?xml version="1.0" encoding="utf-8"?>
+<p:notes xmlns:a="http://schemas.openxmlformats.org/drawingml/2006/main" xmlns:r="http://schemas.openxmlformats.org/officeDocument/2006/relationships" xmlns:p="http://schemas.openxmlformats.org/presentationml/2006/main">
+  <p:cSld>
+    <p:spTree>
+      <p:nvGrpSpPr>
+        <p:cNvPr id="1" name=""/>
+        <p:cNvGrpSpPr/>
+        <p:nvPr/>
+      </p:nvGrpSpPr>
+      <p:grpSpPr>
+        <a:xfrm>
+          <a:off x="0" y="0"/>
+          <a:ext cx="0" cy="0"/>
+          <a:chOff x="0" y="0"/>
+          <a:chExt cx="0" cy="0"/>
+        </a:xfrm>
+      </p:grpSpPr>
+      <p:sp>
+        <p:nvSpPr>
+          <p:cNvPr id="2" name="Slide Image Placeholder 1"/>
+          <p:cNvSpPr>
+            <a:spLocks noGrp="1" noRot="1" noChangeAspect="1"/>
+          </p:cNvSpPr>
+          <p:nvPr>
+            <p:ph type="sldImg"/>
+          </p:nvPr>
+        </p:nvSpPr>
+        <p:spPr/>
+      </p:sp>
+      <p:sp>
+        <p:nvSpPr>
+          <p:cNvPr id="3" name="Notes Placeholder 2"/>
+          <p:cNvSpPr>
+            <a:spLocks noGrp="1"/>
+          </p:cNvSpPr>
+          <p:nvPr>
+            <p:ph type="body" idx="1"/>
+          </p:nvPr>
+        </p:nvSpPr>
+        <p:spPr/>
+        <p:txBody>
+          <a:bodyPr/>
+          <a:lstStyle/>
+          <a:p>
+            <a:r>
+              <a:rPr lang="en-US" dirty="0"/>
+              <a:t>Expected. The group is</a:t>
+            </a:r>
+            <a:r>
+              <a:rPr lang="en-US" baseline="0" dirty="0"/>
+              <a:t> stretched to fit the slide while maintaining aspect ratio</a:t>
+            </a:r>
+            <a:endParaRPr lang="en-US" dirty="0"/>
+          </a:p>
+        </p:txBody>
+      </p:sp>
+      <p:sp>
+        <p:nvSpPr>
+          <p:cNvPr id="4" name="Slide Number Placeholder 3"/>
+          <p:cNvSpPr>
+            <a:spLocks noGrp="1"/>
+          </p:cNvSpPr>
+          <p:nvPr>
+            <p:ph type="sldNum" sz="quarter" idx="10"/>
+          </p:nvPr>
+        </p:nvSpPr>
+        <p:spPr/>
+        <p:txBody>
+          <a:bodyPr/>
+          <a:lstStyle/>
+          <a:p>
+            <a:fld id="{0FE7C38A-472B-4221-8E00-509E1DA863EC}" type="slidenum">
+              <a:rPr lang="en-US" smtClean="0"/>
+              <a:t>33</a:t>
+            </a:fld>
+            <a:endParaRPr lang="en-US"/>
+          </a:p>
+        </p:txBody>
+      </p:sp>
+    </p:spTree>
+    <p:extLst>
+      <p:ext uri="{BB962C8B-B14F-4D97-AF65-F5344CB8AC3E}">
+        <p14:creationId xmlns:p14="http://schemas.microsoft.com/office/powerpoint/2010/main" val="846059797"/>
       </p:ext>
     </p:extLst>
   </p:cSld>
@@ -2149,10 +3017,9 @@
           <a:lstStyle/>
           <a:p>
             <a:r>
-              <a:rPr lang="en-US" dirty="0" smtClean="0"/>
+              <a:rPr lang="en-US" dirty="0"/>
               <a:t>Original Shapes (1 image, rotated)</a:t>
             </a:r>
-            <a:endParaRPr lang="en-US" dirty="0"/>
           </a:p>
         </p:txBody>
       </p:sp>
@@ -2237,11 +3104,11 @@
           <a:lstStyle/>
           <a:p>
             <a:r>
-              <a:rPr lang="en-US" dirty="0" smtClean="0"/>
+              <a:rPr lang="en-US" dirty="0"/>
               <a:t>Expected. The Image should be cropped</a:t>
             </a:r>
             <a:r>
-              <a:rPr lang="en-US" baseline="0" dirty="0" smtClean="0"/>
+              <a:rPr lang="en-US" baseline="0" dirty="0"/>
               <a:t> at the corners</a:t>
             </a:r>
             <a:endParaRPr lang="en-US" dirty="0"/>
@@ -2329,10 +3196,9 @@
           <a:lstStyle/>
           <a:p>
             <a:r>
-              <a:rPr lang="en-US" dirty="0" smtClean="0"/>
+              <a:rPr lang="en-US" dirty="0"/>
               <a:t>Original Shapes (2 image)</a:t>
             </a:r>
-            <a:endParaRPr lang="en-US" dirty="0"/>
           </a:p>
         </p:txBody>
       </p:sp>
@@ -2417,11 +3283,11 @@
           <a:lstStyle/>
           <a:p>
             <a:r>
-              <a:rPr lang="en-US" dirty="0" smtClean="0"/>
+              <a:rPr lang="en-US" dirty="0"/>
               <a:t>Expected. The images are combined</a:t>
             </a:r>
             <a:r>
-              <a:rPr lang="en-US" baseline="0" dirty="0" smtClean="0"/>
+              <a:rPr lang="en-US" baseline="0" dirty="0"/>
               <a:t> into 1 and are cropped accordingly. (No stretching should occur)</a:t>
             </a:r>
             <a:endParaRPr lang="en-US" dirty="0"/>
@@ -2509,10 +3375,9 @@
           <a:lstStyle/>
           <a:p>
             <a:r>
-              <a:rPr lang="en-US" dirty="0" smtClean="0"/>
+              <a:rPr lang="en-US" dirty="0"/>
               <a:t>Original Shapes (1 group of 2 images)</a:t>
             </a:r>
-            <a:endParaRPr lang="en-US" dirty="0"/>
           </a:p>
         </p:txBody>
       </p:sp>
@@ -2597,11 +3462,11 @@
           <a:lstStyle/>
           <a:p>
             <a:r>
-              <a:rPr lang="en-US" dirty="0" smtClean="0"/>
+              <a:rPr lang="en-US" dirty="0"/>
               <a:t>Expected. The group is combined</a:t>
             </a:r>
             <a:r>
-              <a:rPr lang="en-US" baseline="0" dirty="0" smtClean="0"/>
+              <a:rPr lang="en-US" baseline="0" dirty="0"/>
               <a:t> into 1 image and is cropped accordingly. (No stretching should occur)</a:t>
             </a:r>
             <a:endParaRPr lang="en-US" dirty="0"/>
@@ -2823,7 +3688,7 @@
           <a:p>
             <a:fld id="{699DC775-C286-4358-8C92-D7E584E969B3}" type="datetimeFigureOut">
               <a:rPr lang="en-US" smtClean="0"/>
-              <a:t>5/30/2017</a:t>
+              <a:t>2/10/2018</a:t>
             </a:fld>
             <a:endParaRPr lang="en-US"/>
           </a:p>
@@ -2991,7 +3856,7 @@
           <a:p>
             <a:fld id="{699DC775-C286-4358-8C92-D7E584E969B3}" type="datetimeFigureOut">
               <a:rPr lang="en-US" smtClean="0"/>
-              <a:t>5/30/2017</a:t>
+              <a:t>2/10/2018</a:t>
             </a:fld>
             <a:endParaRPr lang="en-US"/>
           </a:p>
@@ -3169,7 +4034,7 @@
           <a:p>
             <a:fld id="{699DC775-C286-4358-8C92-D7E584E969B3}" type="datetimeFigureOut">
               <a:rPr lang="en-US" smtClean="0"/>
-              <a:t>5/30/2017</a:t>
+              <a:t>2/10/2018</a:t>
             </a:fld>
             <a:endParaRPr lang="en-US"/>
           </a:p>
@@ -3409,7 +4274,7 @@
           <a:p>
             <a:fld id="{699DC775-C286-4358-8C92-D7E584E969B3}" type="datetimeFigureOut">
               <a:rPr lang="en-US" smtClean="0"/>
-              <a:t>5/30/2017</a:t>
+              <a:t>2/10/2018</a:t>
             </a:fld>
             <a:endParaRPr lang="en-US"/>
           </a:p>
@@ -3577,7 +4442,7 @@
           <a:p>
             <a:fld id="{699DC775-C286-4358-8C92-D7E584E969B3}" type="datetimeFigureOut">
               <a:rPr lang="en-US" smtClean="0"/>
-              <a:t>5/30/2017</a:t>
+              <a:t>2/10/2018</a:t>
             </a:fld>
             <a:endParaRPr lang="en-US"/>
           </a:p>
@@ -3822,7 +4687,7 @@
           <a:p>
             <a:fld id="{699DC775-C286-4358-8C92-D7E584E969B3}" type="datetimeFigureOut">
               <a:rPr lang="en-US" smtClean="0"/>
-              <a:t>5/30/2017</a:t>
+              <a:t>2/10/2018</a:t>
             </a:fld>
             <a:endParaRPr lang="en-US"/>
           </a:p>
@@ -4107,7 +4972,7 @@
           <a:p>
             <a:fld id="{699DC775-C286-4358-8C92-D7E584E969B3}" type="datetimeFigureOut">
               <a:rPr lang="en-US" smtClean="0"/>
-              <a:t>5/30/2017</a:t>
+              <a:t>2/10/2018</a:t>
             </a:fld>
             <a:endParaRPr lang="en-US"/>
           </a:p>
@@ -4526,7 +5391,7 @@
           <a:p>
             <a:fld id="{699DC775-C286-4358-8C92-D7E584E969B3}" type="datetimeFigureOut">
               <a:rPr lang="en-US" smtClean="0"/>
-              <a:t>5/30/2017</a:t>
+              <a:t>2/10/2018</a:t>
             </a:fld>
             <a:endParaRPr lang="en-US"/>
           </a:p>
@@ -4643,7 +5508,7 @@
           <a:p>
             <a:fld id="{699DC775-C286-4358-8C92-D7E584E969B3}" type="datetimeFigureOut">
               <a:rPr lang="en-US" smtClean="0"/>
-              <a:t>5/30/2017</a:t>
+              <a:t>2/10/2018</a:t>
             </a:fld>
             <a:endParaRPr lang="en-US"/>
           </a:p>
@@ -4738,7 +5603,7 @@
           <a:p>
             <a:fld id="{699DC775-C286-4358-8C92-D7E584E969B3}" type="datetimeFigureOut">
               <a:rPr lang="en-US" smtClean="0"/>
-              <a:t>5/30/2017</a:t>
+              <a:t>2/10/2018</a:t>
             </a:fld>
             <a:endParaRPr lang="en-US"/>
           </a:p>
@@ -5013,7 +5878,7 @@
           <a:p>
             <a:fld id="{699DC775-C286-4358-8C92-D7E584E969B3}" type="datetimeFigureOut">
               <a:rPr lang="en-US" smtClean="0"/>
-              <a:t>5/30/2017</a:t>
+              <a:t>2/10/2018</a:t>
             </a:fld>
             <a:endParaRPr lang="en-US"/>
           </a:p>
@@ -5181,7 +6046,7 @@
           <a:p>
             <a:fld id="{699DC775-C286-4358-8C92-D7E584E969B3}" type="datetimeFigureOut">
               <a:rPr lang="en-US" smtClean="0"/>
-              <a:t>5/30/2017</a:t>
+              <a:t>2/10/2018</a:t>
             </a:fld>
             <a:endParaRPr lang="en-US"/>
           </a:p>
@@ -5433,7 +6298,7 @@
           <a:p>
             <a:fld id="{699DC775-C286-4358-8C92-D7E584E969B3}" type="datetimeFigureOut">
               <a:rPr lang="en-US" smtClean="0"/>
-              <a:t>5/30/2017</a:t>
+              <a:t>2/10/2018</a:t>
             </a:fld>
             <a:endParaRPr lang="en-US"/>
           </a:p>
@@ -5601,7 +6466,7 @@
           <a:p>
             <a:fld id="{699DC775-C286-4358-8C92-D7E584E969B3}" type="datetimeFigureOut">
               <a:rPr lang="en-US" smtClean="0"/>
-              <a:t>5/30/2017</a:t>
+              <a:t>2/10/2018</a:t>
             </a:fld>
             <a:endParaRPr lang="en-US"/>
           </a:p>
@@ -5779,7 +6644,7 @@
           <a:p>
             <a:fld id="{699DC775-C286-4358-8C92-D7E584E969B3}" type="datetimeFigureOut">
               <a:rPr lang="en-US" smtClean="0"/>
-              <a:t>5/30/2017</a:t>
+              <a:t>2/10/2018</a:t>
             </a:fld>
             <a:endParaRPr lang="en-US"/>
           </a:p>
@@ -6027,7 +6892,7 @@
           <a:p>
             <a:fld id="{699DC775-C286-4358-8C92-D7E584E969B3}" type="datetimeFigureOut">
               <a:rPr lang="en-US" smtClean="0"/>
-              <a:t>5/30/2017</a:t>
+              <a:t>2/10/2018</a:t>
             </a:fld>
             <a:endParaRPr lang="en-US"/>
           </a:p>
@@ -6203,7 +7068,7 @@
           <a:p>
             <a:fld id="{699DC775-C286-4358-8C92-D7E584E969B3}" type="datetimeFigureOut">
               <a:rPr lang="en-US" smtClean="0"/>
-              <a:t>5/30/2017</a:t>
+              <a:t>2/10/2018</a:t>
             </a:fld>
             <a:endParaRPr lang="en-US"/>
           </a:p>
@@ -6456,7 +7321,7 @@
           <a:p>
             <a:fld id="{699DC775-C286-4358-8C92-D7E584E969B3}" type="datetimeFigureOut">
               <a:rPr lang="en-US" smtClean="0"/>
-              <a:t>5/30/2017</a:t>
+              <a:t>2/10/2018</a:t>
             </a:fld>
             <a:endParaRPr lang="en-US"/>
           </a:p>
@@ -6749,7 +7614,7 @@
           <a:p>
             <a:fld id="{699DC775-C286-4358-8C92-D7E584E969B3}" type="datetimeFigureOut">
               <a:rPr lang="en-US" smtClean="0"/>
-              <a:t>5/30/2017</a:t>
+              <a:t>2/10/2018</a:t>
             </a:fld>
             <a:endParaRPr lang="en-US"/>
           </a:p>
@@ -7176,7 +8041,7 @@
           <a:p>
             <a:fld id="{699DC775-C286-4358-8C92-D7E584E969B3}" type="datetimeFigureOut">
               <a:rPr lang="en-US" smtClean="0"/>
-              <a:t>5/30/2017</a:t>
+              <a:t>2/10/2018</a:t>
             </a:fld>
             <a:endParaRPr lang="en-US"/>
           </a:p>
@@ -7301,7 +8166,7 @@
           <a:p>
             <a:fld id="{699DC775-C286-4358-8C92-D7E584E969B3}" type="datetimeFigureOut">
               <a:rPr lang="en-US" smtClean="0"/>
-              <a:t>5/30/2017</a:t>
+              <a:t>2/10/2018</a:t>
             </a:fld>
             <a:endParaRPr lang="en-US"/>
           </a:p>
@@ -7404,7 +8269,7 @@
           <a:p>
             <a:fld id="{699DC775-C286-4358-8C92-D7E584E969B3}" type="datetimeFigureOut">
               <a:rPr lang="en-US" smtClean="0"/>
-              <a:t>5/30/2017</a:t>
+              <a:t>2/10/2018</a:t>
             </a:fld>
             <a:endParaRPr lang="en-US"/>
           </a:p>
@@ -7649,7 +8514,7 @@
           <a:p>
             <a:fld id="{699DC775-C286-4358-8C92-D7E584E969B3}" type="datetimeFigureOut">
               <a:rPr lang="en-US" smtClean="0"/>
-              <a:t>5/30/2017</a:t>
+              <a:t>2/10/2018</a:t>
             </a:fld>
             <a:endParaRPr lang="en-US"/>
           </a:p>
@@ -7932,7 +8797,7 @@
           <a:p>
             <a:fld id="{699DC775-C286-4358-8C92-D7E584E969B3}" type="datetimeFigureOut">
               <a:rPr lang="en-US" smtClean="0"/>
-              <a:t>5/30/2017</a:t>
+              <a:t>2/10/2018</a:t>
             </a:fld>
             <a:endParaRPr lang="en-US"/>
           </a:p>
@@ -8192,7 +9057,7 @@
           <a:p>
             <a:fld id="{699DC775-C286-4358-8C92-D7E584E969B3}" type="datetimeFigureOut">
               <a:rPr lang="en-US" smtClean="0"/>
-              <a:t>5/30/2017</a:t>
+              <a:t>2/10/2018</a:t>
             </a:fld>
             <a:endParaRPr lang="en-US"/>
           </a:p>
@@ -8368,7 +9233,7 @@
           <a:p>
             <a:fld id="{699DC775-C286-4358-8C92-D7E584E969B3}" type="datetimeFigureOut">
               <a:rPr lang="en-US" smtClean="0"/>
-              <a:t>5/30/2017</a:t>
+              <a:t>2/10/2018</a:t>
             </a:fld>
             <a:endParaRPr lang="en-US"/>
           </a:p>
@@ -8554,7 +9419,7 @@
           <a:p>
             <a:fld id="{699DC775-C286-4358-8C92-D7E584E969B3}" type="datetimeFigureOut">
               <a:rPr lang="en-US" smtClean="0"/>
-              <a:t>5/30/2017</a:t>
+              <a:t>2/10/2018</a:t>
             </a:fld>
             <a:endParaRPr lang="en-US"/>
           </a:p>
@@ -8657,10 +9522,9 @@
           </a:lstStyle>
           <a:p>
             <a:r>
-              <a:rPr lang="en-US" smtClean="0"/>
+              <a:rPr lang="en-US"/>
               <a:t>Click to edit Master title style</a:t>
             </a:r>
-            <a:endParaRPr lang="en-US"/>
           </a:p>
         </p:txBody>
       </p:sp>
@@ -8722,10 +9586,9 @@
           </a:lstStyle>
           <a:p>
             <a:r>
-              <a:rPr lang="en-US" smtClean="0"/>
+              <a:rPr lang="en-US"/>
               <a:t>Click to edit Master subtitle style</a:t>
             </a:r>
-            <a:endParaRPr lang="en-US"/>
           </a:p>
         </p:txBody>
       </p:sp>
@@ -8746,7 +9609,7 @@
           <a:p>
             <a:fld id="{45696B32-6A70-48EC-8939-9D142D9557CD}" type="datetimeFigureOut">
               <a:rPr lang="en-US" smtClean="0"/>
-              <a:t>5/30/2017</a:t>
+              <a:t>2/10/2018</a:t>
             </a:fld>
             <a:endParaRPr lang="en-US"/>
           </a:p>
@@ -8986,10 +9849,9 @@
           <a:lstStyle/>
           <a:p>
             <a:r>
-              <a:rPr lang="en-US" smtClean="0"/>
+              <a:rPr lang="en-US"/>
               <a:t>Click to edit Master title style</a:t>
             </a:r>
-            <a:endParaRPr lang="en-US"/>
           </a:p>
         </p:txBody>
       </p:sp>
@@ -9010,38 +9872,37 @@
           <a:p>
             <a:pPr lvl="0"/>
             <a:r>
-              <a:rPr lang="en-US" smtClean="0"/>
+              <a:rPr lang="en-US"/>
               <a:t>Click to edit Master text styles</a:t>
             </a:r>
           </a:p>
           <a:p>
             <a:pPr lvl="1"/>
             <a:r>
-              <a:rPr lang="en-US" smtClean="0"/>
+              <a:rPr lang="en-US"/>
               <a:t>Second level</a:t>
             </a:r>
           </a:p>
           <a:p>
             <a:pPr lvl="2"/>
             <a:r>
-              <a:rPr lang="en-US" smtClean="0"/>
+              <a:rPr lang="en-US"/>
               <a:t>Third level</a:t>
             </a:r>
           </a:p>
           <a:p>
             <a:pPr lvl="3"/>
             <a:r>
-              <a:rPr lang="en-US" smtClean="0"/>
+              <a:rPr lang="en-US"/>
               <a:t>Fourth level</a:t>
             </a:r>
           </a:p>
           <a:p>
             <a:pPr lvl="4"/>
             <a:r>
-              <a:rPr lang="en-US" smtClean="0"/>
+              <a:rPr lang="en-US"/>
               <a:t>Fifth level</a:t>
             </a:r>
-            <a:endParaRPr lang="en-US"/>
           </a:p>
         </p:txBody>
       </p:sp>
@@ -9062,7 +9923,7 @@
           <a:p>
             <a:fld id="{45696B32-6A70-48EC-8939-9D142D9557CD}" type="datetimeFigureOut">
               <a:rPr lang="en-US" smtClean="0"/>
-              <a:t>5/30/2017</a:t>
+              <a:t>2/10/2018</a:t>
             </a:fld>
             <a:endParaRPr lang="en-US"/>
           </a:p>
@@ -9165,10 +10026,9 @@
           </a:lstStyle>
           <a:p>
             <a:r>
-              <a:rPr lang="en-US" smtClean="0"/>
+              <a:rPr lang="en-US"/>
               <a:t>Click to edit Master title style</a:t>
             </a:r>
-            <a:endParaRPr lang="en-US"/>
           </a:p>
         </p:txBody>
       </p:sp>
@@ -9285,7 +10145,7 @@
           <a:p>
             <a:pPr lvl="0"/>
             <a:r>
-              <a:rPr lang="en-US" smtClean="0"/>
+              <a:rPr lang="en-US"/>
               <a:t>Click to edit Master text styles</a:t>
             </a:r>
           </a:p>
@@ -9308,7 +10168,7 @@
           <a:p>
             <a:fld id="{45696B32-6A70-48EC-8939-9D142D9557CD}" type="datetimeFigureOut">
               <a:rPr lang="en-US" smtClean="0"/>
-              <a:t>5/30/2017</a:t>
+              <a:t>2/10/2018</a:t>
             </a:fld>
             <a:endParaRPr lang="en-US"/>
           </a:p>
@@ -9402,10 +10262,9 @@
           <a:lstStyle/>
           <a:p>
             <a:r>
-              <a:rPr lang="en-US" smtClean="0"/>
+              <a:rPr lang="en-US"/>
               <a:t>Click to edit Master title style</a:t>
             </a:r>
-            <a:endParaRPr lang="en-US"/>
           </a:p>
         </p:txBody>
       </p:sp>
@@ -9431,38 +10290,37 @@
           <a:p>
             <a:pPr lvl="0"/>
             <a:r>
-              <a:rPr lang="en-US" smtClean="0"/>
+              <a:rPr lang="en-US"/>
               <a:t>Click to edit Master text styles</a:t>
             </a:r>
           </a:p>
           <a:p>
             <a:pPr lvl="1"/>
             <a:r>
-              <a:rPr lang="en-US" smtClean="0"/>
+              <a:rPr lang="en-US"/>
               <a:t>Second level</a:t>
             </a:r>
           </a:p>
           <a:p>
             <a:pPr lvl="2"/>
             <a:r>
-              <a:rPr lang="en-US" smtClean="0"/>
+              <a:rPr lang="en-US"/>
               <a:t>Third level</a:t>
             </a:r>
           </a:p>
           <a:p>
             <a:pPr lvl="3"/>
             <a:r>
-              <a:rPr lang="en-US" smtClean="0"/>
+              <a:rPr lang="en-US"/>
               <a:t>Fourth level</a:t>
             </a:r>
           </a:p>
           <a:p>
             <a:pPr lvl="4"/>
             <a:r>
-              <a:rPr lang="en-US" smtClean="0"/>
+              <a:rPr lang="en-US"/>
               <a:t>Fifth level</a:t>
             </a:r>
-            <a:endParaRPr lang="en-US"/>
           </a:p>
         </p:txBody>
       </p:sp>
@@ -9488,38 +10346,37 @@
           <a:p>
             <a:pPr lvl="0"/>
             <a:r>
-              <a:rPr lang="en-US" smtClean="0"/>
+              <a:rPr lang="en-US"/>
               <a:t>Click to edit Master text styles</a:t>
             </a:r>
           </a:p>
           <a:p>
             <a:pPr lvl="1"/>
             <a:r>
-              <a:rPr lang="en-US" smtClean="0"/>
+              <a:rPr lang="en-US"/>
               <a:t>Second level</a:t>
             </a:r>
           </a:p>
           <a:p>
             <a:pPr lvl="2"/>
             <a:r>
-              <a:rPr lang="en-US" smtClean="0"/>
+              <a:rPr lang="en-US"/>
               <a:t>Third level</a:t>
             </a:r>
           </a:p>
           <a:p>
             <a:pPr lvl="3"/>
             <a:r>
-              <a:rPr lang="en-US" smtClean="0"/>
+              <a:rPr lang="en-US"/>
               <a:t>Fourth level</a:t>
             </a:r>
           </a:p>
           <a:p>
             <a:pPr lvl="4"/>
             <a:r>
-              <a:rPr lang="en-US" smtClean="0"/>
+              <a:rPr lang="en-US"/>
               <a:t>Fifth level</a:t>
             </a:r>
-            <a:endParaRPr lang="en-US"/>
           </a:p>
         </p:txBody>
       </p:sp>
@@ -9540,7 +10397,7 @@
           <a:p>
             <a:fld id="{45696B32-6A70-48EC-8939-9D142D9557CD}" type="datetimeFigureOut">
               <a:rPr lang="en-US" smtClean="0"/>
-              <a:t>5/30/2017</a:t>
+              <a:t>2/10/2018</a:t>
             </a:fld>
             <a:endParaRPr lang="en-US"/>
           </a:p>
@@ -9639,10 +10496,9 @@
           <a:lstStyle/>
           <a:p>
             <a:r>
-              <a:rPr lang="en-US" smtClean="0"/>
+              <a:rPr lang="en-US"/>
               <a:t>Click to edit Master title style</a:t>
             </a:r>
-            <a:endParaRPr lang="en-US"/>
           </a:p>
         </p:txBody>
       </p:sp>
@@ -9705,7 +10561,7 @@
           <a:p>
             <a:pPr lvl="0"/>
             <a:r>
-              <a:rPr lang="en-US" smtClean="0"/>
+              <a:rPr lang="en-US"/>
               <a:t>Click to edit Master text styles</a:t>
             </a:r>
           </a:p>
@@ -9733,38 +10589,37 @@
           <a:p>
             <a:pPr lvl="0"/>
             <a:r>
-              <a:rPr lang="en-US" smtClean="0"/>
+              <a:rPr lang="en-US"/>
               <a:t>Click to edit Master text styles</a:t>
             </a:r>
           </a:p>
           <a:p>
             <a:pPr lvl="1"/>
             <a:r>
-              <a:rPr lang="en-US" smtClean="0"/>
+              <a:rPr lang="en-US"/>
               <a:t>Second level</a:t>
             </a:r>
           </a:p>
           <a:p>
             <a:pPr lvl="2"/>
             <a:r>
-              <a:rPr lang="en-US" smtClean="0"/>
+              <a:rPr lang="en-US"/>
               <a:t>Third level</a:t>
             </a:r>
           </a:p>
           <a:p>
             <a:pPr lvl="3"/>
             <a:r>
-              <a:rPr lang="en-US" smtClean="0"/>
+              <a:rPr lang="en-US"/>
               <a:t>Fourth level</a:t>
             </a:r>
           </a:p>
           <a:p>
             <a:pPr lvl="4"/>
             <a:r>
-              <a:rPr lang="en-US" smtClean="0"/>
+              <a:rPr lang="en-US"/>
               <a:t>Fifth level</a:t>
             </a:r>
-            <a:endParaRPr lang="en-US"/>
           </a:p>
         </p:txBody>
       </p:sp>
@@ -9827,7 +10682,7 @@
           <a:p>
             <a:pPr lvl="0"/>
             <a:r>
-              <a:rPr lang="en-US" smtClean="0"/>
+              <a:rPr lang="en-US"/>
               <a:t>Click to edit Master text styles</a:t>
             </a:r>
           </a:p>
@@ -9855,38 +10710,37 @@
           <a:p>
             <a:pPr lvl="0"/>
             <a:r>
-              <a:rPr lang="en-US" smtClean="0"/>
+              <a:rPr lang="en-US"/>
               <a:t>Click to edit Master text styles</a:t>
             </a:r>
           </a:p>
           <a:p>
             <a:pPr lvl="1"/>
             <a:r>
-              <a:rPr lang="en-US" smtClean="0"/>
+              <a:rPr lang="en-US"/>
               <a:t>Second level</a:t>
             </a:r>
           </a:p>
           <a:p>
             <a:pPr lvl="2"/>
             <a:r>
-              <a:rPr lang="en-US" smtClean="0"/>
+              <a:rPr lang="en-US"/>
               <a:t>Third level</a:t>
             </a:r>
           </a:p>
           <a:p>
             <a:pPr lvl="3"/>
             <a:r>
-              <a:rPr lang="en-US" smtClean="0"/>
+              <a:rPr lang="en-US"/>
               <a:t>Fourth level</a:t>
             </a:r>
           </a:p>
           <a:p>
             <a:pPr lvl="4"/>
             <a:r>
-              <a:rPr lang="en-US" smtClean="0"/>
+              <a:rPr lang="en-US"/>
               <a:t>Fifth level</a:t>
             </a:r>
-            <a:endParaRPr lang="en-US"/>
           </a:p>
         </p:txBody>
       </p:sp>
@@ -9907,7 +10761,7 @@
           <a:p>
             <a:fld id="{45696B32-6A70-48EC-8939-9D142D9557CD}" type="datetimeFigureOut">
               <a:rPr lang="en-US" smtClean="0"/>
-              <a:t>5/30/2017</a:t>
+              <a:t>2/10/2018</a:t>
             </a:fld>
             <a:endParaRPr lang="en-US"/>
           </a:p>
@@ -10001,10 +10855,9 @@
           <a:lstStyle/>
           <a:p>
             <a:r>
-              <a:rPr lang="en-US" smtClean="0"/>
+              <a:rPr lang="en-US"/>
               <a:t>Click to edit Master title style</a:t>
             </a:r>
-            <a:endParaRPr lang="en-US"/>
           </a:p>
         </p:txBody>
       </p:sp>
@@ -10025,7 +10878,7 @@
           <a:p>
             <a:fld id="{45696B32-6A70-48EC-8939-9D142D9557CD}" type="datetimeFigureOut">
               <a:rPr lang="en-US" smtClean="0"/>
-              <a:t>5/30/2017</a:t>
+              <a:t>2/10/2018</a:t>
             </a:fld>
             <a:endParaRPr lang="en-US"/>
           </a:p>
@@ -10310,7 +11163,7 @@
           <a:p>
             <a:fld id="{699DC775-C286-4358-8C92-D7E584E969B3}" type="datetimeFigureOut">
               <a:rPr lang="en-US" smtClean="0"/>
-              <a:t>5/30/2017</a:t>
+              <a:t>2/10/2018</a:t>
             </a:fld>
             <a:endParaRPr lang="en-US"/>
           </a:p>
@@ -10405,7 +11258,7 @@
           <a:p>
             <a:fld id="{45696B32-6A70-48EC-8939-9D142D9557CD}" type="datetimeFigureOut">
               <a:rPr lang="en-US" smtClean="0"/>
-              <a:t>5/30/2017</a:t>
+              <a:t>2/10/2018</a:t>
             </a:fld>
             <a:endParaRPr lang="en-US"/>
           </a:p>
@@ -10508,10 +11361,9 @@
           </a:lstStyle>
           <a:p>
             <a:r>
-              <a:rPr lang="en-US" smtClean="0"/>
+              <a:rPr lang="en-US"/>
               <a:t>Click to edit Master title style</a:t>
             </a:r>
-            <a:endParaRPr lang="en-US"/>
           </a:p>
         </p:txBody>
       </p:sp>
@@ -10565,38 +11417,37 @@
           <a:p>
             <a:pPr lvl="0"/>
             <a:r>
-              <a:rPr lang="en-US" smtClean="0"/>
+              <a:rPr lang="en-US"/>
               <a:t>Click to edit Master text styles</a:t>
             </a:r>
           </a:p>
           <a:p>
             <a:pPr lvl="1"/>
             <a:r>
-              <a:rPr lang="en-US" smtClean="0"/>
+              <a:rPr lang="en-US"/>
               <a:t>Second level</a:t>
             </a:r>
           </a:p>
           <a:p>
             <a:pPr lvl="2"/>
             <a:r>
-              <a:rPr lang="en-US" smtClean="0"/>
+              <a:rPr lang="en-US"/>
               <a:t>Third level</a:t>
             </a:r>
           </a:p>
           <a:p>
             <a:pPr lvl="3"/>
             <a:r>
-              <a:rPr lang="en-US" smtClean="0"/>
+              <a:rPr lang="en-US"/>
               <a:t>Fourth level</a:t>
             </a:r>
           </a:p>
           <a:p>
             <a:pPr lvl="4"/>
             <a:r>
-              <a:rPr lang="en-US" smtClean="0"/>
+              <a:rPr lang="en-US"/>
               <a:t>Fifth level</a:t>
             </a:r>
-            <a:endParaRPr lang="en-US"/>
           </a:p>
         </p:txBody>
       </p:sp>
@@ -10659,7 +11510,7 @@
           <a:p>
             <a:pPr lvl="0"/>
             <a:r>
-              <a:rPr lang="en-US" smtClean="0"/>
+              <a:rPr lang="en-US"/>
               <a:t>Click to edit Master text styles</a:t>
             </a:r>
           </a:p>
@@ -10682,7 +11533,7 @@
           <a:p>
             <a:fld id="{45696B32-6A70-48EC-8939-9D142D9557CD}" type="datetimeFigureOut">
               <a:rPr lang="en-US" smtClean="0"/>
-              <a:t>5/30/2017</a:t>
+              <a:t>2/10/2018</a:t>
             </a:fld>
             <a:endParaRPr lang="en-US"/>
           </a:p>
@@ -10785,10 +11636,9 @@
           </a:lstStyle>
           <a:p>
             <a:r>
-              <a:rPr lang="en-US" smtClean="0"/>
+              <a:rPr lang="en-US"/>
               <a:t>Click to edit Master title style</a:t>
             </a:r>
-            <a:endParaRPr lang="en-US"/>
           </a:p>
         </p:txBody>
       </p:sp>
@@ -10912,7 +11762,7 @@
           <a:p>
             <a:pPr lvl="0"/>
             <a:r>
-              <a:rPr lang="en-US" smtClean="0"/>
+              <a:rPr lang="en-US"/>
               <a:t>Click to edit Master text styles</a:t>
             </a:r>
           </a:p>
@@ -10935,7 +11785,7 @@
           <a:p>
             <a:fld id="{45696B32-6A70-48EC-8939-9D142D9557CD}" type="datetimeFigureOut">
               <a:rPr lang="en-US" smtClean="0"/>
-              <a:t>5/30/2017</a:t>
+              <a:t>2/10/2018</a:t>
             </a:fld>
             <a:endParaRPr lang="en-US"/>
           </a:p>
@@ -11029,10 +11879,9 @@
           <a:lstStyle/>
           <a:p>
             <a:r>
-              <a:rPr lang="en-US" smtClean="0"/>
+              <a:rPr lang="en-US"/>
               <a:t>Click to edit Master title style</a:t>
             </a:r>
-            <a:endParaRPr lang="en-US"/>
           </a:p>
         </p:txBody>
       </p:sp>
@@ -11053,38 +11902,37 @@
           <a:p>
             <a:pPr lvl="0"/>
             <a:r>
-              <a:rPr lang="en-US" smtClean="0"/>
+              <a:rPr lang="en-US"/>
               <a:t>Click to edit Master text styles</a:t>
             </a:r>
           </a:p>
           <a:p>
             <a:pPr lvl="1"/>
             <a:r>
-              <a:rPr lang="en-US" smtClean="0"/>
+              <a:rPr lang="en-US"/>
               <a:t>Second level</a:t>
             </a:r>
           </a:p>
           <a:p>
             <a:pPr lvl="2"/>
             <a:r>
-              <a:rPr lang="en-US" smtClean="0"/>
+              <a:rPr lang="en-US"/>
               <a:t>Third level</a:t>
             </a:r>
           </a:p>
           <a:p>
             <a:pPr lvl="3"/>
             <a:r>
-              <a:rPr lang="en-US" smtClean="0"/>
+              <a:rPr lang="en-US"/>
               <a:t>Fourth level</a:t>
             </a:r>
           </a:p>
           <a:p>
             <a:pPr lvl="4"/>
             <a:r>
-              <a:rPr lang="en-US" smtClean="0"/>
+              <a:rPr lang="en-US"/>
               <a:t>Fifth level</a:t>
             </a:r>
-            <a:endParaRPr lang="en-US"/>
           </a:p>
         </p:txBody>
       </p:sp>
@@ -11105,7 +11953,7 @@
           <a:p>
             <a:fld id="{45696B32-6A70-48EC-8939-9D142D9557CD}" type="datetimeFigureOut">
               <a:rPr lang="en-US" smtClean="0"/>
-              <a:t>5/30/2017</a:t>
+              <a:t>2/10/2018</a:t>
             </a:fld>
             <a:endParaRPr lang="en-US"/>
           </a:p>
@@ -11204,10 +12052,9 @@
           <a:lstStyle/>
           <a:p>
             <a:r>
-              <a:rPr lang="en-US" smtClean="0"/>
+              <a:rPr lang="en-US"/>
               <a:t>Click to edit Master title style</a:t>
             </a:r>
-            <a:endParaRPr lang="en-US"/>
           </a:p>
         </p:txBody>
       </p:sp>
@@ -11233,38 +12080,37 @@
           <a:p>
             <a:pPr lvl="0"/>
             <a:r>
-              <a:rPr lang="en-US" smtClean="0"/>
+              <a:rPr lang="en-US"/>
               <a:t>Click to edit Master text styles</a:t>
             </a:r>
           </a:p>
           <a:p>
             <a:pPr lvl="1"/>
             <a:r>
-              <a:rPr lang="en-US" smtClean="0"/>
+              <a:rPr lang="en-US"/>
               <a:t>Second level</a:t>
             </a:r>
           </a:p>
           <a:p>
             <a:pPr lvl="2"/>
             <a:r>
-              <a:rPr lang="en-US" smtClean="0"/>
+              <a:rPr lang="en-US"/>
               <a:t>Third level</a:t>
             </a:r>
           </a:p>
           <a:p>
             <a:pPr lvl="3"/>
             <a:r>
-              <a:rPr lang="en-US" smtClean="0"/>
+              <a:rPr lang="en-US"/>
               <a:t>Fourth level</a:t>
             </a:r>
           </a:p>
           <a:p>
             <a:pPr lvl="4"/>
             <a:r>
-              <a:rPr lang="en-US" smtClean="0"/>
+              <a:rPr lang="en-US"/>
               <a:t>Fifth level</a:t>
             </a:r>
-            <a:endParaRPr lang="en-US"/>
           </a:p>
         </p:txBody>
       </p:sp>
@@ -11285,7 +12131,7 @@
           <a:p>
             <a:fld id="{45696B32-6A70-48EC-8939-9D142D9557CD}" type="datetimeFigureOut">
               <a:rPr lang="en-US" smtClean="0"/>
-              <a:t>5/30/2017</a:t>
+              <a:t>2/10/2018</a:t>
             </a:fld>
             <a:endParaRPr lang="en-US"/>
           </a:p>
@@ -11704,7 +12550,7 @@
           <a:p>
             <a:fld id="{699DC775-C286-4358-8C92-D7E584E969B3}" type="datetimeFigureOut">
               <a:rPr lang="en-US" smtClean="0"/>
-              <a:t>5/30/2017</a:t>
+              <a:t>2/10/2018</a:t>
             </a:fld>
             <a:endParaRPr lang="en-US"/>
           </a:p>
@@ -11821,7 +12667,7 @@
           <a:p>
             <a:fld id="{699DC775-C286-4358-8C92-D7E584E969B3}" type="datetimeFigureOut">
               <a:rPr lang="en-US" smtClean="0"/>
-              <a:t>5/30/2017</a:t>
+              <a:t>2/10/2018</a:t>
             </a:fld>
             <a:endParaRPr lang="en-US"/>
           </a:p>
@@ -11916,7 +12762,7 @@
           <a:p>
             <a:fld id="{699DC775-C286-4358-8C92-D7E584E969B3}" type="datetimeFigureOut">
               <a:rPr lang="en-US" smtClean="0"/>
-              <a:t>5/30/2017</a:t>
+              <a:t>2/10/2018</a:t>
             </a:fld>
             <a:endParaRPr lang="en-US"/>
           </a:p>
@@ -12191,7 +13037,7 @@
           <a:p>
             <a:fld id="{699DC775-C286-4358-8C92-D7E584E969B3}" type="datetimeFigureOut">
               <a:rPr lang="en-US" smtClean="0"/>
-              <a:t>5/30/2017</a:t>
+              <a:t>2/10/2018</a:t>
             </a:fld>
             <a:endParaRPr lang="en-US"/>
           </a:p>
@@ -12443,7 +13289,7 @@
           <a:p>
             <a:fld id="{699DC775-C286-4358-8C92-D7E584E969B3}" type="datetimeFigureOut">
               <a:rPr lang="en-US" smtClean="0"/>
-              <a:t>5/30/2017</a:t>
+              <a:t>2/10/2018</a:t>
             </a:fld>
             <a:endParaRPr lang="en-US"/>
           </a:p>
@@ -12654,7 +13500,7 @@
           <a:p>
             <a:fld id="{699DC775-C286-4358-8C92-D7E584E969B3}" type="datetimeFigureOut">
               <a:rPr lang="en-US" smtClean="0"/>
-              <a:t>5/30/2017</a:t>
+              <a:t>2/10/2018</a:t>
             </a:fld>
             <a:endParaRPr lang="en-US"/>
           </a:p>
@@ -13167,7 +14013,7 @@
           <a:p>
             <a:fld id="{699DC775-C286-4358-8C92-D7E584E969B3}" type="datetimeFigureOut">
               <a:rPr lang="en-US" smtClean="0"/>
-              <a:t>5/30/2017</a:t>
+              <a:t>2/10/2018</a:t>
             </a:fld>
             <a:endParaRPr lang="en-US"/>
           </a:p>
@@ -13678,7 +14524,7 @@
           <a:p>
             <a:fld id="{699DC775-C286-4358-8C92-D7E584E969B3}" type="datetimeFigureOut">
               <a:rPr lang="en-US" smtClean="0"/>
-              <a:t>5/30/2017</a:t>
+              <a:t>2/10/2018</a:t>
             </a:fld>
             <a:endParaRPr lang="en-US"/>
           </a:p>
@@ -14084,10 +14930,9 @@
           <a:lstStyle/>
           <a:p>
             <a:r>
-              <a:rPr lang="en-US" smtClean="0"/>
+              <a:rPr lang="en-US"/>
               <a:t>Click to edit Master title style</a:t>
             </a:r>
-            <a:endParaRPr lang="en-US"/>
           </a:p>
         </p:txBody>
       </p:sp>
@@ -14118,38 +14963,37 @@
           <a:p>
             <a:pPr lvl="0"/>
             <a:r>
-              <a:rPr lang="en-US" smtClean="0"/>
+              <a:rPr lang="en-US"/>
               <a:t>Click to edit Master text styles</a:t>
             </a:r>
           </a:p>
           <a:p>
             <a:pPr lvl="1"/>
             <a:r>
-              <a:rPr lang="en-US" smtClean="0"/>
+              <a:rPr lang="en-US"/>
               <a:t>Second level</a:t>
             </a:r>
           </a:p>
           <a:p>
             <a:pPr lvl="2"/>
             <a:r>
-              <a:rPr lang="en-US" smtClean="0"/>
+              <a:rPr lang="en-US"/>
               <a:t>Third level</a:t>
             </a:r>
           </a:p>
           <a:p>
             <a:pPr lvl="3"/>
             <a:r>
-              <a:rPr lang="en-US" smtClean="0"/>
+              <a:rPr lang="en-US"/>
               <a:t>Fourth level</a:t>
             </a:r>
           </a:p>
           <a:p>
             <a:pPr lvl="4"/>
             <a:r>
-              <a:rPr lang="en-US" smtClean="0"/>
+              <a:rPr lang="en-US"/>
               <a:t>Fifth level</a:t>
             </a:r>
-            <a:endParaRPr lang="en-US"/>
           </a:p>
         </p:txBody>
       </p:sp>
@@ -14188,7 +15032,7 @@
           <a:p>
             <a:fld id="{45696B32-6A70-48EC-8939-9D142D9557CD}" type="datetimeFigureOut">
               <a:rPr lang="en-US" smtClean="0"/>
-              <a:t>5/30/2017</a:t>
+              <a:t>2/10/2018</a:t>
             </a:fld>
             <a:endParaRPr lang="en-US"/>
           </a:p>
@@ -14918,7 +15762,7 @@
           <a:lstStyle/>
           <a:p>
             <a:r>
-              <a:rPr lang="en-US" dirty="0" smtClean="0"/>
+              <a:rPr lang="en-US" dirty="0"/>
               <a:t>Paste:: Paste At Cursor/Original Position</a:t>
             </a:r>
             <a:endParaRPr lang="en-SG" dirty="0"/>
@@ -14944,59 +15788,36 @@
               <a:buNone/>
             </a:pPr>
             <a:r>
-              <a:rPr lang="en-US" b="1" dirty="0" smtClean="0"/>
-              <a:t>Additional instructions</a:t>
-            </a:r>
-            <a:r>
               <a:rPr lang="en-US" b="1" dirty="0"/>
-              <a:t>:</a:t>
+              <a:t>Additional instructions:</a:t>
             </a:r>
           </a:p>
           <a:p>
             <a:pPr marL="285750" indent="-285750"/>
             <a:r>
               <a:rPr lang="en-US" dirty="0"/>
-              <a:t>Select </a:t>
-            </a:r>
-            <a:r>
-              <a:rPr lang="en-US" dirty="0" smtClean="0"/>
-              <a:t>the appropriate shape/group.</a:t>
-            </a:r>
-            <a:endParaRPr lang="en-US" dirty="0"/>
+              <a:t>Select the appropriate shape/group.</a:t>
+            </a:r>
           </a:p>
           <a:p>
             <a:pPr marL="285750" indent="-285750"/>
             <a:r>
-              <a:rPr lang="en-US" dirty="0" smtClean="0"/>
+              <a:rPr lang="en-US" dirty="0"/>
               <a:t>Right click on the shape/group and click cut.</a:t>
             </a:r>
-            <a:endParaRPr lang="en-US" dirty="0"/>
           </a:p>
           <a:p>
             <a:pPr marL="285750" indent="-285750"/>
             <a:r>
-              <a:rPr lang="en-US" dirty="0" smtClean="0"/>
+              <a:rPr lang="en-US" dirty="0"/>
               <a:t>Right click on an empty position on the slide</a:t>
             </a:r>
-            <a:endParaRPr lang="en-US" dirty="0"/>
           </a:p>
           <a:p>
             <a:pPr marL="285750" indent="-285750"/>
             <a:r>
-              <a:rPr lang="en-US" dirty="0" smtClean="0"/>
-              <a:t>Select either </a:t>
-            </a:r>
-            <a:r>
               <a:rPr lang="en-US" dirty="0"/>
-              <a:t>Paste To </a:t>
-            </a:r>
-            <a:r>
-              <a:rPr lang="en-US" dirty="0" smtClean="0"/>
-              <a:t>Cursor Position or Paste To Original Position under </a:t>
-            </a:r>
-            <a:r>
-              <a:rPr lang="en-US" dirty="0"/>
-              <a:t>the </a:t>
+              <a:t>Select either Paste To Cursor Position or Paste To Original Position under the </a:t>
             </a:r>
             <a:r>
               <a:rPr lang="en-US" dirty="0" err="1"/>
@@ -15004,13 +15825,8 @@
             </a:r>
             <a:r>
               <a:rPr lang="en-US" dirty="0"/>
-              <a:t> context </a:t>
-            </a:r>
-            <a:r>
-              <a:rPr lang="en-US" dirty="0" smtClean="0"/>
-              <a:t>menu based on the test case</a:t>
-            </a:r>
-            <a:endParaRPr lang="en-US" dirty="0"/>
+              <a:t> context menu based on the test case</a:t>
+            </a:r>
           </a:p>
         </p:txBody>
       </p:sp>
@@ -15249,13 +16065,6 @@
   <p:clrMapOvr>
     <a:masterClrMapping/>
   </p:clrMapOvr>
-  <p:timing>
-    <p:tnLst>
-      <p:par>
-        <p:cTn id="1" dur="indefinite" restart="never" nodeType="tmRoot"/>
-      </p:par>
-    </p:tnLst>
-  </p:timing>
 </p:sld>
 </file>
 
@@ -15362,13 +16171,6 @@
   <p:clrMapOvr>
     <a:masterClrMapping/>
   </p:clrMapOvr>
-  <p:timing>
-    <p:tnLst>
-      <p:par>
-        <p:cTn id="1" dur="indefinite" restart="never" nodeType="tmRoot"/>
-      </p:par>
-    </p:tnLst>
-  </p:timing>
 </p:sld>
 </file>
 
@@ -15475,13 +16277,6 @@
   <p:clrMapOvr>
     <a:masterClrMapping/>
   </p:clrMapOvr>
-  <p:timing>
-    <p:tnLst>
-      <p:par>
-        <p:cTn id="1" dur="indefinite" restart="never" nodeType="tmRoot"/>
-      </p:par>
-    </p:tnLst>
-  </p:timing>
 </p:sld>
 </file>
 
@@ -15518,7 +16313,7 @@
           <a:lstStyle/>
           <a:p>
             <a:r>
-              <a:rPr lang="en-US" dirty="0" smtClean="0"/>
+              <a:rPr lang="en-US" dirty="0"/>
               <a:t>Paste:: Replace With Clipboard</a:t>
             </a:r>
             <a:endParaRPr lang="en-SG" dirty="0"/>
@@ -15544,57 +16339,45 @@
               <a:buNone/>
             </a:pPr>
             <a:r>
-              <a:rPr lang="en-US" b="1" dirty="0" smtClean="0"/>
-              <a:t>Additional instructions</a:t>
-            </a:r>
-            <a:r>
               <a:rPr lang="en-US" b="1" dirty="0"/>
-              <a:t>:</a:t>
+              <a:t>Additional instructions:</a:t>
             </a:r>
           </a:p>
           <a:p>
             <a:pPr marL="285750" indent="-285750"/>
             <a:r>
               <a:rPr lang="en-US" dirty="0"/>
-              <a:t>Select </a:t>
-            </a:r>
-            <a:r>
-              <a:rPr lang="en-US" dirty="0" smtClean="0"/>
-              <a:t>the appropriate shape/group.</a:t>
-            </a:r>
-            <a:endParaRPr lang="en-US" dirty="0"/>
+              <a:t>Select the appropriate shape/group.</a:t>
+            </a:r>
           </a:p>
           <a:p>
             <a:pPr marL="285750" indent="-285750"/>
             <a:r>
-              <a:rPr lang="en-US" dirty="0" smtClean="0"/>
+              <a:rPr lang="en-US" dirty="0"/>
               <a:t>Right click on the shape/group and click cut.</a:t>
             </a:r>
-            <a:endParaRPr lang="en-US" dirty="0"/>
           </a:p>
           <a:p>
             <a:pPr marL="285750" indent="-285750"/>
             <a:r>
-              <a:rPr lang="en-US" dirty="0" smtClean="0"/>
+              <a:rPr lang="en-US" dirty="0"/>
               <a:t>Right click on the shape to be replaced</a:t>
             </a:r>
-            <a:endParaRPr lang="en-US" dirty="0"/>
           </a:p>
           <a:p>
             <a:pPr marL="285750" indent="-285750"/>
             <a:r>
-              <a:rPr lang="en-US" dirty="0" smtClean="0"/>
+              <a:rPr lang="en-US" dirty="0"/>
               <a:t>Select Replace With Clipboard in the </a:t>
             </a:r>
             <a:r>
-              <a:rPr lang="en-US" dirty="0" err="1" smtClean="0"/>
+              <a:rPr lang="en-US" dirty="0" err="1"/>
               <a:t>PowerPointLabs</a:t>
             </a:r>
             <a:r>
-              <a:rPr lang="en-US" dirty="0" smtClean="0"/>
+              <a:rPr lang="en-US" dirty="0"/>
               <a:t> context menu</a:t>
             </a:r>
-            <a:endParaRPr lang="en-US" dirty="0"/>
           </a:p>
         </p:txBody>
       </p:sp>
@@ -15608,13 +16391,6 @@
   <p:clrMapOvr>
     <a:masterClrMapping/>
   </p:clrMapOvr>
-  <p:timing>
-    <p:tnLst>
-      <p:par>
-        <p:cTn id="1" dur="indefinite" restart="never" nodeType="tmRoot"/>
-      </p:par>
-    </p:tnLst>
-  </p:timing>
 </p:sld>
 </file>
 
@@ -15804,13 +16580,6 @@
   <p:clrMapOvr>
     <a:masterClrMapping/>
   </p:clrMapOvr>
-  <p:timing>
-    <p:tnLst>
-      <p:par>
-        <p:cTn id="1" dur="indefinite" restart="never" nodeType="tmRoot"/>
-      </p:par>
-    </p:tnLst>
-  </p:timing>
 </p:sld>
 </file>
 
@@ -15957,13 +16726,6 @@
   <p:clrMapOvr>
     <a:masterClrMapping/>
   </p:clrMapOvr>
-  <p:timing>
-    <p:tnLst>
-      <p:par>
-        <p:cTn id="1" dur="indefinite" restart="never" nodeType="tmRoot"/>
-      </p:par>
-    </p:tnLst>
-  </p:timing>
 </p:sld>
 </file>
 
@@ -16018,7 +16780,7 @@
           <a:p>
             <a:pPr algn="l"/>
             <a:r>
-              <a:rPr lang="en-US" sz="7200" dirty="0" smtClean="0"/>
+              <a:rPr lang="en-US" sz="7200" dirty="0"/>
               <a:t>Paste Lab</a:t>
             </a:r>
             <a:endParaRPr lang="en-SG" sz="7200" dirty="0">
@@ -16590,7 +17352,7 @@
           <a:lstStyle/>
           <a:p>
             <a:r>
-              <a:rPr lang="en-US" dirty="0" smtClean="0"/>
+              <a:rPr lang="en-US" dirty="0"/>
               <a:t>Paste:: Paste Into Group</a:t>
             </a:r>
             <a:endParaRPr lang="en-SG" dirty="0"/>
@@ -16616,57 +17378,45 @@
               <a:buNone/>
             </a:pPr>
             <a:r>
-              <a:rPr lang="en-US" b="1" dirty="0" smtClean="0"/>
-              <a:t>Additional instructions</a:t>
-            </a:r>
-            <a:r>
               <a:rPr lang="en-US" b="1" dirty="0"/>
-              <a:t>:</a:t>
+              <a:t>Additional instructions:</a:t>
             </a:r>
           </a:p>
           <a:p>
             <a:pPr marL="285750" indent="-285750"/>
             <a:r>
               <a:rPr lang="en-US" dirty="0"/>
-              <a:t>Select </a:t>
-            </a:r>
-            <a:r>
-              <a:rPr lang="en-US" dirty="0" smtClean="0"/>
-              <a:t>the appropriate shape/group.</a:t>
-            </a:r>
-            <a:endParaRPr lang="en-US" dirty="0"/>
+              <a:t>Select the appropriate shape/group.</a:t>
+            </a:r>
           </a:p>
           <a:p>
             <a:pPr marL="285750" indent="-285750"/>
             <a:r>
-              <a:rPr lang="en-US" dirty="0" smtClean="0"/>
+              <a:rPr lang="en-US" dirty="0"/>
               <a:t>Right click on the shape/group and click cut/copy.</a:t>
             </a:r>
-            <a:endParaRPr lang="en-US" dirty="0"/>
           </a:p>
           <a:p>
             <a:pPr marL="285750" indent="-285750"/>
             <a:r>
-              <a:rPr lang="en-US" dirty="0" smtClean="0"/>
+              <a:rPr lang="en-US" dirty="0"/>
               <a:t>Right click on the group of squares</a:t>
             </a:r>
-            <a:endParaRPr lang="en-US" dirty="0"/>
           </a:p>
           <a:p>
             <a:pPr marL="285750" indent="-285750"/>
             <a:r>
-              <a:rPr lang="en-US" dirty="0" smtClean="0"/>
+              <a:rPr lang="en-US" dirty="0"/>
               <a:t>Select Paste Into Group in the </a:t>
             </a:r>
             <a:r>
-              <a:rPr lang="en-US" dirty="0" err="1" smtClean="0"/>
+              <a:rPr lang="en-US" dirty="0" err="1"/>
               <a:t>PowerPointLabs</a:t>
             </a:r>
             <a:r>
-              <a:rPr lang="en-US" dirty="0" smtClean="0"/>
+              <a:rPr lang="en-US" dirty="0"/>
               <a:t> context menu</a:t>
             </a:r>
-            <a:endParaRPr lang="en-US" dirty="0"/>
           </a:p>
         </p:txBody>
       </p:sp>
@@ -16680,13 +17430,6 @@
   <p:clrMapOvr>
     <a:masterClrMapping/>
   </p:clrMapOvr>
-  <p:timing>
-    <p:tnLst>
-      <p:par>
-        <p:cTn id="1" dur="indefinite" restart="never" nodeType="tmRoot"/>
-      </p:par>
-    </p:tnLst>
-  </p:timing>
 </p:sld>
 </file>
 
@@ -17263,6 +18006,372 @@
 </p:sld>
 </file>
 
+<file path=ppt/slides/slide25.xml><?xml version="1.0" encoding="utf-8"?>
+<p:sld xmlns:a="http://schemas.openxmlformats.org/drawingml/2006/main" xmlns:r="http://schemas.openxmlformats.org/officeDocument/2006/relationships" xmlns:p="http://schemas.openxmlformats.org/presentationml/2006/main">
+  <p:cSld>
+    <p:spTree>
+      <p:nvGrpSpPr>
+        <p:cNvPr id="1" name=""/>
+        <p:cNvGrpSpPr/>
+        <p:nvPr/>
+      </p:nvGrpSpPr>
+      <p:grpSpPr>
+        <a:xfrm>
+          <a:off x="0" y="0"/>
+          <a:ext cx="0" cy="0"/>
+          <a:chOff x="0" y="0"/>
+          <a:chExt cx="0" cy="0"/>
+        </a:xfrm>
+      </p:grpSpPr>
+      <p:sp>
+        <p:nvSpPr>
+          <p:cNvPr id="2" name="Title 1"/>
+          <p:cNvSpPr>
+            <a:spLocks noGrp="1"/>
+          </p:cNvSpPr>
+          <p:nvPr>
+            <p:ph type="title"/>
+          </p:nvPr>
+        </p:nvSpPr>
+        <p:spPr/>
+        <p:txBody>
+          <a:bodyPr/>
+          <a:lstStyle/>
+          <a:p>
+            <a:r>
+              <a:rPr lang="en-US" dirty="0"/>
+              <a:t>Paste:: Paste To Fit Slide </a:t>
+            </a:r>
+            <a:endParaRPr lang="en-SG" dirty="0"/>
+          </a:p>
+        </p:txBody>
+      </p:sp>
+      <p:sp>
+        <p:nvSpPr>
+          <p:cNvPr id="4" name="Content Placeholder 3"/>
+          <p:cNvSpPr>
+            <a:spLocks noGrp="1"/>
+          </p:cNvSpPr>
+          <p:nvPr>
+            <p:ph idx="1"/>
+          </p:nvPr>
+        </p:nvSpPr>
+        <p:spPr/>
+        <p:txBody>
+          <a:bodyPr/>
+          <a:lstStyle/>
+          <a:p>
+            <a:pPr marL="0" indent="0">
+              <a:buNone/>
+            </a:pPr>
+            <a:r>
+              <a:rPr lang="en-US" b="1" dirty="0"/>
+              <a:t>Additional instructions:</a:t>
+            </a:r>
+          </a:p>
+          <a:p>
+            <a:pPr marL="285750" indent="-285750"/>
+            <a:r>
+              <a:rPr lang="en-US" dirty="0"/>
+              <a:t>Select the appropriate shape/group.</a:t>
+            </a:r>
+          </a:p>
+          <a:p>
+            <a:pPr marL="285750" indent="-285750"/>
+            <a:r>
+              <a:rPr lang="en-US" dirty="0"/>
+              <a:t>Right click on the shape/group and click cut.</a:t>
+            </a:r>
+          </a:p>
+          <a:p>
+            <a:pPr marL="285750" indent="-285750"/>
+            <a:r>
+              <a:rPr lang="en-US" dirty="0"/>
+              <a:t>Right click on an empty position on the slide</a:t>
+            </a:r>
+          </a:p>
+          <a:p>
+            <a:pPr marL="285750" indent="-285750"/>
+            <a:r>
+              <a:rPr lang="en-US" dirty="0"/>
+              <a:t>Select Paste To Fit Slide under the </a:t>
+            </a:r>
+            <a:r>
+              <a:rPr lang="en-US" dirty="0" err="1"/>
+              <a:t>PowerPointLabs</a:t>
+            </a:r>
+            <a:r>
+              <a:rPr lang="en-US" dirty="0"/>
+              <a:t> context menu</a:t>
+            </a:r>
+          </a:p>
+        </p:txBody>
+      </p:sp>
+    </p:spTree>
+    <p:extLst>
+      <p:ext uri="{BB962C8B-B14F-4D97-AF65-F5344CB8AC3E}">
+        <p14:creationId xmlns:p14="http://schemas.microsoft.com/office/powerpoint/2010/main" val="3942310800"/>
+      </p:ext>
+    </p:extLst>
+  </p:cSld>
+  <p:clrMapOvr>
+    <a:masterClrMapping/>
+  </p:clrMapOvr>
+</p:sld>
+</file>
+
+<file path=ppt/slides/slide26.xml><?xml version="1.0" encoding="utf-8"?>
+<p:sld xmlns:a="http://schemas.openxmlformats.org/drawingml/2006/main" xmlns:r="http://schemas.openxmlformats.org/officeDocument/2006/relationships" xmlns:p="http://schemas.openxmlformats.org/presentationml/2006/main">
+  <p:cSld>
+    <p:spTree>
+      <p:nvGrpSpPr>
+        <p:cNvPr id="1" name=""/>
+        <p:cNvGrpSpPr/>
+        <p:nvPr/>
+      </p:nvGrpSpPr>
+      <p:grpSpPr>
+        <a:xfrm>
+          <a:off x="0" y="0"/>
+          <a:ext cx="0" cy="0"/>
+          <a:chOff x="0" y="0"/>
+          <a:chExt cx="0" cy="0"/>
+        </a:xfrm>
+      </p:grpSpPr>
+      <p:pic>
+        <p:nvPicPr>
+          <p:cNvPr id="5" name="selectMe"/>
+          <p:cNvPicPr>
+            <a:picLocks noChangeAspect="1"/>
+          </p:cNvPicPr>
+          <p:nvPr/>
+        </p:nvPicPr>
+        <p:blipFill>
+          <a:blip r:embed="rId3">
+            <a:extLst>
+              <a:ext uri="{28A0092B-C50C-407E-A947-70E740481C1C}">
+                <a14:useLocalDpi xmlns:a14="http://schemas.microsoft.com/office/drawing/2010/main" val="0"/>
+              </a:ext>
+            </a:extLst>
+          </a:blip>
+          <a:stretch>
+            <a:fillRect/>
+          </a:stretch>
+        </p:blipFill>
+        <p:spPr>
+          <a:xfrm>
+            <a:off x="2514600" y="1447800"/>
+            <a:ext cx="4572000" cy="3058418"/>
+          </a:xfrm>
+          <a:prstGeom prst="rect">
+            <a:avLst/>
+          </a:prstGeom>
+        </p:spPr>
+      </p:pic>
+    </p:spTree>
+    <p:extLst>
+      <p:ext uri="{BB962C8B-B14F-4D97-AF65-F5344CB8AC3E}">
+        <p14:creationId xmlns:p14="http://schemas.microsoft.com/office/powerpoint/2010/main" val="1421508047"/>
+      </p:ext>
+    </p:extLst>
+  </p:cSld>
+  <p:clrMapOvr>
+    <a:masterClrMapping/>
+  </p:clrMapOvr>
+</p:sld>
+</file>
+
+<file path=ppt/slides/slide27.xml><?xml version="1.0" encoding="utf-8"?>
+<p:sld xmlns:a="http://schemas.openxmlformats.org/drawingml/2006/main" xmlns:r="http://schemas.openxmlformats.org/officeDocument/2006/relationships" xmlns:p="http://schemas.openxmlformats.org/presentationml/2006/main">
+  <p:cSld>
+    <p:spTree>
+      <p:nvGrpSpPr>
+        <p:cNvPr id="1" name=""/>
+        <p:cNvGrpSpPr/>
+        <p:nvPr/>
+      </p:nvGrpSpPr>
+      <p:grpSpPr>
+        <a:xfrm>
+          <a:off x="0" y="0"/>
+          <a:ext cx="0" cy="0"/>
+          <a:chOff x="0" y="0"/>
+          <a:chExt cx="0" cy="0"/>
+        </a:xfrm>
+      </p:grpSpPr>
+      <p:pic>
+        <p:nvPicPr>
+          <p:cNvPr id="3" name="selectMe">
+            <a:extLst>
+              <a:ext uri="{FF2B5EF4-FFF2-40B4-BE49-F238E27FC236}">
+                <a16:creationId xmlns:a16="http://schemas.microsoft.com/office/drawing/2014/main" id="{063F6D96-8C57-440E-921B-1C0D5A5C810B}"/>
+              </a:ext>
+            </a:extLst>
+          </p:cNvPr>
+          <p:cNvPicPr>
+            <a:picLocks noChangeAspect="1"/>
+          </p:cNvPicPr>
+          <p:nvPr/>
+        </p:nvPicPr>
+        <p:blipFill>
+          <a:blip r:embed="rId3">
+            <a:extLst>
+              <a:ext uri="{28A0092B-C50C-407E-A947-70E740481C1C}">
+                <a14:useLocalDpi xmlns:a14="http://schemas.microsoft.com/office/drawing/2010/main" val="0"/>
+              </a:ext>
+            </a:extLst>
+          </a:blip>
+          <a:stretch>
+            <a:fillRect/>
+          </a:stretch>
+        </p:blipFill>
+        <p:spPr>
+          <a:xfrm>
+            <a:off x="0" y="370582"/>
+            <a:ext cx="9144000" cy="6116836"/>
+          </a:xfrm>
+          <a:prstGeom prst="rect">
+            <a:avLst/>
+          </a:prstGeom>
+        </p:spPr>
+      </p:pic>
+    </p:spTree>
+    <p:extLst>
+      <p:ext uri="{BB962C8B-B14F-4D97-AF65-F5344CB8AC3E}">
+        <p14:creationId xmlns:p14="http://schemas.microsoft.com/office/powerpoint/2010/main" val="2753748216"/>
+      </p:ext>
+    </p:extLst>
+  </p:cSld>
+  <p:clrMapOvr>
+    <a:masterClrMapping/>
+  </p:clrMapOvr>
+</p:sld>
+</file>
+
+<file path=ppt/slides/slide28.xml><?xml version="1.0" encoding="utf-8"?>
+<p:sld xmlns:a="http://schemas.openxmlformats.org/drawingml/2006/main" xmlns:r="http://schemas.openxmlformats.org/officeDocument/2006/relationships" xmlns:p="http://schemas.openxmlformats.org/presentationml/2006/main">
+  <p:cSld>
+    <p:spTree>
+      <p:nvGrpSpPr>
+        <p:cNvPr id="1" name=""/>
+        <p:cNvGrpSpPr/>
+        <p:nvPr/>
+      </p:nvGrpSpPr>
+      <p:grpSpPr>
+        <a:xfrm>
+          <a:off x="0" y="0"/>
+          <a:ext cx="0" cy="0"/>
+          <a:chOff x="0" y="0"/>
+          <a:chExt cx="0" cy="0"/>
+        </a:xfrm>
+      </p:grpSpPr>
+      <p:pic>
+        <p:nvPicPr>
+          <p:cNvPr id="4" name="selectMe"/>
+          <p:cNvPicPr>
+            <a:picLocks noChangeAspect="1"/>
+          </p:cNvPicPr>
+          <p:nvPr/>
+        </p:nvPicPr>
+        <p:blipFill>
+          <a:blip r:embed="rId3">
+            <a:extLst>
+              <a:ext uri="{28A0092B-C50C-407E-A947-70E740481C1C}">
+                <a14:useLocalDpi xmlns:a14="http://schemas.microsoft.com/office/drawing/2010/main" val="0"/>
+              </a:ext>
+            </a:extLst>
+          </a:blip>
+          <a:stretch>
+            <a:fillRect/>
+          </a:stretch>
+        </p:blipFill>
+        <p:spPr>
+          <a:xfrm rot="19620406">
+            <a:off x="2362200" y="1295400"/>
+            <a:ext cx="4572000" cy="3058418"/>
+          </a:xfrm>
+          <a:prstGeom prst="rect">
+            <a:avLst/>
+          </a:prstGeom>
+        </p:spPr>
+      </p:pic>
+    </p:spTree>
+    <p:extLst>
+      <p:ext uri="{BB962C8B-B14F-4D97-AF65-F5344CB8AC3E}">
+        <p14:creationId xmlns:p14="http://schemas.microsoft.com/office/powerpoint/2010/main" val="1942971641"/>
+      </p:ext>
+    </p:extLst>
+  </p:cSld>
+  <p:clrMapOvr>
+    <a:masterClrMapping/>
+  </p:clrMapOvr>
+</p:sld>
+</file>
+
+<file path=ppt/slides/slide29.xml><?xml version="1.0" encoding="utf-8"?>
+<p:sld xmlns:a="http://schemas.openxmlformats.org/drawingml/2006/main" xmlns:r="http://schemas.openxmlformats.org/officeDocument/2006/relationships" xmlns:p="http://schemas.openxmlformats.org/presentationml/2006/main">
+  <p:cSld>
+    <p:spTree>
+      <p:nvGrpSpPr>
+        <p:cNvPr id="1" name=""/>
+        <p:cNvGrpSpPr/>
+        <p:nvPr/>
+      </p:nvGrpSpPr>
+      <p:grpSpPr>
+        <a:xfrm>
+          <a:off x="0" y="0"/>
+          <a:ext cx="0" cy="0"/>
+          <a:chOff x="0" y="0"/>
+          <a:chExt cx="0" cy="0"/>
+        </a:xfrm>
+      </p:grpSpPr>
+      <p:pic>
+        <p:nvPicPr>
+          <p:cNvPr id="3" name="selectMe">
+            <a:extLst>
+              <a:ext uri="{FF2B5EF4-FFF2-40B4-BE49-F238E27FC236}">
+                <a16:creationId xmlns:a16="http://schemas.microsoft.com/office/drawing/2014/main" id="{97E693C9-324B-4A09-A689-A1DFF118EC91}"/>
+              </a:ext>
+            </a:extLst>
+          </p:cNvPr>
+          <p:cNvPicPr>
+            <a:picLocks noChangeAspect="1"/>
+          </p:cNvPicPr>
+          <p:nvPr/>
+        </p:nvPicPr>
+        <p:blipFill>
+          <a:blip r:embed="rId3">
+            <a:extLst>
+              <a:ext uri="{28A0092B-C50C-407E-A947-70E740481C1C}">
+                <a14:useLocalDpi xmlns:a14="http://schemas.microsoft.com/office/drawing/2010/main" val="0"/>
+              </a:ext>
+            </a:extLst>
+          </a:blip>
+          <a:stretch>
+            <a:fillRect/>
+          </a:stretch>
+        </p:blipFill>
+        <p:spPr>
+          <a:xfrm rot="19620406">
+            <a:off x="1470539" y="1354292"/>
+            <a:ext cx="6202923" cy="4149416"/>
+          </a:xfrm>
+          <a:prstGeom prst="rect">
+            <a:avLst/>
+          </a:prstGeom>
+        </p:spPr>
+      </p:pic>
+    </p:spTree>
+    <p:extLst>
+      <p:ext uri="{BB962C8B-B14F-4D97-AF65-F5344CB8AC3E}">
+        <p14:creationId xmlns:p14="http://schemas.microsoft.com/office/powerpoint/2010/main" val="4262159515"/>
+      </p:ext>
+    </p:extLst>
+  </p:cSld>
+  <p:clrMapOvr>
+    <a:masterClrMapping/>
+  </p:clrMapOvr>
+</p:sld>
+</file>
+
 <file path=ppt/slides/slide3.xml><?xml version="1.0" encoding="utf-8"?>
 <p:sld xmlns:a="http://schemas.openxmlformats.org/drawingml/2006/main" xmlns:r="http://schemas.openxmlformats.org/officeDocument/2006/relationships" xmlns:p="http://schemas.openxmlformats.org/presentationml/2006/main">
   <p:cSld>
@@ -17296,16 +18405,8 @@
           <a:lstStyle/>
           <a:p>
             <a:r>
-              <a:rPr lang="en-US" dirty="0" smtClean="0"/>
-              <a:t>Paste:: Paste To </a:t>
-            </a:r>
-            <a:r>
               <a:rPr lang="en-US" dirty="0"/>
-              <a:t>F</a:t>
-            </a:r>
-            <a:r>
-              <a:rPr lang="en-US" dirty="0" smtClean="0"/>
-              <a:t>ill Slide </a:t>
+              <a:t>Paste:: Paste To Fill Slide </a:t>
             </a:r>
             <a:endParaRPr lang="en-SG" dirty="0"/>
           </a:p>
@@ -17330,57 +18431,45 @@
               <a:buNone/>
             </a:pPr>
             <a:r>
-              <a:rPr lang="en-US" b="1" dirty="0" smtClean="0"/>
-              <a:t>Additional instructions</a:t>
-            </a:r>
-            <a:r>
               <a:rPr lang="en-US" b="1" dirty="0"/>
-              <a:t>:</a:t>
+              <a:t>Additional instructions:</a:t>
             </a:r>
           </a:p>
           <a:p>
             <a:pPr marL="285750" indent="-285750"/>
             <a:r>
               <a:rPr lang="en-US" dirty="0"/>
-              <a:t>Select </a:t>
-            </a:r>
-            <a:r>
-              <a:rPr lang="en-US" dirty="0" smtClean="0"/>
-              <a:t>the appropriate shape/group.</a:t>
-            </a:r>
-            <a:endParaRPr lang="en-US" dirty="0"/>
+              <a:t>Select the appropriate shape/group.</a:t>
+            </a:r>
           </a:p>
           <a:p>
             <a:pPr marL="285750" indent="-285750"/>
             <a:r>
-              <a:rPr lang="en-US" dirty="0" smtClean="0"/>
+              <a:rPr lang="en-US" dirty="0"/>
               <a:t>Right click on the shape/group and click cut.</a:t>
             </a:r>
-            <a:endParaRPr lang="en-US" dirty="0"/>
           </a:p>
           <a:p>
             <a:pPr marL="285750" indent="-285750"/>
             <a:r>
-              <a:rPr lang="en-US" dirty="0" smtClean="0"/>
+              <a:rPr lang="en-US" dirty="0"/>
               <a:t>Right click on an empty position on the slide</a:t>
             </a:r>
-            <a:endParaRPr lang="en-US" dirty="0"/>
           </a:p>
           <a:p>
             <a:pPr marL="285750" indent="-285750"/>
             <a:r>
-              <a:rPr lang="en-US" dirty="0" smtClean="0"/>
+              <a:rPr lang="en-US" dirty="0"/>
               <a:t>Select Paste To Fill Slide under the </a:t>
             </a:r>
             <a:r>
-              <a:rPr lang="en-US" dirty="0" err="1" smtClean="0"/>
+              <a:rPr lang="en-US" dirty="0" err="1"/>
               <a:t>PowerPointLabs</a:t>
             </a:r>
             <a:r>
-              <a:rPr lang="en-US" dirty="0" smtClean="0"/>
+              <a:rPr lang="en-US" dirty="0"/>
               <a:t> context menu</a:t>
             </a:r>
-            <a:endParaRPr lang="en-US" dirty="0"/>
           </a:p>
         </p:txBody>
       </p:sp>
@@ -17388,6 +18477,455 @@
     <p:extLst>
       <p:ext uri="{BB962C8B-B14F-4D97-AF65-F5344CB8AC3E}">
         <p14:creationId xmlns:p14="http://schemas.microsoft.com/office/powerpoint/2010/main" val="3856831695"/>
+      </p:ext>
+    </p:extLst>
+  </p:cSld>
+  <p:clrMapOvr>
+    <a:masterClrMapping/>
+  </p:clrMapOvr>
+</p:sld>
+</file>
+
+<file path=ppt/slides/slide30.xml><?xml version="1.0" encoding="utf-8"?>
+<p:sld xmlns:a="http://schemas.openxmlformats.org/drawingml/2006/main" xmlns:r="http://schemas.openxmlformats.org/officeDocument/2006/relationships" xmlns:p="http://schemas.openxmlformats.org/presentationml/2006/main">
+  <p:cSld>
+    <p:spTree>
+      <p:nvGrpSpPr>
+        <p:cNvPr id="1" name=""/>
+        <p:cNvGrpSpPr/>
+        <p:nvPr/>
+      </p:nvGrpSpPr>
+      <p:grpSpPr>
+        <a:xfrm>
+          <a:off x="0" y="0"/>
+          <a:ext cx="0" cy="0"/>
+          <a:chOff x="0" y="0"/>
+          <a:chExt cx="0" cy="0"/>
+        </a:xfrm>
+      </p:grpSpPr>
+      <p:pic>
+        <p:nvPicPr>
+          <p:cNvPr id="5" name="selectMe"/>
+          <p:cNvPicPr>
+            <a:picLocks noChangeAspect="1"/>
+          </p:cNvPicPr>
+          <p:nvPr/>
+        </p:nvPicPr>
+        <p:blipFill>
+          <a:blip r:embed="rId3">
+            <a:extLst>
+              <a:ext uri="{28A0092B-C50C-407E-A947-70E740481C1C}">
+                <a14:useLocalDpi xmlns:a14="http://schemas.microsoft.com/office/drawing/2010/main" val="0"/>
+              </a:ext>
+            </a:extLst>
+          </a:blip>
+          <a:stretch>
+            <a:fillRect/>
+          </a:stretch>
+        </p:blipFill>
+        <p:spPr>
+          <a:xfrm>
+            <a:off x="2057400" y="2057400"/>
+            <a:ext cx="4572000" cy="3058418"/>
+          </a:xfrm>
+          <a:prstGeom prst="rect">
+            <a:avLst/>
+          </a:prstGeom>
+        </p:spPr>
+      </p:pic>
+      <p:pic>
+        <p:nvPicPr>
+          <p:cNvPr id="3" name="selectMe1"/>
+          <p:cNvPicPr>
+            <a:picLocks noChangeAspect="1"/>
+          </p:cNvPicPr>
+          <p:nvPr/>
+        </p:nvPicPr>
+        <p:blipFill>
+          <a:blip r:embed="rId4">
+            <a:extLst>
+              <a:ext uri="{28A0092B-C50C-407E-A947-70E740481C1C}">
+                <a14:useLocalDpi xmlns:a14="http://schemas.microsoft.com/office/drawing/2010/main" val="0"/>
+              </a:ext>
+            </a:extLst>
+          </a:blip>
+          <a:srcRect l="26687" t="26687" r="27736" b="26687"/>
+          <a:stretch>
+            <a:fillRect/>
+          </a:stretch>
+        </p:blipFill>
+        <p:spPr>
+          <a:xfrm>
+            <a:off x="2896508" y="762000"/>
+            <a:ext cx="2893784" cy="2960418"/>
+          </a:xfrm>
+          <a:prstGeom prst="rect">
+            <a:avLst/>
+          </a:prstGeom>
+        </p:spPr>
+      </p:pic>
+    </p:spTree>
+    <p:extLst>
+      <p:ext uri="{BB962C8B-B14F-4D97-AF65-F5344CB8AC3E}">
+        <p14:creationId xmlns:p14="http://schemas.microsoft.com/office/powerpoint/2010/main" val="3180922043"/>
+      </p:ext>
+    </p:extLst>
+  </p:cSld>
+  <p:clrMapOvr>
+    <a:masterClrMapping/>
+  </p:clrMapOvr>
+</p:sld>
+</file>
+
+<file path=ppt/slides/slide31.xml><?xml version="1.0" encoding="utf-8"?>
+<p:sld xmlns:a="http://schemas.openxmlformats.org/drawingml/2006/main" xmlns:r="http://schemas.openxmlformats.org/officeDocument/2006/relationships" xmlns:p="http://schemas.openxmlformats.org/presentationml/2006/main">
+  <p:cSld>
+    <p:spTree>
+      <p:nvGrpSpPr>
+        <p:cNvPr id="1" name=""/>
+        <p:cNvGrpSpPr/>
+        <p:nvPr/>
+      </p:nvGrpSpPr>
+      <p:grpSpPr>
+        <a:xfrm>
+          <a:off x="0" y="0"/>
+          <a:ext cx="0" cy="0"/>
+          <a:chOff x="0" y="0"/>
+          <a:chExt cx="0" cy="0"/>
+        </a:xfrm>
+      </p:grpSpPr>
+      <p:grpSp>
+        <p:nvGrpSpPr>
+          <p:cNvPr id="2" name="Group 1">
+            <a:extLst>
+              <a:ext uri="{FF2B5EF4-FFF2-40B4-BE49-F238E27FC236}">
+                <a16:creationId xmlns:a16="http://schemas.microsoft.com/office/drawing/2014/main" id="{2AA390AC-8F39-407E-930D-1FF357A9E7C2}"/>
+              </a:ext>
+            </a:extLst>
+          </p:cNvPr>
+          <p:cNvGrpSpPr>
+            <a:grpSpLocks noChangeAspect="1"/>
+          </p:cNvGrpSpPr>
+          <p:nvPr/>
+        </p:nvGrpSpPr>
+        <p:grpSpPr>
+          <a:xfrm>
+            <a:off x="971163" y="0"/>
+            <a:ext cx="7201674" cy="6857999"/>
+            <a:chOff x="2057400" y="762000"/>
+            <a:chExt cx="4572000" cy="4353818"/>
+          </a:xfrm>
+        </p:grpSpPr>
+        <p:pic>
+          <p:nvPicPr>
+            <p:cNvPr id="4" name="selectMe">
+              <a:extLst>
+                <a:ext uri="{FF2B5EF4-FFF2-40B4-BE49-F238E27FC236}">
+                  <a16:creationId xmlns:a16="http://schemas.microsoft.com/office/drawing/2014/main" id="{7FAE5008-CD7B-48EE-BB15-BB675BC5E358}"/>
+                </a:ext>
+              </a:extLst>
+            </p:cNvPr>
+            <p:cNvPicPr>
+              <a:picLocks noChangeAspect="1"/>
+            </p:cNvPicPr>
+            <p:nvPr/>
+          </p:nvPicPr>
+          <p:blipFill>
+            <a:blip r:embed="rId3">
+              <a:extLst>
+                <a:ext uri="{28A0092B-C50C-407E-A947-70E740481C1C}">
+                  <a14:useLocalDpi xmlns:a14="http://schemas.microsoft.com/office/drawing/2010/main" val="0"/>
+                </a:ext>
+              </a:extLst>
+            </a:blip>
+            <a:stretch>
+              <a:fillRect/>
+            </a:stretch>
+          </p:blipFill>
+          <p:spPr>
+            <a:xfrm>
+              <a:off x="2057400" y="2057400"/>
+              <a:ext cx="4572000" cy="3058418"/>
+            </a:xfrm>
+            <a:prstGeom prst="rect">
+              <a:avLst/>
+            </a:prstGeom>
+          </p:spPr>
+        </p:pic>
+        <p:pic>
+          <p:nvPicPr>
+            <p:cNvPr id="6" name="selectMe1">
+              <a:extLst>
+                <a:ext uri="{FF2B5EF4-FFF2-40B4-BE49-F238E27FC236}">
+                  <a16:creationId xmlns:a16="http://schemas.microsoft.com/office/drawing/2014/main" id="{0CBD59F5-66D6-4328-A6DE-4DDFB7FF3B76}"/>
+                </a:ext>
+              </a:extLst>
+            </p:cNvPr>
+            <p:cNvPicPr>
+              <a:picLocks noChangeAspect="1"/>
+            </p:cNvPicPr>
+            <p:nvPr/>
+          </p:nvPicPr>
+          <p:blipFill>
+            <a:blip r:embed="rId4">
+              <a:extLst>
+                <a:ext uri="{28A0092B-C50C-407E-A947-70E740481C1C}">
+                  <a14:useLocalDpi xmlns:a14="http://schemas.microsoft.com/office/drawing/2010/main" val="0"/>
+                </a:ext>
+              </a:extLst>
+            </a:blip>
+            <a:srcRect l="26687" t="26687" r="27736" b="26687"/>
+            <a:stretch>
+              <a:fillRect/>
+            </a:stretch>
+          </p:blipFill>
+          <p:spPr>
+            <a:xfrm>
+              <a:off x="2896508" y="762000"/>
+              <a:ext cx="2893784" cy="2960418"/>
+            </a:xfrm>
+            <a:prstGeom prst="rect">
+              <a:avLst/>
+            </a:prstGeom>
+          </p:spPr>
+        </p:pic>
+      </p:grpSp>
+    </p:spTree>
+    <p:extLst>
+      <p:ext uri="{BB962C8B-B14F-4D97-AF65-F5344CB8AC3E}">
+        <p14:creationId xmlns:p14="http://schemas.microsoft.com/office/powerpoint/2010/main" val="3386885968"/>
+      </p:ext>
+    </p:extLst>
+  </p:cSld>
+  <p:clrMapOvr>
+    <a:masterClrMapping/>
+  </p:clrMapOvr>
+</p:sld>
+</file>
+
+<file path=ppt/slides/slide32.xml><?xml version="1.0" encoding="utf-8"?>
+<p:sld xmlns:a="http://schemas.openxmlformats.org/drawingml/2006/main" xmlns:r="http://schemas.openxmlformats.org/officeDocument/2006/relationships" xmlns:p="http://schemas.openxmlformats.org/presentationml/2006/main">
+  <p:cSld>
+    <p:spTree>
+      <p:nvGrpSpPr>
+        <p:cNvPr id="1" name=""/>
+        <p:cNvGrpSpPr/>
+        <p:nvPr/>
+      </p:nvGrpSpPr>
+      <p:grpSpPr>
+        <a:xfrm>
+          <a:off x="0" y="0"/>
+          <a:ext cx="0" cy="0"/>
+          <a:chOff x="0" y="0"/>
+          <a:chExt cx="0" cy="0"/>
+        </a:xfrm>
+      </p:grpSpPr>
+      <p:grpSp>
+        <p:nvGrpSpPr>
+          <p:cNvPr id="2" name="selectMe"/>
+          <p:cNvGrpSpPr/>
+          <p:nvPr/>
+        </p:nvGrpSpPr>
+        <p:grpSpPr>
+          <a:xfrm>
+            <a:off x="2057400" y="762000"/>
+            <a:ext cx="4572000" cy="4353818"/>
+            <a:chOff x="2057400" y="762000"/>
+            <a:chExt cx="4572000" cy="4353818"/>
+          </a:xfrm>
+        </p:grpSpPr>
+        <p:pic>
+          <p:nvPicPr>
+            <p:cNvPr id="5" name="selectMe2"/>
+            <p:cNvPicPr>
+              <a:picLocks noChangeAspect="1"/>
+            </p:cNvPicPr>
+            <p:nvPr/>
+          </p:nvPicPr>
+          <p:blipFill>
+            <a:blip r:embed="rId3">
+              <a:extLst>
+                <a:ext uri="{28A0092B-C50C-407E-A947-70E740481C1C}">
+                  <a14:useLocalDpi xmlns:a14="http://schemas.microsoft.com/office/drawing/2010/main" val="0"/>
+                </a:ext>
+              </a:extLst>
+            </a:blip>
+            <a:stretch>
+              <a:fillRect/>
+            </a:stretch>
+          </p:blipFill>
+          <p:spPr>
+            <a:xfrm>
+              <a:off x="2057400" y="2057400"/>
+              <a:ext cx="4572000" cy="3058418"/>
+            </a:xfrm>
+            <a:prstGeom prst="rect">
+              <a:avLst/>
+            </a:prstGeom>
+          </p:spPr>
+        </p:pic>
+        <p:pic>
+          <p:nvPicPr>
+            <p:cNvPr id="3" name="selectMe1"/>
+            <p:cNvPicPr>
+              <a:picLocks noChangeAspect="1"/>
+            </p:cNvPicPr>
+            <p:nvPr/>
+          </p:nvPicPr>
+          <p:blipFill>
+            <a:blip r:embed="rId4">
+              <a:extLst>
+                <a:ext uri="{28A0092B-C50C-407E-A947-70E740481C1C}">
+                  <a14:useLocalDpi xmlns:a14="http://schemas.microsoft.com/office/drawing/2010/main" val="0"/>
+                </a:ext>
+              </a:extLst>
+            </a:blip>
+            <a:srcRect l="26687" t="26687" r="27736" b="26687"/>
+            <a:stretch>
+              <a:fillRect/>
+            </a:stretch>
+          </p:blipFill>
+          <p:spPr>
+            <a:xfrm>
+              <a:off x="2896508" y="762000"/>
+              <a:ext cx="2893784" cy="2960418"/>
+            </a:xfrm>
+            <a:prstGeom prst="rect">
+              <a:avLst/>
+            </a:prstGeom>
+          </p:spPr>
+        </p:pic>
+      </p:grpSp>
+    </p:spTree>
+    <p:extLst>
+      <p:ext uri="{BB962C8B-B14F-4D97-AF65-F5344CB8AC3E}">
+        <p14:creationId xmlns:p14="http://schemas.microsoft.com/office/powerpoint/2010/main" val="1371031776"/>
+      </p:ext>
+    </p:extLst>
+  </p:cSld>
+  <p:clrMapOvr>
+    <a:masterClrMapping/>
+  </p:clrMapOvr>
+</p:sld>
+</file>
+
+<file path=ppt/slides/slide33.xml><?xml version="1.0" encoding="utf-8"?>
+<p:sld xmlns:a="http://schemas.openxmlformats.org/drawingml/2006/main" xmlns:r="http://schemas.openxmlformats.org/officeDocument/2006/relationships" xmlns:p="http://schemas.openxmlformats.org/presentationml/2006/main">
+  <p:cSld>
+    <p:spTree>
+      <p:nvGrpSpPr>
+        <p:cNvPr id="1" name=""/>
+        <p:cNvGrpSpPr/>
+        <p:nvPr/>
+      </p:nvGrpSpPr>
+      <p:grpSpPr>
+        <a:xfrm>
+          <a:off x="0" y="0"/>
+          <a:ext cx="0" cy="0"/>
+          <a:chOff x="0" y="0"/>
+          <a:chExt cx="0" cy="0"/>
+        </a:xfrm>
+      </p:grpSpPr>
+      <p:grpSp>
+        <p:nvGrpSpPr>
+          <p:cNvPr id="6" name="selectMe">
+            <a:extLst>
+              <a:ext uri="{FF2B5EF4-FFF2-40B4-BE49-F238E27FC236}">
+                <a16:creationId xmlns:a16="http://schemas.microsoft.com/office/drawing/2014/main" id="{99440D81-4FFA-4893-A454-DFB58FFEEC1F}"/>
+              </a:ext>
+            </a:extLst>
+          </p:cNvPr>
+          <p:cNvGrpSpPr>
+            <a:grpSpLocks noChangeAspect="1"/>
+          </p:cNvGrpSpPr>
+          <p:nvPr/>
+        </p:nvGrpSpPr>
+        <p:grpSpPr>
+          <a:xfrm>
+            <a:off x="971163" y="0"/>
+            <a:ext cx="7201674" cy="6857999"/>
+            <a:chOff x="2057400" y="762000"/>
+            <a:chExt cx="4572000" cy="4353818"/>
+          </a:xfrm>
+        </p:grpSpPr>
+        <p:pic>
+          <p:nvPicPr>
+            <p:cNvPr id="7" name="selectMe2">
+              <a:extLst>
+                <a:ext uri="{FF2B5EF4-FFF2-40B4-BE49-F238E27FC236}">
+                  <a16:creationId xmlns:a16="http://schemas.microsoft.com/office/drawing/2014/main" id="{EF6E2260-8E85-411B-B58A-F25211B9BD9A}"/>
+                </a:ext>
+              </a:extLst>
+            </p:cNvPr>
+            <p:cNvPicPr>
+              <a:picLocks noChangeAspect="1"/>
+            </p:cNvPicPr>
+            <p:nvPr/>
+          </p:nvPicPr>
+          <p:blipFill>
+            <a:blip r:embed="rId3">
+              <a:extLst>
+                <a:ext uri="{28A0092B-C50C-407E-A947-70E740481C1C}">
+                  <a14:useLocalDpi xmlns:a14="http://schemas.microsoft.com/office/drawing/2010/main" val="0"/>
+                </a:ext>
+              </a:extLst>
+            </a:blip>
+            <a:stretch>
+              <a:fillRect/>
+            </a:stretch>
+          </p:blipFill>
+          <p:spPr>
+            <a:xfrm>
+              <a:off x="2057400" y="2057400"/>
+              <a:ext cx="4572000" cy="3058418"/>
+            </a:xfrm>
+            <a:prstGeom prst="rect">
+              <a:avLst/>
+            </a:prstGeom>
+          </p:spPr>
+        </p:pic>
+        <p:pic>
+          <p:nvPicPr>
+            <p:cNvPr id="8" name="selectMe1">
+              <a:extLst>
+                <a:ext uri="{FF2B5EF4-FFF2-40B4-BE49-F238E27FC236}">
+                  <a16:creationId xmlns:a16="http://schemas.microsoft.com/office/drawing/2014/main" id="{B58ED834-2AB1-4135-B883-54EB019142AF}"/>
+                </a:ext>
+              </a:extLst>
+            </p:cNvPr>
+            <p:cNvPicPr>
+              <a:picLocks noChangeAspect="1"/>
+            </p:cNvPicPr>
+            <p:nvPr/>
+          </p:nvPicPr>
+          <p:blipFill>
+            <a:blip r:embed="rId4">
+              <a:extLst>
+                <a:ext uri="{28A0092B-C50C-407E-A947-70E740481C1C}">
+                  <a14:useLocalDpi xmlns:a14="http://schemas.microsoft.com/office/drawing/2010/main" val="0"/>
+                </a:ext>
+              </a:extLst>
+            </a:blip>
+            <a:srcRect l="26687" t="26687" r="27736" b="26687"/>
+            <a:stretch>
+              <a:fillRect/>
+            </a:stretch>
+          </p:blipFill>
+          <p:spPr>
+            <a:xfrm>
+              <a:off x="2896508" y="762000"/>
+              <a:ext cx="2893784" cy="2960418"/>
+            </a:xfrm>
+            <a:prstGeom prst="rect">
+              <a:avLst/>
+            </a:prstGeom>
+          </p:spPr>
+        </p:pic>
+      </p:grpSp>
+    </p:spTree>
+    <p:extLst>
+      <p:ext uri="{BB962C8B-B14F-4D97-AF65-F5344CB8AC3E}">
+        <p14:creationId xmlns:p14="http://schemas.microsoft.com/office/powerpoint/2010/main" val="2662084768"/>
       </p:ext>
     </p:extLst>
   </p:cSld>

</xml_diff>

<commit_message>
Add tests for paste lab
</commit_message>
<xml_diff>
--- a/doc/test/PasteLab/PasteLab.pptx
+++ b/doc/test/PasteLab/PasteLab.pptx
@@ -8,7 +8,7 @@
     <p:sldMasterId id="2147483684" r:id="rId4"/>
   </p:sldMasterIdLst>
   <p:notesMasterIdLst>
-    <p:notesMasterId r:id="rId38"/>
+    <p:notesMasterId r:id="rId43"/>
   </p:notesMasterIdLst>
   <p:sldIdLst>
     <p:sldId id="287" r:id="rId5"/>
@@ -44,6 +44,11 @@
     <p:sldId id="406" r:id="rId35"/>
     <p:sldId id="407" r:id="rId36"/>
     <p:sldId id="408" r:id="rId37"/>
+    <p:sldId id="413" r:id="rId38"/>
+    <p:sldId id="409" r:id="rId39"/>
+    <p:sldId id="410" r:id="rId40"/>
+    <p:sldId id="411" r:id="rId41"/>
+    <p:sldId id="412" r:id="rId42"/>
   </p:sldIdLst>
   <p:sldSz cx="9144000" cy="6858000" type="screen4x3"/>
   <p:notesSz cx="6858000" cy="9144000"/>
@@ -184,6 +189,11 @@
             <p14:sldId id="406"/>
             <p14:sldId id="407"/>
             <p14:sldId id="408"/>
+            <p14:sldId id="413"/>
+            <p14:sldId id="409"/>
+            <p14:sldId id="410"/>
+            <p14:sldId id="411"/>
+            <p14:sldId id="412"/>
           </p14:sldIdLst>
         </p14:section>
       </p14:sectionLst>
@@ -288,7 +298,7 @@
           <a:p>
             <a:fld id="{43E32005-3A63-48D2-8C73-BF5F95786EBD}" type="datetimeFigureOut">
               <a:rPr lang="en-US" smtClean="0"/>
-              <a:t>2/10/2018</a:t>
+              <a:t>3/18/2018</a:t>
             </a:fld>
             <a:endParaRPr lang="en-US"/>
           </a:p>
@@ -2972,6 +2982,616 @@
 </p:notes>
 </file>
 
+<file path=ppt/notesSlides/notesSlide32.xml><?xml version="1.0" encoding="utf-8"?>
+<p:notes xmlns:a="http://schemas.openxmlformats.org/drawingml/2006/main" xmlns:r="http://schemas.openxmlformats.org/officeDocument/2006/relationships" xmlns:p="http://schemas.openxmlformats.org/presentationml/2006/main">
+  <p:cSld>
+    <p:spTree>
+      <p:nvGrpSpPr>
+        <p:cNvPr id="1" name=""/>
+        <p:cNvGrpSpPr/>
+        <p:nvPr/>
+      </p:nvGrpSpPr>
+      <p:grpSpPr>
+        <a:xfrm>
+          <a:off x="0" y="0"/>
+          <a:ext cx="0" cy="0"/>
+          <a:chOff x="0" y="0"/>
+          <a:chExt cx="0" cy="0"/>
+        </a:xfrm>
+      </p:grpSpPr>
+      <p:sp>
+        <p:nvSpPr>
+          <p:cNvPr id="2" name="Slide Image Placeholder 1"/>
+          <p:cNvSpPr>
+            <a:spLocks noGrp="1" noRot="1" noChangeAspect="1"/>
+          </p:cNvSpPr>
+          <p:nvPr>
+            <p:ph type="sldImg"/>
+          </p:nvPr>
+        </p:nvSpPr>
+        <p:spPr/>
+      </p:sp>
+      <p:sp>
+        <p:nvSpPr>
+          <p:cNvPr id="3" name="Notes Placeholder 2"/>
+          <p:cNvSpPr>
+            <a:spLocks noGrp="1"/>
+          </p:cNvSpPr>
+          <p:nvPr>
+            <p:ph type="body" idx="1"/>
+          </p:nvPr>
+        </p:nvSpPr>
+        <p:spPr/>
+        <p:txBody>
+          <a:bodyPr/>
+          <a:lstStyle/>
+          <a:p>
+            <a:r>
+              <a:rPr lang="en-US" dirty="0"/>
+              <a:t>You can also cut by using ctrl-x</a:t>
+            </a:r>
+          </a:p>
+        </p:txBody>
+      </p:sp>
+      <p:sp>
+        <p:nvSpPr>
+          <p:cNvPr id="4" name="Slide Number Placeholder 3"/>
+          <p:cNvSpPr>
+            <a:spLocks noGrp="1"/>
+          </p:cNvSpPr>
+          <p:nvPr>
+            <p:ph type="sldNum" sz="quarter" idx="10"/>
+          </p:nvPr>
+        </p:nvSpPr>
+        <p:spPr/>
+        <p:txBody>
+          <a:bodyPr/>
+          <a:lstStyle/>
+          <a:p>
+            <a:pPr marL="0" marR="0" lvl="0" indent="0" algn="r" defTabSz="914400" rtl="0" eaLnBrk="1" fontAlgn="auto" latinLnBrk="0" hangingPunct="1">
+              <a:lnSpc>
+                <a:spcPct val="100000"/>
+              </a:lnSpc>
+              <a:spcBef>
+                <a:spcPts val="0"/>
+              </a:spcBef>
+              <a:spcAft>
+                <a:spcPts val="0"/>
+              </a:spcAft>
+              <a:buClrTx/>
+              <a:buSzTx/>
+              <a:buFontTx/>
+              <a:buNone/>
+              <a:tabLst/>
+              <a:defRPr/>
+            </a:pPr>
+            <a:fld id="{0FE7C38A-472B-4221-8E00-509E1DA863EC}" type="slidenum">
+              <a:rPr kumimoji="0" lang="en-US" sz="1200" b="0" i="0" u="none" strike="noStrike" kern="1200" cap="none" spc="0" normalizeH="0" baseline="0" noProof="0" smtClean="0">
+                <a:ln>
+                  <a:noFill/>
+                </a:ln>
+                <a:solidFill>
+                  <a:prstClr val="black"/>
+                </a:solidFill>
+                <a:effectLst/>
+                <a:uLnTx/>
+                <a:uFillTx/>
+                <a:latin typeface="Calibri" panose="020F0502020204030204"/>
+                <a:ea typeface="+mn-ea"/>
+                <a:cs typeface="+mn-cs"/>
+              </a:rPr>
+              <a:pPr marL="0" marR="0" lvl="0" indent="0" algn="r" defTabSz="914400" rtl="0" eaLnBrk="1" fontAlgn="auto" latinLnBrk="0" hangingPunct="1">
+                <a:lnSpc>
+                  <a:spcPct val="100000"/>
+                </a:lnSpc>
+                <a:spcBef>
+                  <a:spcPts val="0"/>
+                </a:spcBef>
+                <a:spcAft>
+                  <a:spcPts val="0"/>
+                </a:spcAft>
+                <a:buClrTx/>
+                <a:buSzTx/>
+                <a:buFontTx/>
+                <a:buNone/>
+                <a:tabLst/>
+                <a:defRPr/>
+              </a:pPr>
+              <a:t>34</a:t>
+            </a:fld>
+            <a:endParaRPr kumimoji="0" lang="en-US" sz="1200" b="0" i="0" u="none" strike="noStrike" kern="1200" cap="none" spc="0" normalizeH="0" baseline="0" noProof="0">
+              <a:ln>
+                <a:noFill/>
+              </a:ln>
+              <a:solidFill>
+                <a:prstClr val="black"/>
+              </a:solidFill>
+              <a:effectLst/>
+              <a:uLnTx/>
+              <a:uFillTx/>
+              <a:latin typeface="Calibri" panose="020F0502020204030204"/>
+              <a:ea typeface="+mn-ea"/>
+              <a:cs typeface="+mn-cs"/>
+            </a:endParaRPr>
+          </a:p>
+        </p:txBody>
+      </p:sp>
+    </p:spTree>
+    <p:extLst>
+      <p:ext uri="{BB962C8B-B14F-4D97-AF65-F5344CB8AC3E}">
+        <p14:creationId xmlns:p14="http://schemas.microsoft.com/office/powerpoint/2010/main" val="1147600831"/>
+      </p:ext>
+    </p:extLst>
+  </p:cSld>
+  <p:clrMapOvr>
+    <a:masterClrMapping/>
+  </p:clrMapOvr>
+</p:notes>
+</file>
+
+<file path=ppt/notesSlides/notesSlide33.xml><?xml version="1.0" encoding="utf-8"?>
+<p:notes xmlns:a="http://schemas.openxmlformats.org/drawingml/2006/main" xmlns:r="http://schemas.openxmlformats.org/officeDocument/2006/relationships" xmlns:p="http://schemas.openxmlformats.org/presentationml/2006/main">
+  <p:cSld>
+    <p:spTree>
+      <p:nvGrpSpPr>
+        <p:cNvPr id="1" name=""/>
+        <p:cNvGrpSpPr/>
+        <p:nvPr/>
+      </p:nvGrpSpPr>
+      <p:grpSpPr>
+        <a:xfrm>
+          <a:off x="0" y="0"/>
+          <a:ext cx="0" cy="0"/>
+          <a:chOff x="0" y="0"/>
+          <a:chExt cx="0" cy="0"/>
+        </a:xfrm>
+      </p:grpSpPr>
+      <p:sp>
+        <p:nvSpPr>
+          <p:cNvPr id="2" name="Slide Image Placeholder 1"/>
+          <p:cNvSpPr>
+            <a:spLocks noGrp="1" noRot="1" noChangeAspect="1"/>
+          </p:cNvSpPr>
+          <p:nvPr>
+            <p:ph type="sldImg"/>
+          </p:nvPr>
+        </p:nvSpPr>
+        <p:spPr/>
+      </p:sp>
+      <p:sp>
+        <p:nvSpPr>
+          <p:cNvPr id="3" name="Notes Placeholder 2"/>
+          <p:cNvSpPr>
+            <a:spLocks noGrp="1"/>
+          </p:cNvSpPr>
+          <p:nvPr>
+            <p:ph type="body" idx="1"/>
+          </p:nvPr>
+        </p:nvSpPr>
+        <p:spPr/>
+        <p:txBody>
+          <a:bodyPr/>
+          <a:lstStyle/>
+          <a:p>
+            <a:r>
+              <a:rPr lang="en-US" dirty="0"/>
+              <a:t>Original</a:t>
+            </a:r>
+            <a:r>
+              <a:rPr lang="en-US" baseline="0" dirty="0"/>
+              <a:t> Shapes 3 colored squares and a buildings image</a:t>
+            </a:r>
+            <a:endParaRPr lang="en-US" dirty="0"/>
+          </a:p>
+        </p:txBody>
+      </p:sp>
+      <p:sp>
+        <p:nvSpPr>
+          <p:cNvPr id="4" name="Slide Number Placeholder 3"/>
+          <p:cNvSpPr>
+            <a:spLocks noGrp="1"/>
+          </p:cNvSpPr>
+          <p:nvPr>
+            <p:ph type="sldNum" sz="quarter" idx="10"/>
+          </p:nvPr>
+        </p:nvSpPr>
+        <p:spPr/>
+        <p:txBody>
+          <a:bodyPr/>
+          <a:lstStyle/>
+          <a:p>
+            <a:fld id="{0FE7C38A-472B-4221-8E00-509E1DA863EC}" type="slidenum">
+              <a:rPr lang="en-US" smtClean="0"/>
+              <a:t>35</a:t>
+            </a:fld>
+            <a:endParaRPr lang="en-US"/>
+          </a:p>
+        </p:txBody>
+      </p:sp>
+    </p:spTree>
+    <p:extLst>
+      <p:ext uri="{BB962C8B-B14F-4D97-AF65-F5344CB8AC3E}">
+        <p14:creationId xmlns:p14="http://schemas.microsoft.com/office/powerpoint/2010/main" val="1743082063"/>
+      </p:ext>
+    </p:extLst>
+  </p:cSld>
+  <p:clrMapOvr>
+    <a:masterClrMapping/>
+  </p:clrMapOvr>
+</p:notes>
+</file>
+
+<file path=ppt/notesSlides/notesSlide34.xml><?xml version="1.0" encoding="utf-8"?>
+<p:notes xmlns:a="http://schemas.openxmlformats.org/drawingml/2006/main" xmlns:r="http://schemas.openxmlformats.org/officeDocument/2006/relationships" xmlns:p="http://schemas.openxmlformats.org/presentationml/2006/main">
+  <p:cSld>
+    <p:spTree>
+      <p:nvGrpSpPr>
+        <p:cNvPr id="1" name=""/>
+        <p:cNvGrpSpPr/>
+        <p:nvPr/>
+      </p:nvGrpSpPr>
+      <p:grpSpPr>
+        <a:xfrm>
+          <a:off x="0" y="0"/>
+          <a:ext cx="0" cy="0"/>
+          <a:chOff x="0" y="0"/>
+          <a:chExt cx="0" cy="0"/>
+        </a:xfrm>
+      </p:grpSpPr>
+      <p:sp>
+        <p:nvSpPr>
+          <p:cNvPr id="2" name="Slide Image Placeholder 1"/>
+          <p:cNvSpPr>
+            <a:spLocks noGrp="1" noRot="1" noChangeAspect="1"/>
+          </p:cNvSpPr>
+          <p:nvPr>
+            <p:ph type="sldImg"/>
+          </p:nvPr>
+        </p:nvSpPr>
+        <p:spPr/>
+      </p:sp>
+      <p:sp>
+        <p:nvSpPr>
+          <p:cNvPr id="3" name="Notes Placeholder 2"/>
+          <p:cNvSpPr>
+            <a:spLocks noGrp="1"/>
+          </p:cNvSpPr>
+          <p:nvPr>
+            <p:ph type="body" idx="1"/>
+          </p:nvPr>
+        </p:nvSpPr>
+        <p:spPr/>
+        <p:txBody>
+          <a:bodyPr/>
+          <a:lstStyle/>
+          <a:p>
+            <a:r>
+              <a:rPr lang="en-US" dirty="0"/>
+              <a:t>Expected.</a:t>
+            </a:r>
+            <a:r>
+              <a:rPr lang="en-US" baseline="0" dirty="0"/>
+              <a:t> Cut the building image and right click the green square and select Replace With Clipboard</a:t>
+            </a:r>
+            <a:r>
+              <a:rPr lang="en-US" baseline="0" dirty="0" smtClean="0"/>
+              <a:t>.</a:t>
+            </a:r>
+          </a:p>
+          <a:p>
+            <a:pPr marL="0" marR="0" lvl="0" indent="0" algn="l" defTabSz="914400" rtl="0" eaLnBrk="1" fontAlgn="auto" latinLnBrk="0" hangingPunct="1">
+              <a:lnSpc>
+                <a:spcPct val="100000"/>
+              </a:lnSpc>
+              <a:spcBef>
+                <a:spcPts val="0"/>
+              </a:spcBef>
+              <a:spcAft>
+                <a:spcPts val="0"/>
+              </a:spcAft>
+              <a:buClrTx/>
+              <a:buSzTx/>
+              <a:buFontTx/>
+              <a:buNone/>
+              <a:tabLst/>
+              <a:defRPr/>
+            </a:pPr>
+            <a:r>
+              <a:rPr lang="en-US" b="0" baseline="0" dirty="0" smtClean="0"/>
+              <a:t>The image pasted should be the building image.</a:t>
+            </a:r>
+            <a:endParaRPr lang="en-US" baseline="0" dirty="0" smtClean="0"/>
+          </a:p>
+          <a:p>
+            <a:endParaRPr lang="en-US" baseline="0" dirty="0"/>
+          </a:p>
+        </p:txBody>
+      </p:sp>
+      <p:sp>
+        <p:nvSpPr>
+          <p:cNvPr id="4" name="Slide Number Placeholder 3"/>
+          <p:cNvSpPr>
+            <a:spLocks noGrp="1"/>
+          </p:cNvSpPr>
+          <p:nvPr>
+            <p:ph type="sldNum" sz="quarter" idx="10"/>
+          </p:nvPr>
+        </p:nvSpPr>
+        <p:spPr/>
+        <p:txBody>
+          <a:bodyPr/>
+          <a:lstStyle/>
+          <a:p>
+            <a:fld id="{0FE7C38A-472B-4221-8E00-509E1DA863EC}" type="slidenum">
+              <a:rPr lang="en-US" smtClean="0"/>
+              <a:t>36</a:t>
+            </a:fld>
+            <a:endParaRPr lang="en-US"/>
+          </a:p>
+        </p:txBody>
+      </p:sp>
+    </p:spTree>
+    <p:extLst>
+      <p:ext uri="{BB962C8B-B14F-4D97-AF65-F5344CB8AC3E}">
+        <p14:creationId xmlns:p14="http://schemas.microsoft.com/office/powerpoint/2010/main" val="2089091601"/>
+      </p:ext>
+    </p:extLst>
+  </p:cSld>
+  <p:clrMapOvr>
+    <a:masterClrMapping/>
+  </p:clrMapOvr>
+</p:notes>
+</file>
+
+<file path=ppt/notesSlides/notesSlide35.xml><?xml version="1.0" encoding="utf-8"?>
+<p:notes xmlns:a="http://schemas.openxmlformats.org/drawingml/2006/main" xmlns:r="http://schemas.openxmlformats.org/officeDocument/2006/relationships" xmlns:p="http://schemas.openxmlformats.org/presentationml/2006/main">
+  <p:cSld>
+    <p:spTree>
+      <p:nvGrpSpPr>
+        <p:cNvPr id="1" name=""/>
+        <p:cNvGrpSpPr/>
+        <p:nvPr/>
+      </p:nvGrpSpPr>
+      <p:grpSpPr>
+        <a:xfrm>
+          <a:off x="0" y="0"/>
+          <a:ext cx="0" cy="0"/>
+          <a:chOff x="0" y="0"/>
+          <a:chExt cx="0" cy="0"/>
+        </a:xfrm>
+      </p:grpSpPr>
+      <p:sp>
+        <p:nvSpPr>
+          <p:cNvPr id="2" name="Slide Image Placeholder 1"/>
+          <p:cNvSpPr>
+            <a:spLocks noGrp="1" noRot="1" noChangeAspect="1"/>
+          </p:cNvSpPr>
+          <p:nvPr>
+            <p:ph type="sldImg"/>
+          </p:nvPr>
+        </p:nvSpPr>
+        <p:spPr/>
+      </p:sp>
+      <p:sp>
+        <p:nvSpPr>
+          <p:cNvPr id="3" name="Notes Placeholder 2"/>
+          <p:cNvSpPr>
+            <a:spLocks noGrp="1"/>
+          </p:cNvSpPr>
+          <p:nvPr>
+            <p:ph type="body" idx="1"/>
+          </p:nvPr>
+        </p:nvSpPr>
+        <p:spPr/>
+        <p:txBody>
+          <a:bodyPr/>
+          <a:lstStyle/>
+          <a:p>
+            <a:r>
+              <a:rPr lang="en-US" dirty="0"/>
+              <a:t>Original</a:t>
+            </a:r>
+            <a:r>
+              <a:rPr lang="en-US" baseline="0" dirty="0"/>
+              <a:t> Shapes</a:t>
+            </a:r>
+            <a:r>
+              <a:rPr lang="en-US" dirty="0"/>
+              <a:t> 3 colored squares that are merged into a group and building</a:t>
+            </a:r>
+            <a:r>
+              <a:rPr lang="en-US" baseline="0" dirty="0"/>
+              <a:t> image</a:t>
+            </a:r>
+          </a:p>
+          <a:p>
+            <a:pPr marL="0" marR="0" lvl="0" indent="0" algn="l" defTabSz="914400" rtl="0" eaLnBrk="1" fontAlgn="auto" latinLnBrk="0" hangingPunct="1">
+              <a:lnSpc>
+                <a:spcPct val="100000"/>
+              </a:lnSpc>
+              <a:spcBef>
+                <a:spcPts val="0"/>
+              </a:spcBef>
+              <a:spcAft>
+                <a:spcPts val="0"/>
+              </a:spcAft>
+              <a:buClrTx/>
+              <a:buSzTx/>
+              <a:buFontTx/>
+              <a:buNone/>
+              <a:tabLst/>
+              <a:defRPr/>
+            </a:pPr>
+            <a:r>
+              <a:rPr lang="en-US" dirty="0"/>
+              <a:t>The grou</a:t>
+            </a:r>
+            <a:r>
+              <a:rPr lang="en-US" baseline="0" dirty="0"/>
+              <a:t>p of 3 colored squares have an appear animation</a:t>
+            </a:r>
+            <a:endParaRPr lang="en-US" dirty="0"/>
+          </a:p>
+          <a:p>
+            <a:endParaRPr lang="en-US" baseline="0" dirty="0"/>
+          </a:p>
+        </p:txBody>
+      </p:sp>
+      <p:sp>
+        <p:nvSpPr>
+          <p:cNvPr id="4" name="Slide Number Placeholder 3"/>
+          <p:cNvSpPr>
+            <a:spLocks noGrp="1"/>
+          </p:cNvSpPr>
+          <p:nvPr>
+            <p:ph type="sldNum" sz="quarter" idx="10"/>
+          </p:nvPr>
+        </p:nvSpPr>
+        <p:spPr/>
+        <p:txBody>
+          <a:bodyPr/>
+          <a:lstStyle/>
+          <a:p>
+            <a:fld id="{0FE7C38A-472B-4221-8E00-509E1DA863EC}" type="slidenum">
+              <a:rPr lang="en-US" smtClean="0"/>
+              <a:t>37</a:t>
+            </a:fld>
+            <a:endParaRPr lang="en-US"/>
+          </a:p>
+        </p:txBody>
+      </p:sp>
+    </p:spTree>
+    <p:extLst>
+      <p:ext uri="{BB962C8B-B14F-4D97-AF65-F5344CB8AC3E}">
+        <p14:creationId xmlns:p14="http://schemas.microsoft.com/office/powerpoint/2010/main" val="893966673"/>
+      </p:ext>
+    </p:extLst>
+  </p:cSld>
+  <p:clrMapOvr>
+    <a:masterClrMapping/>
+  </p:clrMapOvr>
+</p:notes>
+</file>
+
+<file path=ppt/notesSlides/notesSlide36.xml><?xml version="1.0" encoding="utf-8"?>
+<p:notes xmlns:a="http://schemas.openxmlformats.org/drawingml/2006/main" xmlns:r="http://schemas.openxmlformats.org/officeDocument/2006/relationships" xmlns:p="http://schemas.openxmlformats.org/presentationml/2006/main">
+  <p:cSld>
+    <p:spTree>
+      <p:nvGrpSpPr>
+        <p:cNvPr id="1" name=""/>
+        <p:cNvGrpSpPr/>
+        <p:nvPr/>
+      </p:nvGrpSpPr>
+      <p:grpSpPr>
+        <a:xfrm>
+          <a:off x="0" y="0"/>
+          <a:ext cx="0" cy="0"/>
+          <a:chOff x="0" y="0"/>
+          <a:chExt cx="0" cy="0"/>
+        </a:xfrm>
+      </p:grpSpPr>
+      <p:sp>
+        <p:nvSpPr>
+          <p:cNvPr id="2" name="Slide Image Placeholder 1"/>
+          <p:cNvSpPr>
+            <a:spLocks noGrp="1" noRot="1" noChangeAspect="1"/>
+          </p:cNvSpPr>
+          <p:nvPr>
+            <p:ph type="sldImg"/>
+          </p:nvPr>
+        </p:nvSpPr>
+        <p:spPr/>
+      </p:sp>
+      <p:sp>
+        <p:nvSpPr>
+          <p:cNvPr id="3" name="Notes Placeholder 2"/>
+          <p:cNvSpPr>
+            <a:spLocks noGrp="1"/>
+          </p:cNvSpPr>
+          <p:nvPr>
+            <p:ph type="body" idx="1"/>
+          </p:nvPr>
+        </p:nvSpPr>
+        <p:spPr/>
+        <p:txBody>
+          <a:bodyPr/>
+          <a:lstStyle/>
+          <a:p>
+            <a:r>
+              <a:rPr lang="en-US" dirty="0"/>
+              <a:t>Expected. Cut the building image and Paste Into Group </a:t>
+            </a:r>
+            <a:r>
+              <a:rPr lang="en-US" baseline="0" dirty="0"/>
+              <a:t>on the group of 3 colored squares</a:t>
+            </a:r>
+          </a:p>
+          <a:p>
+            <a:r>
+              <a:rPr lang="en-US" dirty="0"/>
+              <a:t>The image</a:t>
+            </a:r>
+            <a:r>
+              <a:rPr lang="en-US" baseline="0" dirty="0"/>
+              <a:t> should be in the center of the group.</a:t>
+            </a:r>
+            <a:r>
+              <a:rPr lang="en-US" b="0" baseline="0" dirty="0"/>
+              <a:t> Note that the group should still retain its </a:t>
+            </a:r>
+            <a:r>
+              <a:rPr lang="en-US" b="0" baseline="0" dirty="0" smtClean="0"/>
+              <a:t>animation</a:t>
+            </a:r>
+          </a:p>
+          <a:p>
+            <a:r>
+              <a:rPr lang="en-US" b="0" baseline="0" dirty="0" smtClean="0"/>
+              <a:t>The image pasted should be the building image.</a:t>
+            </a:r>
+            <a:endParaRPr lang="en-US" baseline="0" dirty="0"/>
+          </a:p>
+          <a:p>
+            <a:endParaRPr lang="en-US" baseline="0" dirty="0"/>
+          </a:p>
+        </p:txBody>
+      </p:sp>
+      <p:sp>
+        <p:nvSpPr>
+          <p:cNvPr id="4" name="Slide Number Placeholder 3"/>
+          <p:cNvSpPr>
+            <a:spLocks noGrp="1"/>
+          </p:cNvSpPr>
+          <p:nvPr>
+            <p:ph type="sldNum" sz="quarter" idx="10"/>
+          </p:nvPr>
+        </p:nvSpPr>
+        <p:spPr/>
+        <p:txBody>
+          <a:bodyPr/>
+          <a:lstStyle/>
+          <a:p>
+            <a:fld id="{0FE7C38A-472B-4221-8E00-509E1DA863EC}" type="slidenum">
+              <a:rPr lang="en-US" smtClean="0"/>
+              <a:t>38</a:t>
+            </a:fld>
+            <a:endParaRPr lang="en-US"/>
+          </a:p>
+        </p:txBody>
+      </p:sp>
+    </p:spTree>
+    <p:extLst>
+      <p:ext uri="{BB962C8B-B14F-4D97-AF65-F5344CB8AC3E}">
+        <p14:creationId xmlns:p14="http://schemas.microsoft.com/office/powerpoint/2010/main" val="3948383510"/>
+      </p:ext>
+    </p:extLst>
+  </p:cSld>
+  <p:clrMapOvr>
+    <a:masterClrMapping/>
+  </p:clrMapOvr>
+</p:notes>
+</file>
+
 <file path=ppt/notesSlides/notesSlide4.xml><?xml version="1.0" encoding="utf-8"?>
 <p:notes xmlns:a="http://schemas.openxmlformats.org/drawingml/2006/main" xmlns:r="http://schemas.openxmlformats.org/officeDocument/2006/relationships" xmlns:p="http://schemas.openxmlformats.org/presentationml/2006/main">
   <p:cSld>
@@ -3688,7 +4308,7 @@
           <a:p>
             <a:fld id="{699DC775-C286-4358-8C92-D7E584E969B3}" type="datetimeFigureOut">
               <a:rPr lang="en-US" smtClean="0"/>
-              <a:t>2/10/2018</a:t>
+              <a:t>3/18/2018</a:t>
             </a:fld>
             <a:endParaRPr lang="en-US"/>
           </a:p>
@@ -3856,7 +4476,7 @@
           <a:p>
             <a:fld id="{699DC775-C286-4358-8C92-D7E584E969B3}" type="datetimeFigureOut">
               <a:rPr lang="en-US" smtClean="0"/>
-              <a:t>2/10/2018</a:t>
+              <a:t>3/18/2018</a:t>
             </a:fld>
             <a:endParaRPr lang="en-US"/>
           </a:p>
@@ -4034,7 +4654,7 @@
           <a:p>
             <a:fld id="{699DC775-C286-4358-8C92-D7E584E969B3}" type="datetimeFigureOut">
               <a:rPr lang="en-US" smtClean="0"/>
-              <a:t>2/10/2018</a:t>
+              <a:t>3/18/2018</a:t>
             </a:fld>
             <a:endParaRPr lang="en-US"/>
           </a:p>
@@ -4274,7 +4894,7 @@
           <a:p>
             <a:fld id="{699DC775-C286-4358-8C92-D7E584E969B3}" type="datetimeFigureOut">
               <a:rPr lang="en-US" smtClean="0"/>
-              <a:t>2/10/2018</a:t>
+              <a:t>3/18/2018</a:t>
             </a:fld>
             <a:endParaRPr lang="en-US"/>
           </a:p>
@@ -4442,7 +5062,7 @@
           <a:p>
             <a:fld id="{699DC775-C286-4358-8C92-D7E584E969B3}" type="datetimeFigureOut">
               <a:rPr lang="en-US" smtClean="0"/>
-              <a:t>2/10/2018</a:t>
+              <a:t>3/18/2018</a:t>
             </a:fld>
             <a:endParaRPr lang="en-US"/>
           </a:p>
@@ -4687,7 +5307,7 @@
           <a:p>
             <a:fld id="{699DC775-C286-4358-8C92-D7E584E969B3}" type="datetimeFigureOut">
               <a:rPr lang="en-US" smtClean="0"/>
-              <a:t>2/10/2018</a:t>
+              <a:t>3/18/2018</a:t>
             </a:fld>
             <a:endParaRPr lang="en-US"/>
           </a:p>
@@ -4972,7 +5592,7 @@
           <a:p>
             <a:fld id="{699DC775-C286-4358-8C92-D7E584E969B3}" type="datetimeFigureOut">
               <a:rPr lang="en-US" smtClean="0"/>
-              <a:t>2/10/2018</a:t>
+              <a:t>3/18/2018</a:t>
             </a:fld>
             <a:endParaRPr lang="en-US"/>
           </a:p>
@@ -5391,7 +6011,7 @@
           <a:p>
             <a:fld id="{699DC775-C286-4358-8C92-D7E584E969B3}" type="datetimeFigureOut">
               <a:rPr lang="en-US" smtClean="0"/>
-              <a:t>2/10/2018</a:t>
+              <a:t>3/18/2018</a:t>
             </a:fld>
             <a:endParaRPr lang="en-US"/>
           </a:p>
@@ -5508,7 +6128,7 @@
           <a:p>
             <a:fld id="{699DC775-C286-4358-8C92-D7E584E969B3}" type="datetimeFigureOut">
               <a:rPr lang="en-US" smtClean="0"/>
-              <a:t>2/10/2018</a:t>
+              <a:t>3/18/2018</a:t>
             </a:fld>
             <a:endParaRPr lang="en-US"/>
           </a:p>
@@ -5603,7 +6223,7 @@
           <a:p>
             <a:fld id="{699DC775-C286-4358-8C92-D7E584E969B3}" type="datetimeFigureOut">
               <a:rPr lang="en-US" smtClean="0"/>
-              <a:t>2/10/2018</a:t>
+              <a:t>3/18/2018</a:t>
             </a:fld>
             <a:endParaRPr lang="en-US"/>
           </a:p>
@@ -5878,7 +6498,7 @@
           <a:p>
             <a:fld id="{699DC775-C286-4358-8C92-D7E584E969B3}" type="datetimeFigureOut">
               <a:rPr lang="en-US" smtClean="0"/>
-              <a:t>2/10/2018</a:t>
+              <a:t>3/18/2018</a:t>
             </a:fld>
             <a:endParaRPr lang="en-US"/>
           </a:p>
@@ -6046,7 +6666,7 @@
           <a:p>
             <a:fld id="{699DC775-C286-4358-8C92-D7E584E969B3}" type="datetimeFigureOut">
               <a:rPr lang="en-US" smtClean="0"/>
-              <a:t>2/10/2018</a:t>
+              <a:t>3/18/2018</a:t>
             </a:fld>
             <a:endParaRPr lang="en-US"/>
           </a:p>
@@ -6298,7 +6918,7 @@
           <a:p>
             <a:fld id="{699DC775-C286-4358-8C92-D7E584E969B3}" type="datetimeFigureOut">
               <a:rPr lang="en-US" smtClean="0"/>
-              <a:t>2/10/2018</a:t>
+              <a:t>3/18/2018</a:t>
             </a:fld>
             <a:endParaRPr lang="en-US"/>
           </a:p>
@@ -6466,7 +7086,7 @@
           <a:p>
             <a:fld id="{699DC775-C286-4358-8C92-D7E584E969B3}" type="datetimeFigureOut">
               <a:rPr lang="en-US" smtClean="0"/>
-              <a:t>2/10/2018</a:t>
+              <a:t>3/18/2018</a:t>
             </a:fld>
             <a:endParaRPr lang="en-US"/>
           </a:p>
@@ -6644,7 +7264,7 @@
           <a:p>
             <a:fld id="{699DC775-C286-4358-8C92-D7E584E969B3}" type="datetimeFigureOut">
               <a:rPr lang="en-US" smtClean="0"/>
-              <a:t>2/10/2018</a:t>
+              <a:t>3/18/2018</a:t>
             </a:fld>
             <a:endParaRPr lang="en-US"/>
           </a:p>
@@ -6892,7 +7512,7 @@
           <a:p>
             <a:fld id="{699DC775-C286-4358-8C92-D7E584E969B3}" type="datetimeFigureOut">
               <a:rPr lang="en-US" smtClean="0"/>
-              <a:t>2/10/2018</a:t>
+              <a:t>3/18/2018</a:t>
             </a:fld>
             <a:endParaRPr lang="en-US"/>
           </a:p>
@@ -7068,7 +7688,7 @@
           <a:p>
             <a:fld id="{699DC775-C286-4358-8C92-D7E584E969B3}" type="datetimeFigureOut">
               <a:rPr lang="en-US" smtClean="0"/>
-              <a:t>2/10/2018</a:t>
+              <a:t>3/18/2018</a:t>
             </a:fld>
             <a:endParaRPr lang="en-US"/>
           </a:p>
@@ -7321,7 +7941,7 @@
           <a:p>
             <a:fld id="{699DC775-C286-4358-8C92-D7E584E969B3}" type="datetimeFigureOut">
               <a:rPr lang="en-US" smtClean="0"/>
-              <a:t>2/10/2018</a:t>
+              <a:t>3/18/2018</a:t>
             </a:fld>
             <a:endParaRPr lang="en-US"/>
           </a:p>
@@ -7614,7 +8234,7 @@
           <a:p>
             <a:fld id="{699DC775-C286-4358-8C92-D7E584E969B3}" type="datetimeFigureOut">
               <a:rPr lang="en-US" smtClean="0"/>
-              <a:t>2/10/2018</a:t>
+              <a:t>3/18/2018</a:t>
             </a:fld>
             <a:endParaRPr lang="en-US"/>
           </a:p>
@@ -8041,7 +8661,7 @@
           <a:p>
             <a:fld id="{699DC775-C286-4358-8C92-D7E584E969B3}" type="datetimeFigureOut">
               <a:rPr lang="en-US" smtClean="0"/>
-              <a:t>2/10/2018</a:t>
+              <a:t>3/18/2018</a:t>
             </a:fld>
             <a:endParaRPr lang="en-US"/>
           </a:p>
@@ -8166,7 +8786,7 @@
           <a:p>
             <a:fld id="{699DC775-C286-4358-8C92-D7E584E969B3}" type="datetimeFigureOut">
               <a:rPr lang="en-US" smtClean="0"/>
-              <a:t>2/10/2018</a:t>
+              <a:t>3/18/2018</a:t>
             </a:fld>
             <a:endParaRPr lang="en-US"/>
           </a:p>
@@ -8269,7 +8889,7 @@
           <a:p>
             <a:fld id="{699DC775-C286-4358-8C92-D7E584E969B3}" type="datetimeFigureOut">
               <a:rPr lang="en-US" smtClean="0"/>
-              <a:t>2/10/2018</a:t>
+              <a:t>3/18/2018</a:t>
             </a:fld>
             <a:endParaRPr lang="en-US"/>
           </a:p>
@@ -8514,7 +9134,7 @@
           <a:p>
             <a:fld id="{699DC775-C286-4358-8C92-D7E584E969B3}" type="datetimeFigureOut">
               <a:rPr lang="en-US" smtClean="0"/>
-              <a:t>2/10/2018</a:t>
+              <a:t>3/18/2018</a:t>
             </a:fld>
             <a:endParaRPr lang="en-US"/>
           </a:p>
@@ -8797,7 +9417,7 @@
           <a:p>
             <a:fld id="{699DC775-C286-4358-8C92-D7E584E969B3}" type="datetimeFigureOut">
               <a:rPr lang="en-US" smtClean="0"/>
-              <a:t>2/10/2018</a:t>
+              <a:t>3/18/2018</a:t>
             </a:fld>
             <a:endParaRPr lang="en-US"/>
           </a:p>
@@ -9057,7 +9677,7 @@
           <a:p>
             <a:fld id="{699DC775-C286-4358-8C92-D7E584E969B3}" type="datetimeFigureOut">
               <a:rPr lang="en-US" smtClean="0"/>
-              <a:t>2/10/2018</a:t>
+              <a:t>3/18/2018</a:t>
             </a:fld>
             <a:endParaRPr lang="en-US"/>
           </a:p>
@@ -9233,7 +9853,7 @@
           <a:p>
             <a:fld id="{699DC775-C286-4358-8C92-D7E584E969B3}" type="datetimeFigureOut">
               <a:rPr lang="en-US" smtClean="0"/>
-              <a:t>2/10/2018</a:t>
+              <a:t>3/18/2018</a:t>
             </a:fld>
             <a:endParaRPr lang="en-US"/>
           </a:p>
@@ -9419,7 +10039,7 @@
           <a:p>
             <a:fld id="{699DC775-C286-4358-8C92-D7E584E969B3}" type="datetimeFigureOut">
               <a:rPr lang="en-US" smtClean="0"/>
-              <a:t>2/10/2018</a:t>
+              <a:t>3/18/2018</a:t>
             </a:fld>
             <a:endParaRPr lang="en-US"/>
           </a:p>
@@ -9609,7 +10229,7 @@
           <a:p>
             <a:fld id="{45696B32-6A70-48EC-8939-9D142D9557CD}" type="datetimeFigureOut">
               <a:rPr lang="en-US" smtClean="0"/>
-              <a:t>2/10/2018</a:t>
+              <a:t>3/18/2018</a:t>
             </a:fld>
             <a:endParaRPr lang="en-US"/>
           </a:p>
@@ -9923,7 +10543,7 @@
           <a:p>
             <a:fld id="{45696B32-6A70-48EC-8939-9D142D9557CD}" type="datetimeFigureOut">
               <a:rPr lang="en-US" smtClean="0"/>
-              <a:t>2/10/2018</a:t>
+              <a:t>3/18/2018</a:t>
             </a:fld>
             <a:endParaRPr lang="en-US"/>
           </a:p>
@@ -10168,7 +10788,7 @@
           <a:p>
             <a:fld id="{45696B32-6A70-48EC-8939-9D142D9557CD}" type="datetimeFigureOut">
               <a:rPr lang="en-US" smtClean="0"/>
-              <a:t>2/10/2018</a:t>
+              <a:t>3/18/2018</a:t>
             </a:fld>
             <a:endParaRPr lang="en-US"/>
           </a:p>
@@ -10397,7 +11017,7 @@
           <a:p>
             <a:fld id="{45696B32-6A70-48EC-8939-9D142D9557CD}" type="datetimeFigureOut">
               <a:rPr lang="en-US" smtClean="0"/>
-              <a:t>2/10/2018</a:t>
+              <a:t>3/18/2018</a:t>
             </a:fld>
             <a:endParaRPr lang="en-US"/>
           </a:p>
@@ -10761,7 +11381,7 @@
           <a:p>
             <a:fld id="{45696B32-6A70-48EC-8939-9D142D9557CD}" type="datetimeFigureOut">
               <a:rPr lang="en-US" smtClean="0"/>
-              <a:t>2/10/2018</a:t>
+              <a:t>3/18/2018</a:t>
             </a:fld>
             <a:endParaRPr lang="en-US"/>
           </a:p>
@@ -10878,7 +11498,7 @@
           <a:p>
             <a:fld id="{45696B32-6A70-48EC-8939-9D142D9557CD}" type="datetimeFigureOut">
               <a:rPr lang="en-US" smtClean="0"/>
-              <a:t>2/10/2018</a:t>
+              <a:t>3/18/2018</a:t>
             </a:fld>
             <a:endParaRPr lang="en-US"/>
           </a:p>
@@ -11163,7 +11783,7 @@
           <a:p>
             <a:fld id="{699DC775-C286-4358-8C92-D7E584E969B3}" type="datetimeFigureOut">
               <a:rPr lang="en-US" smtClean="0"/>
-              <a:t>2/10/2018</a:t>
+              <a:t>3/18/2018</a:t>
             </a:fld>
             <a:endParaRPr lang="en-US"/>
           </a:p>
@@ -11258,7 +11878,7 @@
           <a:p>
             <a:fld id="{45696B32-6A70-48EC-8939-9D142D9557CD}" type="datetimeFigureOut">
               <a:rPr lang="en-US" smtClean="0"/>
-              <a:t>2/10/2018</a:t>
+              <a:t>3/18/2018</a:t>
             </a:fld>
             <a:endParaRPr lang="en-US"/>
           </a:p>
@@ -11533,7 +12153,7 @@
           <a:p>
             <a:fld id="{45696B32-6A70-48EC-8939-9D142D9557CD}" type="datetimeFigureOut">
               <a:rPr lang="en-US" smtClean="0"/>
-              <a:t>2/10/2018</a:t>
+              <a:t>3/18/2018</a:t>
             </a:fld>
             <a:endParaRPr lang="en-US"/>
           </a:p>
@@ -11785,7 +12405,7 @@
           <a:p>
             <a:fld id="{45696B32-6A70-48EC-8939-9D142D9557CD}" type="datetimeFigureOut">
               <a:rPr lang="en-US" smtClean="0"/>
-              <a:t>2/10/2018</a:t>
+              <a:t>3/18/2018</a:t>
             </a:fld>
             <a:endParaRPr lang="en-US"/>
           </a:p>
@@ -11953,7 +12573,7 @@
           <a:p>
             <a:fld id="{45696B32-6A70-48EC-8939-9D142D9557CD}" type="datetimeFigureOut">
               <a:rPr lang="en-US" smtClean="0"/>
-              <a:t>2/10/2018</a:t>
+              <a:t>3/18/2018</a:t>
             </a:fld>
             <a:endParaRPr lang="en-US"/>
           </a:p>
@@ -12131,7 +12751,7 @@
           <a:p>
             <a:fld id="{45696B32-6A70-48EC-8939-9D142D9557CD}" type="datetimeFigureOut">
               <a:rPr lang="en-US" smtClean="0"/>
-              <a:t>2/10/2018</a:t>
+              <a:t>3/18/2018</a:t>
             </a:fld>
             <a:endParaRPr lang="en-US"/>
           </a:p>
@@ -12550,7 +13170,7 @@
           <a:p>
             <a:fld id="{699DC775-C286-4358-8C92-D7E584E969B3}" type="datetimeFigureOut">
               <a:rPr lang="en-US" smtClean="0"/>
-              <a:t>2/10/2018</a:t>
+              <a:t>3/18/2018</a:t>
             </a:fld>
             <a:endParaRPr lang="en-US"/>
           </a:p>
@@ -12667,7 +13287,7 @@
           <a:p>
             <a:fld id="{699DC775-C286-4358-8C92-D7E584E969B3}" type="datetimeFigureOut">
               <a:rPr lang="en-US" smtClean="0"/>
-              <a:t>2/10/2018</a:t>
+              <a:t>3/18/2018</a:t>
             </a:fld>
             <a:endParaRPr lang="en-US"/>
           </a:p>
@@ -12762,7 +13382,7 @@
           <a:p>
             <a:fld id="{699DC775-C286-4358-8C92-D7E584E969B3}" type="datetimeFigureOut">
               <a:rPr lang="en-US" smtClean="0"/>
-              <a:t>2/10/2018</a:t>
+              <a:t>3/18/2018</a:t>
             </a:fld>
             <a:endParaRPr lang="en-US"/>
           </a:p>
@@ -13037,7 +13657,7 @@
           <a:p>
             <a:fld id="{699DC775-C286-4358-8C92-D7E584E969B3}" type="datetimeFigureOut">
               <a:rPr lang="en-US" smtClean="0"/>
-              <a:t>2/10/2018</a:t>
+              <a:t>3/18/2018</a:t>
             </a:fld>
             <a:endParaRPr lang="en-US"/>
           </a:p>
@@ -13289,7 +13909,7 @@
           <a:p>
             <a:fld id="{699DC775-C286-4358-8C92-D7E584E969B3}" type="datetimeFigureOut">
               <a:rPr lang="en-US" smtClean="0"/>
-              <a:t>2/10/2018</a:t>
+              <a:t>3/18/2018</a:t>
             </a:fld>
             <a:endParaRPr lang="en-US"/>
           </a:p>
@@ -13500,7 +14120,7 @@
           <a:p>
             <a:fld id="{699DC775-C286-4358-8C92-D7E584E969B3}" type="datetimeFigureOut">
               <a:rPr lang="en-US" smtClean="0"/>
-              <a:t>2/10/2018</a:t>
+              <a:t>3/18/2018</a:t>
             </a:fld>
             <a:endParaRPr lang="en-US"/>
           </a:p>
@@ -14013,7 +14633,7 @@
           <a:p>
             <a:fld id="{699DC775-C286-4358-8C92-D7E584E969B3}" type="datetimeFigureOut">
               <a:rPr lang="en-US" smtClean="0"/>
-              <a:t>2/10/2018</a:t>
+              <a:t>3/18/2018</a:t>
             </a:fld>
             <a:endParaRPr lang="en-US"/>
           </a:p>
@@ -14524,7 +15144,7 @@
           <a:p>
             <a:fld id="{699DC775-C286-4358-8C92-D7E584E969B3}" type="datetimeFigureOut">
               <a:rPr lang="en-US" smtClean="0"/>
-              <a:t>2/10/2018</a:t>
+              <a:t>3/18/2018</a:t>
             </a:fld>
             <a:endParaRPr lang="en-US"/>
           </a:p>
@@ -15032,7 +15652,7 @@
           <a:p>
             <a:fld id="{45696B32-6A70-48EC-8939-9D142D9557CD}" type="datetimeFigureOut">
               <a:rPr lang="en-US" smtClean="0"/>
-              <a:t>2/10/2018</a:t>
+              <a:t>3/18/2018</a:t>
             </a:fld>
             <a:endParaRPr lang="en-US"/>
           </a:p>
@@ -18932,6 +19552,1071 @@
   <p:clrMapOvr>
     <a:masterClrMapping/>
   </p:clrMapOvr>
+</p:sld>
+</file>
+
+<file path=ppt/slides/slide34.xml><?xml version="1.0" encoding="utf-8"?>
+<p:sld xmlns:a="http://schemas.openxmlformats.org/drawingml/2006/main" xmlns:r="http://schemas.openxmlformats.org/officeDocument/2006/relationships" xmlns:p="http://schemas.openxmlformats.org/presentationml/2006/main">
+  <p:cSld>
+    <p:spTree>
+      <p:nvGrpSpPr>
+        <p:cNvPr id="1" name=""/>
+        <p:cNvGrpSpPr/>
+        <p:nvPr/>
+      </p:nvGrpSpPr>
+      <p:grpSpPr>
+        <a:xfrm>
+          <a:off x="0" y="0"/>
+          <a:ext cx="0" cy="0"/>
+          <a:chOff x="0" y="0"/>
+          <a:chExt cx="0" cy="0"/>
+        </a:xfrm>
+      </p:grpSpPr>
+      <p:sp>
+        <p:nvSpPr>
+          <p:cNvPr id="2" name="Title 1"/>
+          <p:cNvSpPr>
+            <a:spLocks noGrp="1"/>
+          </p:cNvSpPr>
+          <p:nvPr>
+            <p:ph type="title"/>
+          </p:nvPr>
+        </p:nvSpPr>
+        <p:spPr/>
+        <p:txBody>
+          <a:bodyPr/>
+          <a:lstStyle/>
+          <a:p>
+            <a:r>
+              <a:rPr lang="en-US" dirty="0"/>
+              <a:t>Paste:: </a:t>
+            </a:r>
+            <a:r>
+              <a:rPr lang="en-US" dirty="0" smtClean="0"/>
+              <a:t>Is Clipboard Restored?</a:t>
+            </a:r>
+            <a:endParaRPr lang="en-SG" dirty="0"/>
+          </a:p>
+        </p:txBody>
+      </p:sp>
+      <p:sp>
+        <p:nvSpPr>
+          <p:cNvPr id="4" name="Content Placeholder 3"/>
+          <p:cNvSpPr>
+            <a:spLocks noGrp="1"/>
+          </p:cNvSpPr>
+          <p:nvPr>
+            <p:ph idx="1"/>
+          </p:nvPr>
+        </p:nvSpPr>
+        <p:spPr/>
+        <p:txBody>
+          <a:bodyPr/>
+          <a:lstStyle/>
+          <a:p>
+            <a:pPr marL="0" indent="0">
+              <a:buNone/>
+            </a:pPr>
+            <a:r>
+              <a:rPr lang="en-US" b="1" dirty="0" smtClean="0"/>
+              <a:t>Additional instructions:</a:t>
+            </a:r>
+          </a:p>
+          <a:p>
+            <a:pPr marL="285750" indent="-285750"/>
+            <a:r>
+              <a:rPr lang="en-US" dirty="0" smtClean="0"/>
+              <a:t>Do Replace With Clipboard and Paste Into Group as usual</a:t>
+            </a:r>
+          </a:p>
+          <a:p>
+            <a:pPr marL="285750" indent="-285750"/>
+            <a:r>
+              <a:rPr lang="en-US" dirty="0" smtClean="0"/>
+              <a:t>Check if clipboard is restored</a:t>
+            </a:r>
+            <a:endParaRPr lang="en-US" dirty="0"/>
+          </a:p>
+        </p:txBody>
+      </p:sp>
+    </p:spTree>
+    <p:extLst>
+      <p:ext uri="{BB962C8B-B14F-4D97-AF65-F5344CB8AC3E}">
+        <p14:creationId xmlns:p14="http://schemas.microsoft.com/office/powerpoint/2010/main" val="2817971980"/>
+      </p:ext>
+    </p:extLst>
+  </p:cSld>
+  <p:clrMapOvr>
+    <a:masterClrMapping/>
+  </p:clrMapOvr>
+</p:sld>
+</file>
+
+<file path=ppt/slides/slide35.xml><?xml version="1.0" encoding="utf-8"?>
+<p:sld xmlns:a="http://schemas.openxmlformats.org/drawingml/2006/main" xmlns:r="http://schemas.openxmlformats.org/officeDocument/2006/relationships" xmlns:p="http://schemas.openxmlformats.org/presentationml/2006/main">
+  <p:cSld>
+    <p:spTree>
+      <p:nvGrpSpPr>
+        <p:cNvPr id="1" name=""/>
+        <p:cNvGrpSpPr/>
+        <p:nvPr/>
+      </p:nvGrpSpPr>
+      <p:grpSpPr>
+        <a:xfrm>
+          <a:off x="0" y="0"/>
+          <a:ext cx="0" cy="0"/>
+          <a:chOff x="0" y="0"/>
+          <a:chExt cx="0" cy="0"/>
+        </a:xfrm>
+      </p:grpSpPr>
+      <p:sp>
+        <p:nvSpPr>
+          <p:cNvPr id="5" name="Rectangle 4"/>
+          <p:cNvSpPr/>
+          <p:nvPr/>
+        </p:nvSpPr>
+        <p:spPr>
+          <a:xfrm>
+            <a:off x="914400" y="1116842"/>
+            <a:ext cx="1981200" cy="2057400"/>
+          </a:xfrm>
+          <a:prstGeom prst="rect">
+            <a:avLst/>
+          </a:prstGeom>
+          <a:solidFill>
+            <a:srgbClr val="FF0000"/>
+          </a:solidFill>
+        </p:spPr>
+        <p:style>
+          <a:lnRef idx="2">
+            <a:schemeClr val="accent1">
+              <a:shade val="50000"/>
+            </a:schemeClr>
+          </a:lnRef>
+          <a:fillRef idx="1">
+            <a:schemeClr val="accent1"/>
+          </a:fillRef>
+          <a:effectRef idx="0">
+            <a:schemeClr val="accent1"/>
+          </a:effectRef>
+          <a:fontRef idx="minor">
+            <a:schemeClr val="lt1"/>
+          </a:fontRef>
+        </p:style>
+        <p:txBody>
+          <a:bodyPr rtlCol="0" anchor="ctr"/>
+          <a:lstStyle/>
+          <a:p>
+            <a:pPr algn="ctr"/>
+            <a:endParaRPr lang="en-US"/>
+          </a:p>
+        </p:txBody>
+      </p:sp>
+      <p:sp>
+        <p:nvSpPr>
+          <p:cNvPr id="6" name="Rectangle 5"/>
+          <p:cNvSpPr/>
+          <p:nvPr/>
+        </p:nvSpPr>
+        <p:spPr>
+          <a:xfrm>
+            <a:off x="1447800" y="1650242"/>
+            <a:ext cx="1981200" cy="2057400"/>
+          </a:xfrm>
+          <a:prstGeom prst="rect">
+            <a:avLst/>
+          </a:prstGeom>
+          <a:solidFill>
+            <a:srgbClr val="00B050"/>
+          </a:solidFill>
+        </p:spPr>
+        <p:style>
+          <a:lnRef idx="2">
+            <a:schemeClr val="accent1">
+              <a:shade val="50000"/>
+            </a:schemeClr>
+          </a:lnRef>
+          <a:fillRef idx="1">
+            <a:schemeClr val="accent1"/>
+          </a:fillRef>
+          <a:effectRef idx="0">
+            <a:schemeClr val="accent1"/>
+          </a:effectRef>
+          <a:fontRef idx="minor">
+            <a:schemeClr val="lt1"/>
+          </a:fontRef>
+        </p:style>
+        <p:txBody>
+          <a:bodyPr rtlCol="0" anchor="ctr"/>
+          <a:lstStyle/>
+          <a:p>
+            <a:pPr algn="ctr"/>
+            <a:endParaRPr lang="en-US"/>
+          </a:p>
+        </p:txBody>
+      </p:sp>
+      <p:sp>
+        <p:nvSpPr>
+          <p:cNvPr id="7" name="Rectangle 6"/>
+          <p:cNvSpPr/>
+          <p:nvPr/>
+        </p:nvSpPr>
+        <p:spPr>
+          <a:xfrm>
+            <a:off x="1981200" y="2209800"/>
+            <a:ext cx="1981200" cy="2057400"/>
+          </a:xfrm>
+          <a:prstGeom prst="rect">
+            <a:avLst/>
+          </a:prstGeom>
+          <a:solidFill>
+            <a:srgbClr val="0070C0"/>
+          </a:solidFill>
+        </p:spPr>
+        <p:style>
+          <a:lnRef idx="2">
+            <a:schemeClr val="accent1">
+              <a:shade val="50000"/>
+            </a:schemeClr>
+          </a:lnRef>
+          <a:fillRef idx="1">
+            <a:schemeClr val="accent1"/>
+          </a:fillRef>
+          <a:effectRef idx="0">
+            <a:schemeClr val="accent1"/>
+          </a:effectRef>
+          <a:fontRef idx="minor">
+            <a:schemeClr val="lt1"/>
+          </a:fontRef>
+        </p:style>
+        <p:txBody>
+          <a:bodyPr rtlCol="0" anchor="ctr"/>
+          <a:lstStyle/>
+          <a:p>
+            <a:pPr algn="ctr"/>
+            <a:endParaRPr lang="en-US"/>
+          </a:p>
+        </p:txBody>
+      </p:sp>
+      <p:pic>
+        <p:nvPicPr>
+          <p:cNvPr id="8" name="selectMe"/>
+          <p:cNvPicPr>
+            <a:picLocks noChangeAspect="1"/>
+          </p:cNvPicPr>
+          <p:nvPr/>
+        </p:nvPicPr>
+        <p:blipFill>
+          <a:blip r:embed="rId3">
+            <a:extLst>
+              <a:ext uri="{28A0092B-C50C-407E-A947-70E740481C1C}">
+                <a14:useLocalDpi xmlns:a14="http://schemas.microsoft.com/office/drawing/2010/main" val="0"/>
+              </a:ext>
+            </a:extLst>
+          </a:blip>
+          <a:stretch>
+            <a:fillRect/>
+          </a:stretch>
+        </p:blipFill>
+        <p:spPr>
+          <a:xfrm>
+            <a:off x="4343400" y="1208782"/>
+            <a:ext cx="4572000" cy="3058418"/>
+          </a:xfrm>
+          <a:prstGeom prst="rect">
+            <a:avLst/>
+          </a:prstGeom>
+        </p:spPr>
+      </p:pic>
+    </p:spTree>
+    <p:extLst>
+      <p:ext uri="{BB962C8B-B14F-4D97-AF65-F5344CB8AC3E}">
+        <p14:creationId xmlns:p14="http://schemas.microsoft.com/office/powerpoint/2010/main" val="2019145679"/>
+      </p:ext>
+    </p:extLst>
+  </p:cSld>
+  <p:clrMapOvr>
+    <a:masterClrMapping/>
+  </p:clrMapOvr>
+</p:sld>
+</file>
+
+<file path=ppt/slides/slide36.xml><?xml version="1.0" encoding="utf-8"?>
+<p:sld xmlns:a="http://schemas.openxmlformats.org/drawingml/2006/main" xmlns:r="http://schemas.openxmlformats.org/officeDocument/2006/relationships" xmlns:p="http://schemas.openxmlformats.org/presentationml/2006/main">
+  <p:cSld>
+    <p:spTree>
+      <p:nvGrpSpPr>
+        <p:cNvPr id="1" name=""/>
+        <p:cNvGrpSpPr/>
+        <p:nvPr/>
+      </p:nvGrpSpPr>
+      <p:grpSpPr>
+        <a:xfrm>
+          <a:off x="0" y="0"/>
+          <a:ext cx="0" cy="0"/>
+          <a:chOff x="0" y="0"/>
+          <a:chExt cx="0" cy="0"/>
+        </a:xfrm>
+      </p:grpSpPr>
+      <p:sp>
+        <p:nvSpPr>
+          <p:cNvPr id="5" name="Rectangle 4"/>
+          <p:cNvSpPr/>
+          <p:nvPr/>
+        </p:nvSpPr>
+        <p:spPr>
+          <a:xfrm>
+            <a:off x="914400" y="1116842"/>
+            <a:ext cx="1981200" cy="2057400"/>
+          </a:xfrm>
+          <a:prstGeom prst="rect">
+            <a:avLst/>
+          </a:prstGeom>
+          <a:solidFill>
+            <a:srgbClr val="FF0000"/>
+          </a:solidFill>
+        </p:spPr>
+        <p:style>
+          <a:lnRef idx="2">
+            <a:schemeClr val="accent1">
+              <a:shade val="50000"/>
+            </a:schemeClr>
+          </a:lnRef>
+          <a:fillRef idx="1">
+            <a:schemeClr val="accent1"/>
+          </a:fillRef>
+          <a:effectRef idx="0">
+            <a:schemeClr val="accent1"/>
+          </a:effectRef>
+          <a:fontRef idx="minor">
+            <a:schemeClr val="lt1"/>
+          </a:fontRef>
+        </p:style>
+        <p:txBody>
+          <a:bodyPr rtlCol="0" anchor="ctr"/>
+          <a:lstStyle/>
+          <a:p>
+            <a:pPr algn="ctr"/>
+            <a:endParaRPr lang="en-US"/>
+          </a:p>
+        </p:txBody>
+      </p:sp>
+      <p:pic>
+        <p:nvPicPr>
+          <p:cNvPr id="10" name="selectMe"/>
+          <p:cNvPicPr>
+            <a:picLocks noChangeAspect="1"/>
+          </p:cNvPicPr>
+          <p:nvPr/>
+        </p:nvPicPr>
+        <p:blipFill>
+          <a:blip r:embed="rId3">
+            <a:extLst>
+              <a:ext uri="{28A0092B-C50C-407E-A947-70E740481C1C}">
+                <a14:useLocalDpi xmlns:a14="http://schemas.microsoft.com/office/drawing/2010/main" val="0"/>
+              </a:ext>
+            </a:extLst>
+          </a:blip>
+          <a:stretch>
+            <a:fillRect/>
+          </a:stretch>
+        </p:blipFill>
+        <p:spPr>
+          <a:xfrm>
+            <a:off x="1447800" y="1650242"/>
+            <a:ext cx="4572000" cy="3058418"/>
+          </a:xfrm>
+          <a:prstGeom prst="rect">
+            <a:avLst/>
+          </a:prstGeom>
+        </p:spPr>
+      </p:pic>
+      <p:sp>
+        <p:nvSpPr>
+          <p:cNvPr id="7" name="Rectangle 6"/>
+          <p:cNvSpPr/>
+          <p:nvPr/>
+        </p:nvSpPr>
+        <p:spPr>
+          <a:xfrm>
+            <a:off x="1981200" y="2209800"/>
+            <a:ext cx="1981200" cy="2057400"/>
+          </a:xfrm>
+          <a:prstGeom prst="rect">
+            <a:avLst/>
+          </a:prstGeom>
+          <a:solidFill>
+            <a:srgbClr val="0070C0"/>
+          </a:solidFill>
+        </p:spPr>
+        <p:style>
+          <a:lnRef idx="2">
+            <a:schemeClr val="accent1">
+              <a:shade val="50000"/>
+            </a:schemeClr>
+          </a:lnRef>
+          <a:fillRef idx="1">
+            <a:schemeClr val="accent1"/>
+          </a:fillRef>
+          <a:effectRef idx="0">
+            <a:schemeClr val="accent1"/>
+          </a:effectRef>
+          <a:fontRef idx="minor">
+            <a:schemeClr val="lt1"/>
+          </a:fontRef>
+        </p:style>
+        <p:txBody>
+          <a:bodyPr rtlCol="0" anchor="ctr"/>
+          <a:lstStyle/>
+          <a:p>
+            <a:pPr algn="ctr"/>
+            <a:endParaRPr lang="en-US"/>
+          </a:p>
+        </p:txBody>
+      </p:sp>
+      <p:pic>
+        <p:nvPicPr>
+          <p:cNvPr id="12" name="copied"/>
+          <p:cNvPicPr>
+            <a:picLocks noChangeAspect="1"/>
+          </p:cNvPicPr>
+          <p:nvPr/>
+        </p:nvPicPr>
+        <p:blipFill>
+          <a:blip r:embed="rId3">
+            <a:extLst>
+              <a:ext uri="{28A0092B-C50C-407E-A947-70E740481C1C}">
+                <a14:useLocalDpi xmlns:a14="http://schemas.microsoft.com/office/drawing/2010/main" val="0"/>
+              </a:ext>
+            </a:extLst>
+          </a:blip>
+          <a:stretch>
+            <a:fillRect/>
+          </a:stretch>
+        </p:blipFill>
+        <p:spPr>
+          <a:xfrm>
+            <a:off x="4343400" y="1208782"/>
+            <a:ext cx="4572000" cy="3058418"/>
+          </a:xfrm>
+          <a:prstGeom prst="rect">
+            <a:avLst/>
+          </a:prstGeom>
+        </p:spPr>
+      </p:pic>
+    </p:spTree>
+    <p:extLst>
+      <p:ext uri="{BB962C8B-B14F-4D97-AF65-F5344CB8AC3E}">
+        <p14:creationId xmlns:p14="http://schemas.microsoft.com/office/powerpoint/2010/main" val="2330357643"/>
+      </p:ext>
+    </p:extLst>
+  </p:cSld>
+  <p:clrMapOvr>
+    <a:masterClrMapping/>
+  </p:clrMapOvr>
+</p:sld>
+</file>
+
+<file path=ppt/slides/slide37.xml><?xml version="1.0" encoding="utf-8"?>
+<p:sld xmlns:a="http://schemas.openxmlformats.org/drawingml/2006/main" xmlns:r="http://schemas.openxmlformats.org/officeDocument/2006/relationships" xmlns:p="http://schemas.openxmlformats.org/presentationml/2006/main">
+  <p:cSld>
+    <p:spTree>
+      <p:nvGrpSpPr>
+        <p:cNvPr id="1" name=""/>
+        <p:cNvGrpSpPr/>
+        <p:nvPr/>
+      </p:nvGrpSpPr>
+      <p:grpSpPr>
+        <a:xfrm>
+          <a:off x="0" y="0"/>
+          <a:ext cx="0" cy="0"/>
+          <a:chOff x="0" y="0"/>
+          <a:chExt cx="0" cy="0"/>
+        </a:xfrm>
+      </p:grpSpPr>
+      <p:grpSp>
+        <p:nvGrpSpPr>
+          <p:cNvPr id="44" name="Group 1"/>
+          <p:cNvGrpSpPr/>
+          <p:nvPr/>
+        </p:nvGrpSpPr>
+        <p:grpSpPr>
+          <a:xfrm>
+            <a:off x="914400" y="1116842"/>
+            <a:ext cx="3048000" cy="3150358"/>
+            <a:chOff x="914400" y="1116842"/>
+            <a:chExt cx="3048000" cy="3150358"/>
+          </a:xfrm>
+        </p:grpSpPr>
+        <p:sp>
+          <p:nvSpPr>
+            <p:cNvPr id="5" name="Rectangle 4"/>
+            <p:cNvSpPr/>
+            <p:nvPr/>
+          </p:nvSpPr>
+          <p:spPr>
+            <a:xfrm>
+              <a:off x="914400" y="1116842"/>
+              <a:ext cx="1981200" cy="2057400"/>
+            </a:xfrm>
+            <a:prstGeom prst="rect">
+              <a:avLst/>
+            </a:prstGeom>
+            <a:solidFill>
+              <a:srgbClr val="FF0000"/>
+            </a:solidFill>
+          </p:spPr>
+          <p:style>
+            <a:lnRef idx="2">
+              <a:schemeClr val="accent1">
+                <a:shade val="50000"/>
+              </a:schemeClr>
+            </a:lnRef>
+            <a:fillRef idx="1">
+              <a:schemeClr val="accent1"/>
+            </a:fillRef>
+            <a:effectRef idx="0">
+              <a:schemeClr val="accent1"/>
+            </a:effectRef>
+            <a:fontRef idx="minor">
+              <a:schemeClr val="lt1"/>
+            </a:fontRef>
+          </p:style>
+          <p:txBody>
+            <a:bodyPr rtlCol="0" anchor="ctr"/>
+            <a:lstStyle/>
+            <a:p>
+              <a:pPr algn="ctr"/>
+              <a:endParaRPr lang="en-US"/>
+            </a:p>
+          </p:txBody>
+        </p:sp>
+        <p:sp>
+          <p:nvSpPr>
+            <p:cNvPr id="6" name="Rectangle 5"/>
+            <p:cNvSpPr/>
+            <p:nvPr/>
+          </p:nvSpPr>
+          <p:spPr>
+            <a:xfrm>
+              <a:off x="1447800" y="1650242"/>
+              <a:ext cx="1981200" cy="2057400"/>
+            </a:xfrm>
+            <a:prstGeom prst="rect">
+              <a:avLst/>
+            </a:prstGeom>
+            <a:solidFill>
+              <a:srgbClr val="00B050"/>
+            </a:solidFill>
+          </p:spPr>
+          <p:style>
+            <a:lnRef idx="2">
+              <a:schemeClr val="accent1">
+                <a:shade val="50000"/>
+              </a:schemeClr>
+            </a:lnRef>
+            <a:fillRef idx="1">
+              <a:schemeClr val="accent1"/>
+            </a:fillRef>
+            <a:effectRef idx="0">
+              <a:schemeClr val="accent1"/>
+            </a:effectRef>
+            <a:fontRef idx="minor">
+              <a:schemeClr val="lt1"/>
+            </a:fontRef>
+          </p:style>
+          <p:txBody>
+            <a:bodyPr rtlCol="0" anchor="ctr"/>
+            <a:lstStyle/>
+            <a:p>
+              <a:pPr algn="ctr"/>
+              <a:endParaRPr lang="en-US"/>
+            </a:p>
+          </p:txBody>
+        </p:sp>
+        <p:sp>
+          <p:nvSpPr>
+            <p:cNvPr id="7" name="Rectangle 6"/>
+            <p:cNvSpPr/>
+            <p:nvPr/>
+          </p:nvSpPr>
+          <p:spPr>
+            <a:xfrm>
+              <a:off x="1981200" y="2209800"/>
+              <a:ext cx="1981200" cy="2057400"/>
+            </a:xfrm>
+            <a:prstGeom prst="rect">
+              <a:avLst/>
+            </a:prstGeom>
+            <a:solidFill>
+              <a:srgbClr val="0070C0"/>
+            </a:solidFill>
+          </p:spPr>
+          <p:style>
+            <a:lnRef idx="2">
+              <a:schemeClr val="accent1">
+                <a:shade val="50000"/>
+              </a:schemeClr>
+            </a:lnRef>
+            <a:fillRef idx="1">
+              <a:schemeClr val="accent1"/>
+            </a:fillRef>
+            <a:effectRef idx="0">
+              <a:schemeClr val="accent1"/>
+            </a:effectRef>
+            <a:fontRef idx="minor">
+              <a:schemeClr val="lt1"/>
+            </a:fontRef>
+          </p:style>
+          <p:txBody>
+            <a:bodyPr rtlCol="0" anchor="ctr"/>
+            <a:lstStyle/>
+            <a:p>
+              <a:pPr algn="ctr"/>
+              <a:endParaRPr lang="en-US"/>
+            </a:p>
+          </p:txBody>
+        </p:sp>
+      </p:grpSp>
+      <p:pic>
+        <p:nvPicPr>
+          <p:cNvPr id="8" name="selectMe"/>
+          <p:cNvPicPr>
+            <a:picLocks noChangeAspect="1"/>
+          </p:cNvPicPr>
+          <p:nvPr/>
+        </p:nvPicPr>
+        <p:blipFill>
+          <a:blip r:embed="rId3">
+            <a:extLst>
+              <a:ext uri="{28A0092B-C50C-407E-A947-70E740481C1C}">
+                <a14:useLocalDpi xmlns:a14="http://schemas.microsoft.com/office/drawing/2010/main" val="0"/>
+              </a:ext>
+            </a:extLst>
+          </a:blip>
+          <a:stretch>
+            <a:fillRect/>
+          </a:stretch>
+        </p:blipFill>
+        <p:spPr>
+          <a:xfrm>
+            <a:off x="4343400" y="1208782"/>
+            <a:ext cx="4572000" cy="3058418"/>
+          </a:xfrm>
+          <a:prstGeom prst="rect">
+            <a:avLst/>
+          </a:prstGeom>
+        </p:spPr>
+      </p:pic>
+    </p:spTree>
+    <p:extLst>
+      <p:ext uri="{BB962C8B-B14F-4D97-AF65-F5344CB8AC3E}">
+        <p14:creationId xmlns:p14="http://schemas.microsoft.com/office/powerpoint/2010/main" val="3160745459"/>
+      </p:ext>
+    </p:extLst>
+  </p:cSld>
+  <p:clrMapOvr>
+    <a:masterClrMapping/>
+  </p:clrMapOvr>
+  <p:timing>
+    <p:tnLst>
+      <p:par>
+        <p:cTn id="1" dur="indefinite" restart="never" nodeType="tmRoot">
+          <p:childTnLst>
+            <p:seq concurrent="1" nextAc="seek">
+              <p:cTn id="2" dur="indefinite" nodeType="mainSeq">
+                <p:childTnLst>
+                  <p:par>
+                    <p:cTn id="3" fill="hold">
+                      <p:stCondLst>
+                        <p:cond delay="indefinite"/>
+                      </p:stCondLst>
+                      <p:childTnLst>
+                        <p:par>
+                          <p:cTn id="4" fill="hold">
+                            <p:stCondLst>
+                              <p:cond delay="0"/>
+                            </p:stCondLst>
+                            <p:childTnLst>
+                              <p:par>
+                                <p:cTn id="5" presetID="1" presetClass="entr" presetSubtype="0" fill="hold" nodeType="clickEffect">
+                                  <p:stCondLst>
+                                    <p:cond delay="0"/>
+                                  </p:stCondLst>
+                                  <p:childTnLst>
+                                    <p:set>
+                                      <p:cBhvr>
+                                        <p:cTn id="6" dur="1" fill="hold">
+                                          <p:stCondLst>
+                                            <p:cond delay="0"/>
+                                          </p:stCondLst>
+                                        </p:cTn>
+                                        <p:tgtEl>
+                                          <p:spTgt spid="44"/>
+                                        </p:tgtEl>
+                                        <p:attrNameLst>
+                                          <p:attrName>style.visibility</p:attrName>
+                                        </p:attrNameLst>
+                                      </p:cBhvr>
+                                      <p:to>
+                                        <p:strVal val="visible"/>
+                                      </p:to>
+                                    </p:set>
+                                  </p:childTnLst>
+                                </p:cTn>
+                              </p:par>
+                            </p:childTnLst>
+                          </p:cTn>
+                        </p:par>
+                      </p:childTnLst>
+                    </p:cTn>
+                  </p:par>
+                </p:childTnLst>
+              </p:cTn>
+              <p:prevCondLst>
+                <p:cond evt="onPrev" delay="0">
+                  <p:tgtEl>
+                    <p:sldTgt/>
+                  </p:tgtEl>
+                </p:cond>
+              </p:prevCondLst>
+              <p:nextCondLst>
+                <p:cond evt="onNext" delay="0">
+                  <p:tgtEl>
+                    <p:sldTgt/>
+                  </p:tgtEl>
+                </p:cond>
+              </p:nextCondLst>
+            </p:seq>
+          </p:childTnLst>
+        </p:cTn>
+      </p:par>
+    </p:tnLst>
+  </p:timing>
+</p:sld>
+</file>
+
+<file path=ppt/slides/slide38.xml><?xml version="1.0" encoding="utf-8"?>
+<p:sld xmlns:a="http://schemas.openxmlformats.org/drawingml/2006/main" xmlns:r="http://schemas.openxmlformats.org/officeDocument/2006/relationships" xmlns:p="http://schemas.openxmlformats.org/presentationml/2006/main">
+  <p:cSld>
+    <p:spTree>
+      <p:nvGrpSpPr>
+        <p:cNvPr id="1" name=""/>
+        <p:cNvGrpSpPr/>
+        <p:nvPr/>
+      </p:nvGrpSpPr>
+      <p:grpSpPr>
+        <a:xfrm>
+          <a:off x="0" y="0"/>
+          <a:ext cx="0" cy="0"/>
+          <a:chOff x="0" y="0"/>
+          <a:chExt cx="0" cy="0"/>
+        </a:xfrm>
+      </p:grpSpPr>
+      <p:grpSp>
+        <p:nvGrpSpPr>
+          <p:cNvPr id="2" name="Group 1"/>
+          <p:cNvGrpSpPr/>
+          <p:nvPr/>
+        </p:nvGrpSpPr>
+        <p:grpSpPr>
+          <a:xfrm>
+            <a:off x="152400" y="1116842"/>
+            <a:ext cx="4572000" cy="3150358"/>
+            <a:chOff x="152400" y="1116842"/>
+            <a:chExt cx="4572000" cy="3150358"/>
+          </a:xfrm>
+        </p:grpSpPr>
+        <p:grpSp>
+          <p:nvGrpSpPr>
+            <p:cNvPr id="9" name="Group 8"/>
+            <p:cNvGrpSpPr/>
+            <p:nvPr/>
+          </p:nvGrpSpPr>
+          <p:grpSpPr>
+            <a:xfrm>
+              <a:off x="914400" y="1116842"/>
+              <a:ext cx="3048000" cy="3150358"/>
+              <a:chOff x="914400" y="1116842"/>
+              <a:chExt cx="3048000" cy="3150358"/>
+            </a:xfrm>
+          </p:grpSpPr>
+          <p:sp>
+            <p:nvSpPr>
+              <p:cNvPr id="10" name="Rectangle 9"/>
+              <p:cNvSpPr/>
+              <p:nvPr/>
+            </p:nvSpPr>
+            <p:spPr>
+              <a:xfrm>
+                <a:off x="914400" y="1116842"/>
+                <a:ext cx="1981200" cy="2057400"/>
+              </a:xfrm>
+              <a:prstGeom prst="rect">
+                <a:avLst/>
+              </a:prstGeom>
+              <a:solidFill>
+                <a:srgbClr val="FF0000"/>
+              </a:solidFill>
+            </p:spPr>
+            <p:style>
+              <a:lnRef idx="2">
+                <a:schemeClr val="accent1">
+                  <a:shade val="50000"/>
+                </a:schemeClr>
+              </a:lnRef>
+              <a:fillRef idx="1">
+                <a:schemeClr val="accent1"/>
+              </a:fillRef>
+              <a:effectRef idx="0">
+                <a:schemeClr val="accent1"/>
+              </a:effectRef>
+              <a:fontRef idx="minor">
+                <a:schemeClr val="lt1"/>
+              </a:fontRef>
+            </p:style>
+            <p:txBody>
+              <a:bodyPr rtlCol="0" anchor="ctr"/>
+              <a:lstStyle/>
+              <a:p>
+                <a:pPr algn="ctr"/>
+                <a:endParaRPr lang="en-US"/>
+              </a:p>
+            </p:txBody>
+          </p:sp>
+          <p:sp>
+            <p:nvSpPr>
+              <p:cNvPr id="11" name="Rectangle 10"/>
+              <p:cNvSpPr/>
+              <p:nvPr/>
+            </p:nvSpPr>
+            <p:spPr>
+              <a:xfrm>
+                <a:off x="1447800" y="1650242"/>
+                <a:ext cx="1981200" cy="2057400"/>
+              </a:xfrm>
+              <a:prstGeom prst="rect">
+                <a:avLst/>
+              </a:prstGeom>
+              <a:solidFill>
+                <a:srgbClr val="00B050"/>
+              </a:solidFill>
+            </p:spPr>
+            <p:style>
+              <a:lnRef idx="2">
+                <a:schemeClr val="accent1">
+                  <a:shade val="50000"/>
+                </a:schemeClr>
+              </a:lnRef>
+              <a:fillRef idx="1">
+                <a:schemeClr val="accent1"/>
+              </a:fillRef>
+              <a:effectRef idx="0">
+                <a:schemeClr val="accent1"/>
+              </a:effectRef>
+              <a:fontRef idx="minor">
+                <a:schemeClr val="lt1"/>
+              </a:fontRef>
+            </p:style>
+            <p:txBody>
+              <a:bodyPr rtlCol="0" anchor="ctr"/>
+              <a:lstStyle/>
+              <a:p>
+                <a:pPr algn="ctr"/>
+                <a:endParaRPr lang="en-US"/>
+              </a:p>
+            </p:txBody>
+          </p:sp>
+          <p:sp>
+            <p:nvSpPr>
+              <p:cNvPr id="12" name="Rectangle 11"/>
+              <p:cNvSpPr/>
+              <p:nvPr/>
+            </p:nvSpPr>
+            <p:spPr>
+              <a:xfrm>
+                <a:off x="1981200" y="2209800"/>
+                <a:ext cx="1981200" cy="2057400"/>
+              </a:xfrm>
+              <a:prstGeom prst="rect">
+                <a:avLst/>
+              </a:prstGeom>
+              <a:solidFill>
+                <a:srgbClr val="0070C0"/>
+              </a:solidFill>
+            </p:spPr>
+            <p:style>
+              <a:lnRef idx="2">
+                <a:schemeClr val="accent1">
+                  <a:shade val="50000"/>
+                </a:schemeClr>
+              </a:lnRef>
+              <a:fillRef idx="1">
+                <a:schemeClr val="accent1"/>
+              </a:fillRef>
+              <a:effectRef idx="0">
+                <a:schemeClr val="accent1"/>
+              </a:effectRef>
+              <a:fontRef idx="minor">
+                <a:schemeClr val="lt1"/>
+              </a:fontRef>
+            </p:style>
+            <p:txBody>
+              <a:bodyPr rtlCol="0" anchor="ctr"/>
+              <a:lstStyle/>
+              <a:p>
+                <a:pPr algn="ctr"/>
+                <a:endParaRPr lang="en-US"/>
+              </a:p>
+            </p:txBody>
+          </p:sp>
+        </p:grpSp>
+        <p:pic>
+          <p:nvPicPr>
+            <p:cNvPr id="8" name="selectMe"/>
+            <p:cNvPicPr>
+              <a:picLocks noChangeAspect="1"/>
+            </p:cNvPicPr>
+            <p:nvPr/>
+          </p:nvPicPr>
+          <p:blipFill>
+            <a:blip r:embed="rId3">
+              <a:extLst>
+                <a:ext uri="{28A0092B-C50C-407E-A947-70E740481C1C}">
+                  <a14:useLocalDpi xmlns:a14="http://schemas.microsoft.com/office/drawing/2010/main" val="0"/>
+                </a:ext>
+              </a:extLst>
+            </a:blip>
+            <a:stretch>
+              <a:fillRect/>
+            </a:stretch>
+          </p:blipFill>
+          <p:spPr>
+            <a:xfrm>
+              <a:off x="152400" y="1162812"/>
+              <a:ext cx="4572000" cy="3058418"/>
+            </a:xfrm>
+            <a:prstGeom prst="rect">
+              <a:avLst/>
+            </a:prstGeom>
+          </p:spPr>
+        </p:pic>
+      </p:grpSp>
+      <p:pic>
+        <p:nvPicPr>
+          <p:cNvPr id="13" name="copied"/>
+          <p:cNvPicPr>
+            <a:picLocks noChangeAspect="1"/>
+          </p:cNvPicPr>
+          <p:nvPr/>
+        </p:nvPicPr>
+        <p:blipFill>
+          <a:blip r:embed="rId3">
+            <a:extLst>
+              <a:ext uri="{28A0092B-C50C-407E-A947-70E740481C1C}">
+                <a14:useLocalDpi xmlns:a14="http://schemas.microsoft.com/office/drawing/2010/main" val="0"/>
+              </a:ext>
+            </a:extLst>
+          </a:blip>
+          <a:stretch>
+            <a:fillRect/>
+          </a:stretch>
+        </p:blipFill>
+        <p:spPr>
+          <a:xfrm>
+            <a:off x="4343400" y="1208782"/>
+            <a:ext cx="4572000" cy="3058418"/>
+          </a:xfrm>
+          <a:prstGeom prst="rect">
+            <a:avLst/>
+          </a:prstGeom>
+        </p:spPr>
+      </p:pic>
+    </p:spTree>
+    <p:extLst>
+      <p:ext uri="{BB962C8B-B14F-4D97-AF65-F5344CB8AC3E}">
+        <p14:creationId xmlns:p14="http://schemas.microsoft.com/office/powerpoint/2010/main" val="147479287"/>
+      </p:ext>
+    </p:extLst>
+  </p:cSld>
+  <p:clrMapOvr>
+    <a:masterClrMapping/>
+  </p:clrMapOvr>
+  <p:timing>
+    <p:tnLst>
+      <p:par>
+        <p:cTn id="1" dur="indefinite" restart="never" nodeType="tmRoot">
+          <p:childTnLst>
+            <p:seq concurrent="1" nextAc="seek">
+              <p:cTn id="2" dur="indefinite" nodeType="mainSeq">
+                <p:childTnLst>
+                  <p:par>
+                    <p:cTn id="3" fill="hold">
+                      <p:stCondLst>
+                        <p:cond delay="indefinite"/>
+                      </p:stCondLst>
+                      <p:childTnLst>
+                        <p:par>
+                          <p:cTn id="4" fill="hold">
+                            <p:stCondLst>
+                              <p:cond delay="0"/>
+                            </p:stCondLst>
+                            <p:childTnLst>
+                              <p:par>
+                                <p:cTn id="5" presetID="1" presetClass="entr" presetSubtype="0" fill="hold" nodeType="clickEffect">
+                                  <p:stCondLst>
+                                    <p:cond delay="0"/>
+                                  </p:stCondLst>
+                                  <p:childTnLst>
+                                    <p:set>
+                                      <p:cBhvr>
+                                        <p:cTn id="6" dur="1" fill="hold">
+                                          <p:stCondLst>
+                                            <p:cond delay="0"/>
+                                          </p:stCondLst>
+                                        </p:cTn>
+                                        <p:tgtEl>
+                                          <p:spTgt spid="2"/>
+                                        </p:tgtEl>
+                                        <p:attrNameLst>
+                                          <p:attrName>style.visibility</p:attrName>
+                                        </p:attrNameLst>
+                                      </p:cBhvr>
+                                      <p:to>
+                                        <p:strVal val="visible"/>
+                                      </p:to>
+                                    </p:set>
+                                  </p:childTnLst>
+                                </p:cTn>
+                              </p:par>
+                            </p:childTnLst>
+                          </p:cTn>
+                        </p:par>
+                      </p:childTnLst>
+                    </p:cTn>
+                  </p:par>
+                </p:childTnLst>
+              </p:cTn>
+              <p:prevCondLst>
+                <p:cond evt="onPrev" delay="0">
+                  <p:tgtEl>
+                    <p:sldTgt/>
+                  </p:tgtEl>
+                </p:cond>
+              </p:prevCondLst>
+              <p:nextCondLst>
+                <p:cond evt="onNext" delay="0">
+                  <p:tgtEl>
+                    <p:sldTgt/>
+                  </p:tgtEl>
+                </p:cond>
+              </p:nextCondLst>
+            </p:seq>
+          </p:childTnLst>
+        </p:cTn>
+      </p:par>
+    </p:tnLst>
+  </p:timing>
 </p:sld>
 </file>
 

</xml_diff>

<commit_message>
Add tests for paste lab (#1635)
</commit_message>
<xml_diff>
--- a/doc/test/PasteLab/PasteLab.pptx
+++ b/doc/test/PasteLab/PasteLab.pptx
@@ -8,7 +8,7 @@
     <p:sldMasterId id="2147483684" r:id="rId4"/>
   </p:sldMasterIdLst>
   <p:notesMasterIdLst>
-    <p:notesMasterId r:id="rId38"/>
+    <p:notesMasterId r:id="rId43"/>
   </p:notesMasterIdLst>
   <p:sldIdLst>
     <p:sldId id="287" r:id="rId5"/>
@@ -44,6 +44,11 @@
     <p:sldId id="406" r:id="rId35"/>
     <p:sldId id="407" r:id="rId36"/>
     <p:sldId id="408" r:id="rId37"/>
+    <p:sldId id="413" r:id="rId38"/>
+    <p:sldId id="409" r:id="rId39"/>
+    <p:sldId id="410" r:id="rId40"/>
+    <p:sldId id="411" r:id="rId41"/>
+    <p:sldId id="412" r:id="rId42"/>
   </p:sldIdLst>
   <p:sldSz cx="9144000" cy="6858000" type="screen4x3"/>
   <p:notesSz cx="6858000" cy="9144000"/>
@@ -184,6 +189,11 @@
             <p14:sldId id="406"/>
             <p14:sldId id="407"/>
             <p14:sldId id="408"/>
+            <p14:sldId id="413"/>
+            <p14:sldId id="409"/>
+            <p14:sldId id="410"/>
+            <p14:sldId id="411"/>
+            <p14:sldId id="412"/>
           </p14:sldIdLst>
         </p14:section>
       </p14:sectionLst>
@@ -288,7 +298,7 @@
           <a:p>
             <a:fld id="{43E32005-3A63-48D2-8C73-BF5F95786EBD}" type="datetimeFigureOut">
               <a:rPr lang="en-US" smtClean="0"/>
-              <a:t>2/10/2018</a:t>
+              <a:t>3/18/2018</a:t>
             </a:fld>
             <a:endParaRPr lang="en-US"/>
           </a:p>
@@ -2972,6 +2982,616 @@
 </p:notes>
 </file>
 
+<file path=ppt/notesSlides/notesSlide32.xml><?xml version="1.0" encoding="utf-8"?>
+<p:notes xmlns:a="http://schemas.openxmlformats.org/drawingml/2006/main" xmlns:r="http://schemas.openxmlformats.org/officeDocument/2006/relationships" xmlns:p="http://schemas.openxmlformats.org/presentationml/2006/main">
+  <p:cSld>
+    <p:spTree>
+      <p:nvGrpSpPr>
+        <p:cNvPr id="1" name=""/>
+        <p:cNvGrpSpPr/>
+        <p:nvPr/>
+      </p:nvGrpSpPr>
+      <p:grpSpPr>
+        <a:xfrm>
+          <a:off x="0" y="0"/>
+          <a:ext cx="0" cy="0"/>
+          <a:chOff x="0" y="0"/>
+          <a:chExt cx="0" cy="0"/>
+        </a:xfrm>
+      </p:grpSpPr>
+      <p:sp>
+        <p:nvSpPr>
+          <p:cNvPr id="2" name="Slide Image Placeholder 1"/>
+          <p:cNvSpPr>
+            <a:spLocks noGrp="1" noRot="1" noChangeAspect="1"/>
+          </p:cNvSpPr>
+          <p:nvPr>
+            <p:ph type="sldImg"/>
+          </p:nvPr>
+        </p:nvSpPr>
+        <p:spPr/>
+      </p:sp>
+      <p:sp>
+        <p:nvSpPr>
+          <p:cNvPr id="3" name="Notes Placeholder 2"/>
+          <p:cNvSpPr>
+            <a:spLocks noGrp="1"/>
+          </p:cNvSpPr>
+          <p:nvPr>
+            <p:ph type="body" idx="1"/>
+          </p:nvPr>
+        </p:nvSpPr>
+        <p:spPr/>
+        <p:txBody>
+          <a:bodyPr/>
+          <a:lstStyle/>
+          <a:p>
+            <a:r>
+              <a:rPr lang="en-US" dirty="0"/>
+              <a:t>You can also cut by using ctrl-x</a:t>
+            </a:r>
+          </a:p>
+        </p:txBody>
+      </p:sp>
+      <p:sp>
+        <p:nvSpPr>
+          <p:cNvPr id="4" name="Slide Number Placeholder 3"/>
+          <p:cNvSpPr>
+            <a:spLocks noGrp="1"/>
+          </p:cNvSpPr>
+          <p:nvPr>
+            <p:ph type="sldNum" sz="quarter" idx="10"/>
+          </p:nvPr>
+        </p:nvSpPr>
+        <p:spPr/>
+        <p:txBody>
+          <a:bodyPr/>
+          <a:lstStyle/>
+          <a:p>
+            <a:pPr marL="0" marR="0" lvl="0" indent="0" algn="r" defTabSz="914400" rtl="0" eaLnBrk="1" fontAlgn="auto" latinLnBrk="0" hangingPunct="1">
+              <a:lnSpc>
+                <a:spcPct val="100000"/>
+              </a:lnSpc>
+              <a:spcBef>
+                <a:spcPts val="0"/>
+              </a:spcBef>
+              <a:spcAft>
+                <a:spcPts val="0"/>
+              </a:spcAft>
+              <a:buClrTx/>
+              <a:buSzTx/>
+              <a:buFontTx/>
+              <a:buNone/>
+              <a:tabLst/>
+              <a:defRPr/>
+            </a:pPr>
+            <a:fld id="{0FE7C38A-472B-4221-8E00-509E1DA863EC}" type="slidenum">
+              <a:rPr kumimoji="0" lang="en-US" sz="1200" b="0" i="0" u="none" strike="noStrike" kern="1200" cap="none" spc="0" normalizeH="0" baseline="0" noProof="0" smtClean="0">
+                <a:ln>
+                  <a:noFill/>
+                </a:ln>
+                <a:solidFill>
+                  <a:prstClr val="black"/>
+                </a:solidFill>
+                <a:effectLst/>
+                <a:uLnTx/>
+                <a:uFillTx/>
+                <a:latin typeface="Calibri" panose="020F0502020204030204"/>
+                <a:ea typeface="+mn-ea"/>
+                <a:cs typeface="+mn-cs"/>
+              </a:rPr>
+              <a:pPr marL="0" marR="0" lvl="0" indent="0" algn="r" defTabSz="914400" rtl="0" eaLnBrk="1" fontAlgn="auto" latinLnBrk="0" hangingPunct="1">
+                <a:lnSpc>
+                  <a:spcPct val="100000"/>
+                </a:lnSpc>
+                <a:spcBef>
+                  <a:spcPts val="0"/>
+                </a:spcBef>
+                <a:spcAft>
+                  <a:spcPts val="0"/>
+                </a:spcAft>
+                <a:buClrTx/>
+                <a:buSzTx/>
+                <a:buFontTx/>
+                <a:buNone/>
+                <a:tabLst/>
+                <a:defRPr/>
+              </a:pPr>
+              <a:t>34</a:t>
+            </a:fld>
+            <a:endParaRPr kumimoji="0" lang="en-US" sz="1200" b="0" i="0" u="none" strike="noStrike" kern="1200" cap="none" spc="0" normalizeH="0" baseline="0" noProof="0">
+              <a:ln>
+                <a:noFill/>
+              </a:ln>
+              <a:solidFill>
+                <a:prstClr val="black"/>
+              </a:solidFill>
+              <a:effectLst/>
+              <a:uLnTx/>
+              <a:uFillTx/>
+              <a:latin typeface="Calibri" panose="020F0502020204030204"/>
+              <a:ea typeface="+mn-ea"/>
+              <a:cs typeface="+mn-cs"/>
+            </a:endParaRPr>
+          </a:p>
+        </p:txBody>
+      </p:sp>
+    </p:spTree>
+    <p:extLst>
+      <p:ext uri="{BB962C8B-B14F-4D97-AF65-F5344CB8AC3E}">
+        <p14:creationId xmlns:p14="http://schemas.microsoft.com/office/powerpoint/2010/main" val="1147600831"/>
+      </p:ext>
+    </p:extLst>
+  </p:cSld>
+  <p:clrMapOvr>
+    <a:masterClrMapping/>
+  </p:clrMapOvr>
+</p:notes>
+</file>
+
+<file path=ppt/notesSlides/notesSlide33.xml><?xml version="1.0" encoding="utf-8"?>
+<p:notes xmlns:a="http://schemas.openxmlformats.org/drawingml/2006/main" xmlns:r="http://schemas.openxmlformats.org/officeDocument/2006/relationships" xmlns:p="http://schemas.openxmlformats.org/presentationml/2006/main">
+  <p:cSld>
+    <p:spTree>
+      <p:nvGrpSpPr>
+        <p:cNvPr id="1" name=""/>
+        <p:cNvGrpSpPr/>
+        <p:nvPr/>
+      </p:nvGrpSpPr>
+      <p:grpSpPr>
+        <a:xfrm>
+          <a:off x="0" y="0"/>
+          <a:ext cx="0" cy="0"/>
+          <a:chOff x="0" y="0"/>
+          <a:chExt cx="0" cy="0"/>
+        </a:xfrm>
+      </p:grpSpPr>
+      <p:sp>
+        <p:nvSpPr>
+          <p:cNvPr id="2" name="Slide Image Placeholder 1"/>
+          <p:cNvSpPr>
+            <a:spLocks noGrp="1" noRot="1" noChangeAspect="1"/>
+          </p:cNvSpPr>
+          <p:nvPr>
+            <p:ph type="sldImg"/>
+          </p:nvPr>
+        </p:nvSpPr>
+        <p:spPr/>
+      </p:sp>
+      <p:sp>
+        <p:nvSpPr>
+          <p:cNvPr id="3" name="Notes Placeholder 2"/>
+          <p:cNvSpPr>
+            <a:spLocks noGrp="1"/>
+          </p:cNvSpPr>
+          <p:nvPr>
+            <p:ph type="body" idx="1"/>
+          </p:nvPr>
+        </p:nvSpPr>
+        <p:spPr/>
+        <p:txBody>
+          <a:bodyPr/>
+          <a:lstStyle/>
+          <a:p>
+            <a:r>
+              <a:rPr lang="en-US" dirty="0"/>
+              <a:t>Original</a:t>
+            </a:r>
+            <a:r>
+              <a:rPr lang="en-US" baseline="0" dirty="0"/>
+              <a:t> Shapes 3 colored squares and a buildings image</a:t>
+            </a:r>
+            <a:endParaRPr lang="en-US" dirty="0"/>
+          </a:p>
+        </p:txBody>
+      </p:sp>
+      <p:sp>
+        <p:nvSpPr>
+          <p:cNvPr id="4" name="Slide Number Placeholder 3"/>
+          <p:cNvSpPr>
+            <a:spLocks noGrp="1"/>
+          </p:cNvSpPr>
+          <p:nvPr>
+            <p:ph type="sldNum" sz="quarter" idx="10"/>
+          </p:nvPr>
+        </p:nvSpPr>
+        <p:spPr/>
+        <p:txBody>
+          <a:bodyPr/>
+          <a:lstStyle/>
+          <a:p>
+            <a:fld id="{0FE7C38A-472B-4221-8E00-509E1DA863EC}" type="slidenum">
+              <a:rPr lang="en-US" smtClean="0"/>
+              <a:t>35</a:t>
+            </a:fld>
+            <a:endParaRPr lang="en-US"/>
+          </a:p>
+        </p:txBody>
+      </p:sp>
+    </p:spTree>
+    <p:extLst>
+      <p:ext uri="{BB962C8B-B14F-4D97-AF65-F5344CB8AC3E}">
+        <p14:creationId xmlns:p14="http://schemas.microsoft.com/office/powerpoint/2010/main" val="1743082063"/>
+      </p:ext>
+    </p:extLst>
+  </p:cSld>
+  <p:clrMapOvr>
+    <a:masterClrMapping/>
+  </p:clrMapOvr>
+</p:notes>
+</file>
+
+<file path=ppt/notesSlides/notesSlide34.xml><?xml version="1.0" encoding="utf-8"?>
+<p:notes xmlns:a="http://schemas.openxmlformats.org/drawingml/2006/main" xmlns:r="http://schemas.openxmlformats.org/officeDocument/2006/relationships" xmlns:p="http://schemas.openxmlformats.org/presentationml/2006/main">
+  <p:cSld>
+    <p:spTree>
+      <p:nvGrpSpPr>
+        <p:cNvPr id="1" name=""/>
+        <p:cNvGrpSpPr/>
+        <p:nvPr/>
+      </p:nvGrpSpPr>
+      <p:grpSpPr>
+        <a:xfrm>
+          <a:off x="0" y="0"/>
+          <a:ext cx="0" cy="0"/>
+          <a:chOff x="0" y="0"/>
+          <a:chExt cx="0" cy="0"/>
+        </a:xfrm>
+      </p:grpSpPr>
+      <p:sp>
+        <p:nvSpPr>
+          <p:cNvPr id="2" name="Slide Image Placeholder 1"/>
+          <p:cNvSpPr>
+            <a:spLocks noGrp="1" noRot="1" noChangeAspect="1"/>
+          </p:cNvSpPr>
+          <p:nvPr>
+            <p:ph type="sldImg"/>
+          </p:nvPr>
+        </p:nvSpPr>
+        <p:spPr/>
+      </p:sp>
+      <p:sp>
+        <p:nvSpPr>
+          <p:cNvPr id="3" name="Notes Placeholder 2"/>
+          <p:cNvSpPr>
+            <a:spLocks noGrp="1"/>
+          </p:cNvSpPr>
+          <p:nvPr>
+            <p:ph type="body" idx="1"/>
+          </p:nvPr>
+        </p:nvSpPr>
+        <p:spPr/>
+        <p:txBody>
+          <a:bodyPr/>
+          <a:lstStyle/>
+          <a:p>
+            <a:r>
+              <a:rPr lang="en-US" dirty="0"/>
+              <a:t>Expected.</a:t>
+            </a:r>
+            <a:r>
+              <a:rPr lang="en-US" baseline="0" dirty="0"/>
+              <a:t> Cut the building image and right click the green square and select Replace With Clipboard</a:t>
+            </a:r>
+            <a:r>
+              <a:rPr lang="en-US" baseline="0" dirty="0" smtClean="0"/>
+              <a:t>.</a:t>
+            </a:r>
+          </a:p>
+          <a:p>
+            <a:pPr marL="0" marR="0" lvl="0" indent="0" algn="l" defTabSz="914400" rtl="0" eaLnBrk="1" fontAlgn="auto" latinLnBrk="0" hangingPunct="1">
+              <a:lnSpc>
+                <a:spcPct val="100000"/>
+              </a:lnSpc>
+              <a:spcBef>
+                <a:spcPts val="0"/>
+              </a:spcBef>
+              <a:spcAft>
+                <a:spcPts val="0"/>
+              </a:spcAft>
+              <a:buClrTx/>
+              <a:buSzTx/>
+              <a:buFontTx/>
+              <a:buNone/>
+              <a:tabLst/>
+              <a:defRPr/>
+            </a:pPr>
+            <a:r>
+              <a:rPr lang="en-US" b="0" baseline="0" dirty="0" smtClean="0"/>
+              <a:t>The image pasted should be the building image.</a:t>
+            </a:r>
+            <a:endParaRPr lang="en-US" baseline="0" dirty="0" smtClean="0"/>
+          </a:p>
+          <a:p>
+            <a:endParaRPr lang="en-US" baseline="0" dirty="0"/>
+          </a:p>
+        </p:txBody>
+      </p:sp>
+      <p:sp>
+        <p:nvSpPr>
+          <p:cNvPr id="4" name="Slide Number Placeholder 3"/>
+          <p:cNvSpPr>
+            <a:spLocks noGrp="1"/>
+          </p:cNvSpPr>
+          <p:nvPr>
+            <p:ph type="sldNum" sz="quarter" idx="10"/>
+          </p:nvPr>
+        </p:nvSpPr>
+        <p:spPr/>
+        <p:txBody>
+          <a:bodyPr/>
+          <a:lstStyle/>
+          <a:p>
+            <a:fld id="{0FE7C38A-472B-4221-8E00-509E1DA863EC}" type="slidenum">
+              <a:rPr lang="en-US" smtClean="0"/>
+              <a:t>36</a:t>
+            </a:fld>
+            <a:endParaRPr lang="en-US"/>
+          </a:p>
+        </p:txBody>
+      </p:sp>
+    </p:spTree>
+    <p:extLst>
+      <p:ext uri="{BB962C8B-B14F-4D97-AF65-F5344CB8AC3E}">
+        <p14:creationId xmlns:p14="http://schemas.microsoft.com/office/powerpoint/2010/main" val="2089091601"/>
+      </p:ext>
+    </p:extLst>
+  </p:cSld>
+  <p:clrMapOvr>
+    <a:masterClrMapping/>
+  </p:clrMapOvr>
+</p:notes>
+</file>
+
+<file path=ppt/notesSlides/notesSlide35.xml><?xml version="1.0" encoding="utf-8"?>
+<p:notes xmlns:a="http://schemas.openxmlformats.org/drawingml/2006/main" xmlns:r="http://schemas.openxmlformats.org/officeDocument/2006/relationships" xmlns:p="http://schemas.openxmlformats.org/presentationml/2006/main">
+  <p:cSld>
+    <p:spTree>
+      <p:nvGrpSpPr>
+        <p:cNvPr id="1" name=""/>
+        <p:cNvGrpSpPr/>
+        <p:nvPr/>
+      </p:nvGrpSpPr>
+      <p:grpSpPr>
+        <a:xfrm>
+          <a:off x="0" y="0"/>
+          <a:ext cx="0" cy="0"/>
+          <a:chOff x="0" y="0"/>
+          <a:chExt cx="0" cy="0"/>
+        </a:xfrm>
+      </p:grpSpPr>
+      <p:sp>
+        <p:nvSpPr>
+          <p:cNvPr id="2" name="Slide Image Placeholder 1"/>
+          <p:cNvSpPr>
+            <a:spLocks noGrp="1" noRot="1" noChangeAspect="1"/>
+          </p:cNvSpPr>
+          <p:nvPr>
+            <p:ph type="sldImg"/>
+          </p:nvPr>
+        </p:nvSpPr>
+        <p:spPr/>
+      </p:sp>
+      <p:sp>
+        <p:nvSpPr>
+          <p:cNvPr id="3" name="Notes Placeholder 2"/>
+          <p:cNvSpPr>
+            <a:spLocks noGrp="1"/>
+          </p:cNvSpPr>
+          <p:nvPr>
+            <p:ph type="body" idx="1"/>
+          </p:nvPr>
+        </p:nvSpPr>
+        <p:spPr/>
+        <p:txBody>
+          <a:bodyPr/>
+          <a:lstStyle/>
+          <a:p>
+            <a:r>
+              <a:rPr lang="en-US" dirty="0"/>
+              <a:t>Original</a:t>
+            </a:r>
+            <a:r>
+              <a:rPr lang="en-US" baseline="0" dirty="0"/>
+              <a:t> Shapes</a:t>
+            </a:r>
+            <a:r>
+              <a:rPr lang="en-US" dirty="0"/>
+              <a:t> 3 colored squares that are merged into a group and building</a:t>
+            </a:r>
+            <a:r>
+              <a:rPr lang="en-US" baseline="0" dirty="0"/>
+              <a:t> image</a:t>
+            </a:r>
+          </a:p>
+          <a:p>
+            <a:pPr marL="0" marR="0" lvl="0" indent="0" algn="l" defTabSz="914400" rtl="0" eaLnBrk="1" fontAlgn="auto" latinLnBrk="0" hangingPunct="1">
+              <a:lnSpc>
+                <a:spcPct val="100000"/>
+              </a:lnSpc>
+              <a:spcBef>
+                <a:spcPts val="0"/>
+              </a:spcBef>
+              <a:spcAft>
+                <a:spcPts val="0"/>
+              </a:spcAft>
+              <a:buClrTx/>
+              <a:buSzTx/>
+              <a:buFontTx/>
+              <a:buNone/>
+              <a:tabLst/>
+              <a:defRPr/>
+            </a:pPr>
+            <a:r>
+              <a:rPr lang="en-US" dirty="0"/>
+              <a:t>The grou</a:t>
+            </a:r>
+            <a:r>
+              <a:rPr lang="en-US" baseline="0" dirty="0"/>
+              <a:t>p of 3 colored squares have an appear animation</a:t>
+            </a:r>
+            <a:endParaRPr lang="en-US" dirty="0"/>
+          </a:p>
+          <a:p>
+            <a:endParaRPr lang="en-US" baseline="0" dirty="0"/>
+          </a:p>
+        </p:txBody>
+      </p:sp>
+      <p:sp>
+        <p:nvSpPr>
+          <p:cNvPr id="4" name="Slide Number Placeholder 3"/>
+          <p:cNvSpPr>
+            <a:spLocks noGrp="1"/>
+          </p:cNvSpPr>
+          <p:nvPr>
+            <p:ph type="sldNum" sz="quarter" idx="10"/>
+          </p:nvPr>
+        </p:nvSpPr>
+        <p:spPr/>
+        <p:txBody>
+          <a:bodyPr/>
+          <a:lstStyle/>
+          <a:p>
+            <a:fld id="{0FE7C38A-472B-4221-8E00-509E1DA863EC}" type="slidenum">
+              <a:rPr lang="en-US" smtClean="0"/>
+              <a:t>37</a:t>
+            </a:fld>
+            <a:endParaRPr lang="en-US"/>
+          </a:p>
+        </p:txBody>
+      </p:sp>
+    </p:spTree>
+    <p:extLst>
+      <p:ext uri="{BB962C8B-B14F-4D97-AF65-F5344CB8AC3E}">
+        <p14:creationId xmlns:p14="http://schemas.microsoft.com/office/powerpoint/2010/main" val="893966673"/>
+      </p:ext>
+    </p:extLst>
+  </p:cSld>
+  <p:clrMapOvr>
+    <a:masterClrMapping/>
+  </p:clrMapOvr>
+</p:notes>
+</file>
+
+<file path=ppt/notesSlides/notesSlide36.xml><?xml version="1.0" encoding="utf-8"?>
+<p:notes xmlns:a="http://schemas.openxmlformats.org/drawingml/2006/main" xmlns:r="http://schemas.openxmlformats.org/officeDocument/2006/relationships" xmlns:p="http://schemas.openxmlformats.org/presentationml/2006/main">
+  <p:cSld>
+    <p:spTree>
+      <p:nvGrpSpPr>
+        <p:cNvPr id="1" name=""/>
+        <p:cNvGrpSpPr/>
+        <p:nvPr/>
+      </p:nvGrpSpPr>
+      <p:grpSpPr>
+        <a:xfrm>
+          <a:off x="0" y="0"/>
+          <a:ext cx="0" cy="0"/>
+          <a:chOff x="0" y="0"/>
+          <a:chExt cx="0" cy="0"/>
+        </a:xfrm>
+      </p:grpSpPr>
+      <p:sp>
+        <p:nvSpPr>
+          <p:cNvPr id="2" name="Slide Image Placeholder 1"/>
+          <p:cNvSpPr>
+            <a:spLocks noGrp="1" noRot="1" noChangeAspect="1"/>
+          </p:cNvSpPr>
+          <p:nvPr>
+            <p:ph type="sldImg"/>
+          </p:nvPr>
+        </p:nvSpPr>
+        <p:spPr/>
+      </p:sp>
+      <p:sp>
+        <p:nvSpPr>
+          <p:cNvPr id="3" name="Notes Placeholder 2"/>
+          <p:cNvSpPr>
+            <a:spLocks noGrp="1"/>
+          </p:cNvSpPr>
+          <p:nvPr>
+            <p:ph type="body" idx="1"/>
+          </p:nvPr>
+        </p:nvSpPr>
+        <p:spPr/>
+        <p:txBody>
+          <a:bodyPr/>
+          <a:lstStyle/>
+          <a:p>
+            <a:r>
+              <a:rPr lang="en-US" dirty="0"/>
+              <a:t>Expected. Cut the building image and Paste Into Group </a:t>
+            </a:r>
+            <a:r>
+              <a:rPr lang="en-US" baseline="0" dirty="0"/>
+              <a:t>on the group of 3 colored squares</a:t>
+            </a:r>
+          </a:p>
+          <a:p>
+            <a:r>
+              <a:rPr lang="en-US" dirty="0"/>
+              <a:t>The image</a:t>
+            </a:r>
+            <a:r>
+              <a:rPr lang="en-US" baseline="0" dirty="0"/>
+              <a:t> should be in the center of the group.</a:t>
+            </a:r>
+            <a:r>
+              <a:rPr lang="en-US" b="0" baseline="0" dirty="0"/>
+              <a:t> Note that the group should still retain its </a:t>
+            </a:r>
+            <a:r>
+              <a:rPr lang="en-US" b="0" baseline="0" dirty="0" smtClean="0"/>
+              <a:t>animation</a:t>
+            </a:r>
+          </a:p>
+          <a:p>
+            <a:r>
+              <a:rPr lang="en-US" b="0" baseline="0" dirty="0" smtClean="0"/>
+              <a:t>The image pasted should be the building image.</a:t>
+            </a:r>
+            <a:endParaRPr lang="en-US" baseline="0" dirty="0"/>
+          </a:p>
+          <a:p>
+            <a:endParaRPr lang="en-US" baseline="0" dirty="0"/>
+          </a:p>
+        </p:txBody>
+      </p:sp>
+      <p:sp>
+        <p:nvSpPr>
+          <p:cNvPr id="4" name="Slide Number Placeholder 3"/>
+          <p:cNvSpPr>
+            <a:spLocks noGrp="1"/>
+          </p:cNvSpPr>
+          <p:nvPr>
+            <p:ph type="sldNum" sz="quarter" idx="10"/>
+          </p:nvPr>
+        </p:nvSpPr>
+        <p:spPr/>
+        <p:txBody>
+          <a:bodyPr/>
+          <a:lstStyle/>
+          <a:p>
+            <a:fld id="{0FE7C38A-472B-4221-8E00-509E1DA863EC}" type="slidenum">
+              <a:rPr lang="en-US" smtClean="0"/>
+              <a:t>38</a:t>
+            </a:fld>
+            <a:endParaRPr lang="en-US"/>
+          </a:p>
+        </p:txBody>
+      </p:sp>
+    </p:spTree>
+    <p:extLst>
+      <p:ext uri="{BB962C8B-B14F-4D97-AF65-F5344CB8AC3E}">
+        <p14:creationId xmlns:p14="http://schemas.microsoft.com/office/powerpoint/2010/main" val="3948383510"/>
+      </p:ext>
+    </p:extLst>
+  </p:cSld>
+  <p:clrMapOvr>
+    <a:masterClrMapping/>
+  </p:clrMapOvr>
+</p:notes>
+</file>
+
 <file path=ppt/notesSlides/notesSlide4.xml><?xml version="1.0" encoding="utf-8"?>
 <p:notes xmlns:a="http://schemas.openxmlformats.org/drawingml/2006/main" xmlns:r="http://schemas.openxmlformats.org/officeDocument/2006/relationships" xmlns:p="http://schemas.openxmlformats.org/presentationml/2006/main">
   <p:cSld>
@@ -3688,7 +4308,7 @@
           <a:p>
             <a:fld id="{699DC775-C286-4358-8C92-D7E584E969B3}" type="datetimeFigureOut">
               <a:rPr lang="en-US" smtClean="0"/>
-              <a:t>2/10/2018</a:t>
+              <a:t>3/18/2018</a:t>
             </a:fld>
             <a:endParaRPr lang="en-US"/>
           </a:p>
@@ -3856,7 +4476,7 @@
           <a:p>
             <a:fld id="{699DC775-C286-4358-8C92-D7E584E969B3}" type="datetimeFigureOut">
               <a:rPr lang="en-US" smtClean="0"/>
-              <a:t>2/10/2018</a:t>
+              <a:t>3/18/2018</a:t>
             </a:fld>
             <a:endParaRPr lang="en-US"/>
           </a:p>
@@ -4034,7 +4654,7 @@
           <a:p>
             <a:fld id="{699DC775-C286-4358-8C92-D7E584E969B3}" type="datetimeFigureOut">
               <a:rPr lang="en-US" smtClean="0"/>
-              <a:t>2/10/2018</a:t>
+              <a:t>3/18/2018</a:t>
             </a:fld>
             <a:endParaRPr lang="en-US"/>
           </a:p>
@@ -4274,7 +4894,7 @@
           <a:p>
             <a:fld id="{699DC775-C286-4358-8C92-D7E584E969B3}" type="datetimeFigureOut">
               <a:rPr lang="en-US" smtClean="0"/>
-              <a:t>2/10/2018</a:t>
+              <a:t>3/18/2018</a:t>
             </a:fld>
             <a:endParaRPr lang="en-US"/>
           </a:p>
@@ -4442,7 +5062,7 @@
           <a:p>
             <a:fld id="{699DC775-C286-4358-8C92-D7E584E969B3}" type="datetimeFigureOut">
               <a:rPr lang="en-US" smtClean="0"/>
-              <a:t>2/10/2018</a:t>
+              <a:t>3/18/2018</a:t>
             </a:fld>
             <a:endParaRPr lang="en-US"/>
           </a:p>
@@ -4687,7 +5307,7 @@
           <a:p>
             <a:fld id="{699DC775-C286-4358-8C92-D7E584E969B3}" type="datetimeFigureOut">
               <a:rPr lang="en-US" smtClean="0"/>
-              <a:t>2/10/2018</a:t>
+              <a:t>3/18/2018</a:t>
             </a:fld>
             <a:endParaRPr lang="en-US"/>
           </a:p>
@@ -4972,7 +5592,7 @@
           <a:p>
             <a:fld id="{699DC775-C286-4358-8C92-D7E584E969B3}" type="datetimeFigureOut">
               <a:rPr lang="en-US" smtClean="0"/>
-              <a:t>2/10/2018</a:t>
+              <a:t>3/18/2018</a:t>
             </a:fld>
             <a:endParaRPr lang="en-US"/>
           </a:p>
@@ -5391,7 +6011,7 @@
           <a:p>
             <a:fld id="{699DC775-C286-4358-8C92-D7E584E969B3}" type="datetimeFigureOut">
               <a:rPr lang="en-US" smtClean="0"/>
-              <a:t>2/10/2018</a:t>
+              <a:t>3/18/2018</a:t>
             </a:fld>
             <a:endParaRPr lang="en-US"/>
           </a:p>
@@ -5508,7 +6128,7 @@
           <a:p>
             <a:fld id="{699DC775-C286-4358-8C92-D7E584E969B3}" type="datetimeFigureOut">
               <a:rPr lang="en-US" smtClean="0"/>
-              <a:t>2/10/2018</a:t>
+              <a:t>3/18/2018</a:t>
             </a:fld>
             <a:endParaRPr lang="en-US"/>
           </a:p>
@@ -5603,7 +6223,7 @@
           <a:p>
             <a:fld id="{699DC775-C286-4358-8C92-D7E584E969B3}" type="datetimeFigureOut">
               <a:rPr lang="en-US" smtClean="0"/>
-              <a:t>2/10/2018</a:t>
+              <a:t>3/18/2018</a:t>
             </a:fld>
             <a:endParaRPr lang="en-US"/>
           </a:p>
@@ -5878,7 +6498,7 @@
           <a:p>
             <a:fld id="{699DC775-C286-4358-8C92-D7E584E969B3}" type="datetimeFigureOut">
               <a:rPr lang="en-US" smtClean="0"/>
-              <a:t>2/10/2018</a:t>
+              <a:t>3/18/2018</a:t>
             </a:fld>
             <a:endParaRPr lang="en-US"/>
           </a:p>
@@ -6046,7 +6666,7 @@
           <a:p>
             <a:fld id="{699DC775-C286-4358-8C92-D7E584E969B3}" type="datetimeFigureOut">
               <a:rPr lang="en-US" smtClean="0"/>
-              <a:t>2/10/2018</a:t>
+              <a:t>3/18/2018</a:t>
             </a:fld>
             <a:endParaRPr lang="en-US"/>
           </a:p>
@@ -6298,7 +6918,7 @@
           <a:p>
             <a:fld id="{699DC775-C286-4358-8C92-D7E584E969B3}" type="datetimeFigureOut">
               <a:rPr lang="en-US" smtClean="0"/>
-              <a:t>2/10/2018</a:t>
+              <a:t>3/18/2018</a:t>
             </a:fld>
             <a:endParaRPr lang="en-US"/>
           </a:p>
@@ -6466,7 +7086,7 @@
           <a:p>
             <a:fld id="{699DC775-C286-4358-8C92-D7E584E969B3}" type="datetimeFigureOut">
               <a:rPr lang="en-US" smtClean="0"/>
-              <a:t>2/10/2018</a:t>
+              <a:t>3/18/2018</a:t>
             </a:fld>
             <a:endParaRPr lang="en-US"/>
           </a:p>
@@ -6644,7 +7264,7 @@
           <a:p>
             <a:fld id="{699DC775-C286-4358-8C92-D7E584E969B3}" type="datetimeFigureOut">
               <a:rPr lang="en-US" smtClean="0"/>
-              <a:t>2/10/2018</a:t>
+              <a:t>3/18/2018</a:t>
             </a:fld>
             <a:endParaRPr lang="en-US"/>
           </a:p>
@@ -6892,7 +7512,7 @@
           <a:p>
             <a:fld id="{699DC775-C286-4358-8C92-D7E584E969B3}" type="datetimeFigureOut">
               <a:rPr lang="en-US" smtClean="0"/>
-              <a:t>2/10/2018</a:t>
+              <a:t>3/18/2018</a:t>
             </a:fld>
             <a:endParaRPr lang="en-US"/>
           </a:p>
@@ -7068,7 +7688,7 @@
           <a:p>
             <a:fld id="{699DC775-C286-4358-8C92-D7E584E969B3}" type="datetimeFigureOut">
               <a:rPr lang="en-US" smtClean="0"/>
-              <a:t>2/10/2018</a:t>
+              <a:t>3/18/2018</a:t>
             </a:fld>
             <a:endParaRPr lang="en-US"/>
           </a:p>
@@ -7321,7 +7941,7 @@
           <a:p>
             <a:fld id="{699DC775-C286-4358-8C92-D7E584E969B3}" type="datetimeFigureOut">
               <a:rPr lang="en-US" smtClean="0"/>
-              <a:t>2/10/2018</a:t>
+              <a:t>3/18/2018</a:t>
             </a:fld>
             <a:endParaRPr lang="en-US"/>
           </a:p>
@@ -7614,7 +8234,7 @@
           <a:p>
             <a:fld id="{699DC775-C286-4358-8C92-D7E584E969B3}" type="datetimeFigureOut">
               <a:rPr lang="en-US" smtClean="0"/>
-              <a:t>2/10/2018</a:t>
+              <a:t>3/18/2018</a:t>
             </a:fld>
             <a:endParaRPr lang="en-US"/>
           </a:p>
@@ -8041,7 +8661,7 @@
           <a:p>
             <a:fld id="{699DC775-C286-4358-8C92-D7E584E969B3}" type="datetimeFigureOut">
               <a:rPr lang="en-US" smtClean="0"/>
-              <a:t>2/10/2018</a:t>
+              <a:t>3/18/2018</a:t>
             </a:fld>
             <a:endParaRPr lang="en-US"/>
           </a:p>
@@ -8166,7 +8786,7 @@
           <a:p>
             <a:fld id="{699DC775-C286-4358-8C92-D7E584E969B3}" type="datetimeFigureOut">
               <a:rPr lang="en-US" smtClean="0"/>
-              <a:t>2/10/2018</a:t>
+              <a:t>3/18/2018</a:t>
             </a:fld>
             <a:endParaRPr lang="en-US"/>
           </a:p>
@@ -8269,7 +8889,7 @@
           <a:p>
             <a:fld id="{699DC775-C286-4358-8C92-D7E584E969B3}" type="datetimeFigureOut">
               <a:rPr lang="en-US" smtClean="0"/>
-              <a:t>2/10/2018</a:t>
+              <a:t>3/18/2018</a:t>
             </a:fld>
             <a:endParaRPr lang="en-US"/>
           </a:p>
@@ -8514,7 +9134,7 @@
           <a:p>
             <a:fld id="{699DC775-C286-4358-8C92-D7E584E969B3}" type="datetimeFigureOut">
               <a:rPr lang="en-US" smtClean="0"/>
-              <a:t>2/10/2018</a:t>
+              <a:t>3/18/2018</a:t>
             </a:fld>
             <a:endParaRPr lang="en-US"/>
           </a:p>
@@ -8797,7 +9417,7 @@
           <a:p>
             <a:fld id="{699DC775-C286-4358-8C92-D7E584E969B3}" type="datetimeFigureOut">
               <a:rPr lang="en-US" smtClean="0"/>
-              <a:t>2/10/2018</a:t>
+              <a:t>3/18/2018</a:t>
             </a:fld>
             <a:endParaRPr lang="en-US"/>
           </a:p>
@@ -9057,7 +9677,7 @@
           <a:p>
             <a:fld id="{699DC775-C286-4358-8C92-D7E584E969B3}" type="datetimeFigureOut">
               <a:rPr lang="en-US" smtClean="0"/>
-              <a:t>2/10/2018</a:t>
+              <a:t>3/18/2018</a:t>
             </a:fld>
             <a:endParaRPr lang="en-US"/>
           </a:p>
@@ -9233,7 +9853,7 @@
           <a:p>
             <a:fld id="{699DC775-C286-4358-8C92-D7E584E969B3}" type="datetimeFigureOut">
               <a:rPr lang="en-US" smtClean="0"/>
-              <a:t>2/10/2018</a:t>
+              <a:t>3/18/2018</a:t>
             </a:fld>
             <a:endParaRPr lang="en-US"/>
           </a:p>
@@ -9419,7 +10039,7 @@
           <a:p>
             <a:fld id="{699DC775-C286-4358-8C92-D7E584E969B3}" type="datetimeFigureOut">
               <a:rPr lang="en-US" smtClean="0"/>
-              <a:t>2/10/2018</a:t>
+              <a:t>3/18/2018</a:t>
             </a:fld>
             <a:endParaRPr lang="en-US"/>
           </a:p>
@@ -9609,7 +10229,7 @@
           <a:p>
             <a:fld id="{45696B32-6A70-48EC-8939-9D142D9557CD}" type="datetimeFigureOut">
               <a:rPr lang="en-US" smtClean="0"/>
-              <a:t>2/10/2018</a:t>
+              <a:t>3/18/2018</a:t>
             </a:fld>
             <a:endParaRPr lang="en-US"/>
           </a:p>
@@ -9923,7 +10543,7 @@
           <a:p>
             <a:fld id="{45696B32-6A70-48EC-8939-9D142D9557CD}" type="datetimeFigureOut">
               <a:rPr lang="en-US" smtClean="0"/>
-              <a:t>2/10/2018</a:t>
+              <a:t>3/18/2018</a:t>
             </a:fld>
             <a:endParaRPr lang="en-US"/>
           </a:p>
@@ -10168,7 +10788,7 @@
           <a:p>
             <a:fld id="{45696B32-6A70-48EC-8939-9D142D9557CD}" type="datetimeFigureOut">
               <a:rPr lang="en-US" smtClean="0"/>
-              <a:t>2/10/2018</a:t>
+              <a:t>3/18/2018</a:t>
             </a:fld>
             <a:endParaRPr lang="en-US"/>
           </a:p>
@@ -10397,7 +11017,7 @@
           <a:p>
             <a:fld id="{45696B32-6A70-48EC-8939-9D142D9557CD}" type="datetimeFigureOut">
               <a:rPr lang="en-US" smtClean="0"/>
-              <a:t>2/10/2018</a:t>
+              <a:t>3/18/2018</a:t>
             </a:fld>
             <a:endParaRPr lang="en-US"/>
           </a:p>
@@ -10761,7 +11381,7 @@
           <a:p>
             <a:fld id="{45696B32-6A70-48EC-8939-9D142D9557CD}" type="datetimeFigureOut">
               <a:rPr lang="en-US" smtClean="0"/>
-              <a:t>2/10/2018</a:t>
+              <a:t>3/18/2018</a:t>
             </a:fld>
             <a:endParaRPr lang="en-US"/>
           </a:p>
@@ -10878,7 +11498,7 @@
           <a:p>
             <a:fld id="{45696B32-6A70-48EC-8939-9D142D9557CD}" type="datetimeFigureOut">
               <a:rPr lang="en-US" smtClean="0"/>
-              <a:t>2/10/2018</a:t>
+              <a:t>3/18/2018</a:t>
             </a:fld>
             <a:endParaRPr lang="en-US"/>
           </a:p>
@@ -11163,7 +11783,7 @@
           <a:p>
             <a:fld id="{699DC775-C286-4358-8C92-D7E584E969B3}" type="datetimeFigureOut">
               <a:rPr lang="en-US" smtClean="0"/>
-              <a:t>2/10/2018</a:t>
+              <a:t>3/18/2018</a:t>
             </a:fld>
             <a:endParaRPr lang="en-US"/>
           </a:p>
@@ -11258,7 +11878,7 @@
           <a:p>
             <a:fld id="{45696B32-6A70-48EC-8939-9D142D9557CD}" type="datetimeFigureOut">
               <a:rPr lang="en-US" smtClean="0"/>
-              <a:t>2/10/2018</a:t>
+              <a:t>3/18/2018</a:t>
             </a:fld>
             <a:endParaRPr lang="en-US"/>
           </a:p>
@@ -11533,7 +12153,7 @@
           <a:p>
             <a:fld id="{45696B32-6A70-48EC-8939-9D142D9557CD}" type="datetimeFigureOut">
               <a:rPr lang="en-US" smtClean="0"/>
-              <a:t>2/10/2018</a:t>
+              <a:t>3/18/2018</a:t>
             </a:fld>
             <a:endParaRPr lang="en-US"/>
           </a:p>
@@ -11785,7 +12405,7 @@
           <a:p>
             <a:fld id="{45696B32-6A70-48EC-8939-9D142D9557CD}" type="datetimeFigureOut">
               <a:rPr lang="en-US" smtClean="0"/>
-              <a:t>2/10/2018</a:t>
+              <a:t>3/18/2018</a:t>
             </a:fld>
             <a:endParaRPr lang="en-US"/>
           </a:p>
@@ -11953,7 +12573,7 @@
           <a:p>
             <a:fld id="{45696B32-6A70-48EC-8939-9D142D9557CD}" type="datetimeFigureOut">
               <a:rPr lang="en-US" smtClean="0"/>
-              <a:t>2/10/2018</a:t>
+              <a:t>3/18/2018</a:t>
             </a:fld>
             <a:endParaRPr lang="en-US"/>
           </a:p>
@@ -12131,7 +12751,7 @@
           <a:p>
             <a:fld id="{45696B32-6A70-48EC-8939-9D142D9557CD}" type="datetimeFigureOut">
               <a:rPr lang="en-US" smtClean="0"/>
-              <a:t>2/10/2018</a:t>
+              <a:t>3/18/2018</a:t>
             </a:fld>
             <a:endParaRPr lang="en-US"/>
           </a:p>
@@ -12550,7 +13170,7 @@
           <a:p>
             <a:fld id="{699DC775-C286-4358-8C92-D7E584E969B3}" type="datetimeFigureOut">
               <a:rPr lang="en-US" smtClean="0"/>
-              <a:t>2/10/2018</a:t>
+              <a:t>3/18/2018</a:t>
             </a:fld>
             <a:endParaRPr lang="en-US"/>
           </a:p>
@@ -12667,7 +13287,7 @@
           <a:p>
             <a:fld id="{699DC775-C286-4358-8C92-D7E584E969B3}" type="datetimeFigureOut">
               <a:rPr lang="en-US" smtClean="0"/>
-              <a:t>2/10/2018</a:t>
+              <a:t>3/18/2018</a:t>
             </a:fld>
             <a:endParaRPr lang="en-US"/>
           </a:p>
@@ -12762,7 +13382,7 @@
           <a:p>
             <a:fld id="{699DC775-C286-4358-8C92-D7E584E969B3}" type="datetimeFigureOut">
               <a:rPr lang="en-US" smtClean="0"/>
-              <a:t>2/10/2018</a:t>
+              <a:t>3/18/2018</a:t>
             </a:fld>
             <a:endParaRPr lang="en-US"/>
           </a:p>
@@ -13037,7 +13657,7 @@
           <a:p>
             <a:fld id="{699DC775-C286-4358-8C92-D7E584E969B3}" type="datetimeFigureOut">
               <a:rPr lang="en-US" smtClean="0"/>
-              <a:t>2/10/2018</a:t>
+              <a:t>3/18/2018</a:t>
             </a:fld>
             <a:endParaRPr lang="en-US"/>
           </a:p>
@@ -13289,7 +13909,7 @@
           <a:p>
             <a:fld id="{699DC775-C286-4358-8C92-D7E584E969B3}" type="datetimeFigureOut">
               <a:rPr lang="en-US" smtClean="0"/>
-              <a:t>2/10/2018</a:t>
+              <a:t>3/18/2018</a:t>
             </a:fld>
             <a:endParaRPr lang="en-US"/>
           </a:p>
@@ -13500,7 +14120,7 @@
           <a:p>
             <a:fld id="{699DC775-C286-4358-8C92-D7E584E969B3}" type="datetimeFigureOut">
               <a:rPr lang="en-US" smtClean="0"/>
-              <a:t>2/10/2018</a:t>
+              <a:t>3/18/2018</a:t>
             </a:fld>
             <a:endParaRPr lang="en-US"/>
           </a:p>
@@ -14013,7 +14633,7 @@
           <a:p>
             <a:fld id="{699DC775-C286-4358-8C92-D7E584E969B3}" type="datetimeFigureOut">
               <a:rPr lang="en-US" smtClean="0"/>
-              <a:t>2/10/2018</a:t>
+              <a:t>3/18/2018</a:t>
             </a:fld>
             <a:endParaRPr lang="en-US"/>
           </a:p>
@@ -14524,7 +15144,7 @@
           <a:p>
             <a:fld id="{699DC775-C286-4358-8C92-D7E584E969B3}" type="datetimeFigureOut">
               <a:rPr lang="en-US" smtClean="0"/>
-              <a:t>2/10/2018</a:t>
+              <a:t>3/18/2018</a:t>
             </a:fld>
             <a:endParaRPr lang="en-US"/>
           </a:p>
@@ -15032,7 +15652,7 @@
           <a:p>
             <a:fld id="{45696B32-6A70-48EC-8939-9D142D9557CD}" type="datetimeFigureOut">
               <a:rPr lang="en-US" smtClean="0"/>
-              <a:t>2/10/2018</a:t>
+              <a:t>3/18/2018</a:t>
             </a:fld>
             <a:endParaRPr lang="en-US"/>
           </a:p>
@@ -18932,6 +19552,1071 @@
   <p:clrMapOvr>
     <a:masterClrMapping/>
   </p:clrMapOvr>
+</p:sld>
+</file>
+
+<file path=ppt/slides/slide34.xml><?xml version="1.0" encoding="utf-8"?>
+<p:sld xmlns:a="http://schemas.openxmlformats.org/drawingml/2006/main" xmlns:r="http://schemas.openxmlformats.org/officeDocument/2006/relationships" xmlns:p="http://schemas.openxmlformats.org/presentationml/2006/main">
+  <p:cSld>
+    <p:spTree>
+      <p:nvGrpSpPr>
+        <p:cNvPr id="1" name=""/>
+        <p:cNvGrpSpPr/>
+        <p:nvPr/>
+      </p:nvGrpSpPr>
+      <p:grpSpPr>
+        <a:xfrm>
+          <a:off x="0" y="0"/>
+          <a:ext cx="0" cy="0"/>
+          <a:chOff x="0" y="0"/>
+          <a:chExt cx="0" cy="0"/>
+        </a:xfrm>
+      </p:grpSpPr>
+      <p:sp>
+        <p:nvSpPr>
+          <p:cNvPr id="2" name="Title 1"/>
+          <p:cNvSpPr>
+            <a:spLocks noGrp="1"/>
+          </p:cNvSpPr>
+          <p:nvPr>
+            <p:ph type="title"/>
+          </p:nvPr>
+        </p:nvSpPr>
+        <p:spPr/>
+        <p:txBody>
+          <a:bodyPr/>
+          <a:lstStyle/>
+          <a:p>
+            <a:r>
+              <a:rPr lang="en-US" dirty="0"/>
+              <a:t>Paste:: </a:t>
+            </a:r>
+            <a:r>
+              <a:rPr lang="en-US" dirty="0" smtClean="0"/>
+              <a:t>Is Clipboard Restored?</a:t>
+            </a:r>
+            <a:endParaRPr lang="en-SG" dirty="0"/>
+          </a:p>
+        </p:txBody>
+      </p:sp>
+      <p:sp>
+        <p:nvSpPr>
+          <p:cNvPr id="4" name="Content Placeholder 3"/>
+          <p:cNvSpPr>
+            <a:spLocks noGrp="1"/>
+          </p:cNvSpPr>
+          <p:nvPr>
+            <p:ph idx="1"/>
+          </p:nvPr>
+        </p:nvSpPr>
+        <p:spPr/>
+        <p:txBody>
+          <a:bodyPr/>
+          <a:lstStyle/>
+          <a:p>
+            <a:pPr marL="0" indent="0">
+              <a:buNone/>
+            </a:pPr>
+            <a:r>
+              <a:rPr lang="en-US" b="1" dirty="0" smtClean="0"/>
+              <a:t>Additional instructions:</a:t>
+            </a:r>
+          </a:p>
+          <a:p>
+            <a:pPr marL="285750" indent="-285750"/>
+            <a:r>
+              <a:rPr lang="en-US" dirty="0" smtClean="0"/>
+              <a:t>Do Replace With Clipboard and Paste Into Group as usual</a:t>
+            </a:r>
+          </a:p>
+          <a:p>
+            <a:pPr marL="285750" indent="-285750"/>
+            <a:r>
+              <a:rPr lang="en-US" dirty="0" smtClean="0"/>
+              <a:t>Check if clipboard is restored</a:t>
+            </a:r>
+            <a:endParaRPr lang="en-US" dirty="0"/>
+          </a:p>
+        </p:txBody>
+      </p:sp>
+    </p:spTree>
+    <p:extLst>
+      <p:ext uri="{BB962C8B-B14F-4D97-AF65-F5344CB8AC3E}">
+        <p14:creationId xmlns:p14="http://schemas.microsoft.com/office/powerpoint/2010/main" val="2817971980"/>
+      </p:ext>
+    </p:extLst>
+  </p:cSld>
+  <p:clrMapOvr>
+    <a:masterClrMapping/>
+  </p:clrMapOvr>
+</p:sld>
+</file>
+
+<file path=ppt/slides/slide35.xml><?xml version="1.0" encoding="utf-8"?>
+<p:sld xmlns:a="http://schemas.openxmlformats.org/drawingml/2006/main" xmlns:r="http://schemas.openxmlformats.org/officeDocument/2006/relationships" xmlns:p="http://schemas.openxmlformats.org/presentationml/2006/main">
+  <p:cSld>
+    <p:spTree>
+      <p:nvGrpSpPr>
+        <p:cNvPr id="1" name=""/>
+        <p:cNvGrpSpPr/>
+        <p:nvPr/>
+      </p:nvGrpSpPr>
+      <p:grpSpPr>
+        <a:xfrm>
+          <a:off x="0" y="0"/>
+          <a:ext cx="0" cy="0"/>
+          <a:chOff x="0" y="0"/>
+          <a:chExt cx="0" cy="0"/>
+        </a:xfrm>
+      </p:grpSpPr>
+      <p:sp>
+        <p:nvSpPr>
+          <p:cNvPr id="5" name="Rectangle 4"/>
+          <p:cNvSpPr/>
+          <p:nvPr/>
+        </p:nvSpPr>
+        <p:spPr>
+          <a:xfrm>
+            <a:off x="914400" y="1116842"/>
+            <a:ext cx="1981200" cy="2057400"/>
+          </a:xfrm>
+          <a:prstGeom prst="rect">
+            <a:avLst/>
+          </a:prstGeom>
+          <a:solidFill>
+            <a:srgbClr val="FF0000"/>
+          </a:solidFill>
+        </p:spPr>
+        <p:style>
+          <a:lnRef idx="2">
+            <a:schemeClr val="accent1">
+              <a:shade val="50000"/>
+            </a:schemeClr>
+          </a:lnRef>
+          <a:fillRef idx="1">
+            <a:schemeClr val="accent1"/>
+          </a:fillRef>
+          <a:effectRef idx="0">
+            <a:schemeClr val="accent1"/>
+          </a:effectRef>
+          <a:fontRef idx="minor">
+            <a:schemeClr val="lt1"/>
+          </a:fontRef>
+        </p:style>
+        <p:txBody>
+          <a:bodyPr rtlCol="0" anchor="ctr"/>
+          <a:lstStyle/>
+          <a:p>
+            <a:pPr algn="ctr"/>
+            <a:endParaRPr lang="en-US"/>
+          </a:p>
+        </p:txBody>
+      </p:sp>
+      <p:sp>
+        <p:nvSpPr>
+          <p:cNvPr id="6" name="Rectangle 5"/>
+          <p:cNvSpPr/>
+          <p:nvPr/>
+        </p:nvSpPr>
+        <p:spPr>
+          <a:xfrm>
+            <a:off x="1447800" y="1650242"/>
+            <a:ext cx="1981200" cy="2057400"/>
+          </a:xfrm>
+          <a:prstGeom prst="rect">
+            <a:avLst/>
+          </a:prstGeom>
+          <a:solidFill>
+            <a:srgbClr val="00B050"/>
+          </a:solidFill>
+        </p:spPr>
+        <p:style>
+          <a:lnRef idx="2">
+            <a:schemeClr val="accent1">
+              <a:shade val="50000"/>
+            </a:schemeClr>
+          </a:lnRef>
+          <a:fillRef idx="1">
+            <a:schemeClr val="accent1"/>
+          </a:fillRef>
+          <a:effectRef idx="0">
+            <a:schemeClr val="accent1"/>
+          </a:effectRef>
+          <a:fontRef idx="minor">
+            <a:schemeClr val="lt1"/>
+          </a:fontRef>
+        </p:style>
+        <p:txBody>
+          <a:bodyPr rtlCol="0" anchor="ctr"/>
+          <a:lstStyle/>
+          <a:p>
+            <a:pPr algn="ctr"/>
+            <a:endParaRPr lang="en-US"/>
+          </a:p>
+        </p:txBody>
+      </p:sp>
+      <p:sp>
+        <p:nvSpPr>
+          <p:cNvPr id="7" name="Rectangle 6"/>
+          <p:cNvSpPr/>
+          <p:nvPr/>
+        </p:nvSpPr>
+        <p:spPr>
+          <a:xfrm>
+            <a:off x="1981200" y="2209800"/>
+            <a:ext cx="1981200" cy="2057400"/>
+          </a:xfrm>
+          <a:prstGeom prst="rect">
+            <a:avLst/>
+          </a:prstGeom>
+          <a:solidFill>
+            <a:srgbClr val="0070C0"/>
+          </a:solidFill>
+        </p:spPr>
+        <p:style>
+          <a:lnRef idx="2">
+            <a:schemeClr val="accent1">
+              <a:shade val="50000"/>
+            </a:schemeClr>
+          </a:lnRef>
+          <a:fillRef idx="1">
+            <a:schemeClr val="accent1"/>
+          </a:fillRef>
+          <a:effectRef idx="0">
+            <a:schemeClr val="accent1"/>
+          </a:effectRef>
+          <a:fontRef idx="minor">
+            <a:schemeClr val="lt1"/>
+          </a:fontRef>
+        </p:style>
+        <p:txBody>
+          <a:bodyPr rtlCol="0" anchor="ctr"/>
+          <a:lstStyle/>
+          <a:p>
+            <a:pPr algn="ctr"/>
+            <a:endParaRPr lang="en-US"/>
+          </a:p>
+        </p:txBody>
+      </p:sp>
+      <p:pic>
+        <p:nvPicPr>
+          <p:cNvPr id="8" name="selectMe"/>
+          <p:cNvPicPr>
+            <a:picLocks noChangeAspect="1"/>
+          </p:cNvPicPr>
+          <p:nvPr/>
+        </p:nvPicPr>
+        <p:blipFill>
+          <a:blip r:embed="rId3">
+            <a:extLst>
+              <a:ext uri="{28A0092B-C50C-407E-A947-70E740481C1C}">
+                <a14:useLocalDpi xmlns:a14="http://schemas.microsoft.com/office/drawing/2010/main" val="0"/>
+              </a:ext>
+            </a:extLst>
+          </a:blip>
+          <a:stretch>
+            <a:fillRect/>
+          </a:stretch>
+        </p:blipFill>
+        <p:spPr>
+          <a:xfrm>
+            <a:off x="4343400" y="1208782"/>
+            <a:ext cx="4572000" cy="3058418"/>
+          </a:xfrm>
+          <a:prstGeom prst="rect">
+            <a:avLst/>
+          </a:prstGeom>
+        </p:spPr>
+      </p:pic>
+    </p:spTree>
+    <p:extLst>
+      <p:ext uri="{BB962C8B-B14F-4D97-AF65-F5344CB8AC3E}">
+        <p14:creationId xmlns:p14="http://schemas.microsoft.com/office/powerpoint/2010/main" val="2019145679"/>
+      </p:ext>
+    </p:extLst>
+  </p:cSld>
+  <p:clrMapOvr>
+    <a:masterClrMapping/>
+  </p:clrMapOvr>
+</p:sld>
+</file>
+
+<file path=ppt/slides/slide36.xml><?xml version="1.0" encoding="utf-8"?>
+<p:sld xmlns:a="http://schemas.openxmlformats.org/drawingml/2006/main" xmlns:r="http://schemas.openxmlformats.org/officeDocument/2006/relationships" xmlns:p="http://schemas.openxmlformats.org/presentationml/2006/main">
+  <p:cSld>
+    <p:spTree>
+      <p:nvGrpSpPr>
+        <p:cNvPr id="1" name=""/>
+        <p:cNvGrpSpPr/>
+        <p:nvPr/>
+      </p:nvGrpSpPr>
+      <p:grpSpPr>
+        <a:xfrm>
+          <a:off x="0" y="0"/>
+          <a:ext cx="0" cy="0"/>
+          <a:chOff x="0" y="0"/>
+          <a:chExt cx="0" cy="0"/>
+        </a:xfrm>
+      </p:grpSpPr>
+      <p:sp>
+        <p:nvSpPr>
+          <p:cNvPr id="5" name="Rectangle 4"/>
+          <p:cNvSpPr/>
+          <p:nvPr/>
+        </p:nvSpPr>
+        <p:spPr>
+          <a:xfrm>
+            <a:off x="914400" y="1116842"/>
+            <a:ext cx="1981200" cy="2057400"/>
+          </a:xfrm>
+          <a:prstGeom prst="rect">
+            <a:avLst/>
+          </a:prstGeom>
+          <a:solidFill>
+            <a:srgbClr val="FF0000"/>
+          </a:solidFill>
+        </p:spPr>
+        <p:style>
+          <a:lnRef idx="2">
+            <a:schemeClr val="accent1">
+              <a:shade val="50000"/>
+            </a:schemeClr>
+          </a:lnRef>
+          <a:fillRef idx="1">
+            <a:schemeClr val="accent1"/>
+          </a:fillRef>
+          <a:effectRef idx="0">
+            <a:schemeClr val="accent1"/>
+          </a:effectRef>
+          <a:fontRef idx="minor">
+            <a:schemeClr val="lt1"/>
+          </a:fontRef>
+        </p:style>
+        <p:txBody>
+          <a:bodyPr rtlCol="0" anchor="ctr"/>
+          <a:lstStyle/>
+          <a:p>
+            <a:pPr algn="ctr"/>
+            <a:endParaRPr lang="en-US"/>
+          </a:p>
+        </p:txBody>
+      </p:sp>
+      <p:pic>
+        <p:nvPicPr>
+          <p:cNvPr id="10" name="selectMe"/>
+          <p:cNvPicPr>
+            <a:picLocks noChangeAspect="1"/>
+          </p:cNvPicPr>
+          <p:nvPr/>
+        </p:nvPicPr>
+        <p:blipFill>
+          <a:blip r:embed="rId3">
+            <a:extLst>
+              <a:ext uri="{28A0092B-C50C-407E-A947-70E740481C1C}">
+                <a14:useLocalDpi xmlns:a14="http://schemas.microsoft.com/office/drawing/2010/main" val="0"/>
+              </a:ext>
+            </a:extLst>
+          </a:blip>
+          <a:stretch>
+            <a:fillRect/>
+          </a:stretch>
+        </p:blipFill>
+        <p:spPr>
+          <a:xfrm>
+            <a:off x="1447800" y="1650242"/>
+            <a:ext cx="4572000" cy="3058418"/>
+          </a:xfrm>
+          <a:prstGeom prst="rect">
+            <a:avLst/>
+          </a:prstGeom>
+        </p:spPr>
+      </p:pic>
+      <p:sp>
+        <p:nvSpPr>
+          <p:cNvPr id="7" name="Rectangle 6"/>
+          <p:cNvSpPr/>
+          <p:nvPr/>
+        </p:nvSpPr>
+        <p:spPr>
+          <a:xfrm>
+            <a:off x="1981200" y="2209800"/>
+            <a:ext cx="1981200" cy="2057400"/>
+          </a:xfrm>
+          <a:prstGeom prst="rect">
+            <a:avLst/>
+          </a:prstGeom>
+          <a:solidFill>
+            <a:srgbClr val="0070C0"/>
+          </a:solidFill>
+        </p:spPr>
+        <p:style>
+          <a:lnRef idx="2">
+            <a:schemeClr val="accent1">
+              <a:shade val="50000"/>
+            </a:schemeClr>
+          </a:lnRef>
+          <a:fillRef idx="1">
+            <a:schemeClr val="accent1"/>
+          </a:fillRef>
+          <a:effectRef idx="0">
+            <a:schemeClr val="accent1"/>
+          </a:effectRef>
+          <a:fontRef idx="minor">
+            <a:schemeClr val="lt1"/>
+          </a:fontRef>
+        </p:style>
+        <p:txBody>
+          <a:bodyPr rtlCol="0" anchor="ctr"/>
+          <a:lstStyle/>
+          <a:p>
+            <a:pPr algn="ctr"/>
+            <a:endParaRPr lang="en-US"/>
+          </a:p>
+        </p:txBody>
+      </p:sp>
+      <p:pic>
+        <p:nvPicPr>
+          <p:cNvPr id="12" name="copied"/>
+          <p:cNvPicPr>
+            <a:picLocks noChangeAspect="1"/>
+          </p:cNvPicPr>
+          <p:nvPr/>
+        </p:nvPicPr>
+        <p:blipFill>
+          <a:blip r:embed="rId3">
+            <a:extLst>
+              <a:ext uri="{28A0092B-C50C-407E-A947-70E740481C1C}">
+                <a14:useLocalDpi xmlns:a14="http://schemas.microsoft.com/office/drawing/2010/main" val="0"/>
+              </a:ext>
+            </a:extLst>
+          </a:blip>
+          <a:stretch>
+            <a:fillRect/>
+          </a:stretch>
+        </p:blipFill>
+        <p:spPr>
+          <a:xfrm>
+            <a:off x="4343400" y="1208782"/>
+            <a:ext cx="4572000" cy="3058418"/>
+          </a:xfrm>
+          <a:prstGeom prst="rect">
+            <a:avLst/>
+          </a:prstGeom>
+        </p:spPr>
+      </p:pic>
+    </p:spTree>
+    <p:extLst>
+      <p:ext uri="{BB962C8B-B14F-4D97-AF65-F5344CB8AC3E}">
+        <p14:creationId xmlns:p14="http://schemas.microsoft.com/office/powerpoint/2010/main" val="2330357643"/>
+      </p:ext>
+    </p:extLst>
+  </p:cSld>
+  <p:clrMapOvr>
+    <a:masterClrMapping/>
+  </p:clrMapOvr>
+</p:sld>
+</file>
+
+<file path=ppt/slides/slide37.xml><?xml version="1.0" encoding="utf-8"?>
+<p:sld xmlns:a="http://schemas.openxmlformats.org/drawingml/2006/main" xmlns:r="http://schemas.openxmlformats.org/officeDocument/2006/relationships" xmlns:p="http://schemas.openxmlformats.org/presentationml/2006/main">
+  <p:cSld>
+    <p:spTree>
+      <p:nvGrpSpPr>
+        <p:cNvPr id="1" name=""/>
+        <p:cNvGrpSpPr/>
+        <p:nvPr/>
+      </p:nvGrpSpPr>
+      <p:grpSpPr>
+        <a:xfrm>
+          <a:off x="0" y="0"/>
+          <a:ext cx="0" cy="0"/>
+          <a:chOff x="0" y="0"/>
+          <a:chExt cx="0" cy="0"/>
+        </a:xfrm>
+      </p:grpSpPr>
+      <p:grpSp>
+        <p:nvGrpSpPr>
+          <p:cNvPr id="44" name="Group 1"/>
+          <p:cNvGrpSpPr/>
+          <p:nvPr/>
+        </p:nvGrpSpPr>
+        <p:grpSpPr>
+          <a:xfrm>
+            <a:off x="914400" y="1116842"/>
+            <a:ext cx="3048000" cy="3150358"/>
+            <a:chOff x="914400" y="1116842"/>
+            <a:chExt cx="3048000" cy="3150358"/>
+          </a:xfrm>
+        </p:grpSpPr>
+        <p:sp>
+          <p:nvSpPr>
+            <p:cNvPr id="5" name="Rectangle 4"/>
+            <p:cNvSpPr/>
+            <p:nvPr/>
+          </p:nvSpPr>
+          <p:spPr>
+            <a:xfrm>
+              <a:off x="914400" y="1116842"/>
+              <a:ext cx="1981200" cy="2057400"/>
+            </a:xfrm>
+            <a:prstGeom prst="rect">
+              <a:avLst/>
+            </a:prstGeom>
+            <a:solidFill>
+              <a:srgbClr val="FF0000"/>
+            </a:solidFill>
+          </p:spPr>
+          <p:style>
+            <a:lnRef idx="2">
+              <a:schemeClr val="accent1">
+                <a:shade val="50000"/>
+              </a:schemeClr>
+            </a:lnRef>
+            <a:fillRef idx="1">
+              <a:schemeClr val="accent1"/>
+            </a:fillRef>
+            <a:effectRef idx="0">
+              <a:schemeClr val="accent1"/>
+            </a:effectRef>
+            <a:fontRef idx="minor">
+              <a:schemeClr val="lt1"/>
+            </a:fontRef>
+          </p:style>
+          <p:txBody>
+            <a:bodyPr rtlCol="0" anchor="ctr"/>
+            <a:lstStyle/>
+            <a:p>
+              <a:pPr algn="ctr"/>
+              <a:endParaRPr lang="en-US"/>
+            </a:p>
+          </p:txBody>
+        </p:sp>
+        <p:sp>
+          <p:nvSpPr>
+            <p:cNvPr id="6" name="Rectangle 5"/>
+            <p:cNvSpPr/>
+            <p:nvPr/>
+          </p:nvSpPr>
+          <p:spPr>
+            <a:xfrm>
+              <a:off x="1447800" y="1650242"/>
+              <a:ext cx="1981200" cy="2057400"/>
+            </a:xfrm>
+            <a:prstGeom prst="rect">
+              <a:avLst/>
+            </a:prstGeom>
+            <a:solidFill>
+              <a:srgbClr val="00B050"/>
+            </a:solidFill>
+          </p:spPr>
+          <p:style>
+            <a:lnRef idx="2">
+              <a:schemeClr val="accent1">
+                <a:shade val="50000"/>
+              </a:schemeClr>
+            </a:lnRef>
+            <a:fillRef idx="1">
+              <a:schemeClr val="accent1"/>
+            </a:fillRef>
+            <a:effectRef idx="0">
+              <a:schemeClr val="accent1"/>
+            </a:effectRef>
+            <a:fontRef idx="minor">
+              <a:schemeClr val="lt1"/>
+            </a:fontRef>
+          </p:style>
+          <p:txBody>
+            <a:bodyPr rtlCol="0" anchor="ctr"/>
+            <a:lstStyle/>
+            <a:p>
+              <a:pPr algn="ctr"/>
+              <a:endParaRPr lang="en-US"/>
+            </a:p>
+          </p:txBody>
+        </p:sp>
+        <p:sp>
+          <p:nvSpPr>
+            <p:cNvPr id="7" name="Rectangle 6"/>
+            <p:cNvSpPr/>
+            <p:nvPr/>
+          </p:nvSpPr>
+          <p:spPr>
+            <a:xfrm>
+              <a:off x="1981200" y="2209800"/>
+              <a:ext cx="1981200" cy="2057400"/>
+            </a:xfrm>
+            <a:prstGeom prst="rect">
+              <a:avLst/>
+            </a:prstGeom>
+            <a:solidFill>
+              <a:srgbClr val="0070C0"/>
+            </a:solidFill>
+          </p:spPr>
+          <p:style>
+            <a:lnRef idx="2">
+              <a:schemeClr val="accent1">
+                <a:shade val="50000"/>
+              </a:schemeClr>
+            </a:lnRef>
+            <a:fillRef idx="1">
+              <a:schemeClr val="accent1"/>
+            </a:fillRef>
+            <a:effectRef idx="0">
+              <a:schemeClr val="accent1"/>
+            </a:effectRef>
+            <a:fontRef idx="minor">
+              <a:schemeClr val="lt1"/>
+            </a:fontRef>
+          </p:style>
+          <p:txBody>
+            <a:bodyPr rtlCol="0" anchor="ctr"/>
+            <a:lstStyle/>
+            <a:p>
+              <a:pPr algn="ctr"/>
+              <a:endParaRPr lang="en-US"/>
+            </a:p>
+          </p:txBody>
+        </p:sp>
+      </p:grpSp>
+      <p:pic>
+        <p:nvPicPr>
+          <p:cNvPr id="8" name="selectMe"/>
+          <p:cNvPicPr>
+            <a:picLocks noChangeAspect="1"/>
+          </p:cNvPicPr>
+          <p:nvPr/>
+        </p:nvPicPr>
+        <p:blipFill>
+          <a:blip r:embed="rId3">
+            <a:extLst>
+              <a:ext uri="{28A0092B-C50C-407E-A947-70E740481C1C}">
+                <a14:useLocalDpi xmlns:a14="http://schemas.microsoft.com/office/drawing/2010/main" val="0"/>
+              </a:ext>
+            </a:extLst>
+          </a:blip>
+          <a:stretch>
+            <a:fillRect/>
+          </a:stretch>
+        </p:blipFill>
+        <p:spPr>
+          <a:xfrm>
+            <a:off x="4343400" y="1208782"/>
+            <a:ext cx="4572000" cy="3058418"/>
+          </a:xfrm>
+          <a:prstGeom prst="rect">
+            <a:avLst/>
+          </a:prstGeom>
+        </p:spPr>
+      </p:pic>
+    </p:spTree>
+    <p:extLst>
+      <p:ext uri="{BB962C8B-B14F-4D97-AF65-F5344CB8AC3E}">
+        <p14:creationId xmlns:p14="http://schemas.microsoft.com/office/powerpoint/2010/main" val="3160745459"/>
+      </p:ext>
+    </p:extLst>
+  </p:cSld>
+  <p:clrMapOvr>
+    <a:masterClrMapping/>
+  </p:clrMapOvr>
+  <p:timing>
+    <p:tnLst>
+      <p:par>
+        <p:cTn id="1" dur="indefinite" restart="never" nodeType="tmRoot">
+          <p:childTnLst>
+            <p:seq concurrent="1" nextAc="seek">
+              <p:cTn id="2" dur="indefinite" nodeType="mainSeq">
+                <p:childTnLst>
+                  <p:par>
+                    <p:cTn id="3" fill="hold">
+                      <p:stCondLst>
+                        <p:cond delay="indefinite"/>
+                      </p:stCondLst>
+                      <p:childTnLst>
+                        <p:par>
+                          <p:cTn id="4" fill="hold">
+                            <p:stCondLst>
+                              <p:cond delay="0"/>
+                            </p:stCondLst>
+                            <p:childTnLst>
+                              <p:par>
+                                <p:cTn id="5" presetID="1" presetClass="entr" presetSubtype="0" fill="hold" nodeType="clickEffect">
+                                  <p:stCondLst>
+                                    <p:cond delay="0"/>
+                                  </p:stCondLst>
+                                  <p:childTnLst>
+                                    <p:set>
+                                      <p:cBhvr>
+                                        <p:cTn id="6" dur="1" fill="hold">
+                                          <p:stCondLst>
+                                            <p:cond delay="0"/>
+                                          </p:stCondLst>
+                                        </p:cTn>
+                                        <p:tgtEl>
+                                          <p:spTgt spid="44"/>
+                                        </p:tgtEl>
+                                        <p:attrNameLst>
+                                          <p:attrName>style.visibility</p:attrName>
+                                        </p:attrNameLst>
+                                      </p:cBhvr>
+                                      <p:to>
+                                        <p:strVal val="visible"/>
+                                      </p:to>
+                                    </p:set>
+                                  </p:childTnLst>
+                                </p:cTn>
+                              </p:par>
+                            </p:childTnLst>
+                          </p:cTn>
+                        </p:par>
+                      </p:childTnLst>
+                    </p:cTn>
+                  </p:par>
+                </p:childTnLst>
+              </p:cTn>
+              <p:prevCondLst>
+                <p:cond evt="onPrev" delay="0">
+                  <p:tgtEl>
+                    <p:sldTgt/>
+                  </p:tgtEl>
+                </p:cond>
+              </p:prevCondLst>
+              <p:nextCondLst>
+                <p:cond evt="onNext" delay="0">
+                  <p:tgtEl>
+                    <p:sldTgt/>
+                  </p:tgtEl>
+                </p:cond>
+              </p:nextCondLst>
+            </p:seq>
+          </p:childTnLst>
+        </p:cTn>
+      </p:par>
+    </p:tnLst>
+  </p:timing>
+</p:sld>
+</file>
+
+<file path=ppt/slides/slide38.xml><?xml version="1.0" encoding="utf-8"?>
+<p:sld xmlns:a="http://schemas.openxmlformats.org/drawingml/2006/main" xmlns:r="http://schemas.openxmlformats.org/officeDocument/2006/relationships" xmlns:p="http://schemas.openxmlformats.org/presentationml/2006/main">
+  <p:cSld>
+    <p:spTree>
+      <p:nvGrpSpPr>
+        <p:cNvPr id="1" name=""/>
+        <p:cNvGrpSpPr/>
+        <p:nvPr/>
+      </p:nvGrpSpPr>
+      <p:grpSpPr>
+        <a:xfrm>
+          <a:off x="0" y="0"/>
+          <a:ext cx="0" cy="0"/>
+          <a:chOff x="0" y="0"/>
+          <a:chExt cx="0" cy="0"/>
+        </a:xfrm>
+      </p:grpSpPr>
+      <p:grpSp>
+        <p:nvGrpSpPr>
+          <p:cNvPr id="2" name="Group 1"/>
+          <p:cNvGrpSpPr/>
+          <p:nvPr/>
+        </p:nvGrpSpPr>
+        <p:grpSpPr>
+          <a:xfrm>
+            <a:off x="152400" y="1116842"/>
+            <a:ext cx="4572000" cy="3150358"/>
+            <a:chOff x="152400" y="1116842"/>
+            <a:chExt cx="4572000" cy="3150358"/>
+          </a:xfrm>
+        </p:grpSpPr>
+        <p:grpSp>
+          <p:nvGrpSpPr>
+            <p:cNvPr id="9" name="Group 8"/>
+            <p:cNvGrpSpPr/>
+            <p:nvPr/>
+          </p:nvGrpSpPr>
+          <p:grpSpPr>
+            <a:xfrm>
+              <a:off x="914400" y="1116842"/>
+              <a:ext cx="3048000" cy="3150358"/>
+              <a:chOff x="914400" y="1116842"/>
+              <a:chExt cx="3048000" cy="3150358"/>
+            </a:xfrm>
+          </p:grpSpPr>
+          <p:sp>
+            <p:nvSpPr>
+              <p:cNvPr id="10" name="Rectangle 9"/>
+              <p:cNvSpPr/>
+              <p:nvPr/>
+            </p:nvSpPr>
+            <p:spPr>
+              <a:xfrm>
+                <a:off x="914400" y="1116842"/>
+                <a:ext cx="1981200" cy="2057400"/>
+              </a:xfrm>
+              <a:prstGeom prst="rect">
+                <a:avLst/>
+              </a:prstGeom>
+              <a:solidFill>
+                <a:srgbClr val="FF0000"/>
+              </a:solidFill>
+            </p:spPr>
+            <p:style>
+              <a:lnRef idx="2">
+                <a:schemeClr val="accent1">
+                  <a:shade val="50000"/>
+                </a:schemeClr>
+              </a:lnRef>
+              <a:fillRef idx="1">
+                <a:schemeClr val="accent1"/>
+              </a:fillRef>
+              <a:effectRef idx="0">
+                <a:schemeClr val="accent1"/>
+              </a:effectRef>
+              <a:fontRef idx="minor">
+                <a:schemeClr val="lt1"/>
+              </a:fontRef>
+            </p:style>
+            <p:txBody>
+              <a:bodyPr rtlCol="0" anchor="ctr"/>
+              <a:lstStyle/>
+              <a:p>
+                <a:pPr algn="ctr"/>
+                <a:endParaRPr lang="en-US"/>
+              </a:p>
+            </p:txBody>
+          </p:sp>
+          <p:sp>
+            <p:nvSpPr>
+              <p:cNvPr id="11" name="Rectangle 10"/>
+              <p:cNvSpPr/>
+              <p:nvPr/>
+            </p:nvSpPr>
+            <p:spPr>
+              <a:xfrm>
+                <a:off x="1447800" y="1650242"/>
+                <a:ext cx="1981200" cy="2057400"/>
+              </a:xfrm>
+              <a:prstGeom prst="rect">
+                <a:avLst/>
+              </a:prstGeom>
+              <a:solidFill>
+                <a:srgbClr val="00B050"/>
+              </a:solidFill>
+            </p:spPr>
+            <p:style>
+              <a:lnRef idx="2">
+                <a:schemeClr val="accent1">
+                  <a:shade val="50000"/>
+                </a:schemeClr>
+              </a:lnRef>
+              <a:fillRef idx="1">
+                <a:schemeClr val="accent1"/>
+              </a:fillRef>
+              <a:effectRef idx="0">
+                <a:schemeClr val="accent1"/>
+              </a:effectRef>
+              <a:fontRef idx="minor">
+                <a:schemeClr val="lt1"/>
+              </a:fontRef>
+            </p:style>
+            <p:txBody>
+              <a:bodyPr rtlCol="0" anchor="ctr"/>
+              <a:lstStyle/>
+              <a:p>
+                <a:pPr algn="ctr"/>
+                <a:endParaRPr lang="en-US"/>
+              </a:p>
+            </p:txBody>
+          </p:sp>
+          <p:sp>
+            <p:nvSpPr>
+              <p:cNvPr id="12" name="Rectangle 11"/>
+              <p:cNvSpPr/>
+              <p:nvPr/>
+            </p:nvSpPr>
+            <p:spPr>
+              <a:xfrm>
+                <a:off x="1981200" y="2209800"/>
+                <a:ext cx="1981200" cy="2057400"/>
+              </a:xfrm>
+              <a:prstGeom prst="rect">
+                <a:avLst/>
+              </a:prstGeom>
+              <a:solidFill>
+                <a:srgbClr val="0070C0"/>
+              </a:solidFill>
+            </p:spPr>
+            <p:style>
+              <a:lnRef idx="2">
+                <a:schemeClr val="accent1">
+                  <a:shade val="50000"/>
+                </a:schemeClr>
+              </a:lnRef>
+              <a:fillRef idx="1">
+                <a:schemeClr val="accent1"/>
+              </a:fillRef>
+              <a:effectRef idx="0">
+                <a:schemeClr val="accent1"/>
+              </a:effectRef>
+              <a:fontRef idx="minor">
+                <a:schemeClr val="lt1"/>
+              </a:fontRef>
+            </p:style>
+            <p:txBody>
+              <a:bodyPr rtlCol="0" anchor="ctr"/>
+              <a:lstStyle/>
+              <a:p>
+                <a:pPr algn="ctr"/>
+                <a:endParaRPr lang="en-US"/>
+              </a:p>
+            </p:txBody>
+          </p:sp>
+        </p:grpSp>
+        <p:pic>
+          <p:nvPicPr>
+            <p:cNvPr id="8" name="selectMe"/>
+            <p:cNvPicPr>
+              <a:picLocks noChangeAspect="1"/>
+            </p:cNvPicPr>
+            <p:nvPr/>
+          </p:nvPicPr>
+          <p:blipFill>
+            <a:blip r:embed="rId3">
+              <a:extLst>
+                <a:ext uri="{28A0092B-C50C-407E-A947-70E740481C1C}">
+                  <a14:useLocalDpi xmlns:a14="http://schemas.microsoft.com/office/drawing/2010/main" val="0"/>
+                </a:ext>
+              </a:extLst>
+            </a:blip>
+            <a:stretch>
+              <a:fillRect/>
+            </a:stretch>
+          </p:blipFill>
+          <p:spPr>
+            <a:xfrm>
+              <a:off x="152400" y="1162812"/>
+              <a:ext cx="4572000" cy="3058418"/>
+            </a:xfrm>
+            <a:prstGeom prst="rect">
+              <a:avLst/>
+            </a:prstGeom>
+          </p:spPr>
+        </p:pic>
+      </p:grpSp>
+      <p:pic>
+        <p:nvPicPr>
+          <p:cNvPr id="13" name="copied"/>
+          <p:cNvPicPr>
+            <a:picLocks noChangeAspect="1"/>
+          </p:cNvPicPr>
+          <p:nvPr/>
+        </p:nvPicPr>
+        <p:blipFill>
+          <a:blip r:embed="rId3">
+            <a:extLst>
+              <a:ext uri="{28A0092B-C50C-407E-A947-70E740481C1C}">
+                <a14:useLocalDpi xmlns:a14="http://schemas.microsoft.com/office/drawing/2010/main" val="0"/>
+              </a:ext>
+            </a:extLst>
+          </a:blip>
+          <a:stretch>
+            <a:fillRect/>
+          </a:stretch>
+        </p:blipFill>
+        <p:spPr>
+          <a:xfrm>
+            <a:off x="4343400" y="1208782"/>
+            <a:ext cx="4572000" cy="3058418"/>
+          </a:xfrm>
+          <a:prstGeom prst="rect">
+            <a:avLst/>
+          </a:prstGeom>
+        </p:spPr>
+      </p:pic>
+    </p:spTree>
+    <p:extLst>
+      <p:ext uri="{BB962C8B-B14F-4D97-AF65-F5344CB8AC3E}">
+        <p14:creationId xmlns:p14="http://schemas.microsoft.com/office/powerpoint/2010/main" val="147479287"/>
+      </p:ext>
+    </p:extLst>
+  </p:cSld>
+  <p:clrMapOvr>
+    <a:masterClrMapping/>
+  </p:clrMapOvr>
+  <p:timing>
+    <p:tnLst>
+      <p:par>
+        <p:cTn id="1" dur="indefinite" restart="never" nodeType="tmRoot">
+          <p:childTnLst>
+            <p:seq concurrent="1" nextAc="seek">
+              <p:cTn id="2" dur="indefinite" nodeType="mainSeq">
+                <p:childTnLst>
+                  <p:par>
+                    <p:cTn id="3" fill="hold">
+                      <p:stCondLst>
+                        <p:cond delay="indefinite"/>
+                      </p:stCondLst>
+                      <p:childTnLst>
+                        <p:par>
+                          <p:cTn id="4" fill="hold">
+                            <p:stCondLst>
+                              <p:cond delay="0"/>
+                            </p:stCondLst>
+                            <p:childTnLst>
+                              <p:par>
+                                <p:cTn id="5" presetID="1" presetClass="entr" presetSubtype="0" fill="hold" nodeType="clickEffect">
+                                  <p:stCondLst>
+                                    <p:cond delay="0"/>
+                                  </p:stCondLst>
+                                  <p:childTnLst>
+                                    <p:set>
+                                      <p:cBhvr>
+                                        <p:cTn id="6" dur="1" fill="hold">
+                                          <p:stCondLst>
+                                            <p:cond delay="0"/>
+                                          </p:stCondLst>
+                                        </p:cTn>
+                                        <p:tgtEl>
+                                          <p:spTgt spid="2"/>
+                                        </p:tgtEl>
+                                        <p:attrNameLst>
+                                          <p:attrName>style.visibility</p:attrName>
+                                        </p:attrNameLst>
+                                      </p:cBhvr>
+                                      <p:to>
+                                        <p:strVal val="visible"/>
+                                      </p:to>
+                                    </p:set>
+                                  </p:childTnLst>
+                                </p:cTn>
+                              </p:par>
+                            </p:childTnLst>
+                          </p:cTn>
+                        </p:par>
+                      </p:childTnLst>
+                    </p:cTn>
+                  </p:par>
+                </p:childTnLst>
+              </p:cTn>
+              <p:prevCondLst>
+                <p:cond evt="onPrev" delay="0">
+                  <p:tgtEl>
+                    <p:sldTgt/>
+                  </p:tgtEl>
+                </p:cond>
+              </p:prevCondLst>
+              <p:nextCondLst>
+                <p:cond evt="onNext" delay="0">
+                  <p:tgtEl>
+                    <p:sldTgt/>
+                  </p:tgtEl>
+                </p:cond>
+              </p:nextCondLst>
+            </p:seq>
+          </p:childTnLst>
+        </p:cTn>
+      </p:par>
+    </p:tnLst>
+  </p:timing>
 </p:sld>
 </file>
 

</xml_diff>